<commit_message>
Added EP in PPT
</commit_message>
<xml_diff>
--- a/docs/Slutredovisning_grp5_v8.pptx
+++ b/docs/Slutredovisning_grp5_v8.pptx
@@ -12010,25 +12010,41 @@
           </a:p>
         </p:txBody>
       </p:sp>
-      <p:sp>
-        <p:nvSpPr>
-          <p:cNvPr id="3" name="Platshållare för innehåll 2"/>
-          <p:cNvSpPr>
-            <a:spLocks noGrp="1"/>
-          </p:cNvSpPr>
+      <p:pic>
+        <p:nvPicPr>
+          <p:cNvPr id="14" name="Content Placeholder 13">
+            <a:extLst>
+              <a:ext uri="{FF2B5EF4-FFF2-40B4-BE49-F238E27FC236}">
+                <a16:creationId xmlns:a16="http://schemas.microsoft.com/office/drawing/2014/main" id="{702366A0-AB4E-B240-A8A6-87717022F6D9}"/>
+              </a:ext>
+            </a:extLst>
+          </p:cNvPr>
+          <p:cNvPicPr>
+            <a:picLocks noGrp="1" noChangeAspect="1"/>
+          </p:cNvPicPr>
           <p:nvPr>
             <p:ph idx="1"/>
           </p:nvPr>
-        </p:nvSpPr>
-        <p:spPr/>
-        <p:txBody>
-          <a:bodyPr/>
-          <a:lstStyle/>
-          <a:p>
-            <a:endParaRPr lang="sv-SE"/>
-          </a:p>
-        </p:txBody>
-      </p:sp>
+        </p:nvPicPr>
+        <p:blipFill>
+          <a:blip r:embed="rId4">
+            <a:extLst>
+              <a:ext uri="{28A0092B-C50C-407E-A947-70E740481C1C}">
+                <a14:useLocalDpi xmlns:a14="http://schemas.microsoft.com/office/drawing/2010/main" val="0"/>
+              </a:ext>
+            </a:extLst>
+          </a:blip>
+          <a:stretch>
+            <a:fillRect/>
+          </a:stretch>
+        </p:blipFill>
+        <p:spPr>
+          <a:xfrm>
+            <a:off x="4475931" y="1255366"/>
+            <a:ext cx="3664769" cy="4921597"/>
+          </a:xfrm>
+        </p:spPr>
+      </p:pic>
     </p:spTree>
     <p:custDataLst>
       <p:tags r:id="rId1"/>
@@ -12222,1183 +12238,77 @@
           </a:p>
         </p:txBody>
       </p:sp>
-      <p:graphicFrame>
-        <p:nvGraphicFramePr>
-          <p:cNvPr id="4" name="Content Placeholder 3">
+      <p:pic>
+        <p:nvPicPr>
+          <p:cNvPr id="7" name="Content Placeholder 6">
             <a:extLst>
               <a:ext uri="{FF2B5EF4-FFF2-40B4-BE49-F238E27FC236}">
-                <a16:creationId xmlns:a16="http://schemas.microsoft.com/office/drawing/2014/main" id="{72DD9D18-2ED2-6942-8C68-EB5FC6C38AD3}"/>
+                <a16:creationId xmlns:a16="http://schemas.microsoft.com/office/drawing/2014/main" id="{8FF3AB4D-8F59-0649-B99C-7CEBC25576D9}"/>
               </a:ext>
             </a:extLst>
           </p:cNvPr>
-          <p:cNvGraphicFramePr>
-            <a:graphicFrameLocks noGrp="1"/>
-          </p:cNvGraphicFramePr>
+          <p:cNvPicPr>
+            <a:picLocks noGrp="1" noChangeAspect="1"/>
+          </p:cNvPicPr>
           <p:nvPr>
             <p:ph idx="1"/>
-            <p:extLst>
-              <p:ext uri="{D42A27DB-BD31-4B8C-83A1-F6EECF244321}">
-                <p14:modId xmlns:p14="http://schemas.microsoft.com/office/powerpoint/2010/main" val="720735015"/>
-              </p:ext>
-            </p:extLst>
-          </p:nvPr>
-        </p:nvGraphicFramePr>
-        <p:xfrm>
-          <a:off x="838200" y="1825625"/>
-          <a:ext cx="10515600" cy="3708400"/>
-        </p:xfrm>
-        <a:graphic>
-          <a:graphicData uri="http://schemas.openxmlformats.org/drawingml/2006/table">
-            <a:tbl>
-              <a:tblPr firstRow="1" bandRow="1">
-                <a:tableStyleId>{5C22544A-7EE6-4342-B048-85BDC9FD1C3A}</a:tableStyleId>
-              </a:tblPr>
-              <a:tblGrid>
-                <a:gridCol w="1051560">
-                  <a:extLst>
-                    <a:ext uri="{9D8B030D-6E8A-4147-A177-3AD203B41FA5}">
-                      <a16:colId xmlns:a16="http://schemas.microsoft.com/office/drawing/2014/main" val="3184229283"/>
-                    </a:ext>
-                  </a:extLst>
-                </a:gridCol>
-                <a:gridCol w="1051560">
-                  <a:extLst>
-                    <a:ext uri="{9D8B030D-6E8A-4147-A177-3AD203B41FA5}">
-                      <a16:colId xmlns:a16="http://schemas.microsoft.com/office/drawing/2014/main" val="2611572147"/>
-                    </a:ext>
-                  </a:extLst>
-                </a:gridCol>
-                <a:gridCol w="1051560">
-                  <a:extLst>
-                    <a:ext uri="{9D8B030D-6E8A-4147-A177-3AD203B41FA5}">
-                      <a16:colId xmlns:a16="http://schemas.microsoft.com/office/drawing/2014/main" val="446212208"/>
-                    </a:ext>
-                  </a:extLst>
-                </a:gridCol>
-                <a:gridCol w="1051560">
-                  <a:extLst>
-                    <a:ext uri="{9D8B030D-6E8A-4147-A177-3AD203B41FA5}">
-                      <a16:colId xmlns:a16="http://schemas.microsoft.com/office/drawing/2014/main" val="3573034008"/>
-                    </a:ext>
-                  </a:extLst>
-                </a:gridCol>
-                <a:gridCol w="1051560">
-                  <a:extLst>
-                    <a:ext uri="{9D8B030D-6E8A-4147-A177-3AD203B41FA5}">
-                      <a16:colId xmlns:a16="http://schemas.microsoft.com/office/drawing/2014/main" val="2433933469"/>
-                    </a:ext>
-                  </a:extLst>
-                </a:gridCol>
-                <a:gridCol w="1051560">
-                  <a:extLst>
-                    <a:ext uri="{9D8B030D-6E8A-4147-A177-3AD203B41FA5}">
-                      <a16:colId xmlns:a16="http://schemas.microsoft.com/office/drawing/2014/main" val="3072811336"/>
-                    </a:ext>
-                  </a:extLst>
-                </a:gridCol>
-                <a:gridCol w="1051560">
-                  <a:extLst>
-                    <a:ext uri="{9D8B030D-6E8A-4147-A177-3AD203B41FA5}">
-                      <a16:colId xmlns:a16="http://schemas.microsoft.com/office/drawing/2014/main" val="279017012"/>
-                    </a:ext>
-                  </a:extLst>
-                </a:gridCol>
-                <a:gridCol w="1051560">
-                  <a:extLst>
-                    <a:ext uri="{9D8B030D-6E8A-4147-A177-3AD203B41FA5}">
-                      <a16:colId xmlns:a16="http://schemas.microsoft.com/office/drawing/2014/main" val="2427630921"/>
-                    </a:ext>
-                  </a:extLst>
-                </a:gridCol>
-                <a:gridCol w="1051560">
-                  <a:extLst>
-                    <a:ext uri="{9D8B030D-6E8A-4147-A177-3AD203B41FA5}">
-                      <a16:colId xmlns:a16="http://schemas.microsoft.com/office/drawing/2014/main" val="547985546"/>
-                    </a:ext>
-                  </a:extLst>
-                </a:gridCol>
-                <a:gridCol w="1051560">
-                  <a:extLst>
-                    <a:ext uri="{9D8B030D-6E8A-4147-A177-3AD203B41FA5}">
-                      <a16:colId xmlns:a16="http://schemas.microsoft.com/office/drawing/2014/main" val="2314024160"/>
-                    </a:ext>
-                  </a:extLst>
-                </a:gridCol>
-              </a:tblGrid>
-              <a:tr h="370840">
-                <a:tc>
-                  <a:txBody>
-                    <a:bodyPr/>
-                    <a:lstStyle/>
-                    <a:p>
-                      <a:endParaRPr lang="sv-SE" dirty="0"/>
-                    </a:p>
-                  </a:txBody>
-                  <a:tcPr/>
-                </a:tc>
-                <a:tc>
-                  <a:txBody>
-                    <a:bodyPr/>
-                    <a:lstStyle/>
-                    <a:p>
-                      <a:endParaRPr lang="sv-SE"/>
-                    </a:p>
-                  </a:txBody>
-                  <a:tcPr/>
-                </a:tc>
-                <a:tc>
-                  <a:txBody>
-                    <a:bodyPr/>
-                    <a:lstStyle/>
-                    <a:p>
-                      <a:endParaRPr lang="sv-SE"/>
-                    </a:p>
-                  </a:txBody>
-                  <a:tcPr/>
-                </a:tc>
-                <a:tc>
-                  <a:txBody>
-                    <a:bodyPr/>
-                    <a:lstStyle/>
-                    <a:p>
-                      <a:endParaRPr lang="sv-SE"/>
-                    </a:p>
-                  </a:txBody>
-                  <a:tcPr/>
-                </a:tc>
-                <a:tc>
-                  <a:txBody>
-                    <a:bodyPr/>
-                    <a:lstStyle/>
-                    <a:p>
-                      <a:endParaRPr lang="sv-SE"/>
-                    </a:p>
-                  </a:txBody>
-                  <a:tcPr/>
-                </a:tc>
-                <a:tc>
-                  <a:txBody>
-                    <a:bodyPr/>
-                    <a:lstStyle/>
-                    <a:p>
-                      <a:endParaRPr lang="sv-SE"/>
-                    </a:p>
-                  </a:txBody>
-                  <a:tcPr/>
-                </a:tc>
-                <a:tc>
-                  <a:txBody>
-                    <a:bodyPr/>
-                    <a:lstStyle/>
-                    <a:p>
-                      <a:endParaRPr lang="sv-SE"/>
-                    </a:p>
-                  </a:txBody>
-                  <a:tcPr/>
-                </a:tc>
-                <a:tc>
-                  <a:txBody>
-                    <a:bodyPr/>
-                    <a:lstStyle/>
-                    <a:p>
-                      <a:endParaRPr lang="sv-SE"/>
-                    </a:p>
-                  </a:txBody>
-                  <a:tcPr/>
-                </a:tc>
-                <a:tc>
-                  <a:txBody>
-                    <a:bodyPr/>
-                    <a:lstStyle/>
-                    <a:p>
-                      <a:endParaRPr lang="sv-SE"/>
-                    </a:p>
-                  </a:txBody>
-                  <a:tcPr/>
-                </a:tc>
-                <a:tc>
-                  <a:txBody>
-                    <a:bodyPr/>
-                    <a:lstStyle/>
-                    <a:p>
-                      <a:endParaRPr lang="sv-SE"/>
-                    </a:p>
-                  </a:txBody>
-                  <a:tcPr/>
-                </a:tc>
-                <a:extLst>
-                  <a:ext uri="{0D108BD9-81ED-4DB2-BD59-A6C34878D82A}">
-                    <a16:rowId xmlns:a16="http://schemas.microsoft.com/office/drawing/2014/main" val="960999540"/>
-                  </a:ext>
-                </a:extLst>
-              </a:tr>
-              <a:tr h="370840">
-                <a:tc>
-                  <a:txBody>
-                    <a:bodyPr/>
-                    <a:lstStyle/>
-                    <a:p>
-                      <a:endParaRPr lang="sv-SE"/>
-                    </a:p>
-                  </a:txBody>
-                  <a:tcPr/>
-                </a:tc>
-                <a:tc>
-                  <a:txBody>
-                    <a:bodyPr/>
-                    <a:lstStyle/>
-                    <a:p>
-                      <a:endParaRPr lang="sv-SE"/>
-                    </a:p>
-                  </a:txBody>
-                  <a:tcPr/>
-                </a:tc>
-                <a:tc>
-                  <a:txBody>
-                    <a:bodyPr/>
-                    <a:lstStyle/>
-                    <a:p>
-                      <a:endParaRPr lang="sv-SE"/>
-                    </a:p>
-                  </a:txBody>
-                  <a:tcPr/>
-                </a:tc>
-                <a:tc>
-                  <a:txBody>
-                    <a:bodyPr/>
-                    <a:lstStyle/>
-                    <a:p>
-                      <a:endParaRPr lang="sv-SE"/>
-                    </a:p>
-                  </a:txBody>
-                  <a:tcPr/>
-                </a:tc>
-                <a:tc>
-                  <a:txBody>
-                    <a:bodyPr/>
-                    <a:lstStyle/>
-                    <a:p>
-                      <a:endParaRPr lang="sv-SE"/>
-                    </a:p>
-                  </a:txBody>
-                  <a:tcPr/>
-                </a:tc>
-                <a:tc>
-                  <a:txBody>
-                    <a:bodyPr/>
-                    <a:lstStyle/>
-                    <a:p>
-                      <a:endParaRPr lang="sv-SE"/>
-                    </a:p>
-                  </a:txBody>
-                  <a:tcPr/>
-                </a:tc>
-                <a:tc>
-                  <a:txBody>
-                    <a:bodyPr/>
-                    <a:lstStyle/>
-                    <a:p>
-                      <a:endParaRPr lang="sv-SE"/>
-                    </a:p>
-                  </a:txBody>
-                  <a:tcPr/>
-                </a:tc>
-                <a:tc>
-                  <a:txBody>
-                    <a:bodyPr/>
-                    <a:lstStyle/>
-                    <a:p>
-                      <a:endParaRPr lang="sv-SE"/>
-                    </a:p>
-                  </a:txBody>
-                  <a:tcPr/>
-                </a:tc>
-                <a:tc>
-                  <a:txBody>
-                    <a:bodyPr/>
-                    <a:lstStyle/>
-                    <a:p>
-                      <a:endParaRPr lang="sv-SE"/>
-                    </a:p>
-                  </a:txBody>
-                  <a:tcPr/>
-                </a:tc>
-                <a:tc>
-                  <a:txBody>
-                    <a:bodyPr/>
-                    <a:lstStyle/>
-                    <a:p>
-                      <a:endParaRPr lang="sv-SE"/>
-                    </a:p>
-                  </a:txBody>
-                  <a:tcPr/>
-                </a:tc>
-                <a:extLst>
-                  <a:ext uri="{0D108BD9-81ED-4DB2-BD59-A6C34878D82A}">
-                    <a16:rowId xmlns:a16="http://schemas.microsoft.com/office/drawing/2014/main" val="1476821810"/>
-                  </a:ext>
-                </a:extLst>
-              </a:tr>
-              <a:tr h="370840">
-                <a:tc>
-                  <a:txBody>
-                    <a:bodyPr/>
-                    <a:lstStyle/>
-                    <a:p>
-                      <a:endParaRPr lang="sv-SE"/>
-                    </a:p>
-                  </a:txBody>
-                  <a:tcPr/>
-                </a:tc>
-                <a:tc>
-                  <a:txBody>
-                    <a:bodyPr/>
-                    <a:lstStyle/>
-                    <a:p>
-                      <a:endParaRPr lang="sv-SE"/>
-                    </a:p>
-                  </a:txBody>
-                  <a:tcPr/>
-                </a:tc>
-                <a:tc>
-                  <a:txBody>
-                    <a:bodyPr/>
-                    <a:lstStyle/>
-                    <a:p>
-                      <a:endParaRPr lang="sv-SE"/>
-                    </a:p>
-                  </a:txBody>
-                  <a:tcPr/>
-                </a:tc>
-                <a:tc>
-                  <a:txBody>
-                    <a:bodyPr/>
-                    <a:lstStyle/>
-                    <a:p>
-                      <a:endParaRPr lang="sv-SE"/>
-                    </a:p>
-                  </a:txBody>
-                  <a:tcPr/>
-                </a:tc>
-                <a:tc>
-                  <a:txBody>
-                    <a:bodyPr/>
-                    <a:lstStyle/>
-                    <a:p>
-                      <a:endParaRPr lang="sv-SE"/>
-                    </a:p>
-                  </a:txBody>
-                  <a:tcPr/>
-                </a:tc>
-                <a:tc>
-                  <a:txBody>
-                    <a:bodyPr/>
-                    <a:lstStyle/>
-                    <a:p>
-                      <a:endParaRPr lang="sv-SE"/>
-                    </a:p>
-                  </a:txBody>
-                  <a:tcPr/>
-                </a:tc>
-                <a:tc>
-                  <a:txBody>
-                    <a:bodyPr/>
-                    <a:lstStyle/>
-                    <a:p>
-                      <a:endParaRPr lang="sv-SE"/>
-                    </a:p>
-                  </a:txBody>
-                  <a:tcPr/>
-                </a:tc>
-                <a:tc>
-                  <a:txBody>
-                    <a:bodyPr/>
-                    <a:lstStyle/>
-                    <a:p>
-                      <a:endParaRPr lang="sv-SE"/>
-                    </a:p>
-                  </a:txBody>
-                  <a:tcPr/>
-                </a:tc>
-                <a:tc>
-                  <a:txBody>
-                    <a:bodyPr/>
-                    <a:lstStyle/>
-                    <a:p>
-                      <a:endParaRPr lang="sv-SE"/>
-                    </a:p>
-                  </a:txBody>
-                  <a:tcPr/>
-                </a:tc>
-                <a:tc>
-                  <a:txBody>
-                    <a:bodyPr/>
-                    <a:lstStyle/>
-                    <a:p>
-                      <a:endParaRPr lang="sv-SE"/>
-                    </a:p>
-                  </a:txBody>
-                  <a:tcPr/>
-                </a:tc>
-                <a:extLst>
-                  <a:ext uri="{0D108BD9-81ED-4DB2-BD59-A6C34878D82A}">
-                    <a16:rowId xmlns:a16="http://schemas.microsoft.com/office/drawing/2014/main" val="1162274056"/>
-                  </a:ext>
-                </a:extLst>
-              </a:tr>
-              <a:tr h="370840">
-                <a:tc>
-                  <a:txBody>
-                    <a:bodyPr/>
-                    <a:lstStyle/>
-                    <a:p>
-                      <a:endParaRPr lang="sv-SE"/>
-                    </a:p>
-                  </a:txBody>
-                  <a:tcPr/>
-                </a:tc>
-                <a:tc>
-                  <a:txBody>
-                    <a:bodyPr/>
-                    <a:lstStyle/>
-                    <a:p>
-                      <a:endParaRPr lang="sv-SE"/>
-                    </a:p>
-                  </a:txBody>
-                  <a:tcPr/>
-                </a:tc>
-                <a:tc>
-                  <a:txBody>
-                    <a:bodyPr/>
-                    <a:lstStyle/>
-                    <a:p>
-                      <a:endParaRPr lang="sv-SE"/>
-                    </a:p>
-                  </a:txBody>
-                  <a:tcPr/>
-                </a:tc>
-                <a:tc>
-                  <a:txBody>
-                    <a:bodyPr/>
-                    <a:lstStyle/>
-                    <a:p>
-                      <a:endParaRPr lang="sv-SE"/>
-                    </a:p>
-                  </a:txBody>
-                  <a:tcPr/>
-                </a:tc>
-                <a:tc>
-                  <a:txBody>
-                    <a:bodyPr/>
-                    <a:lstStyle/>
-                    <a:p>
-                      <a:endParaRPr lang="sv-SE"/>
-                    </a:p>
-                  </a:txBody>
-                  <a:tcPr/>
-                </a:tc>
-                <a:tc>
-                  <a:txBody>
-                    <a:bodyPr/>
-                    <a:lstStyle/>
-                    <a:p>
-                      <a:endParaRPr lang="sv-SE"/>
-                    </a:p>
-                  </a:txBody>
-                  <a:tcPr/>
-                </a:tc>
-                <a:tc>
-                  <a:txBody>
-                    <a:bodyPr/>
-                    <a:lstStyle/>
-                    <a:p>
-                      <a:endParaRPr lang="sv-SE"/>
-                    </a:p>
-                  </a:txBody>
-                  <a:tcPr/>
-                </a:tc>
-                <a:tc>
-                  <a:txBody>
-                    <a:bodyPr/>
-                    <a:lstStyle/>
-                    <a:p>
-                      <a:endParaRPr lang="sv-SE"/>
-                    </a:p>
-                  </a:txBody>
-                  <a:tcPr/>
-                </a:tc>
-                <a:tc>
-                  <a:txBody>
-                    <a:bodyPr/>
-                    <a:lstStyle/>
-                    <a:p>
-                      <a:endParaRPr lang="sv-SE"/>
-                    </a:p>
-                  </a:txBody>
-                  <a:tcPr/>
-                </a:tc>
-                <a:tc>
-                  <a:txBody>
-                    <a:bodyPr/>
-                    <a:lstStyle/>
-                    <a:p>
-                      <a:endParaRPr lang="sv-SE"/>
-                    </a:p>
-                  </a:txBody>
-                  <a:tcPr/>
-                </a:tc>
-                <a:extLst>
-                  <a:ext uri="{0D108BD9-81ED-4DB2-BD59-A6C34878D82A}">
-                    <a16:rowId xmlns:a16="http://schemas.microsoft.com/office/drawing/2014/main" val="1299163262"/>
-                  </a:ext>
-                </a:extLst>
-              </a:tr>
-              <a:tr h="370840">
-                <a:tc>
-                  <a:txBody>
-                    <a:bodyPr/>
-                    <a:lstStyle/>
-                    <a:p>
-                      <a:endParaRPr lang="sv-SE"/>
-                    </a:p>
-                  </a:txBody>
-                  <a:tcPr/>
-                </a:tc>
-                <a:tc>
-                  <a:txBody>
-                    <a:bodyPr/>
-                    <a:lstStyle/>
-                    <a:p>
-                      <a:endParaRPr lang="sv-SE"/>
-                    </a:p>
-                  </a:txBody>
-                  <a:tcPr/>
-                </a:tc>
-                <a:tc>
-                  <a:txBody>
-                    <a:bodyPr/>
-                    <a:lstStyle/>
-                    <a:p>
-                      <a:endParaRPr lang="sv-SE"/>
-                    </a:p>
-                  </a:txBody>
-                  <a:tcPr/>
-                </a:tc>
-                <a:tc>
-                  <a:txBody>
-                    <a:bodyPr/>
-                    <a:lstStyle/>
-                    <a:p>
-                      <a:endParaRPr lang="sv-SE"/>
-                    </a:p>
-                  </a:txBody>
-                  <a:tcPr/>
-                </a:tc>
-                <a:tc>
-                  <a:txBody>
-                    <a:bodyPr/>
-                    <a:lstStyle/>
-                    <a:p>
-                      <a:endParaRPr lang="sv-SE"/>
-                    </a:p>
-                  </a:txBody>
-                  <a:tcPr/>
-                </a:tc>
-                <a:tc>
-                  <a:txBody>
-                    <a:bodyPr/>
-                    <a:lstStyle/>
-                    <a:p>
-                      <a:endParaRPr lang="sv-SE"/>
-                    </a:p>
-                  </a:txBody>
-                  <a:tcPr/>
-                </a:tc>
-                <a:tc>
-                  <a:txBody>
-                    <a:bodyPr/>
-                    <a:lstStyle/>
-                    <a:p>
-                      <a:endParaRPr lang="sv-SE"/>
-                    </a:p>
-                  </a:txBody>
-                  <a:tcPr/>
-                </a:tc>
-                <a:tc>
-                  <a:txBody>
-                    <a:bodyPr/>
-                    <a:lstStyle/>
-                    <a:p>
-                      <a:endParaRPr lang="sv-SE"/>
-                    </a:p>
-                  </a:txBody>
-                  <a:tcPr/>
-                </a:tc>
-                <a:tc>
-                  <a:txBody>
-                    <a:bodyPr/>
-                    <a:lstStyle/>
-                    <a:p>
-                      <a:endParaRPr lang="sv-SE"/>
-                    </a:p>
-                  </a:txBody>
-                  <a:tcPr/>
-                </a:tc>
-                <a:tc>
-                  <a:txBody>
-                    <a:bodyPr/>
-                    <a:lstStyle/>
-                    <a:p>
-                      <a:endParaRPr lang="sv-SE"/>
-                    </a:p>
-                  </a:txBody>
-                  <a:tcPr/>
-                </a:tc>
-                <a:extLst>
-                  <a:ext uri="{0D108BD9-81ED-4DB2-BD59-A6C34878D82A}">
-                    <a16:rowId xmlns:a16="http://schemas.microsoft.com/office/drawing/2014/main" val="4050405104"/>
-                  </a:ext>
-                </a:extLst>
-              </a:tr>
-              <a:tr h="370840">
-                <a:tc>
-                  <a:txBody>
-                    <a:bodyPr/>
-                    <a:lstStyle/>
-                    <a:p>
-                      <a:endParaRPr lang="sv-SE"/>
-                    </a:p>
-                  </a:txBody>
-                  <a:tcPr/>
-                </a:tc>
-                <a:tc>
-                  <a:txBody>
-                    <a:bodyPr/>
-                    <a:lstStyle/>
-                    <a:p>
-                      <a:endParaRPr lang="sv-SE"/>
-                    </a:p>
-                  </a:txBody>
-                  <a:tcPr/>
-                </a:tc>
-                <a:tc>
-                  <a:txBody>
-                    <a:bodyPr/>
-                    <a:lstStyle/>
-                    <a:p>
-                      <a:endParaRPr lang="sv-SE"/>
-                    </a:p>
-                  </a:txBody>
-                  <a:tcPr/>
-                </a:tc>
-                <a:tc>
-                  <a:txBody>
-                    <a:bodyPr/>
-                    <a:lstStyle/>
-                    <a:p>
-                      <a:endParaRPr lang="sv-SE"/>
-                    </a:p>
-                  </a:txBody>
-                  <a:tcPr/>
-                </a:tc>
-                <a:tc>
-                  <a:txBody>
-                    <a:bodyPr/>
-                    <a:lstStyle/>
-                    <a:p>
-                      <a:endParaRPr lang="sv-SE"/>
-                    </a:p>
-                  </a:txBody>
-                  <a:tcPr/>
-                </a:tc>
-                <a:tc>
-                  <a:txBody>
-                    <a:bodyPr/>
-                    <a:lstStyle/>
-                    <a:p>
-                      <a:endParaRPr lang="sv-SE"/>
-                    </a:p>
-                  </a:txBody>
-                  <a:tcPr/>
-                </a:tc>
-                <a:tc>
-                  <a:txBody>
-                    <a:bodyPr/>
-                    <a:lstStyle/>
-                    <a:p>
-                      <a:endParaRPr lang="sv-SE"/>
-                    </a:p>
-                  </a:txBody>
-                  <a:tcPr/>
-                </a:tc>
-                <a:tc>
-                  <a:txBody>
-                    <a:bodyPr/>
-                    <a:lstStyle/>
-                    <a:p>
-                      <a:endParaRPr lang="sv-SE"/>
-                    </a:p>
-                  </a:txBody>
-                  <a:tcPr/>
-                </a:tc>
-                <a:tc>
-                  <a:txBody>
-                    <a:bodyPr/>
-                    <a:lstStyle/>
-                    <a:p>
-                      <a:endParaRPr lang="sv-SE"/>
-                    </a:p>
-                  </a:txBody>
-                  <a:tcPr/>
-                </a:tc>
-                <a:tc>
-                  <a:txBody>
-                    <a:bodyPr/>
-                    <a:lstStyle/>
-                    <a:p>
-                      <a:endParaRPr lang="sv-SE"/>
-                    </a:p>
-                  </a:txBody>
-                  <a:tcPr/>
-                </a:tc>
-                <a:extLst>
-                  <a:ext uri="{0D108BD9-81ED-4DB2-BD59-A6C34878D82A}">
-                    <a16:rowId xmlns:a16="http://schemas.microsoft.com/office/drawing/2014/main" val="818876687"/>
-                  </a:ext>
-                </a:extLst>
-              </a:tr>
-              <a:tr h="370840">
-                <a:tc>
-                  <a:txBody>
-                    <a:bodyPr/>
-                    <a:lstStyle/>
-                    <a:p>
-                      <a:endParaRPr lang="sv-SE"/>
-                    </a:p>
-                  </a:txBody>
-                  <a:tcPr/>
-                </a:tc>
-                <a:tc>
-                  <a:txBody>
-                    <a:bodyPr/>
-                    <a:lstStyle/>
-                    <a:p>
-                      <a:endParaRPr lang="sv-SE"/>
-                    </a:p>
-                  </a:txBody>
-                  <a:tcPr/>
-                </a:tc>
-                <a:tc>
-                  <a:txBody>
-                    <a:bodyPr/>
-                    <a:lstStyle/>
-                    <a:p>
-                      <a:endParaRPr lang="sv-SE"/>
-                    </a:p>
-                  </a:txBody>
-                  <a:tcPr/>
-                </a:tc>
-                <a:tc>
-                  <a:txBody>
-                    <a:bodyPr/>
-                    <a:lstStyle/>
-                    <a:p>
-                      <a:endParaRPr lang="sv-SE"/>
-                    </a:p>
-                  </a:txBody>
-                  <a:tcPr/>
-                </a:tc>
-                <a:tc>
-                  <a:txBody>
-                    <a:bodyPr/>
-                    <a:lstStyle/>
-                    <a:p>
-                      <a:endParaRPr lang="sv-SE"/>
-                    </a:p>
-                  </a:txBody>
-                  <a:tcPr/>
-                </a:tc>
-                <a:tc>
-                  <a:txBody>
-                    <a:bodyPr/>
-                    <a:lstStyle/>
-                    <a:p>
-                      <a:endParaRPr lang="sv-SE"/>
-                    </a:p>
-                  </a:txBody>
-                  <a:tcPr/>
-                </a:tc>
-                <a:tc>
-                  <a:txBody>
-                    <a:bodyPr/>
-                    <a:lstStyle/>
-                    <a:p>
-                      <a:endParaRPr lang="sv-SE"/>
-                    </a:p>
-                  </a:txBody>
-                  <a:tcPr/>
-                </a:tc>
-                <a:tc>
-                  <a:txBody>
-                    <a:bodyPr/>
-                    <a:lstStyle/>
-                    <a:p>
-                      <a:endParaRPr lang="sv-SE"/>
-                    </a:p>
-                  </a:txBody>
-                  <a:tcPr/>
-                </a:tc>
-                <a:tc>
-                  <a:txBody>
-                    <a:bodyPr/>
-                    <a:lstStyle/>
-                    <a:p>
-                      <a:endParaRPr lang="sv-SE"/>
-                    </a:p>
-                  </a:txBody>
-                  <a:tcPr/>
-                </a:tc>
-                <a:tc>
-                  <a:txBody>
-                    <a:bodyPr/>
-                    <a:lstStyle/>
-                    <a:p>
-                      <a:endParaRPr lang="sv-SE"/>
-                    </a:p>
-                  </a:txBody>
-                  <a:tcPr/>
-                </a:tc>
-                <a:extLst>
-                  <a:ext uri="{0D108BD9-81ED-4DB2-BD59-A6C34878D82A}">
-                    <a16:rowId xmlns:a16="http://schemas.microsoft.com/office/drawing/2014/main" val="617085206"/>
-                  </a:ext>
-                </a:extLst>
-              </a:tr>
-              <a:tr h="370840">
-                <a:tc>
-                  <a:txBody>
-                    <a:bodyPr/>
-                    <a:lstStyle/>
-                    <a:p>
-                      <a:endParaRPr lang="sv-SE"/>
-                    </a:p>
-                  </a:txBody>
-                  <a:tcPr/>
-                </a:tc>
-                <a:tc>
-                  <a:txBody>
-                    <a:bodyPr/>
-                    <a:lstStyle/>
-                    <a:p>
-                      <a:endParaRPr lang="sv-SE"/>
-                    </a:p>
-                  </a:txBody>
-                  <a:tcPr/>
-                </a:tc>
-                <a:tc>
-                  <a:txBody>
-                    <a:bodyPr/>
-                    <a:lstStyle/>
-                    <a:p>
-                      <a:endParaRPr lang="sv-SE"/>
-                    </a:p>
-                  </a:txBody>
-                  <a:tcPr/>
-                </a:tc>
-                <a:tc>
-                  <a:txBody>
-                    <a:bodyPr/>
-                    <a:lstStyle/>
-                    <a:p>
-                      <a:endParaRPr lang="sv-SE"/>
-                    </a:p>
-                  </a:txBody>
-                  <a:tcPr/>
-                </a:tc>
-                <a:tc>
-                  <a:txBody>
-                    <a:bodyPr/>
-                    <a:lstStyle/>
-                    <a:p>
-                      <a:endParaRPr lang="sv-SE"/>
-                    </a:p>
-                  </a:txBody>
-                  <a:tcPr/>
-                </a:tc>
-                <a:tc>
-                  <a:txBody>
-                    <a:bodyPr/>
-                    <a:lstStyle/>
-                    <a:p>
-                      <a:endParaRPr lang="sv-SE"/>
-                    </a:p>
-                  </a:txBody>
-                  <a:tcPr/>
-                </a:tc>
-                <a:tc>
-                  <a:txBody>
-                    <a:bodyPr/>
-                    <a:lstStyle/>
-                    <a:p>
-                      <a:endParaRPr lang="sv-SE"/>
-                    </a:p>
-                  </a:txBody>
-                  <a:tcPr/>
-                </a:tc>
-                <a:tc>
-                  <a:txBody>
-                    <a:bodyPr/>
-                    <a:lstStyle/>
-                    <a:p>
-                      <a:endParaRPr lang="sv-SE"/>
-                    </a:p>
-                  </a:txBody>
-                  <a:tcPr/>
-                </a:tc>
-                <a:tc>
-                  <a:txBody>
-                    <a:bodyPr/>
-                    <a:lstStyle/>
-                    <a:p>
-                      <a:endParaRPr lang="sv-SE"/>
-                    </a:p>
-                  </a:txBody>
-                  <a:tcPr/>
-                </a:tc>
-                <a:tc>
-                  <a:txBody>
-                    <a:bodyPr/>
-                    <a:lstStyle/>
-                    <a:p>
-                      <a:endParaRPr lang="sv-SE"/>
-                    </a:p>
-                  </a:txBody>
-                  <a:tcPr/>
-                </a:tc>
-                <a:extLst>
-                  <a:ext uri="{0D108BD9-81ED-4DB2-BD59-A6C34878D82A}">
-                    <a16:rowId xmlns:a16="http://schemas.microsoft.com/office/drawing/2014/main" val="1105384879"/>
-                  </a:ext>
-                </a:extLst>
-              </a:tr>
-              <a:tr h="370840">
-                <a:tc>
-                  <a:txBody>
-                    <a:bodyPr/>
-                    <a:lstStyle/>
-                    <a:p>
-                      <a:endParaRPr lang="sv-SE"/>
-                    </a:p>
-                  </a:txBody>
-                  <a:tcPr/>
-                </a:tc>
-                <a:tc>
-                  <a:txBody>
-                    <a:bodyPr/>
-                    <a:lstStyle/>
-                    <a:p>
-                      <a:endParaRPr lang="sv-SE"/>
-                    </a:p>
-                  </a:txBody>
-                  <a:tcPr/>
-                </a:tc>
-                <a:tc>
-                  <a:txBody>
-                    <a:bodyPr/>
-                    <a:lstStyle/>
-                    <a:p>
-                      <a:endParaRPr lang="sv-SE"/>
-                    </a:p>
-                  </a:txBody>
-                  <a:tcPr/>
-                </a:tc>
-                <a:tc>
-                  <a:txBody>
-                    <a:bodyPr/>
-                    <a:lstStyle/>
-                    <a:p>
-                      <a:endParaRPr lang="sv-SE"/>
-                    </a:p>
-                  </a:txBody>
-                  <a:tcPr/>
-                </a:tc>
-                <a:tc>
-                  <a:txBody>
-                    <a:bodyPr/>
-                    <a:lstStyle/>
-                    <a:p>
-                      <a:endParaRPr lang="sv-SE"/>
-                    </a:p>
-                  </a:txBody>
-                  <a:tcPr/>
-                </a:tc>
-                <a:tc>
-                  <a:txBody>
-                    <a:bodyPr/>
-                    <a:lstStyle/>
-                    <a:p>
-                      <a:endParaRPr lang="sv-SE"/>
-                    </a:p>
-                  </a:txBody>
-                  <a:tcPr/>
-                </a:tc>
-                <a:tc>
-                  <a:txBody>
-                    <a:bodyPr/>
-                    <a:lstStyle/>
-                    <a:p>
-                      <a:endParaRPr lang="sv-SE"/>
-                    </a:p>
-                  </a:txBody>
-                  <a:tcPr/>
-                </a:tc>
-                <a:tc>
-                  <a:txBody>
-                    <a:bodyPr/>
-                    <a:lstStyle/>
-                    <a:p>
-                      <a:endParaRPr lang="sv-SE"/>
-                    </a:p>
-                  </a:txBody>
-                  <a:tcPr/>
-                </a:tc>
-                <a:tc>
-                  <a:txBody>
-                    <a:bodyPr/>
-                    <a:lstStyle/>
-                    <a:p>
-                      <a:endParaRPr lang="sv-SE"/>
-                    </a:p>
-                  </a:txBody>
-                  <a:tcPr/>
-                </a:tc>
-                <a:tc>
-                  <a:txBody>
-                    <a:bodyPr/>
-                    <a:lstStyle/>
-                    <a:p>
-                      <a:endParaRPr lang="sv-SE"/>
-                    </a:p>
-                  </a:txBody>
-                  <a:tcPr/>
-                </a:tc>
-                <a:extLst>
-                  <a:ext uri="{0D108BD9-81ED-4DB2-BD59-A6C34878D82A}">
-                    <a16:rowId xmlns:a16="http://schemas.microsoft.com/office/drawing/2014/main" val="3177079486"/>
-                  </a:ext>
-                </a:extLst>
-              </a:tr>
-              <a:tr h="370840">
-                <a:tc>
-                  <a:txBody>
-                    <a:bodyPr/>
-                    <a:lstStyle/>
-                    <a:p>
-                      <a:endParaRPr lang="sv-SE"/>
-                    </a:p>
-                  </a:txBody>
-                  <a:tcPr/>
-                </a:tc>
-                <a:tc>
-                  <a:txBody>
-                    <a:bodyPr/>
-                    <a:lstStyle/>
-                    <a:p>
-                      <a:endParaRPr lang="sv-SE"/>
-                    </a:p>
-                  </a:txBody>
-                  <a:tcPr/>
-                </a:tc>
-                <a:tc>
-                  <a:txBody>
-                    <a:bodyPr/>
-                    <a:lstStyle/>
-                    <a:p>
-                      <a:endParaRPr lang="sv-SE"/>
-                    </a:p>
-                  </a:txBody>
-                  <a:tcPr/>
-                </a:tc>
-                <a:tc>
-                  <a:txBody>
-                    <a:bodyPr/>
-                    <a:lstStyle/>
-                    <a:p>
-                      <a:endParaRPr lang="sv-SE"/>
-                    </a:p>
-                  </a:txBody>
-                  <a:tcPr/>
-                </a:tc>
-                <a:tc>
-                  <a:txBody>
-                    <a:bodyPr/>
-                    <a:lstStyle/>
-                    <a:p>
-                      <a:endParaRPr lang="sv-SE"/>
-                    </a:p>
-                  </a:txBody>
-                  <a:tcPr/>
-                </a:tc>
-                <a:tc>
-                  <a:txBody>
-                    <a:bodyPr/>
-                    <a:lstStyle/>
-                    <a:p>
-                      <a:endParaRPr lang="sv-SE"/>
-                    </a:p>
-                  </a:txBody>
-                  <a:tcPr/>
-                </a:tc>
-                <a:tc>
-                  <a:txBody>
-                    <a:bodyPr/>
-                    <a:lstStyle/>
-                    <a:p>
-                      <a:endParaRPr lang="sv-SE"/>
-                    </a:p>
-                  </a:txBody>
-                  <a:tcPr/>
-                </a:tc>
-                <a:tc>
-                  <a:txBody>
-                    <a:bodyPr/>
-                    <a:lstStyle/>
-                    <a:p>
-                      <a:endParaRPr lang="sv-SE"/>
-                    </a:p>
-                  </a:txBody>
-                  <a:tcPr/>
-                </a:tc>
-                <a:tc>
-                  <a:txBody>
-                    <a:bodyPr/>
-                    <a:lstStyle/>
-                    <a:p>
-                      <a:endParaRPr lang="sv-SE"/>
-                    </a:p>
-                  </a:txBody>
-                  <a:tcPr/>
-                </a:tc>
-                <a:tc>
-                  <a:txBody>
-                    <a:bodyPr/>
-                    <a:lstStyle/>
-                    <a:p>
-                      <a:endParaRPr lang="sv-SE"/>
-                    </a:p>
-                  </a:txBody>
-                  <a:tcPr/>
-                </a:tc>
-                <a:extLst>
-                  <a:ext uri="{0D108BD9-81ED-4DB2-BD59-A6C34878D82A}">
-                    <a16:rowId xmlns:a16="http://schemas.microsoft.com/office/drawing/2014/main" val="2535145467"/>
-                  </a:ext>
-                </a:extLst>
-              </a:tr>
-            </a:tbl>
-          </a:graphicData>
-        </a:graphic>
-      </p:graphicFrame>
+          </p:nvPr>
+        </p:nvPicPr>
+        <p:blipFill>
+          <a:blip r:embed="rId4">
+            <a:extLst>
+              <a:ext uri="{28A0092B-C50C-407E-A947-70E740481C1C}">
+                <a14:useLocalDpi xmlns:a14="http://schemas.microsoft.com/office/drawing/2010/main" val="0"/>
+              </a:ext>
+            </a:extLst>
+          </a:blip>
+          <a:stretch>
+            <a:fillRect/>
+          </a:stretch>
+        </p:blipFill>
+        <p:spPr>
+          <a:xfrm>
+            <a:off x="4511665" y="1825624"/>
+            <a:ext cx="7359670" cy="4351338"/>
+          </a:xfrm>
+        </p:spPr>
+      </p:pic>
+      <p:pic>
+        <p:nvPicPr>
+          <p:cNvPr id="8" name="Content Placeholder 13">
+            <a:extLst>
+              <a:ext uri="{FF2B5EF4-FFF2-40B4-BE49-F238E27FC236}">
+                <a16:creationId xmlns:a16="http://schemas.microsoft.com/office/drawing/2014/main" id="{C4C2EFD9-565C-3947-9B69-2F4785C12013}"/>
+              </a:ext>
+            </a:extLst>
+          </p:cNvPr>
+          <p:cNvPicPr>
+            <a:picLocks noChangeAspect="1"/>
+          </p:cNvPicPr>
+          <p:nvPr/>
+        </p:nvPicPr>
+        <p:blipFill>
+          <a:blip r:embed="rId5">
+            <a:extLst>
+              <a:ext uri="{28A0092B-C50C-407E-A947-70E740481C1C}">
+                <a14:useLocalDpi xmlns:a14="http://schemas.microsoft.com/office/drawing/2010/main" val="0"/>
+              </a:ext>
+            </a:extLst>
+          </a:blip>
+          <a:stretch>
+            <a:fillRect/>
+          </a:stretch>
+        </p:blipFill>
+        <p:spPr>
+          <a:xfrm>
+            <a:off x="596480" y="1540495"/>
+            <a:ext cx="3664769" cy="4921597"/>
+          </a:xfrm>
+          <a:prstGeom prst="rect">
+            <a:avLst/>
+          </a:prstGeom>
+        </p:spPr>
+      </p:pic>
     </p:spTree>
     <p:custDataLst>
       <p:tags r:id="rId1"/>

</xml_diff>

<commit_message>
Förfinat mapTest (från tidigare TDD)
Uppdaterat slutredovisning v8 pptx
</commit_message>
<xml_diff>
--- a/docs/Slutredovisning_grp5_v8.pptx
+++ b/docs/Slutredovisning_grp5_v8.pptx
@@ -237,7 +237,7 @@
           <a:p>
             <a:fld id="{78657D70-8167-4127-866D-BAA56A2DFFEF}" type="datetimeFigureOut">
               <a:rPr lang="sv-SE" smtClean="0"/>
-              <a:t>2018-10-24</a:t>
+              <a:t>2018-10-25</a:t>
             </a:fld>
             <a:endParaRPr lang="sv-SE"/>
           </a:p>
@@ -5639,7 +5639,7 @@
           <a:p>
             <a:fld id="{B4C653A3-D7FF-4AF7-943B-34A467C3139E}" type="datetimeFigureOut">
               <a:rPr lang="sv-SE" smtClean="0"/>
-              <a:t>2018-10-24</a:t>
+              <a:t>2018-10-25</a:t>
             </a:fld>
             <a:endParaRPr lang="sv-SE"/>
           </a:p>
@@ -5807,7 +5807,7 @@
           <a:p>
             <a:fld id="{B4C653A3-D7FF-4AF7-943B-34A467C3139E}" type="datetimeFigureOut">
               <a:rPr lang="sv-SE" smtClean="0"/>
-              <a:t>2018-10-24</a:t>
+              <a:t>2018-10-25</a:t>
             </a:fld>
             <a:endParaRPr lang="sv-SE"/>
           </a:p>
@@ -5985,7 +5985,7 @@
           <a:p>
             <a:fld id="{B4C653A3-D7FF-4AF7-943B-34A467C3139E}" type="datetimeFigureOut">
               <a:rPr lang="sv-SE" smtClean="0"/>
-              <a:t>2018-10-24</a:t>
+              <a:t>2018-10-25</a:t>
             </a:fld>
             <a:endParaRPr lang="sv-SE"/>
           </a:p>
@@ -6153,7 +6153,7 @@
           <a:p>
             <a:fld id="{B4C653A3-D7FF-4AF7-943B-34A467C3139E}" type="datetimeFigureOut">
               <a:rPr lang="sv-SE" smtClean="0"/>
-              <a:t>2018-10-24</a:t>
+              <a:t>2018-10-25</a:t>
             </a:fld>
             <a:endParaRPr lang="sv-SE"/>
           </a:p>
@@ -6398,7 +6398,7 @@
           <a:p>
             <a:fld id="{B4C653A3-D7FF-4AF7-943B-34A467C3139E}" type="datetimeFigureOut">
               <a:rPr lang="sv-SE" smtClean="0"/>
-              <a:t>2018-10-24</a:t>
+              <a:t>2018-10-25</a:t>
             </a:fld>
             <a:endParaRPr lang="sv-SE"/>
           </a:p>
@@ -6627,7 +6627,7 @@
           <a:p>
             <a:fld id="{B4C653A3-D7FF-4AF7-943B-34A467C3139E}" type="datetimeFigureOut">
               <a:rPr lang="sv-SE" smtClean="0"/>
-              <a:t>2018-10-24</a:t>
+              <a:t>2018-10-25</a:t>
             </a:fld>
             <a:endParaRPr lang="sv-SE"/>
           </a:p>
@@ -6991,7 +6991,7 @@
           <a:p>
             <a:fld id="{B4C653A3-D7FF-4AF7-943B-34A467C3139E}" type="datetimeFigureOut">
               <a:rPr lang="sv-SE" smtClean="0"/>
-              <a:t>2018-10-24</a:t>
+              <a:t>2018-10-25</a:t>
             </a:fld>
             <a:endParaRPr lang="sv-SE"/>
           </a:p>
@@ -7108,7 +7108,7 @@
           <a:p>
             <a:fld id="{B4C653A3-D7FF-4AF7-943B-34A467C3139E}" type="datetimeFigureOut">
               <a:rPr lang="sv-SE" smtClean="0"/>
-              <a:t>2018-10-24</a:t>
+              <a:t>2018-10-25</a:t>
             </a:fld>
             <a:endParaRPr lang="sv-SE"/>
           </a:p>
@@ -7203,7 +7203,7 @@
           <a:p>
             <a:fld id="{B4C653A3-D7FF-4AF7-943B-34A467C3139E}" type="datetimeFigureOut">
               <a:rPr lang="sv-SE" smtClean="0"/>
-              <a:t>2018-10-24</a:t>
+              <a:t>2018-10-25</a:t>
             </a:fld>
             <a:endParaRPr lang="sv-SE"/>
           </a:p>
@@ -7478,7 +7478,7 @@
           <a:p>
             <a:fld id="{B4C653A3-D7FF-4AF7-943B-34A467C3139E}" type="datetimeFigureOut">
               <a:rPr lang="sv-SE" smtClean="0"/>
-              <a:t>2018-10-24</a:t>
+              <a:t>2018-10-25</a:t>
             </a:fld>
             <a:endParaRPr lang="sv-SE"/>
           </a:p>
@@ -7730,7 +7730,7 @@
           <a:p>
             <a:fld id="{B4C653A3-D7FF-4AF7-943B-34A467C3139E}" type="datetimeFigureOut">
               <a:rPr lang="sv-SE" smtClean="0"/>
-              <a:t>2018-10-24</a:t>
+              <a:t>2018-10-25</a:t>
             </a:fld>
             <a:endParaRPr lang="sv-SE"/>
           </a:p>
@@ -7941,7 +7941,7 @@
           <a:p>
             <a:fld id="{B4C653A3-D7FF-4AF7-943B-34A467C3139E}" type="datetimeFigureOut">
               <a:rPr lang="sv-SE" smtClean="0"/>
-              <a:t>2018-10-24</a:t>
+              <a:t>2018-10-25</a:t>
             </a:fld>
             <a:endParaRPr lang="sv-SE"/>
           </a:p>
@@ -8548,9 +8548,16 @@
             <p:ph type="body" idx="1"/>
           </p:nvPr>
         </p:nvSpPr>
-        <p:spPr/>
-        <p:txBody>
-          <a:bodyPr/>
+        <p:spPr>
+          <a:xfrm>
+            <a:off x="836612" y="1451373"/>
+            <a:ext cx="5157787" cy="411955"/>
+          </a:xfrm>
+        </p:spPr>
+        <p:txBody>
+          <a:bodyPr>
+            <a:normAutofit lnSpcReduction="10000"/>
+          </a:bodyPr>
           <a:lstStyle/>
           <a:p>
             <a:r>
@@ -8571,59 +8578,639 @@
             <p:ph sz="half" idx="2"/>
           </p:nvPr>
         </p:nvSpPr>
-        <p:spPr/>
-        <p:txBody>
-          <a:bodyPr/>
+        <p:spPr>
+          <a:xfrm>
+            <a:off x="836612" y="2093119"/>
+            <a:ext cx="5157787" cy="4399756"/>
+          </a:xfrm>
+        </p:spPr>
+        <p:txBody>
+          <a:bodyPr>
+            <a:normAutofit/>
+          </a:bodyPr>
           <a:lstStyle/>
           <a:p>
             <a:pPr marL="0" indent="0">
               <a:buNone/>
             </a:pPr>
-            <a:endParaRPr lang="sv-SE" dirty="0"/>
-          </a:p>
-        </p:txBody>
-      </p:sp>
-      <p:sp>
-        <p:nvSpPr>
-          <p:cNvPr id="6" name="Platshållare för text 5"/>
-          <p:cNvSpPr>
-            <a:spLocks noGrp="1"/>
-          </p:cNvSpPr>
-          <p:nvPr>
-            <p:ph type="body" sz="quarter" idx="3"/>
-          </p:nvPr>
-        </p:nvSpPr>
-        <p:spPr/>
-        <p:txBody>
-          <a:bodyPr/>
-          <a:lstStyle/>
-          <a:p>
-            <a:r>
-              <a:rPr lang="sv-SE" dirty="0"/>
-              <a:t>Koden som testas</a:t>
-            </a:r>
-          </a:p>
-        </p:txBody>
-      </p:sp>
-      <p:sp>
-        <p:nvSpPr>
-          <p:cNvPr id="7" name="Platshållare för innehåll 6"/>
-          <p:cNvSpPr>
-            <a:spLocks noGrp="1"/>
-          </p:cNvSpPr>
-          <p:nvPr>
-            <p:ph sz="quarter" idx="4"/>
-          </p:nvPr>
-        </p:nvSpPr>
-        <p:spPr/>
-        <p:txBody>
-          <a:bodyPr/>
-          <a:lstStyle/>
+            <a:r>
+              <a:rPr lang="sv-SE" sz="1400" dirty="0"/>
+              <a:t>@Test</a:t>
+            </a:r>
+            <a:br>
+              <a:rPr lang="sv-SE" sz="1400" dirty="0"/>
+            </a:br>
+            <a:r>
+              <a:rPr lang="sv-SE" sz="1400" dirty="0"/>
+              <a:t>public </a:t>
+            </a:r>
+            <a:r>
+              <a:rPr lang="sv-SE" sz="1400" dirty="0" err="1"/>
+              <a:t>void</a:t>
+            </a:r>
+            <a:r>
+              <a:rPr lang="sv-SE" sz="1400" dirty="0"/>
+              <a:t> </a:t>
+            </a:r>
+            <a:r>
+              <a:rPr lang="sv-SE" sz="1400" dirty="0" err="1"/>
+              <a:t>removeItemFromMap_ok</a:t>
+            </a:r>
+            <a:r>
+              <a:rPr lang="sv-SE" sz="1400" dirty="0"/>
+              <a:t>(){</a:t>
+            </a:r>
+            <a:br>
+              <a:rPr lang="sv-SE" sz="1400" dirty="0"/>
+            </a:br>
+            <a:r>
+              <a:rPr lang="sv-SE" sz="1400" dirty="0"/>
+              <a:t>    </a:t>
+            </a:r>
+            <a:r>
+              <a:rPr lang="sv-SE" sz="1400" dirty="0" err="1"/>
+              <a:t>Map</a:t>
+            </a:r>
+            <a:r>
+              <a:rPr lang="sv-SE" sz="1400" dirty="0"/>
+              <a:t> </a:t>
+            </a:r>
+            <a:r>
+              <a:rPr lang="sv-SE" sz="1400" dirty="0" err="1"/>
+              <a:t>map</a:t>
+            </a:r>
+            <a:r>
+              <a:rPr lang="sv-SE" sz="1400" dirty="0"/>
+              <a:t> = new </a:t>
+            </a:r>
+            <a:r>
+              <a:rPr lang="sv-SE" sz="1400" dirty="0" err="1"/>
+              <a:t>Map</a:t>
+            </a:r>
+            <a:r>
+              <a:rPr lang="sv-SE" sz="1400" dirty="0"/>
+              <a:t>(20,20);</a:t>
+            </a:r>
+            <a:br>
+              <a:rPr lang="sv-SE" sz="1400" dirty="0"/>
+            </a:br>
+            <a:r>
+              <a:rPr lang="sv-SE" sz="1400" dirty="0"/>
+              <a:t>    Wall </a:t>
+            </a:r>
+            <a:r>
+              <a:rPr lang="sv-SE" sz="1400" dirty="0" err="1"/>
+              <a:t>wall</a:t>
+            </a:r>
+            <a:r>
+              <a:rPr lang="sv-SE" sz="1400" dirty="0"/>
+              <a:t> = new Wall();</a:t>
+            </a:r>
+            <a:br>
+              <a:rPr lang="sv-SE" sz="1400" dirty="0"/>
+            </a:br>
+            <a:r>
+              <a:rPr lang="sv-SE" sz="1400" dirty="0"/>
+              <a:t>    </a:t>
+            </a:r>
+            <a:r>
+              <a:rPr lang="sv-SE" sz="1400" i="1" dirty="0" err="1"/>
+              <a:t>assertNull</a:t>
+            </a:r>
+            <a:r>
+              <a:rPr lang="sv-SE" sz="1400" dirty="0"/>
+              <a:t>(</a:t>
+            </a:r>
+            <a:r>
+              <a:rPr lang="sv-SE" sz="1400" dirty="0" err="1"/>
+              <a:t>map.getMap</a:t>
+            </a:r>
+            <a:r>
+              <a:rPr lang="sv-SE" sz="1400" dirty="0"/>
+              <a:t>()[10][10]);</a:t>
+            </a:r>
+            <a:br>
+              <a:rPr lang="sv-SE" sz="1400" dirty="0"/>
+            </a:br>
+            <a:r>
+              <a:rPr lang="sv-SE" sz="1400" dirty="0"/>
+              <a:t>    </a:t>
+            </a:r>
+            <a:r>
+              <a:rPr lang="sv-SE" sz="1400" dirty="0" err="1"/>
+              <a:t>map.placeGameObject</a:t>
+            </a:r>
+            <a:r>
+              <a:rPr lang="sv-SE" sz="1400" dirty="0"/>
+              <a:t>(10, 10, </a:t>
+            </a:r>
+            <a:r>
+              <a:rPr lang="sv-SE" sz="1400" dirty="0" err="1"/>
+              <a:t>wall</a:t>
+            </a:r>
+            <a:r>
+              <a:rPr lang="sv-SE" sz="1400" dirty="0"/>
+              <a:t>);</a:t>
+            </a:r>
+            <a:br>
+              <a:rPr lang="sv-SE" sz="1400" dirty="0"/>
+            </a:br>
+            <a:r>
+              <a:rPr lang="sv-SE" sz="1400" dirty="0"/>
+              <a:t>    </a:t>
+            </a:r>
+            <a:r>
+              <a:rPr lang="sv-SE" sz="1400" i="1" dirty="0" err="1"/>
+              <a:t>assertEquals</a:t>
+            </a:r>
+            <a:r>
+              <a:rPr lang="sv-SE" sz="1400" dirty="0"/>
+              <a:t>(</a:t>
+            </a:r>
+            <a:r>
+              <a:rPr lang="sv-SE" sz="1400" dirty="0" err="1"/>
+              <a:t>wall</a:t>
+            </a:r>
+            <a:r>
+              <a:rPr lang="sv-SE" sz="1400" dirty="0"/>
+              <a:t>, </a:t>
+            </a:r>
+            <a:r>
+              <a:rPr lang="sv-SE" sz="1400" dirty="0" err="1"/>
+              <a:t>map.getMap</a:t>
+            </a:r>
+            <a:r>
+              <a:rPr lang="sv-SE" sz="1400" dirty="0"/>
+              <a:t>()[10][10]);</a:t>
+            </a:r>
+            <a:br>
+              <a:rPr lang="sv-SE" sz="1400" dirty="0"/>
+            </a:br>
+            <a:r>
+              <a:rPr lang="sv-SE" sz="1400" dirty="0"/>
+              <a:t>    </a:t>
+            </a:r>
+            <a:r>
+              <a:rPr lang="sv-SE" sz="1400" i="1" dirty="0" err="1"/>
+              <a:t>assertEquals</a:t>
+            </a:r>
+            <a:r>
+              <a:rPr lang="sv-SE" sz="1400" dirty="0"/>
+              <a:t>(</a:t>
+            </a:r>
+            <a:r>
+              <a:rPr lang="sv-SE" sz="1400" dirty="0" err="1"/>
+              <a:t>wall</a:t>
+            </a:r>
+            <a:r>
+              <a:rPr lang="sv-SE" sz="1400" dirty="0"/>
+              <a:t>, </a:t>
+            </a:r>
+            <a:r>
+              <a:rPr lang="sv-SE" sz="1400" dirty="0" err="1"/>
+              <a:t>map.removeItem</a:t>
+            </a:r>
+            <a:r>
+              <a:rPr lang="sv-SE" sz="1400" dirty="0"/>
+              <a:t>(10,10));</a:t>
+            </a:r>
+            <a:br>
+              <a:rPr lang="sv-SE" sz="1400" dirty="0"/>
+            </a:br>
+            <a:r>
+              <a:rPr lang="sv-SE" sz="1400" dirty="0"/>
+              <a:t>}</a:t>
+            </a:r>
+          </a:p>
           <a:p>
             <a:pPr marL="0" indent="0">
               <a:buNone/>
             </a:pPr>
-            <a:endParaRPr lang="sv-SE" dirty="0"/>
+            <a:endParaRPr lang="sv-SE" sz="1400" dirty="0"/>
+          </a:p>
+          <a:p>
+            <a:pPr marL="0" indent="0">
+              <a:buNone/>
+            </a:pPr>
+            <a:r>
+              <a:rPr lang="sv-SE" sz="1400" dirty="0"/>
+              <a:t>@Test</a:t>
+            </a:r>
+            <a:br>
+              <a:rPr lang="sv-SE" sz="1400" dirty="0"/>
+            </a:br>
+            <a:r>
+              <a:rPr lang="sv-SE" sz="1400" dirty="0"/>
+              <a:t>public </a:t>
+            </a:r>
+            <a:r>
+              <a:rPr lang="sv-SE" sz="1400" dirty="0" err="1"/>
+              <a:t>void</a:t>
+            </a:r>
+            <a:r>
+              <a:rPr lang="sv-SE" sz="1400" dirty="0"/>
+              <a:t> </a:t>
+            </a:r>
+            <a:r>
+              <a:rPr lang="sv-SE" sz="1400" dirty="0" err="1"/>
+              <a:t>removeItemThatDontExist_ok</a:t>
+            </a:r>
+            <a:r>
+              <a:rPr lang="sv-SE" sz="1400" dirty="0"/>
+              <a:t>(){</a:t>
+            </a:r>
+            <a:br>
+              <a:rPr lang="sv-SE" sz="1400" dirty="0"/>
+            </a:br>
+            <a:r>
+              <a:rPr lang="sv-SE" sz="1400" dirty="0"/>
+              <a:t>    </a:t>
+            </a:r>
+            <a:r>
+              <a:rPr lang="sv-SE" sz="1400" i="1" dirty="0" err="1"/>
+              <a:t>assertNull</a:t>
+            </a:r>
+            <a:r>
+              <a:rPr lang="sv-SE" sz="1400" dirty="0"/>
+              <a:t>(</a:t>
+            </a:r>
+            <a:r>
+              <a:rPr lang="sv-SE" sz="1400" dirty="0" err="1"/>
+              <a:t>map.removeItem</a:t>
+            </a:r>
+            <a:r>
+              <a:rPr lang="sv-SE" sz="1400" dirty="0"/>
+              <a:t>(10,10));</a:t>
+            </a:r>
+            <a:br>
+              <a:rPr lang="sv-SE" sz="1400" dirty="0"/>
+            </a:br>
+            <a:r>
+              <a:rPr lang="sv-SE" sz="1400" dirty="0"/>
+              <a:t>}</a:t>
+            </a:r>
+            <a:br>
+              <a:rPr lang="sv-SE" sz="1400" dirty="0"/>
+            </a:br>
+            <a:br>
+              <a:rPr lang="sv-SE" sz="1400" dirty="0"/>
+            </a:br>
+            <a:r>
+              <a:rPr lang="sv-SE" sz="1400" dirty="0"/>
+              <a:t>@Test(</a:t>
+            </a:r>
+            <a:r>
+              <a:rPr lang="sv-SE" sz="1400" dirty="0" err="1"/>
+              <a:t>expected</a:t>
+            </a:r>
+            <a:r>
+              <a:rPr lang="sv-SE" sz="1400" dirty="0"/>
+              <a:t> = </a:t>
+            </a:r>
+            <a:r>
+              <a:rPr lang="sv-SE" sz="1400" dirty="0" err="1"/>
+              <a:t>IndexOutOfBoundsException.class</a:t>
+            </a:r>
+            <a:r>
+              <a:rPr lang="sv-SE" sz="1400" dirty="0"/>
+              <a:t>)</a:t>
+            </a:r>
+            <a:br>
+              <a:rPr lang="sv-SE" sz="1400" dirty="0"/>
+            </a:br>
+            <a:r>
+              <a:rPr lang="sv-SE" sz="1400" dirty="0"/>
+              <a:t>public </a:t>
+            </a:r>
+            <a:r>
+              <a:rPr lang="sv-SE" sz="1400" dirty="0" err="1"/>
+              <a:t>void</a:t>
+            </a:r>
+            <a:r>
+              <a:rPr lang="sv-SE" sz="1400" dirty="0"/>
+              <a:t> </a:t>
+            </a:r>
+            <a:r>
+              <a:rPr lang="sv-SE" sz="1400" dirty="0" err="1"/>
+              <a:t>removeItemFromMap_indexOutOfBound</a:t>
+            </a:r>
+            <a:r>
+              <a:rPr lang="sv-SE" sz="1400" dirty="0"/>
+              <a:t>(){</a:t>
+            </a:r>
+            <a:br>
+              <a:rPr lang="sv-SE" sz="1400" dirty="0"/>
+            </a:br>
+            <a:r>
+              <a:rPr lang="sv-SE" sz="1400" dirty="0"/>
+              <a:t>    </a:t>
+            </a:r>
+            <a:r>
+              <a:rPr lang="sv-SE" sz="1400" dirty="0" err="1"/>
+              <a:t>map.removeItem</a:t>
+            </a:r>
+            <a:r>
+              <a:rPr lang="sv-SE" sz="1400" dirty="0"/>
+              <a:t>(400,500);</a:t>
+            </a:r>
+            <a:br>
+              <a:rPr lang="sv-SE" sz="1400" dirty="0"/>
+            </a:br>
+            <a:r>
+              <a:rPr lang="sv-SE" sz="1400" dirty="0"/>
+              <a:t>}</a:t>
+            </a:r>
+          </a:p>
+        </p:txBody>
+      </p:sp>
+      <p:sp>
+        <p:nvSpPr>
+          <p:cNvPr id="6" name="Platshållare för text 5"/>
+          <p:cNvSpPr>
+            <a:spLocks noGrp="1"/>
+          </p:cNvSpPr>
+          <p:nvPr>
+            <p:ph type="body" sz="quarter" idx="3"/>
+          </p:nvPr>
+        </p:nvSpPr>
+        <p:spPr>
+          <a:xfrm>
+            <a:off x="6175376" y="1451373"/>
+            <a:ext cx="5183188" cy="411956"/>
+          </a:xfrm>
+        </p:spPr>
+        <p:txBody>
+          <a:bodyPr>
+            <a:normAutofit lnSpcReduction="10000"/>
+          </a:bodyPr>
+          <a:lstStyle/>
+          <a:p>
+            <a:r>
+              <a:rPr lang="sv-SE" dirty="0"/>
+              <a:t>Koden som testas</a:t>
+            </a:r>
+          </a:p>
+        </p:txBody>
+      </p:sp>
+      <p:sp>
+        <p:nvSpPr>
+          <p:cNvPr id="7" name="Platshållare för innehåll 6"/>
+          <p:cNvSpPr>
+            <a:spLocks noGrp="1"/>
+          </p:cNvSpPr>
+          <p:nvPr>
+            <p:ph sz="quarter" idx="4"/>
+          </p:nvPr>
+        </p:nvSpPr>
+        <p:spPr>
+          <a:xfrm>
+            <a:off x="6172200" y="2093118"/>
+            <a:ext cx="5183188" cy="4399755"/>
+          </a:xfrm>
+        </p:spPr>
+        <p:txBody>
+          <a:bodyPr>
+            <a:normAutofit/>
+          </a:bodyPr>
+          <a:lstStyle/>
+          <a:p>
+            <a:pPr marL="0" indent="0">
+              <a:buNone/>
+            </a:pPr>
+            <a:r>
+              <a:rPr lang="sv-SE" sz="1600" dirty="0"/>
+              <a:t>public </a:t>
+            </a:r>
+            <a:r>
+              <a:rPr lang="sv-SE" sz="1600" dirty="0" err="1"/>
+              <a:t>GameObject</a:t>
+            </a:r>
+            <a:r>
+              <a:rPr lang="sv-SE" sz="1600" dirty="0"/>
+              <a:t> </a:t>
+            </a:r>
+            <a:r>
+              <a:rPr lang="sv-SE" sz="1600" dirty="0" err="1"/>
+              <a:t>removeItem</a:t>
+            </a:r>
+            <a:r>
+              <a:rPr lang="sv-SE" sz="1600" dirty="0"/>
+              <a:t>(</a:t>
+            </a:r>
+            <a:r>
+              <a:rPr lang="sv-SE" sz="1600" dirty="0" err="1"/>
+              <a:t>int</a:t>
+            </a:r>
+            <a:r>
+              <a:rPr lang="sv-SE" sz="1600" dirty="0"/>
+              <a:t> x, </a:t>
+            </a:r>
+            <a:r>
+              <a:rPr lang="sv-SE" sz="1600" dirty="0" err="1"/>
+              <a:t>int</a:t>
+            </a:r>
+            <a:r>
+              <a:rPr lang="sv-SE" sz="1600" dirty="0"/>
+              <a:t> y) {</a:t>
+            </a:r>
+            <a:br>
+              <a:rPr lang="sv-SE" sz="1600" dirty="0"/>
+            </a:br>
+            <a:r>
+              <a:rPr lang="sv-SE" sz="1600" dirty="0"/>
+              <a:t>    </a:t>
+            </a:r>
+            <a:r>
+              <a:rPr lang="sv-SE" sz="1600" dirty="0" err="1"/>
+              <a:t>if</a:t>
+            </a:r>
+            <a:r>
+              <a:rPr lang="sv-SE" sz="1600" dirty="0"/>
+              <a:t> (x &gt; </a:t>
+            </a:r>
+            <a:r>
+              <a:rPr lang="sv-SE" sz="1600" dirty="0" err="1"/>
+              <a:t>width</a:t>
+            </a:r>
+            <a:r>
+              <a:rPr lang="sv-SE" sz="1600" dirty="0"/>
+              <a:t>) {</a:t>
+            </a:r>
+            <a:br>
+              <a:rPr lang="sv-SE" sz="1600" dirty="0"/>
+            </a:br>
+            <a:r>
+              <a:rPr lang="sv-SE" sz="1600" dirty="0"/>
+              <a:t>        </a:t>
+            </a:r>
+            <a:r>
+              <a:rPr lang="sv-SE" sz="1600" dirty="0" err="1"/>
+              <a:t>throw</a:t>
+            </a:r>
+            <a:r>
+              <a:rPr lang="sv-SE" sz="1600" dirty="0"/>
+              <a:t> new </a:t>
+            </a:r>
+            <a:r>
+              <a:rPr lang="sv-SE" sz="1600" dirty="0" err="1"/>
+              <a:t>IndexOutOfBoundsException</a:t>
+            </a:r>
+            <a:r>
+              <a:rPr lang="sv-SE" sz="1600" dirty="0"/>
+              <a:t>();</a:t>
+            </a:r>
+            <a:br>
+              <a:rPr lang="sv-SE" sz="1600" dirty="0"/>
+            </a:br>
+            <a:r>
+              <a:rPr lang="sv-SE" sz="1600" dirty="0"/>
+              <a:t>    }</a:t>
+            </a:r>
+            <a:br>
+              <a:rPr lang="sv-SE" sz="1600" dirty="0"/>
+            </a:br>
+            <a:r>
+              <a:rPr lang="sv-SE" sz="1600" dirty="0"/>
+              <a:t>    </a:t>
+            </a:r>
+            <a:r>
+              <a:rPr lang="sv-SE" sz="1600" dirty="0" err="1"/>
+              <a:t>else</a:t>
+            </a:r>
+            <a:r>
+              <a:rPr lang="sv-SE" sz="1600" dirty="0"/>
+              <a:t> </a:t>
+            </a:r>
+            <a:r>
+              <a:rPr lang="sv-SE" sz="1600" dirty="0" err="1"/>
+              <a:t>if</a:t>
+            </a:r>
+            <a:r>
+              <a:rPr lang="sv-SE" sz="1600" dirty="0"/>
+              <a:t> (y &gt; </a:t>
+            </a:r>
+            <a:r>
+              <a:rPr lang="sv-SE" sz="1600" dirty="0" err="1"/>
+              <a:t>height</a:t>
+            </a:r>
+            <a:r>
+              <a:rPr lang="sv-SE" sz="1600" dirty="0"/>
+              <a:t>) {</a:t>
+            </a:r>
+            <a:br>
+              <a:rPr lang="sv-SE" sz="1600" dirty="0"/>
+            </a:br>
+            <a:r>
+              <a:rPr lang="sv-SE" sz="1600" dirty="0"/>
+              <a:t>        </a:t>
+            </a:r>
+            <a:r>
+              <a:rPr lang="sv-SE" sz="1600" dirty="0" err="1"/>
+              <a:t>throw</a:t>
+            </a:r>
+            <a:r>
+              <a:rPr lang="sv-SE" sz="1600" dirty="0"/>
+              <a:t> new </a:t>
+            </a:r>
+            <a:r>
+              <a:rPr lang="sv-SE" sz="1600" dirty="0" err="1"/>
+              <a:t>IndexOutOfBoundsException</a:t>
+            </a:r>
+            <a:r>
+              <a:rPr lang="sv-SE" sz="1600" dirty="0"/>
+              <a:t>();</a:t>
+            </a:r>
+            <a:br>
+              <a:rPr lang="sv-SE" sz="1600" dirty="0"/>
+            </a:br>
+            <a:r>
+              <a:rPr lang="sv-SE" sz="1600" dirty="0"/>
+              <a:t>    }</a:t>
+            </a:r>
+            <a:br>
+              <a:rPr lang="sv-SE" sz="1600" dirty="0"/>
+            </a:br>
+            <a:r>
+              <a:rPr lang="sv-SE" sz="1600" dirty="0"/>
+              <a:t>    </a:t>
+            </a:r>
+            <a:r>
+              <a:rPr lang="sv-SE" sz="1600" dirty="0" err="1"/>
+              <a:t>GameObject</a:t>
+            </a:r>
+            <a:r>
+              <a:rPr lang="sv-SE" sz="1600" dirty="0"/>
+              <a:t> </a:t>
+            </a:r>
+            <a:r>
+              <a:rPr lang="sv-SE" sz="1600" dirty="0" err="1"/>
+              <a:t>obj</a:t>
+            </a:r>
+            <a:r>
+              <a:rPr lang="sv-SE" sz="1600" dirty="0"/>
+              <a:t> = </a:t>
+            </a:r>
+            <a:r>
+              <a:rPr lang="sv-SE" sz="1600" dirty="0" err="1"/>
+              <a:t>map</a:t>
+            </a:r>
+            <a:r>
+              <a:rPr lang="sv-SE" sz="1600" dirty="0"/>
+              <a:t>[x][y];</a:t>
+            </a:r>
+            <a:br>
+              <a:rPr lang="sv-SE" sz="1600" dirty="0"/>
+            </a:br>
+            <a:r>
+              <a:rPr lang="sv-SE" sz="1600" dirty="0"/>
+              <a:t>    </a:t>
+            </a:r>
+            <a:r>
+              <a:rPr lang="sv-SE" sz="1600" dirty="0" err="1"/>
+              <a:t>map</a:t>
+            </a:r>
+            <a:r>
+              <a:rPr lang="sv-SE" sz="1600" dirty="0"/>
+              <a:t>[x][y] = </a:t>
+            </a:r>
+            <a:r>
+              <a:rPr lang="sv-SE" sz="1600" dirty="0" err="1"/>
+              <a:t>null</a:t>
+            </a:r>
+            <a:r>
+              <a:rPr lang="sv-SE" sz="1600" dirty="0"/>
+              <a:t>;</a:t>
+            </a:r>
+            <a:br>
+              <a:rPr lang="sv-SE" sz="1600" dirty="0"/>
+            </a:br>
+            <a:r>
+              <a:rPr lang="sv-SE" sz="1600" dirty="0"/>
+              <a:t>    </a:t>
+            </a:r>
+            <a:r>
+              <a:rPr lang="sv-SE" sz="1600" dirty="0" err="1"/>
+              <a:t>return</a:t>
+            </a:r>
+            <a:r>
+              <a:rPr lang="sv-SE" sz="1600" dirty="0"/>
+              <a:t> </a:t>
+            </a:r>
+            <a:r>
+              <a:rPr lang="sv-SE" sz="1600" dirty="0" err="1"/>
+              <a:t>obj</a:t>
+            </a:r>
+            <a:r>
+              <a:rPr lang="sv-SE" sz="1600" dirty="0"/>
+              <a:t>;</a:t>
+            </a:r>
+            <a:br>
+              <a:rPr lang="sv-SE" sz="1600" dirty="0"/>
+            </a:br>
+            <a:r>
+              <a:rPr lang="sv-SE" sz="1600" dirty="0"/>
+              <a:t>}</a:t>
+            </a:r>
           </a:p>
         </p:txBody>
       </p:sp>

</xml_diff>

<commit_message>
Ändrat PPT med ett till TDD fall
</commit_message>
<xml_diff>
--- a/docs/Slutredovisning_grp5_v8.pptx
+++ b/docs/Slutredovisning_grp5_v8.pptx
@@ -12286,13 +12286,287 @@
         </p:nvSpPr>
         <p:spPr/>
         <p:txBody>
-          <a:bodyPr/>
+          <a:bodyPr>
+            <a:noAutofit/>
+          </a:bodyPr>
           <a:lstStyle/>
           <a:p>
             <a:pPr marL="0" indent="0">
               <a:buNone/>
             </a:pPr>
-            <a:endParaRPr lang="sv-SE" dirty="0"/>
+            <a:r>
+              <a:rPr lang="sv-SE" sz="1400" dirty="0"/>
+              <a:t>@Test</a:t>
+            </a:r>
+            <a:br>
+              <a:rPr lang="sv-SE" sz="1400" dirty="0"/>
+            </a:br>
+            <a:r>
+              <a:rPr lang="sv-SE" sz="1400" dirty="0"/>
+              <a:t>public </a:t>
+            </a:r>
+            <a:r>
+              <a:rPr lang="sv-SE" sz="1400" dirty="0" err="1"/>
+              <a:t>void</a:t>
+            </a:r>
+            <a:r>
+              <a:rPr lang="sv-SE" sz="1400" dirty="0"/>
+              <a:t> getStrength_EquipmentEmtpy_0strength(){</a:t>
+            </a:r>
+            <a:br>
+              <a:rPr lang="sv-SE" sz="1400" dirty="0"/>
+            </a:br>
+            <a:r>
+              <a:rPr lang="sv-SE" sz="1400" dirty="0"/>
+              <a:t>    Hero </a:t>
+            </a:r>
+            <a:r>
+              <a:rPr lang="sv-SE" sz="1400" dirty="0" err="1"/>
+              <a:t>hero</a:t>
+            </a:r>
+            <a:r>
+              <a:rPr lang="sv-SE" sz="1400" dirty="0"/>
+              <a:t> = new Hero(100);</a:t>
+            </a:r>
+            <a:br>
+              <a:rPr lang="sv-SE" sz="1400" dirty="0"/>
+            </a:br>
+            <a:r>
+              <a:rPr lang="sv-SE" sz="1400" dirty="0"/>
+              <a:t>    </a:t>
+            </a:r>
+            <a:r>
+              <a:rPr lang="sv-SE" sz="1400" i="1" dirty="0" err="1"/>
+              <a:t>assertEquals</a:t>
+            </a:r>
+            <a:r>
+              <a:rPr lang="sv-SE" sz="1400" dirty="0"/>
+              <a:t>(0, </a:t>
+            </a:r>
+            <a:r>
+              <a:rPr lang="sv-SE" sz="1400" dirty="0" err="1"/>
+              <a:t>hero.getStrength</a:t>
+            </a:r>
+            <a:r>
+              <a:rPr lang="sv-SE" sz="1400" dirty="0"/>
+              <a:t>());</a:t>
+            </a:r>
+            <a:br>
+              <a:rPr lang="sv-SE" sz="1400" dirty="0"/>
+            </a:br>
+            <a:r>
+              <a:rPr lang="sv-SE" sz="1400" dirty="0"/>
+              <a:t>}</a:t>
+            </a:r>
+            <a:br>
+              <a:rPr lang="sv-SE" sz="1400" dirty="0"/>
+            </a:br>
+            <a:br>
+              <a:rPr lang="sv-SE" sz="1400" dirty="0"/>
+            </a:br>
+            <a:r>
+              <a:rPr lang="sv-SE" sz="1400" dirty="0"/>
+              <a:t>@Test</a:t>
+            </a:r>
+            <a:br>
+              <a:rPr lang="sv-SE" sz="1400" dirty="0"/>
+            </a:br>
+            <a:r>
+              <a:rPr lang="sv-SE" sz="1400" dirty="0"/>
+              <a:t>public </a:t>
+            </a:r>
+            <a:r>
+              <a:rPr lang="sv-SE" sz="1400" dirty="0" err="1"/>
+              <a:t>void</a:t>
+            </a:r>
+            <a:r>
+              <a:rPr lang="sv-SE" sz="1400" dirty="0"/>
+              <a:t> getStrength_EquipmentWeapon_5Strength(){</a:t>
+            </a:r>
+            <a:br>
+              <a:rPr lang="sv-SE" sz="1400" dirty="0"/>
+            </a:br>
+            <a:r>
+              <a:rPr lang="sv-SE" sz="1400" dirty="0"/>
+              <a:t>    Hero </a:t>
+            </a:r>
+            <a:r>
+              <a:rPr lang="sv-SE" sz="1400" dirty="0" err="1"/>
+              <a:t>hero</a:t>
+            </a:r>
+            <a:r>
+              <a:rPr lang="sv-SE" sz="1400" dirty="0"/>
+              <a:t> = new Hero(100);</a:t>
+            </a:r>
+            <a:br>
+              <a:rPr lang="sv-SE" sz="1400" dirty="0"/>
+            </a:br>
+            <a:r>
+              <a:rPr lang="sv-SE" sz="1400" dirty="0"/>
+              <a:t>    </a:t>
+            </a:r>
+            <a:r>
+              <a:rPr lang="sv-SE" sz="1400" dirty="0" err="1"/>
+              <a:t>hero.pickUpItem</a:t>
+            </a:r>
+            <a:r>
+              <a:rPr lang="sv-SE" sz="1400" dirty="0"/>
+              <a:t>(new </a:t>
+            </a:r>
+            <a:r>
+              <a:rPr lang="sv-SE" sz="1400" dirty="0" err="1"/>
+              <a:t>Weapon</a:t>
+            </a:r>
+            <a:r>
+              <a:rPr lang="sv-SE" sz="1400" dirty="0"/>
+              <a:t>(5));</a:t>
+            </a:r>
+            <a:br>
+              <a:rPr lang="sv-SE" sz="1400" dirty="0"/>
+            </a:br>
+            <a:r>
+              <a:rPr lang="sv-SE" sz="1400" dirty="0"/>
+              <a:t>    </a:t>
+            </a:r>
+            <a:r>
+              <a:rPr lang="sv-SE" sz="1400" i="1" dirty="0" err="1"/>
+              <a:t>assertEquals</a:t>
+            </a:r>
+            <a:r>
+              <a:rPr lang="sv-SE" sz="1400" dirty="0"/>
+              <a:t>(5, </a:t>
+            </a:r>
+            <a:r>
+              <a:rPr lang="sv-SE" sz="1400" dirty="0" err="1"/>
+              <a:t>hero.getStrength</a:t>
+            </a:r>
+            <a:r>
+              <a:rPr lang="sv-SE" sz="1400" dirty="0"/>
+              <a:t>());</a:t>
+            </a:r>
+            <a:br>
+              <a:rPr lang="sv-SE" sz="1400" dirty="0"/>
+            </a:br>
+            <a:r>
+              <a:rPr lang="sv-SE" sz="1400" dirty="0"/>
+              <a:t>}</a:t>
+            </a:r>
+            <a:br>
+              <a:rPr lang="sv-SE" sz="1400" dirty="0"/>
+            </a:br>
+            <a:br>
+              <a:rPr lang="sv-SE" sz="1400" dirty="0"/>
+            </a:br>
+            <a:r>
+              <a:rPr lang="sv-SE" sz="1400" dirty="0"/>
+              <a:t>@Test</a:t>
+            </a:r>
+            <a:br>
+              <a:rPr lang="sv-SE" sz="1400" dirty="0"/>
+            </a:br>
+            <a:r>
+              <a:rPr lang="sv-SE" sz="1400" dirty="0"/>
+              <a:t>public </a:t>
+            </a:r>
+            <a:r>
+              <a:rPr lang="sv-SE" sz="1400" dirty="0" err="1"/>
+              <a:t>void</a:t>
+            </a:r>
+            <a:r>
+              <a:rPr lang="sv-SE" sz="1400" dirty="0"/>
+              <a:t> getStrength_EquipmentWeaponArmor_10Strength(){</a:t>
+            </a:r>
+            <a:br>
+              <a:rPr lang="sv-SE" sz="1400" dirty="0"/>
+            </a:br>
+            <a:r>
+              <a:rPr lang="sv-SE" sz="1400" dirty="0"/>
+              <a:t>    Hero </a:t>
+            </a:r>
+            <a:r>
+              <a:rPr lang="sv-SE" sz="1400" dirty="0" err="1"/>
+              <a:t>hero</a:t>
+            </a:r>
+            <a:r>
+              <a:rPr lang="sv-SE" sz="1400" dirty="0"/>
+              <a:t> = new Hero(100);</a:t>
+            </a:r>
+            <a:br>
+              <a:rPr lang="sv-SE" sz="1400" dirty="0"/>
+            </a:br>
+            <a:r>
+              <a:rPr lang="sv-SE" sz="1400" dirty="0"/>
+              <a:t>    </a:t>
+            </a:r>
+            <a:r>
+              <a:rPr lang="sv-SE" sz="1400" dirty="0" err="1"/>
+              <a:t>hero.pickUpItem</a:t>
+            </a:r>
+            <a:r>
+              <a:rPr lang="sv-SE" sz="1400" dirty="0"/>
+              <a:t>(new </a:t>
+            </a:r>
+            <a:r>
+              <a:rPr lang="sv-SE" sz="1400" dirty="0" err="1"/>
+              <a:t>Weapon</a:t>
+            </a:r>
+            <a:r>
+              <a:rPr lang="sv-SE" sz="1400" dirty="0"/>
+              <a:t>(5));</a:t>
+            </a:r>
+            <a:br>
+              <a:rPr lang="sv-SE" sz="1400" dirty="0"/>
+            </a:br>
+            <a:r>
+              <a:rPr lang="sv-SE" sz="1400" dirty="0"/>
+              <a:t>    </a:t>
+            </a:r>
+            <a:r>
+              <a:rPr lang="sv-SE" sz="1400" dirty="0" err="1"/>
+              <a:t>hero.pickUpItem</a:t>
+            </a:r>
+            <a:r>
+              <a:rPr lang="sv-SE" sz="1400" dirty="0"/>
+              <a:t>(new </a:t>
+            </a:r>
+            <a:r>
+              <a:rPr lang="sv-SE" sz="1400" dirty="0" err="1"/>
+              <a:t>Armor</a:t>
+            </a:r>
+            <a:r>
+              <a:rPr lang="sv-SE" sz="1400" dirty="0"/>
+              <a:t>(5));</a:t>
+            </a:r>
+            <a:br>
+              <a:rPr lang="sv-SE" sz="1400" dirty="0"/>
+            </a:br>
+            <a:r>
+              <a:rPr lang="sv-SE" sz="1400" dirty="0"/>
+              <a:t>    </a:t>
+            </a:r>
+            <a:r>
+              <a:rPr lang="sv-SE" sz="1400" i="1" dirty="0" err="1"/>
+              <a:t>assertEquals</a:t>
+            </a:r>
+            <a:r>
+              <a:rPr lang="sv-SE" sz="1400" dirty="0"/>
+              <a:t>(10, </a:t>
+            </a:r>
+            <a:r>
+              <a:rPr lang="sv-SE" sz="1400" dirty="0" err="1"/>
+              <a:t>hero.getStrength</a:t>
+            </a:r>
+            <a:r>
+              <a:rPr lang="sv-SE" sz="1400" dirty="0"/>
+              <a:t>());</a:t>
+            </a:r>
+            <a:br>
+              <a:rPr lang="sv-SE" sz="1400" dirty="0"/>
+            </a:br>
+            <a:r>
+              <a:rPr lang="sv-SE" sz="1400" dirty="0"/>
+              <a:t>}</a:t>
+            </a:r>
           </a:p>
         </p:txBody>
       </p:sp>
@@ -12330,13 +12604,192 @@
         </p:nvSpPr>
         <p:spPr/>
         <p:txBody>
-          <a:bodyPr/>
+          <a:bodyPr>
+            <a:normAutofit fontScale="55000" lnSpcReduction="20000"/>
+          </a:bodyPr>
           <a:lstStyle/>
           <a:p>
             <a:pPr marL="0" indent="0">
               <a:buNone/>
             </a:pPr>
-            <a:endParaRPr lang="sv-SE" dirty="0"/>
+            <a:r>
+              <a:rPr lang="sv-SE" dirty="0"/>
+              <a:t>public </a:t>
+            </a:r>
+            <a:r>
+              <a:rPr lang="sv-SE" dirty="0" err="1"/>
+              <a:t>int</a:t>
+            </a:r>
+            <a:r>
+              <a:rPr lang="sv-SE" dirty="0"/>
+              <a:t> </a:t>
+            </a:r>
+            <a:r>
+              <a:rPr lang="sv-SE" dirty="0" err="1"/>
+              <a:t>getStrength</a:t>
+            </a:r>
+            <a:r>
+              <a:rPr lang="sv-SE" dirty="0"/>
+              <a:t>(){</a:t>
+            </a:r>
+          </a:p>
+          <a:p>
+            <a:pPr marL="0" indent="0">
+              <a:buNone/>
+            </a:pPr>
+            <a:br>
+              <a:rPr lang="sv-SE" dirty="0"/>
+            </a:br>
+            <a:r>
+              <a:rPr lang="sv-SE" dirty="0"/>
+              <a:t>   </a:t>
+            </a:r>
+            <a:r>
+              <a:rPr lang="sv-SE" dirty="0" err="1"/>
+              <a:t>int</a:t>
+            </a:r>
+            <a:r>
+              <a:rPr lang="sv-SE" dirty="0"/>
+              <a:t> total = 0;</a:t>
+            </a:r>
+          </a:p>
+          <a:p>
+            <a:pPr marL="0" indent="0">
+              <a:buNone/>
+            </a:pPr>
+            <a:br>
+              <a:rPr lang="sv-SE" dirty="0"/>
+            </a:br>
+            <a:r>
+              <a:rPr lang="sv-SE" dirty="0"/>
+              <a:t>    </a:t>
+            </a:r>
+            <a:r>
+              <a:rPr lang="sv-SE" dirty="0" err="1"/>
+              <a:t>if</a:t>
+            </a:r>
+            <a:r>
+              <a:rPr lang="sv-SE" dirty="0"/>
+              <a:t>(</a:t>
+            </a:r>
+            <a:r>
+              <a:rPr lang="sv-SE" dirty="0" err="1"/>
+              <a:t>equippedWeapon</a:t>
+            </a:r>
+            <a:r>
+              <a:rPr lang="sv-SE" dirty="0"/>
+              <a:t> != </a:t>
+            </a:r>
+            <a:r>
+              <a:rPr lang="sv-SE" dirty="0" err="1"/>
+              <a:t>null</a:t>
+            </a:r>
+            <a:r>
+              <a:rPr lang="sv-SE" dirty="0"/>
+              <a:t>){</a:t>
+            </a:r>
+            <a:br>
+              <a:rPr lang="sv-SE" dirty="0"/>
+            </a:br>
+            <a:r>
+              <a:rPr lang="sv-SE" dirty="0"/>
+              <a:t>        total += </a:t>
+            </a:r>
+            <a:r>
+              <a:rPr lang="sv-SE" dirty="0" err="1"/>
+              <a:t>equippedWeapon.getDamage</a:t>
+            </a:r>
+            <a:r>
+              <a:rPr lang="sv-SE" dirty="0"/>
+              <a:t>();</a:t>
+            </a:r>
+            <a:br>
+              <a:rPr lang="sv-SE" dirty="0"/>
+            </a:br>
+            <a:r>
+              <a:rPr lang="sv-SE" dirty="0"/>
+              <a:t>    }</a:t>
+            </a:r>
+            <a:br>
+              <a:rPr lang="sv-SE" dirty="0"/>
+            </a:br>
+            <a:r>
+              <a:rPr lang="sv-SE" dirty="0"/>
+              <a:t>    </a:t>
+            </a:r>
+            <a:r>
+              <a:rPr lang="sv-SE" dirty="0" err="1"/>
+              <a:t>if</a:t>
+            </a:r>
+            <a:r>
+              <a:rPr lang="sv-SE" dirty="0"/>
+              <a:t>(</a:t>
+            </a:r>
+            <a:r>
+              <a:rPr lang="sv-SE" dirty="0" err="1"/>
+              <a:t>equippedArmor</a:t>
+            </a:r>
+            <a:r>
+              <a:rPr lang="sv-SE" dirty="0"/>
+              <a:t> != </a:t>
+            </a:r>
+            <a:r>
+              <a:rPr lang="sv-SE" dirty="0" err="1"/>
+              <a:t>null</a:t>
+            </a:r>
+            <a:r>
+              <a:rPr lang="sv-SE" dirty="0"/>
+              <a:t>){</a:t>
+            </a:r>
+            <a:br>
+              <a:rPr lang="sv-SE" dirty="0"/>
+            </a:br>
+            <a:r>
+              <a:rPr lang="sv-SE" dirty="0"/>
+              <a:t>        total += </a:t>
+            </a:r>
+            <a:r>
+              <a:rPr lang="sv-SE" dirty="0" err="1"/>
+              <a:t>equippedArmor.getResistance</a:t>
+            </a:r>
+            <a:r>
+              <a:rPr lang="sv-SE" dirty="0"/>
+              <a:t>();</a:t>
+            </a:r>
+            <a:br>
+              <a:rPr lang="sv-SE" dirty="0"/>
+            </a:br>
+            <a:r>
+              <a:rPr lang="sv-SE" dirty="0"/>
+              <a:t>    }</a:t>
+            </a:r>
+          </a:p>
+          <a:p>
+            <a:pPr marL="0" indent="0">
+              <a:buNone/>
+            </a:pPr>
+            <a:br>
+              <a:rPr lang="sv-SE" dirty="0"/>
+            </a:br>
+            <a:r>
+              <a:rPr lang="sv-SE" dirty="0"/>
+              <a:t>    </a:t>
+            </a:r>
+            <a:r>
+              <a:rPr lang="sv-SE" dirty="0" err="1"/>
+              <a:t>return</a:t>
+            </a:r>
+            <a:r>
+              <a:rPr lang="sv-SE" dirty="0"/>
+              <a:t> total;</a:t>
+            </a:r>
+            <a:br>
+              <a:rPr lang="sv-SE" dirty="0"/>
+            </a:br>
+            <a:r>
+              <a:rPr lang="sv-SE" dirty="0"/>
+              <a:t>}</a:t>
+            </a:r>
           </a:p>
         </p:txBody>
       </p:sp>

</xml_diff>

<commit_message>
Created tests from the equivalence partitioning (that were not already written) and updated presentation with second FindBugs slide.
</commit_message>
<xml_diff>
--- a/docs/Slutredovisning_grp5_v8.pptx
+++ b/docs/Slutredovisning_grp5_v8.pptx
@@ -5,7 +5,7 @@
     <p:sldMasterId id="2147483648" r:id="rId1"/>
   </p:sldMasterIdLst>
   <p:notesMasterIdLst>
-    <p:notesMasterId r:id="rId37"/>
+    <p:notesMasterId r:id="rId38"/>
   </p:notesMasterIdLst>
   <p:sldIdLst>
     <p:sldId id="256" r:id="rId2"/>
@@ -37,17 +37,18 @@
     <p:sldId id="274" r:id="rId28"/>
     <p:sldId id="275" r:id="rId29"/>
     <p:sldId id="276" r:id="rId30"/>
-    <p:sldId id="277" r:id="rId31"/>
-    <p:sldId id="297" r:id="rId32"/>
-    <p:sldId id="278" r:id="rId33"/>
-    <p:sldId id="279" r:id="rId34"/>
-    <p:sldId id="280" r:id="rId35"/>
-    <p:sldId id="294" r:id="rId36"/>
+    <p:sldId id="301" r:id="rId31"/>
+    <p:sldId id="277" r:id="rId32"/>
+    <p:sldId id="297" r:id="rId33"/>
+    <p:sldId id="278" r:id="rId34"/>
+    <p:sldId id="279" r:id="rId35"/>
+    <p:sldId id="280" r:id="rId36"/>
+    <p:sldId id="294" r:id="rId37"/>
   </p:sldIdLst>
   <p:sldSz cx="12192000" cy="6858000"/>
   <p:notesSz cx="6858000" cy="9144000"/>
   <p:custDataLst>
-    <p:tags r:id="rId38"/>
+    <p:tags r:id="rId39"/>
   </p:custDataLst>
   <p:defaultTextStyle>
     <a:defPPr>
@@ -3647,12 +3648,11 @@
                 <a:ea typeface="+mn-ea"/>
                 <a:cs typeface="+mn-cs"/>
               </a:rPr>
-              <a:t>En presentation och diskussion kring ett antal lämpliga statiska mått på koden. Att vi inte specificerar exakt vilka mått som ska tas upp beror på att olika verktyg har olika uppsättningar, men vi förväntar oss fler och mer intressanta mått än bara rena storleksmått som LOC, #klasser, #metoder, etc. Även här är det viktigt att förhållas sig till måtten, inte bara lista dem. </a:t>
-            </a:r>
-            <a:r>
-              <a:rPr lang="sv-SE" dirty="0"/>
-              <a:t>Rader kod för projektet resp. testerna för att kunna jämföra.</a:t>
-            </a:r>
+              <a:t>En presentation av de problem som hittats med hjälp av verktyg för statisk analys och en diskussion av dem enligt anvisningarna. Det räcker alltså inte med att bara lista problemen, ni måste förhålla er till dem också. Tänk också på att ni ska göra detta både på koden som den såg ut före granskningen och på koden efter att ni rättat det som kommit fram under granskningen. OBS sätt upp känsligheten så saker hittas!</a:t>
+            </a:r>
+          </a:p>
+          <a:p>
+            <a:endParaRPr lang="sv-SE" dirty="0"/>
           </a:p>
         </p:txBody>
       </p:sp>
@@ -3682,7 +3682,7 @@
     </p:spTree>
     <p:extLst>
       <p:ext uri="{BB962C8B-B14F-4D97-AF65-F5344CB8AC3E}">
-        <p14:creationId xmlns:p14="http://schemas.microsoft.com/office/powerpoint/2010/main" val="247082709"/>
+        <p14:creationId xmlns:p14="http://schemas.microsoft.com/office/powerpoint/2010/main" val="3955757252"/>
       </p:ext>
     </p:extLst>
   </p:cSld>
@@ -3763,61 +3763,12 @@
                 <a:ea typeface="+mn-ea"/>
                 <a:cs typeface="+mn-cs"/>
               </a:rPr>
-              <a:t>En presentation och diskussion kring ett antal lämpliga statiska mått på koden. Att vi inte specificerar exakt vilka mått som ska tas upp beror på att olika verktyg har olika uppsättningar, men vi förväntar oss fler och mer intressanta mått än bara rena storleksmått som LOC, #klasser, #metoder, etc. Även här är det viktigt att förhållas sig till måtten, inte bara lista dem.</a:t>
-            </a:r>
-          </a:p>
-          <a:p>
-            <a:pPr>
-              <a:lnSpc>
-                <a:spcPct val="100000"/>
-              </a:lnSpc>
-              <a:spcBef>
-                <a:spcPts val="0"/>
-              </a:spcBef>
-            </a:pPr>
-            <a:endParaRPr lang="sv-SE" dirty="0"/>
-          </a:p>
-          <a:p>
-            <a:pPr>
-              <a:lnSpc>
-                <a:spcPct val="100000"/>
-              </a:lnSpc>
-              <a:spcBef>
-                <a:spcPts val="0"/>
-              </a:spcBef>
-            </a:pPr>
-            <a:r>
-              <a:rPr lang="sv-SE" i="1" dirty="0"/>
-              <a:t>Indikerar måtten om vi gjort </a:t>
-            </a:r>
-            <a:r>
-              <a:rPr lang="sv-SE" i="1" dirty="0" err="1"/>
-              <a:t>trade-offs</a:t>
-            </a:r>
-            <a:r>
-              <a:rPr lang="sv-SE" i="1" dirty="0"/>
-              <a:t> mellan motstridiga krav; som ökad återanvändning genom mer arv, eller enkelhet att testa genom mindre arv?</a:t>
-            </a:r>
-          </a:p>
-          <a:p>
-            <a:pPr marL="0" marR="0" lvl="0" indent="0" algn="l" defTabSz="914400" rtl="0" eaLnBrk="1" fontAlgn="auto" latinLnBrk="0" hangingPunct="1">
-              <a:lnSpc>
-                <a:spcPct val="100000"/>
-              </a:lnSpc>
-              <a:spcBef>
-                <a:spcPts val="0"/>
-              </a:spcBef>
-              <a:spcAft>
-                <a:spcPts val="0"/>
-              </a:spcAft>
-              <a:buClrTx/>
-              <a:buSzTx/>
-              <a:buFontTx/>
-              <a:buNone/>
-              <a:tabLst/>
-              <a:defRPr/>
-            </a:pPr>
-            <a:endParaRPr lang="sv-SE" dirty="0"/>
+              <a:t>En presentation och diskussion kring ett antal lämpliga statiska mått på koden. Att vi inte specificerar exakt vilka mått som ska tas upp beror på att olika verktyg har olika uppsättningar, men vi förväntar oss fler och mer intressanta mått än bara rena storleksmått som LOC, #klasser, #metoder, etc. Även här är det viktigt att förhållas sig till måtten, inte bara lista dem. </a:t>
+            </a:r>
+            <a:r>
+              <a:rPr lang="sv-SE" dirty="0"/>
+              <a:t>Rader kod för projektet resp. testerna för att kunna jämföra.</a:t>
+            </a:r>
           </a:p>
         </p:txBody>
       </p:sp>
@@ -3847,7 +3798,7 @@
     </p:spTree>
     <p:extLst>
       <p:ext uri="{BB962C8B-B14F-4D97-AF65-F5344CB8AC3E}">
-        <p14:creationId xmlns:p14="http://schemas.microsoft.com/office/powerpoint/2010/main" val="3898918040"/>
+        <p14:creationId xmlns:p14="http://schemas.microsoft.com/office/powerpoint/2010/main" val="247082709"/>
       </p:ext>
     </p:extLst>
   </p:cSld>
@@ -3928,58 +3879,60 @@
                 <a:ea typeface="+mn-ea"/>
                 <a:cs typeface="+mn-cs"/>
               </a:rPr>
-              <a:t>En översikt över vilken täckningsgrad era testfall uppnått. Denna kan antagligen tas rakt av från verktyget ni använt för att mäta den. Om ni inte uppnått fullständig täckning så ska detta förklaras och motiveras. T.ex. Emma för </a:t>
-            </a:r>
-            <a:r>
-              <a:rPr lang="sv-SE" sz="1200" kern="1200" dirty="0" err="1">
-                <a:solidFill>
-                  <a:schemeClr val="tx1"/>
-                </a:solidFill>
-                <a:effectLst/>
-                <a:latin typeface="+mn-lt"/>
-                <a:ea typeface="+mn-ea"/>
-                <a:cs typeface="+mn-cs"/>
-              </a:rPr>
-              <a:t>Eclipse</a:t>
-            </a:r>
-            <a:r>
-              <a:rPr lang="sv-SE" sz="1200" kern="1200" dirty="0">
-                <a:solidFill>
-                  <a:schemeClr val="tx1"/>
-                </a:solidFill>
-                <a:effectLst/>
-                <a:latin typeface="+mn-lt"/>
-                <a:ea typeface="+mn-ea"/>
-                <a:cs typeface="+mn-cs"/>
-              </a:rPr>
-              <a:t> missar när det blir </a:t>
-            </a:r>
-            <a:r>
-              <a:rPr lang="sv-SE" sz="1200" kern="1200" dirty="0" err="1">
-                <a:solidFill>
-                  <a:schemeClr val="tx1"/>
-                </a:solidFill>
-                <a:effectLst/>
-                <a:latin typeface="+mn-lt"/>
-                <a:ea typeface="+mn-ea"/>
-                <a:cs typeface="+mn-cs"/>
-              </a:rPr>
-              <a:t>exceptions</a:t>
-            </a:r>
-            <a:r>
-              <a:rPr lang="sv-SE" sz="1200" kern="1200" dirty="0">
-                <a:solidFill>
-                  <a:schemeClr val="tx1"/>
-                </a:solidFill>
-                <a:effectLst/>
-                <a:latin typeface="+mn-lt"/>
-                <a:ea typeface="+mn-ea"/>
-                <a:cs typeface="+mn-cs"/>
-              </a:rPr>
-              <a:t>, blir ej 100% då.</a:t>
-            </a:r>
-          </a:p>
-          <a:p>
+              <a:t>En presentation och diskussion kring ett antal lämpliga statiska mått på koden. Att vi inte specificerar exakt vilka mått som ska tas upp beror på att olika verktyg har olika uppsättningar, men vi förväntar oss fler och mer intressanta mått än bara rena storleksmått som LOC, #klasser, #metoder, etc. Även här är det viktigt att förhållas sig till måtten, inte bara lista dem.</a:t>
+            </a:r>
+          </a:p>
+          <a:p>
+            <a:pPr>
+              <a:lnSpc>
+                <a:spcPct val="100000"/>
+              </a:lnSpc>
+              <a:spcBef>
+                <a:spcPts val="0"/>
+              </a:spcBef>
+            </a:pPr>
+            <a:endParaRPr lang="sv-SE" dirty="0"/>
+          </a:p>
+          <a:p>
+            <a:pPr>
+              <a:lnSpc>
+                <a:spcPct val="100000"/>
+              </a:lnSpc>
+              <a:spcBef>
+                <a:spcPts val="0"/>
+              </a:spcBef>
+            </a:pPr>
+            <a:r>
+              <a:rPr lang="sv-SE" i="1" dirty="0"/>
+              <a:t>Indikerar måtten om vi gjort </a:t>
+            </a:r>
+            <a:r>
+              <a:rPr lang="sv-SE" i="1" dirty="0" err="1"/>
+              <a:t>trade-offs</a:t>
+            </a:r>
+            <a:r>
+              <a:rPr lang="sv-SE" i="1" dirty="0"/>
+              <a:t> mellan motstridiga krav; som ökad återanvändning genom mer arv, eller enkelhet att testa genom mindre arv?</a:t>
+            </a:r>
+          </a:p>
+          <a:p>
+            <a:pPr marL="0" marR="0" lvl="0" indent="0" algn="l" defTabSz="914400" rtl="0" eaLnBrk="1" fontAlgn="auto" latinLnBrk="0" hangingPunct="1">
+              <a:lnSpc>
+                <a:spcPct val="100000"/>
+              </a:lnSpc>
+              <a:spcBef>
+                <a:spcPts val="0"/>
+              </a:spcBef>
+              <a:spcAft>
+                <a:spcPts val="0"/>
+              </a:spcAft>
+              <a:buClrTx/>
+              <a:buSzTx/>
+              <a:buFontTx/>
+              <a:buNone/>
+              <a:tabLst/>
+              <a:defRPr/>
+            </a:pPr>
             <a:endParaRPr lang="sv-SE" dirty="0"/>
           </a:p>
         </p:txBody>
@@ -4010,7 +3963,7 @@
     </p:spTree>
     <p:extLst>
       <p:ext uri="{BB962C8B-B14F-4D97-AF65-F5344CB8AC3E}">
-        <p14:creationId xmlns:p14="http://schemas.microsoft.com/office/powerpoint/2010/main" val="169751880"/>
+        <p14:creationId xmlns:p14="http://schemas.microsoft.com/office/powerpoint/2010/main" val="3898918040"/>
       </p:ext>
     </p:extLst>
   </p:cSld>
@@ -4091,48 +4044,59 @@
                 <a:ea typeface="+mn-ea"/>
                 <a:cs typeface="+mn-cs"/>
               </a:rPr>
-              <a:t>En kort presentation av hur ni gått tillväga för att testa koden med en profiler och vilka resultat ni fick fram. Även här är det viktigt att förhållas sig till måtten, inte bara presentera dem.</a:t>
-            </a:r>
-          </a:p>
-          <a:p>
-            <a:pPr marL="0" marR="0" lvl="0" indent="0" algn="l" defTabSz="914400" rtl="0" eaLnBrk="1" fontAlgn="auto" latinLnBrk="0" hangingPunct="1">
-              <a:lnSpc>
-                <a:spcPct val="100000"/>
-              </a:lnSpc>
-              <a:spcBef>
-                <a:spcPts val="0"/>
-              </a:spcBef>
-              <a:spcAft>
-                <a:spcPts val="0"/>
-              </a:spcAft>
-              <a:buClrTx/>
-              <a:buSzTx/>
-              <a:buFontTx/>
-              <a:buNone/>
-              <a:tabLst/>
-              <a:defRPr/>
-            </a:pPr>
-            <a:endParaRPr lang="sv-SE" sz="1200" kern="1200" dirty="0">
-              <a:solidFill>
-                <a:schemeClr val="tx1"/>
-              </a:solidFill>
-              <a:effectLst/>
-              <a:latin typeface="+mn-lt"/>
-              <a:ea typeface="+mn-ea"/>
-              <a:cs typeface="+mn-cs"/>
-            </a:endParaRPr>
-          </a:p>
-          <a:p>
-            <a:r>
-              <a:rPr lang="sv-SE" dirty="0"/>
-              <a:t>Profiler kollar körande program, var spenderas tid och minne osv.</a:t>
-            </a:r>
-          </a:p>
-          <a:p>
-            <a:r>
-              <a:rPr lang="sv-SE" dirty="0"/>
-              <a:t>Kolla nåt intressant! Se inspelad fl.</a:t>
-            </a:r>
+              <a:t>En översikt över vilken täckningsgrad era testfall uppnått. Denna kan antagligen tas rakt av från verktyget ni använt för att mäta den. Om ni inte uppnått fullständig täckning så ska detta förklaras och motiveras. T.ex. Emma för </a:t>
+            </a:r>
+            <a:r>
+              <a:rPr lang="sv-SE" sz="1200" kern="1200" dirty="0" err="1">
+                <a:solidFill>
+                  <a:schemeClr val="tx1"/>
+                </a:solidFill>
+                <a:effectLst/>
+                <a:latin typeface="+mn-lt"/>
+                <a:ea typeface="+mn-ea"/>
+                <a:cs typeface="+mn-cs"/>
+              </a:rPr>
+              <a:t>Eclipse</a:t>
+            </a:r>
+            <a:r>
+              <a:rPr lang="sv-SE" sz="1200" kern="1200" dirty="0">
+                <a:solidFill>
+                  <a:schemeClr val="tx1"/>
+                </a:solidFill>
+                <a:effectLst/>
+                <a:latin typeface="+mn-lt"/>
+                <a:ea typeface="+mn-ea"/>
+                <a:cs typeface="+mn-cs"/>
+              </a:rPr>
+              <a:t> missar när det blir </a:t>
+            </a:r>
+            <a:r>
+              <a:rPr lang="sv-SE" sz="1200" kern="1200" dirty="0" err="1">
+                <a:solidFill>
+                  <a:schemeClr val="tx1"/>
+                </a:solidFill>
+                <a:effectLst/>
+                <a:latin typeface="+mn-lt"/>
+                <a:ea typeface="+mn-ea"/>
+                <a:cs typeface="+mn-cs"/>
+              </a:rPr>
+              <a:t>exceptions</a:t>
+            </a:r>
+            <a:r>
+              <a:rPr lang="sv-SE" sz="1200" kern="1200" dirty="0">
+                <a:solidFill>
+                  <a:schemeClr val="tx1"/>
+                </a:solidFill>
+                <a:effectLst/>
+                <a:latin typeface="+mn-lt"/>
+                <a:ea typeface="+mn-ea"/>
+                <a:cs typeface="+mn-cs"/>
+              </a:rPr>
+              <a:t>, blir ej 100% då.</a:t>
+            </a:r>
+          </a:p>
+          <a:p>
+            <a:endParaRPr lang="sv-SE" dirty="0"/>
           </a:p>
         </p:txBody>
       </p:sp>
@@ -4162,7 +4126,7 @@
     </p:spTree>
     <p:extLst>
       <p:ext uri="{BB962C8B-B14F-4D97-AF65-F5344CB8AC3E}">
-        <p14:creationId xmlns:p14="http://schemas.microsoft.com/office/powerpoint/2010/main" val="1278246246"/>
+        <p14:creationId xmlns:p14="http://schemas.microsoft.com/office/powerpoint/2010/main" val="169751880"/>
       </p:ext>
     </p:extLst>
   </p:cSld>
@@ -4243,7 +4207,7 @@
                 <a:ea typeface="+mn-ea"/>
                 <a:cs typeface="+mn-cs"/>
               </a:rPr>
-              <a:t>Byggscriptets första (seriösa/fungerande) version, och den slutliga (efter att saker lagts till).</a:t>
+              <a:t>En kort presentation av hur ni gått tillväga för att testa koden med en profiler och vilka resultat ni fick fram. Även här är det viktigt att förhållas sig till måtten, inte bara presentera dem.</a:t>
             </a:r>
           </a:p>
           <a:p>
@@ -4264,42 +4228,6 @@
               <a:tabLst/>
               <a:defRPr/>
             </a:pPr>
-            <a:r>
-              <a:rPr lang="sv-SE" sz="1200" kern="1200" dirty="0" err="1">
-                <a:solidFill>
-                  <a:schemeClr val="tx1"/>
-                </a:solidFill>
-                <a:effectLst/>
-                <a:latin typeface="+mn-lt"/>
-                <a:ea typeface="+mn-ea"/>
-                <a:cs typeface="+mn-cs"/>
-              </a:rPr>
-              <a:t>Maven</a:t>
-            </a:r>
-            <a:r>
-              <a:rPr lang="sv-SE" sz="1200" kern="1200" dirty="0">
-                <a:solidFill>
-                  <a:schemeClr val="tx1"/>
-                </a:solidFill>
-                <a:effectLst/>
-                <a:latin typeface="+mn-lt"/>
-                <a:ea typeface="+mn-ea"/>
-                <a:cs typeface="+mn-cs"/>
-              </a:rPr>
-              <a:t>, </a:t>
-            </a:r>
-            <a:r>
-              <a:rPr lang="sv-SE" sz="1200" kern="1200" dirty="0" err="1">
-                <a:solidFill>
-                  <a:schemeClr val="tx1"/>
-                </a:solidFill>
-                <a:effectLst/>
-                <a:latin typeface="+mn-lt"/>
-                <a:ea typeface="+mn-ea"/>
-                <a:cs typeface="+mn-cs"/>
-              </a:rPr>
-              <a:t>xml</a:t>
-            </a:r>
             <a:endParaRPr lang="sv-SE" sz="1200" kern="1200" dirty="0">
               <a:solidFill>
                 <a:schemeClr val="tx1"/>
@@ -4311,7 +4239,16 @@
             </a:endParaRPr>
           </a:p>
           <a:p>
-            <a:endParaRPr lang="sv-SE" dirty="0"/>
+            <a:r>
+              <a:rPr lang="sv-SE" dirty="0"/>
+              <a:t>Profiler kollar körande program, var spenderas tid och minne osv.</a:t>
+            </a:r>
+          </a:p>
+          <a:p>
+            <a:r>
+              <a:rPr lang="sv-SE" dirty="0"/>
+              <a:t>Kolla nåt intressant! Se inspelad fl.</a:t>
+            </a:r>
           </a:p>
         </p:txBody>
       </p:sp>
@@ -4341,7 +4278,7 @@
     </p:spTree>
     <p:extLst>
       <p:ext uri="{BB962C8B-B14F-4D97-AF65-F5344CB8AC3E}">
-        <p14:creationId xmlns:p14="http://schemas.microsoft.com/office/powerpoint/2010/main" val="109849433"/>
+        <p14:creationId xmlns:p14="http://schemas.microsoft.com/office/powerpoint/2010/main" val="1278246246"/>
       </p:ext>
     </p:extLst>
   </p:cSld>
@@ -4424,6 +4361,72 @@
               </a:rPr>
               <a:t>Byggscriptets första (seriösa/fungerande) version, och den slutliga (efter att saker lagts till).</a:t>
             </a:r>
+          </a:p>
+          <a:p>
+            <a:pPr marL="0" marR="0" lvl="0" indent="0" algn="l" defTabSz="914400" rtl="0" eaLnBrk="1" fontAlgn="auto" latinLnBrk="0" hangingPunct="1">
+              <a:lnSpc>
+                <a:spcPct val="100000"/>
+              </a:lnSpc>
+              <a:spcBef>
+                <a:spcPts val="0"/>
+              </a:spcBef>
+              <a:spcAft>
+                <a:spcPts val="0"/>
+              </a:spcAft>
+              <a:buClrTx/>
+              <a:buSzTx/>
+              <a:buFontTx/>
+              <a:buNone/>
+              <a:tabLst/>
+              <a:defRPr/>
+            </a:pPr>
+            <a:r>
+              <a:rPr lang="sv-SE" sz="1200" kern="1200" dirty="0" err="1">
+                <a:solidFill>
+                  <a:schemeClr val="tx1"/>
+                </a:solidFill>
+                <a:effectLst/>
+                <a:latin typeface="+mn-lt"/>
+                <a:ea typeface="+mn-ea"/>
+                <a:cs typeface="+mn-cs"/>
+              </a:rPr>
+              <a:t>Maven</a:t>
+            </a:r>
+            <a:r>
+              <a:rPr lang="sv-SE" sz="1200" kern="1200" dirty="0">
+                <a:solidFill>
+                  <a:schemeClr val="tx1"/>
+                </a:solidFill>
+                <a:effectLst/>
+                <a:latin typeface="+mn-lt"/>
+                <a:ea typeface="+mn-ea"/>
+                <a:cs typeface="+mn-cs"/>
+              </a:rPr>
+              <a:t>, </a:t>
+            </a:r>
+            <a:r>
+              <a:rPr lang="sv-SE" sz="1200" kern="1200" dirty="0" err="1">
+                <a:solidFill>
+                  <a:schemeClr val="tx1"/>
+                </a:solidFill>
+                <a:effectLst/>
+                <a:latin typeface="+mn-lt"/>
+                <a:ea typeface="+mn-ea"/>
+                <a:cs typeface="+mn-cs"/>
+              </a:rPr>
+              <a:t>xml</a:t>
+            </a:r>
+            <a:endParaRPr lang="sv-SE" sz="1200" kern="1200" dirty="0">
+              <a:solidFill>
+                <a:schemeClr val="tx1"/>
+              </a:solidFill>
+              <a:effectLst/>
+              <a:latin typeface="+mn-lt"/>
+              <a:ea typeface="+mn-ea"/>
+              <a:cs typeface="+mn-cs"/>
+            </a:endParaRPr>
+          </a:p>
+          <a:p>
             <a:endParaRPr lang="sv-SE" dirty="0"/>
           </a:p>
         </p:txBody>
@@ -4446,6 +4449,119 @@
             <a:fld id="{8667F948-D2CB-486C-A2EA-FEABC2DAAE8D}" type="slidenum">
               <a:rPr lang="sv-SE" smtClean="0"/>
               <a:t>35</a:t>
+            </a:fld>
+            <a:endParaRPr lang="sv-SE"/>
+          </a:p>
+        </p:txBody>
+      </p:sp>
+    </p:spTree>
+    <p:extLst>
+      <p:ext uri="{BB962C8B-B14F-4D97-AF65-F5344CB8AC3E}">
+        <p14:creationId xmlns:p14="http://schemas.microsoft.com/office/powerpoint/2010/main" val="109849433"/>
+      </p:ext>
+    </p:extLst>
+  </p:cSld>
+  <p:clrMapOvr>
+    <a:masterClrMapping/>
+  </p:clrMapOvr>
+</p:notes>
+</file>
+
+<file path=ppt/notesSlides/notesSlide36.xml><?xml version="1.0" encoding="utf-8"?>
+<p:notes xmlns:a="http://schemas.openxmlformats.org/drawingml/2006/main" xmlns:r="http://schemas.openxmlformats.org/officeDocument/2006/relationships" xmlns:p="http://schemas.openxmlformats.org/presentationml/2006/main">
+  <p:cSld>
+    <p:spTree>
+      <p:nvGrpSpPr>
+        <p:cNvPr id="1" name=""/>
+        <p:cNvGrpSpPr/>
+        <p:nvPr/>
+      </p:nvGrpSpPr>
+      <p:grpSpPr>
+        <a:xfrm>
+          <a:off x="0" y="0"/>
+          <a:ext cx="0" cy="0"/>
+          <a:chOff x="0" y="0"/>
+          <a:chExt cx="0" cy="0"/>
+        </a:xfrm>
+      </p:grpSpPr>
+      <p:sp>
+        <p:nvSpPr>
+          <p:cNvPr id="2" name="Platshållare för bildobjekt 1"/>
+          <p:cNvSpPr>
+            <a:spLocks noGrp="1" noRot="1" noChangeAspect="1"/>
+          </p:cNvSpPr>
+          <p:nvPr>
+            <p:ph type="sldImg"/>
+          </p:nvPr>
+        </p:nvSpPr>
+        <p:spPr/>
+      </p:sp>
+      <p:sp>
+        <p:nvSpPr>
+          <p:cNvPr id="3" name="Platshållare för anteckningar 2"/>
+          <p:cNvSpPr>
+            <a:spLocks noGrp="1"/>
+          </p:cNvSpPr>
+          <p:nvPr>
+            <p:ph type="body" idx="1"/>
+          </p:nvPr>
+        </p:nvSpPr>
+        <p:spPr/>
+        <p:txBody>
+          <a:bodyPr/>
+          <a:lstStyle/>
+          <a:p>
+            <a:pPr marL="0" marR="0" lvl="0" indent="0" algn="l" defTabSz="914400" rtl="0" eaLnBrk="1" fontAlgn="auto" latinLnBrk="0" hangingPunct="1">
+              <a:lnSpc>
+                <a:spcPct val="100000"/>
+              </a:lnSpc>
+              <a:spcBef>
+                <a:spcPts val="0"/>
+              </a:spcBef>
+              <a:spcAft>
+                <a:spcPts val="0"/>
+              </a:spcAft>
+              <a:buClrTx/>
+              <a:buSzTx/>
+              <a:buFontTx/>
+              <a:buNone/>
+              <a:tabLst/>
+              <a:defRPr/>
+            </a:pPr>
+            <a:r>
+              <a:rPr lang="sv-SE" sz="1200" kern="1200" dirty="0">
+                <a:solidFill>
+                  <a:schemeClr val="tx1"/>
+                </a:solidFill>
+                <a:effectLst/>
+                <a:latin typeface="+mn-lt"/>
+                <a:ea typeface="+mn-ea"/>
+                <a:cs typeface="+mn-cs"/>
+              </a:rPr>
+              <a:t>Byggscriptets första (seriösa/fungerande) version, och den slutliga (efter att saker lagts till).</a:t>
+            </a:r>
+            <a:endParaRPr lang="sv-SE" dirty="0"/>
+          </a:p>
+        </p:txBody>
+      </p:sp>
+      <p:sp>
+        <p:nvSpPr>
+          <p:cNvPr id="4" name="Platshållare för bildnummer 3"/>
+          <p:cNvSpPr>
+            <a:spLocks noGrp="1"/>
+          </p:cNvSpPr>
+          <p:nvPr>
+            <p:ph type="sldNum" sz="quarter" idx="10"/>
+          </p:nvPr>
+        </p:nvSpPr>
+        <p:spPr/>
+        <p:txBody>
+          <a:bodyPr/>
+          <a:lstStyle/>
+          <a:p>
+            <a:fld id="{8667F948-D2CB-486C-A2EA-FEABC2DAAE8D}" type="slidenum">
+              <a:rPr lang="sv-SE" smtClean="0"/>
+              <a:t>36</a:t>
             </a:fld>
             <a:endParaRPr lang="sv-SE"/>
           </a:p>
@@ -13473,8 +13589,8 @@
         </p:nvSpPr>
         <p:spPr>
           <a:xfrm>
-            <a:off x="839788" y="1227348"/>
-            <a:ext cx="5157787" cy="823912"/>
+            <a:off x="382772" y="1227348"/>
+            <a:ext cx="5614803" cy="823912"/>
           </a:xfrm>
         </p:spPr>
         <p:txBody>
@@ -13501,8 +13617,8 @@
         </p:nvSpPr>
         <p:spPr>
           <a:xfrm>
-            <a:off x="839788" y="2101893"/>
-            <a:ext cx="5157787" cy="3684588"/>
+            <a:off x="304800" y="2101893"/>
+            <a:ext cx="5864224" cy="3684588"/>
           </a:xfrm>
         </p:spPr>
         <p:txBody>
@@ -13999,27 +14115,7 @@
                   </a:schemeClr>
                 </a:solidFill>
               </a:rPr>
-              <a:t>(</a:t>
-            </a:r>
-            <a:r>
-              <a:rPr lang="sv-SE" sz="1400" dirty="0" err="1">
-                <a:solidFill>
-                  <a:schemeClr val="accent1">
-                    <a:lumMod val="75000"/>
-                  </a:schemeClr>
-                </a:solidFill>
-              </a:rPr>
-              <a:t>ch</a:t>
-            </a:r>
-            <a:r>
-              <a:rPr lang="sv-SE" sz="1400" dirty="0">
-                <a:solidFill>
-                  <a:schemeClr val="accent1">
-                    <a:lumMod val="75000"/>
-                  </a:schemeClr>
-                </a:solidFill>
-              </a:rPr>
-              <a:t>);</a:t>
+              <a:t>();</a:t>
             </a:r>
             <a:br>
               <a:rPr lang="sv-SE" sz="1400" dirty="0">
@@ -19676,7 +19772,7 @@
         <p:spPr>
           <a:xfrm>
             <a:off x="1060803" y="2274838"/>
-            <a:ext cx="3650312" cy="3816429"/>
+            <a:ext cx="3650312" cy="2369880"/>
           </a:xfrm>
           <a:prstGeom prst="rect">
             <a:avLst/>
@@ -19698,7 +19794,15 @@
             </a:pPr>
             <a:r>
               <a:rPr lang="sv-SE" dirty="0"/>
-              <a:t>- get-metoder som returnerade direkta referenser istället för kopior av referensen, vilket gör att objekten kan förändras. </a:t>
+              <a:t>get-metoder i ”</a:t>
+            </a:r>
+            <a:r>
+              <a:rPr lang="sv-SE" dirty="0" err="1"/>
+              <a:t>mutable</a:t>
+            </a:r>
+            <a:r>
+              <a:rPr lang="sv-SE" dirty="0"/>
+              <a:t>” objekt</a:t>
             </a:r>
           </a:p>
           <a:p>
@@ -19708,31 +19812,7 @@
             </a:pPr>
             <a:r>
               <a:rPr lang="sv-SE" dirty="0"/>
-              <a:t>- </a:t>
-            </a:r>
-            <a:r>
-              <a:rPr lang="sv-SE" dirty="0" err="1"/>
-              <a:t>Override</a:t>
-            </a:r>
-            <a:r>
-              <a:rPr lang="sv-SE" dirty="0"/>
-              <a:t> av </a:t>
-            </a:r>
-            <a:r>
-              <a:rPr lang="sv-SE" dirty="0" err="1"/>
-              <a:t>equals</a:t>
-            </a:r>
-            <a:r>
-              <a:rPr lang="sv-SE" dirty="0"/>
-              <a:t>-metoder men inte </a:t>
-            </a:r>
-            <a:r>
-              <a:rPr lang="sv-SE" dirty="0" err="1"/>
-              <a:t>hashcode</a:t>
-            </a:r>
-            <a:r>
-              <a:rPr lang="sv-SE" dirty="0"/>
-              <a:t> </a:t>
+              <a:t>If-sats som inte gjorde något (TODO)</a:t>
             </a:r>
           </a:p>
           <a:p>
@@ -19741,8 +19821,28 @@
               <a:buChar char="•"/>
             </a:pPr>
             <a:r>
+              <a:rPr lang="sv-SE" dirty="0" err="1"/>
+              <a:t>Override</a:t>
+            </a:r>
+            <a:r>
               <a:rPr lang="sv-SE" dirty="0"/>
-              <a:t>- Variabler som inte användes </a:t>
+              <a:t> av </a:t>
+            </a:r>
+            <a:r>
+              <a:rPr lang="sv-SE" dirty="0" err="1"/>
+              <a:t>equals</a:t>
+            </a:r>
+            <a:r>
+              <a:rPr lang="sv-SE" dirty="0"/>
+              <a:t>-metoder men inte </a:t>
+            </a:r>
+            <a:r>
+              <a:rPr lang="sv-SE" dirty="0" err="1"/>
+              <a:t>hashcode</a:t>
+            </a:r>
+            <a:r>
+              <a:rPr lang="sv-SE" dirty="0"/>
+              <a:t> </a:t>
             </a:r>
           </a:p>
           <a:p>
@@ -19752,22 +19852,8 @@
             </a:pPr>
             <a:r>
               <a:rPr lang="sv-SE" dirty="0"/>
-              <a:t>- Anmärkte på metoder som inte gjorde något (TODO)</a:t>
-            </a:r>
-            <a:endParaRPr lang="sv-SE" sz="2000" dirty="0"/>
-          </a:p>
-          <a:p>
-            <a:pPr marL="285750" indent="-285750">
-              <a:buFont typeface="Arial" panose="020B0604020202020204" pitchFamily="34" charset="0"/>
-              <a:buChar char="•"/>
-            </a:pPr>
-            <a:endParaRPr lang="sv-SE" sz="2000" dirty="0"/>
-          </a:p>
-          <a:p>
-            <a:pPr marL="285750" indent="-285750">
-              <a:buFont typeface="Arial" panose="020B0604020202020204" pitchFamily="34" charset="0"/>
-              <a:buChar char="•"/>
-            </a:pPr>
+              <a:t>Variabler som inte användes</a:t>
+            </a:r>
             <a:endParaRPr lang="sv-SE" sz="2000" dirty="0"/>
           </a:p>
           <a:p>
@@ -19914,6 +20000,260 @@
         </p:nvSpPr>
         <p:spPr>
           <a:xfrm>
+            <a:off x="839788" y="457200"/>
+            <a:ext cx="9925194" cy="938463"/>
+          </a:xfrm>
+        </p:spPr>
+        <p:txBody>
+          <a:bodyPr>
+            <a:normAutofit fontScale="90000"/>
+          </a:bodyPr>
+          <a:lstStyle/>
+          <a:p>
+            <a:r>
+              <a:rPr lang="sv-SE" dirty="0"/>
+              <a:t>Kodkritiksystem: </a:t>
+            </a:r>
+            <a:r>
+              <a:rPr lang="sv-SE" dirty="0" err="1"/>
+              <a:t>FindBugs</a:t>
+            </a:r>
+            <a:r>
+              <a:rPr lang="sv-SE" dirty="0"/>
+              <a:t> IDEA, efter korrigering/granskning</a:t>
+            </a:r>
+          </a:p>
+        </p:txBody>
+      </p:sp>
+      <p:pic>
+        <p:nvPicPr>
+          <p:cNvPr id="13" name="Platshållare för bild 12">
+            <a:extLst>
+              <a:ext uri="{FF2B5EF4-FFF2-40B4-BE49-F238E27FC236}">
+                <a16:creationId xmlns:a16="http://schemas.microsoft.com/office/drawing/2014/main" id="{916DB166-5CF7-1044-A24D-D093AD43B49C}"/>
+              </a:ext>
+            </a:extLst>
+          </p:cNvPr>
+          <p:cNvPicPr>
+            <a:picLocks noGrp="1" noChangeAspect="1"/>
+          </p:cNvPicPr>
+          <p:nvPr>
+            <p:ph type="pic" idx="1"/>
+          </p:nvPr>
+        </p:nvPicPr>
+        <p:blipFill>
+          <a:blip r:embed="rId4">
+            <a:extLst>
+              <a:ext uri="{28A0092B-C50C-407E-A947-70E740481C1C}">
+                <a14:useLocalDpi xmlns:a14="http://schemas.microsoft.com/office/drawing/2010/main" val="0"/>
+              </a:ext>
+            </a:extLst>
+          </a:blip>
+          <a:srcRect l="1821" r="1821"/>
+          <a:stretch>
+            <a:fillRect/>
+          </a:stretch>
+        </p:blipFill>
+        <p:spPr>
+          <a:xfrm>
+            <a:off x="4965149" y="2208846"/>
+            <a:ext cx="6950927" cy="2808503"/>
+          </a:xfrm>
+        </p:spPr>
+      </p:pic>
+      <p:sp>
+        <p:nvSpPr>
+          <p:cNvPr id="3" name="TextBox 2">
+            <a:extLst>
+              <a:ext uri="{FF2B5EF4-FFF2-40B4-BE49-F238E27FC236}">
+                <a16:creationId xmlns:a16="http://schemas.microsoft.com/office/drawing/2014/main" id="{11503290-4916-4645-B157-1A59B4A79972}"/>
+              </a:ext>
+            </a:extLst>
+          </p:cNvPr>
+          <p:cNvSpPr txBox="1"/>
+          <p:nvPr/>
+        </p:nvSpPr>
+        <p:spPr>
+          <a:xfrm>
+            <a:off x="1060803" y="2274838"/>
+            <a:ext cx="3650312" cy="2246769"/>
+          </a:xfrm>
+          <a:prstGeom prst="rect">
+            <a:avLst/>
+          </a:prstGeom>
+          <a:noFill/>
+        </p:spPr>
+        <p:txBody>
+          <a:bodyPr wrap="square" rtlCol="0">
+            <a:spAutoFit/>
+          </a:bodyPr>
+          <a:lstStyle/>
+          <a:p>
+            <a:endParaRPr lang="sv-SE" sz="2000" dirty="0"/>
+          </a:p>
+          <a:p>
+            <a:pPr marL="285750" indent="-285750">
+              <a:buFont typeface="Arial" panose="020B0604020202020204" pitchFamily="34" charset="0"/>
+              <a:buChar char="•"/>
+            </a:pPr>
+            <a:r>
+              <a:rPr lang="sv-SE" sz="2000" dirty="0"/>
+              <a:t>Under granskningen hittades: </a:t>
+            </a:r>
+          </a:p>
+          <a:p>
+            <a:r>
+              <a:rPr lang="sv-SE" sz="2000" dirty="0"/>
+              <a:t>     - felaktig get-metod </a:t>
+            </a:r>
+          </a:p>
+          <a:p>
+            <a:r>
+              <a:rPr lang="sv-SE" sz="2000" dirty="0"/>
+              <a:t>     - icke-använda fält</a:t>
+            </a:r>
+          </a:p>
+          <a:p>
+            <a:pPr marL="285750" indent="-285750">
+              <a:buFont typeface="Arial" panose="020B0604020202020204" pitchFamily="34" charset="0"/>
+              <a:buChar char="•"/>
+            </a:pPr>
+            <a:r>
+              <a:rPr lang="sv-SE" sz="2000" dirty="0"/>
+              <a:t>TODO</a:t>
+            </a:r>
+          </a:p>
+          <a:p>
+            <a:pPr marL="285750" indent="-285750">
+              <a:buFont typeface="Arial" panose="020B0604020202020204" pitchFamily="34" charset="0"/>
+              <a:buChar char="•"/>
+            </a:pPr>
+            <a:r>
+              <a:rPr lang="sv-SE" sz="2000" dirty="0" err="1"/>
+              <a:t>Hashcodes</a:t>
+            </a:r>
+            <a:r>
+              <a:rPr lang="sv-SE" sz="2000" dirty="0"/>
+              <a:t> ej fixat</a:t>
+            </a:r>
+          </a:p>
+          <a:p>
+            <a:pPr marL="285750" indent="-285750">
+              <a:buFont typeface="Arial" panose="020B0604020202020204" pitchFamily="34" charset="0"/>
+              <a:buChar char="•"/>
+            </a:pPr>
+            <a:endParaRPr lang="sv-SE" sz="2000" dirty="0"/>
+          </a:p>
+        </p:txBody>
+      </p:sp>
+      <p:sp>
+        <p:nvSpPr>
+          <p:cNvPr id="4" name="textruta 3">
+            <a:extLst>
+              <a:ext uri="{FF2B5EF4-FFF2-40B4-BE49-F238E27FC236}">
+                <a16:creationId xmlns:a16="http://schemas.microsoft.com/office/drawing/2014/main" id="{7C3EFF06-01CF-49D3-8372-E63FAE765BAC}"/>
+              </a:ext>
+            </a:extLst>
+          </p:cNvPr>
+          <p:cNvSpPr txBox="1"/>
+          <p:nvPr/>
+        </p:nvSpPr>
+        <p:spPr>
+          <a:xfrm>
+            <a:off x="6226688" y="3128940"/>
+            <a:ext cx="4301836" cy="707886"/>
+          </a:xfrm>
+          <a:prstGeom prst="rect">
+            <a:avLst/>
+          </a:prstGeom>
+          <a:noFill/>
+        </p:spPr>
+        <p:txBody>
+          <a:bodyPr wrap="square" rtlCol="0">
+            <a:spAutoFit/>
+          </a:bodyPr>
+          <a:lstStyle/>
+          <a:p>
+            <a:r>
+              <a:rPr lang="en-US" sz="4000" dirty="0" err="1">
+                <a:solidFill>
+                  <a:srgbClr val="FF0000"/>
+                </a:solidFill>
+              </a:rPr>
+              <a:t>Bilden</a:t>
+            </a:r>
+            <a:r>
+              <a:rPr lang="en-US" sz="4000" dirty="0">
+                <a:solidFill>
+                  <a:srgbClr val="FF0000"/>
+                </a:solidFill>
+              </a:rPr>
+              <a:t> ska </a:t>
+            </a:r>
+            <a:r>
+              <a:rPr lang="en-US" sz="4000" dirty="0" err="1">
+                <a:solidFill>
+                  <a:srgbClr val="FF0000"/>
+                </a:solidFill>
+              </a:rPr>
+              <a:t>bytas</a:t>
+            </a:r>
+            <a:r>
+              <a:rPr lang="en-US" sz="4000" dirty="0">
+                <a:solidFill>
+                  <a:srgbClr val="FF0000"/>
+                </a:solidFill>
+              </a:rPr>
+              <a:t>!</a:t>
+            </a:r>
+          </a:p>
+        </p:txBody>
+      </p:sp>
+    </p:spTree>
+    <p:custDataLst>
+      <p:tags r:id="rId1"/>
+    </p:custDataLst>
+    <p:extLst>
+      <p:ext uri="{BB962C8B-B14F-4D97-AF65-F5344CB8AC3E}">
+        <p14:creationId xmlns:p14="http://schemas.microsoft.com/office/powerpoint/2010/main" val="3735210224"/>
+      </p:ext>
+    </p:extLst>
+  </p:cSld>
+  <p:clrMapOvr>
+    <a:masterClrMapping/>
+  </p:clrMapOvr>
+</p:sld>
+</file>
+
+<file path=ppt/slides/slide31.xml><?xml version="1.0" encoding="utf-8"?>
+<p:sld xmlns:a="http://schemas.openxmlformats.org/drawingml/2006/main" xmlns:r="http://schemas.openxmlformats.org/officeDocument/2006/relationships" xmlns:p="http://schemas.openxmlformats.org/presentationml/2006/main">
+  <p:cSld>
+    <p:spTree>
+      <p:nvGrpSpPr>
+        <p:cNvPr id="1" name=""/>
+        <p:cNvGrpSpPr/>
+        <p:nvPr/>
+      </p:nvGrpSpPr>
+      <p:grpSpPr>
+        <a:xfrm>
+          <a:off x="0" y="0"/>
+          <a:ext cx="0" cy="0"/>
+          <a:chOff x="0" y="0"/>
+          <a:chExt cx="0" cy="0"/>
+        </a:xfrm>
+      </p:grpSpPr>
+      <p:sp>
+        <p:nvSpPr>
+          <p:cNvPr id="2" name="Rubrik 1"/>
+          <p:cNvSpPr>
+            <a:spLocks noGrp="1"/>
+          </p:cNvSpPr>
+          <p:nvPr>
+            <p:ph type="title"/>
+          </p:nvPr>
+        </p:nvSpPr>
+        <p:spPr>
+          <a:xfrm>
             <a:off x="614363" y="559594"/>
             <a:ext cx="3932237" cy="1600200"/>
           </a:xfrm>
@@ -20056,7 +20396,7 @@
 </p:sld>
 </file>
 
-<file path=ppt/slides/slide31.xml><?xml version="1.0" encoding="utf-8"?>
+<file path=ppt/slides/slide32.xml><?xml version="1.0" encoding="utf-8"?>
 <p:sld xmlns:a="http://schemas.openxmlformats.org/drawingml/2006/main" xmlns:r="http://schemas.openxmlformats.org/officeDocument/2006/relationships" xmlns:p="http://schemas.openxmlformats.org/presentationml/2006/main">
   <p:cSld>
     <p:spTree>
@@ -20547,7 +20887,7 @@
 </p:sld>
 </file>
 
-<file path=ppt/slides/slide32.xml><?xml version="1.0" encoding="utf-8"?>
+<file path=ppt/slides/slide33.xml><?xml version="1.0" encoding="utf-8"?>
 <p:sld xmlns:a="http://schemas.openxmlformats.org/drawingml/2006/main" xmlns:r="http://schemas.openxmlformats.org/officeDocument/2006/relationships" xmlns:p="http://schemas.openxmlformats.org/presentationml/2006/main">
   <p:cSld>
     <p:spTree>
@@ -20686,7 +21026,7 @@
 </p:sld>
 </file>
 
-<file path=ppt/slides/slide33.xml><?xml version="1.0" encoding="utf-8"?>
+<file path=ppt/slides/slide34.xml><?xml version="1.0" encoding="utf-8"?>
 <p:sld xmlns:a="http://schemas.openxmlformats.org/drawingml/2006/main" xmlns:r="http://schemas.openxmlformats.org/officeDocument/2006/relationships" xmlns:p="http://schemas.openxmlformats.org/presentationml/2006/main">
   <p:cSld>
     <p:spTree>
@@ -20769,7 +21109,7 @@
 </p:sld>
 </file>
 
-<file path=ppt/slides/slide34.xml><?xml version="1.0" encoding="utf-8"?>
+<file path=ppt/slides/slide35.xml><?xml version="1.0" encoding="utf-8"?>
 <p:sld xmlns:a="http://schemas.openxmlformats.org/drawingml/2006/main" xmlns:r="http://schemas.openxmlformats.org/officeDocument/2006/relationships" xmlns:p="http://schemas.openxmlformats.org/presentationml/2006/main">
   <p:cSld>
     <p:spTree>
@@ -24171,7 +24511,7 @@
 </p:sld>
 </file>
 
-<file path=ppt/slides/slide35.xml><?xml version="1.0" encoding="utf-8"?>
+<file path=ppt/slides/slide36.xml><?xml version="1.0" encoding="utf-8"?>
 <p:sld xmlns:a="http://schemas.openxmlformats.org/drawingml/2006/main" xmlns:r="http://schemas.openxmlformats.org/officeDocument/2006/relationships" xmlns:p="http://schemas.openxmlformats.org/presentationml/2006/main">
   <p:cSld>
     <p:spTree>
@@ -29013,6 +29353,12 @@
 </file>
 
 <file path=ppt/tags/tag36.xml><?xml version="1.0" encoding="utf-8"?>
+<p:tagLst xmlns:a="http://schemas.openxmlformats.org/drawingml/2006/main" xmlns:r="http://schemas.openxmlformats.org/officeDocument/2006/relationships" xmlns:p="http://schemas.openxmlformats.org/presentationml/2006/main">
+  <p:tag name="ARTICULATE_SLIDE_THUMBNAIL_REFRESH" val="1"/>
+</p:tagLst>
+</file>
+
+<file path=ppt/tags/tag37.xml><?xml version="1.0" encoding="utf-8"?>
 <p:tagLst xmlns:a="http://schemas.openxmlformats.org/drawingml/2006/main" xmlns:r="http://schemas.openxmlformats.org/officeDocument/2006/relationships" xmlns:p="http://schemas.openxmlformats.org/presentationml/2006/main">
   <p:tag name="ARTICULATE_SLIDE_THUMBNAIL_REFRESH" val="1"/>
 </p:tagLst>

</xml_diff>

<commit_message>
Uppdaterat PPT med Profiler
</commit_message>
<xml_diff>
--- a/docs/Slutredovisning_grp5_v8.pptx
+++ b/docs/Slutredovisning_grp5_v8.pptx
@@ -5,7 +5,7 @@
     <p:sldMasterId id="2147483648" r:id="rId1"/>
   </p:sldMasterIdLst>
   <p:notesMasterIdLst>
-    <p:notesMasterId r:id="rId38"/>
+    <p:notesMasterId r:id="rId42"/>
   </p:notesMasterIdLst>
   <p:sldIdLst>
     <p:sldId id="256" r:id="rId2"/>
@@ -41,14 +41,18 @@
     <p:sldId id="277" r:id="rId32"/>
     <p:sldId id="297" r:id="rId33"/>
     <p:sldId id="278" r:id="rId34"/>
-    <p:sldId id="279" r:id="rId35"/>
-    <p:sldId id="280" r:id="rId36"/>
-    <p:sldId id="294" r:id="rId37"/>
+    <p:sldId id="302" r:id="rId35"/>
+    <p:sldId id="279" r:id="rId36"/>
+    <p:sldId id="304" r:id="rId37"/>
+    <p:sldId id="303" r:id="rId38"/>
+    <p:sldId id="305" r:id="rId39"/>
+    <p:sldId id="280" r:id="rId40"/>
+    <p:sldId id="294" r:id="rId41"/>
   </p:sldIdLst>
   <p:sldSz cx="12192000" cy="6858000"/>
   <p:notesSz cx="6858000" cy="9144000"/>
   <p:custDataLst>
-    <p:tags r:id="rId39"/>
+    <p:tags r:id="rId43"/>
   </p:custDataLst>
   <p:defaultTextStyle>
     <a:defPPr>
@@ -247,7 +251,7 @@
           <a:p>
             <a:fld id="{78657D70-8167-4127-866D-BAA56A2DFFEF}" type="datetimeFigureOut">
               <a:rPr lang="sv-SE" smtClean="0"/>
-              <a:t>2018-10-29</a:t>
+              <a:t>2018-10-30</a:t>
             </a:fld>
             <a:endParaRPr lang="sv-SE"/>
           </a:p>
@@ -4278,7 +4282,7 @@
     </p:spTree>
     <p:extLst>
       <p:ext uri="{BB962C8B-B14F-4D97-AF65-F5344CB8AC3E}">
-        <p14:creationId xmlns:p14="http://schemas.microsoft.com/office/powerpoint/2010/main" val="1278246246"/>
+        <p14:creationId xmlns:p14="http://schemas.microsoft.com/office/powerpoint/2010/main" val="2509318816"/>
       </p:ext>
     </p:extLst>
   </p:cSld>
@@ -4359,7 +4363,7 @@
                 <a:ea typeface="+mn-ea"/>
                 <a:cs typeface="+mn-cs"/>
               </a:rPr>
-              <a:t>Byggscriptets första (seriösa/fungerande) version, och den slutliga (efter att saker lagts till).</a:t>
+              <a:t>En kort presentation av hur ni gått tillväga för att testa koden med en profiler och vilka resultat ni fick fram. Även här är det viktigt att förhållas sig till måtten, inte bara presentera dem.</a:t>
             </a:r>
           </a:p>
           <a:p>
@@ -4380,42 +4384,6 @@
               <a:tabLst/>
               <a:defRPr/>
             </a:pPr>
-            <a:r>
-              <a:rPr lang="sv-SE" sz="1200" kern="1200" dirty="0" err="1">
-                <a:solidFill>
-                  <a:schemeClr val="tx1"/>
-                </a:solidFill>
-                <a:effectLst/>
-                <a:latin typeface="+mn-lt"/>
-                <a:ea typeface="+mn-ea"/>
-                <a:cs typeface="+mn-cs"/>
-              </a:rPr>
-              <a:t>Maven</a:t>
-            </a:r>
-            <a:r>
-              <a:rPr lang="sv-SE" sz="1200" kern="1200" dirty="0">
-                <a:solidFill>
-                  <a:schemeClr val="tx1"/>
-                </a:solidFill>
-                <a:effectLst/>
-                <a:latin typeface="+mn-lt"/>
-                <a:ea typeface="+mn-ea"/>
-                <a:cs typeface="+mn-cs"/>
-              </a:rPr>
-              <a:t>, </a:t>
-            </a:r>
-            <a:r>
-              <a:rPr lang="sv-SE" sz="1200" kern="1200" dirty="0" err="1">
-                <a:solidFill>
-                  <a:schemeClr val="tx1"/>
-                </a:solidFill>
-                <a:effectLst/>
-                <a:latin typeface="+mn-lt"/>
-                <a:ea typeface="+mn-ea"/>
-                <a:cs typeface="+mn-cs"/>
-              </a:rPr>
-              <a:t>xml</a:t>
-            </a:r>
             <a:endParaRPr lang="sv-SE" sz="1200" kern="1200" dirty="0">
               <a:solidFill>
                 <a:schemeClr val="tx1"/>
@@ -4427,7 +4395,16 @@
             </a:endParaRPr>
           </a:p>
           <a:p>
-            <a:endParaRPr lang="sv-SE" dirty="0"/>
+            <a:r>
+              <a:rPr lang="sv-SE" dirty="0"/>
+              <a:t>Profiler kollar körande program, var spenderas tid och minne osv.</a:t>
+            </a:r>
+          </a:p>
+          <a:p>
+            <a:r>
+              <a:rPr lang="sv-SE" dirty="0"/>
+              <a:t>Kolla nåt intressant! Se inspelad fl.</a:t>
+            </a:r>
           </a:p>
         </p:txBody>
       </p:sp>
@@ -4457,7 +4434,7 @@
     </p:spTree>
     <p:extLst>
       <p:ext uri="{BB962C8B-B14F-4D97-AF65-F5344CB8AC3E}">
-        <p14:creationId xmlns:p14="http://schemas.microsoft.com/office/powerpoint/2010/main" val="109849433"/>
+        <p14:creationId xmlns:p14="http://schemas.microsoft.com/office/powerpoint/2010/main" val="1278246246"/>
       </p:ext>
     </p:extLst>
   </p:cSld>
@@ -4538,9 +4515,48 @@
                 <a:ea typeface="+mn-ea"/>
                 <a:cs typeface="+mn-cs"/>
               </a:rPr>
-              <a:t>Byggscriptets första (seriösa/fungerande) version, och den slutliga (efter att saker lagts till).</a:t>
-            </a:r>
-            <a:endParaRPr lang="sv-SE" dirty="0"/>
+              <a:t>En kort presentation av hur ni gått tillväga för att testa koden med en profiler och vilka resultat ni fick fram. Även här är det viktigt att förhållas sig till måtten, inte bara presentera dem.</a:t>
+            </a:r>
+          </a:p>
+          <a:p>
+            <a:pPr marL="0" marR="0" lvl="0" indent="0" algn="l" defTabSz="914400" rtl="0" eaLnBrk="1" fontAlgn="auto" latinLnBrk="0" hangingPunct="1">
+              <a:lnSpc>
+                <a:spcPct val="100000"/>
+              </a:lnSpc>
+              <a:spcBef>
+                <a:spcPts val="0"/>
+              </a:spcBef>
+              <a:spcAft>
+                <a:spcPts val="0"/>
+              </a:spcAft>
+              <a:buClrTx/>
+              <a:buSzTx/>
+              <a:buFontTx/>
+              <a:buNone/>
+              <a:tabLst/>
+              <a:defRPr/>
+            </a:pPr>
+            <a:endParaRPr lang="sv-SE" sz="1200" kern="1200" dirty="0">
+              <a:solidFill>
+                <a:schemeClr val="tx1"/>
+              </a:solidFill>
+              <a:effectLst/>
+              <a:latin typeface="+mn-lt"/>
+              <a:ea typeface="+mn-ea"/>
+              <a:cs typeface="+mn-cs"/>
+            </a:endParaRPr>
+          </a:p>
+          <a:p>
+            <a:r>
+              <a:rPr lang="sv-SE" dirty="0"/>
+              <a:t>Profiler kollar körande program, var spenderas tid och minne osv.</a:t>
+            </a:r>
+          </a:p>
+          <a:p>
+            <a:r>
+              <a:rPr lang="sv-SE" dirty="0"/>
+              <a:t>Kolla nåt intressant! Se inspelad fl.</a:t>
+            </a:r>
           </a:p>
         </p:txBody>
       </p:sp>
@@ -4561,7 +4577,299 @@
           <a:p>
             <a:fld id="{8667F948-D2CB-486C-A2EA-FEABC2DAAE8D}" type="slidenum">
               <a:rPr lang="sv-SE" smtClean="0"/>
-              <a:t>36</a:t>
+              <a:t>37</a:t>
+            </a:fld>
+            <a:endParaRPr lang="sv-SE"/>
+          </a:p>
+        </p:txBody>
+      </p:sp>
+    </p:spTree>
+    <p:extLst>
+      <p:ext uri="{BB962C8B-B14F-4D97-AF65-F5344CB8AC3E}">
+        <p14:creationId xmlns:p14="http://schemas.microsoft.com/office/powerpoint/2010/main" val="1564569851"/>
+      </p:ext>
+    </p:extLst>
+  </p:cSld>
+  <p:clrMapOvr>
+    <a:masterClrMapping/>
+  </p:clrMapOvr>
+</p:notes>
+</file>
+
+<file path=ppt/notesSlides/notesSlide37.xml><?xml version="1.0" encoding="utf-8"?>
+<p:notes xmlns:a="http://schemas.openxmlformats.org/drawingml/2006/main" xmlns:r="http://schemas.openxmlformats.org/officeDocument/2006/relationships" xmlns:p="http://schemas.openxmlformats.org/presentationml/2006/main">
+  <p:cSld>
+    <p:spTree>
+      <p:nvGrpSpPr>
+        <p:cNvPr id="1" name=""/>
+        <p:cNvGrpSpPr/>
+        <p:nvPr/>
+      </p:nvGrpSpPr>
+      <p:grpSpPr>
+        <a:xfrm>
+          <a:off x="0" y="0"/>
+          <a:ext cx="0" cy="0"/>
+          <a:chOff x="0" y="0"/>
+          <a:chExt cx="0" cy="0"/>
+        </a:xfrm>
+      </p:grpSpPr>
+      <p:sp>
+        <p:nvSpPr>
+          <p:cNvPr id="2" name="Platshållare för bildobjekt 1"/>
+          <p:cNvSpPr>
+            <a:spLocks noGrp="1" noRot="1" noChangeAspect="1"/>
+          </p:cNvSpPr>
+          <p:nvPr>
+            <p:ph type="sldImg"/>
+          </p:nvPr>
+        </p:nvSpPr>
+        <p:spPr/>
+      </p:sp>
+      <p:sp>
+        <p:nvSpPr>
+          <p:cNvPr id="3" name="Platshållare för anteckningar 2"/>
+          <p:cNvSpPr>
+            <a:spLocks noGrp="1"/>
+          </p:cNvSpPr>
+          <p:nvPr>
+            <p:ph type="body" idx="1"/>
+          </p:nvPr>
+        </p:nvSpPr>
+        <p:spPr/>
+        <p:txBody>
+          <a:bodyPr/>
+          <a:lstStyle/>
+          <a:p>
+            <a:pPr marL="0" marR="0" lvl="0" indent="0" algn="l" defTabSz="914400" rtl="0" eaLnBrk="1" fontAlgn="auto" latinLnBrk="0" hangingPunct="1">
+              <a:lnSpc>
+                <a:spcPct val="100000"/>
+              </a:lnSpc>
+              <a:spcBef>
+                <a:spcPts val="0"/>
+              </a:spcBef>
+              <a:spcAft>
+                <a:spcPts val="0"/>
+              </a:spcAft>
+              <a:buClrTx/>
+              <a:buSzTx/>
+              <a:buFontTx/>
+              <a:buNone/>
+              <a:tabLst/>
+              <a:defRPr/>
+            </a:pPr>
+            <a:r>
+              <a:rPr lang="sv-SE" sz="1200" kern="1200" dirty="0">
+                <a:solidFill>
+                  <a:schemeClr val="tx1"/>
+                </a:solidFill>
+                <a:effectLst/>
+                <a:latin typeface="+mn-lt"/>
+                <a:ea typeface="+mn-ea"/>
+                <a:cs typeface="+mn-cs"/>
+              </a:rPr>
+              <a:t>Byggscriptets första (seriösa/fungerande) version, och den slutliga (efter att saker lagts till).</a:t>
+            </a:r>
+          </a:p>
+          <a:p>
+            <a:pPr marL="0" marR="0" lvl="0" indent="0" algn="l" defTabSz="914400" rtl="0" eaLnBrk="1" fontAlgn="auto" latinLnBrk="0" hangingPunct="1">
+              <a:lnSpc>
+                <a:spcPct val="100000"/>
+              </a:lnSpc>
+              <a:spcBef>
+                <a:spcPts val="0"/>
+              </a:spcBef>
+              <a:spcAft>
+                <a:spcPts val="0"/>
+              </a:spcAft>
+              <a:buClrTx/>
+              <a:buSzTx/>
+              <a:buFontTx/>
+              <a:buNone/>
+              <a:tabLst/>
+              <a:defRPr/>
+            </a:pPr>
+            <a:r>
+              <a:rPr lang="sv-SE" sz="1200" kern="1200" dirty="0" err="1">
+                <a:solidFill>
+                  <a:schemeClr val="tx1"/>
+                </a:solidFill>
+                <a:effectLst/>
+                <a:latin typeface="+mn-lt"/>
+                <a:ea typeface="+mn-ea"/>
+                <a:cs typeface="+mn-cs"/>
+              </a:rPr>
+              <a:t>Maven</a:t>
+            </a:r>
+            <a:r>
+              <a:rPr lang="sv-SE" sz="1200" kern="1200" dirty="0">
+                <a:solidFill>
+                  <a:schemeClr val="tx1"/>
+                </a:solidFill>
+                <a:effectLst/>
+                <a:latin typeface="+mn-lt"/>
+                <a:ea typeface="+mn-ea"/>
+                <a:cs typeface="+mn-cs"/>
+              </a:rPr>
+              <a:t>, </a:t>
+            </a:r>
+            <a:r>
+              <a:rPr lang="sv-SE" sz="1200" kern="1200" dirty="0" err="1">
+                <a:solidFill>
+                  <a:schemeClr val="tx1"/>
+                </a:solidFill>
+                <a:effectLst/>
+                <a:latin typeface="+mn-lt"/>
+                <a:ea typeface="+mn-ea"/>
+                <a:cs typeface="+mn-cs"/>
+              </a:rPr>
+              <a:t>xml</a:t>
+            </a:r>
+            <a:endParaRPr lang="sv-SE" sz="1200" kern="1200" dirty="0">
+              <a:solidFill>
+                <a:schemeClr val="tx1"/>
+              </a:solidFill>
+              <a:effectLst/>
+              <a:latin typeface="+mn-lt"/>
+              <a:ea typeface="+mn-ea"/>
+              <a:cs typeface="+mn-cs"/>
+            </a:endParaRPr>
+          </a:p>
+          <a:p>
+            <a:endParaRPr lang="sv-SE" dirty="0"/>
+          </a:p>
+        </p:txBody>
+      </p:sp>
+      <p:sp>
+        <p:nvSpPr>
+          <p:cNvPr id="4" name="Platshållare för bildnummer 3"/>
+          <p:cNvSpPr>
+            <a:spLocks noGrp="1"/>
+          </p:cNvSpPr>
+          <p:nvPr>
+            <p:ph type="sldNum" sz="quarter" idx="10"/>
+          </p:nvPr>
+        </p:nvSpPr>
+        <p:spPr/>
+        <p:txBody>
+          <a:bodyPr/>
+          <a:lstStyle/>
+          <a:p>
+            <a:fld id="{8667F948-D2CB-486C-A2EA-FEABC2DAAE8D}" type="slidenum">
+              <a:rPr lang="sv-SE" smtClean="0"/>
+              <a:t>39</a:t>
+            </a:fld>
+            <a:endParaRPr lang="sv-SE"/>
+          </a:p>
+        </p:txBody>
+      </p:sp>
+    </p:spTree>
+    <p:extLst>
+      <p:ext uri="{BB962C8B-B14F-4D97-AF65-F5344CB8AC3E}">
+        <p14:creationId xmlns:p14="http://schemas.microsoft.com/office/powerpoint/2010/main" val="109849433"/>
+      </p:ext>
+    </p:extLst>
+  </p:cSld>
+  <p:clrMapOvr>
+    <a:masterClrMapping/>
+  </p:clrMapOvr>
+</p:notes>
+</file>
+
+<file path=ppt/notesSlides/notesSlide38.xml><?xml version="1.0" encoding="utf-8"?>
+<p:notes xmlns:a="http://schemas.openxmlformats.org/drawingml/2006/main" xmlns:r="http://schemas.openxmlformats.org/officeDocument/2006/relationships" xmlns:p="http://schemas.openxmlformats.org/presentationml/2006/main">
+  <p:cSld>
+    <p:spTree>
+      <p:nvGrpSpPr>
+        <p:cNvPr id="1" name=""/>
+        <p:cNvGrpSpPr/>
+        <p:nvPr/>
+      </p:nvGrpSpPr>
+      <p:grpSpPr>
+        <a:xfrm>
+          <a:off x="0" y="0"/>
+          <a:ext cx="0" cy="0"/>
+          <a:chOff x="0" y="0"/>
+          <a:chExt cx="0" cy="0"/>
+        </a:xfrm>
+      </p:grpSpPr>
+      <p:sp>
+        <p:nvSpPr>
+          <p:cNvPr id="2" name="Platshållare för bildobjekt 1"/>
+          <p:cNvSpPr>
+            <a:spLocks noGrp="1" noRot="1" noChangeAspect="1"/>
+          </p:cNvSpPr>
+          <p:nvPr>
+            <p:ph type="sldImg"/>
+          </p:nvPr>
+        </p:nvSpPr>
+        <p:spPr/>
+      </p:sp>
+      <p:sp>
+        <p:nvSpPr>
+          <p:cNvPr id="3" name="Platshållare för anteckningar 2"/>
+          <p:cNvSpPr>
+            <a:spLocks noGrp="1"/>
+          </p:cNvSpPr>
+          <p:nvPr>
+            <p:ph type="body" idx="1"/>
+          </p:nvPr>
+        </p:nvSpPr>
+        <p:spPr/>
+        <p:txBody>
+          <a:bodyPr/>
+          <a:lstStyle/>
+          <a:p>
+            <a:pPr marL="0" marR="0" lvl="0" indent="0" algn="l" defTabSz="914400" rtl="0" eaLnBrk="1" fontAlgn="auto" latinLnBrk="0" hangingPunct="1">
+              <a:lnSpc>
+                <a:spcPct val="100000"/>
+              </a:lnSpc>
+              <a:spcBef>
+                <a:spcPts val="0"/>
+              </a:spcBef>
+              <a:spcAft>
+                <a:spcPts val="0"/>
+              </a:spcAft>
+              <a:buClrTx/>
+              <a:buSzTx/>
+              <a:buFontTx/>
+              <a:buNone/>
+              <a:tabLst/>
+              <a:defRPr/>
+            </a:pPr>
+            <a:r>
+              <a:rPr lang="sv-SE" sz="1200" kern="1200" dirty="0">
+                <a:solidFill>
+                  <a:schemeClr val="tx1"/>
+                </a:solidFill>
+                <a:effectLst/>
+                <a:latin typeface="+mn-lt"/>
+                <a:ea typeface="+mn-ea"/>
+                <a:cs typeface="+mn-cs"/>
+              </a:rPr>
+              <a:t>Byggscriptets första (seriösa/fungerande) version, och den slutliga (efter att saker lagts till).</a:t>
+            </a:r>
+            <a:endParaRPr lang="sv-SE" dirty="0"/>
+          </a:p>
+        </p:txBody>
+      </p:sp>
+      <p:sp>
+        <p:nvSpPr>
+          <p:cNvPr id="4" name="Platshållare för bildnummer 3"/>
+          <p:cNvSpPr>
+            <a:spLocks noGrp="1"/>
+          </p:cNvSpPr>
+          <p:nvPr>
+            <p:ph type="sldNum" sz="quarter" idx="10"/>
+          </p:nvPr>
+        </p:nvSpPr>
+        <p:spPr/>
+        <p:txBody>
+          <a:bodyPr/>
+          <a:lstStyle/>
+          <a:p>
+            <a:fld id="{8667F948-D2CB-486C-A2EA-FEABC2DAAE8D}" type="slidenum">
+              <a:rPr lang="sv-SE" smtClean="0"/>
+              <a:t>40</a:t>
             </a:fld>
             <a:endParaRPr lang="sv-SE"/>
           </a:p>
@@ -5523,7 +5831,7 @@
           <a:p>
             <a:fld id="{B4C653A3-D7FF-4AF7-943B-34A467C3139E}" type="datetimeFigureOut">
               <a:rPr lang="sv-SE" smtClean="0"/>
-              <a:t>2018-10-29</a:t>
+              <a:t>2018-10-30</a:t>
             </a:fld>
             <a:endParaRPr lang="sv-SE"/>
           </a:p>
@@ -5691,7 +5999,7 @@
           <a:p>
             <a:fld id="{B4C653A3-D7FF-4AF7-943B-34A467C3139E}" type="datetimeFigureOut">
               <a:rPr lang="sv-SE" smtClean="0"/>
-              <a:t>2018-10-29</a:t>
+              <a:t>2018-10-30</a:t>
             </a:fld>
             <a:endParaRPr lang="sv-SE"/>
           </a:p>
@@ -5869,7 +6177,7 @@
           <a:p>
             <a:fld id="{B4C653A3-D7FF-4AF7-943B-34A467C3139E}" type="datetimeFigureOut">
               <a:rPr lang="sv-SE" smtClean="0"/>
-              <a:t>2018-10-29</a:t>
+              <a:t>2018-10-30</a:t>
             </a:fld>
             <a:endParaRPr lang="sv-SE"/>
           </a:p>
@@ -6037,7 +6345,7 @@
           <a:p>
             <a:fld id="{B4C653A3-D7FF-4AF7-943B-34A467C3139E}" type="datetimeFigureOut">
               <a:rPr lang="sv-SE" smtClean="0"/>
-              <a:t>2018-10-29</a:t>
+              <a:t>2018-10-30</a:t>
             </a:fld>
             <a:endParaRPr lang="sv-SE"/>
           </a:p>
@@ -6282,7 +6590,7 @@
           <a:p>
             <a:fld id="{B4C653A3-D7FF-4AF7-943B-34A467C3139E}" type="datetimeFigureOut">
               <a:rPr lang="sv-SE" smtClean="0"/>
-              <a:t>2018-10-29</a:t>
+              <a:t>2018-10-30</a:t>
             </a:fld>
             <a:endParaRPr lang="sv-SE"/>
           </a:p>
@@ -6511,7 +6819,7 @@
           <a:p>
             <a:fld id="{B4C653A3-D7FF-4AF7-943B-34A467C3139E}" type="datetimeFigureOut">
               <a:rPr lang="sv-SE" smtClean="0"/>
-              <a:t>2018-10-29</a:t>
+              <a:t>2018-10-30</a:t>
             </a:fld>
             <a:endParaRPr lang="sv-SE"/>
           </a:p>
@@ -6875,7 +7183,7 @@
           <a:p>
             <a:fld id="{B4C653A3-D7FF-4AF7-943B-34A467C3139E}" type="datetimeFigureOut">
               <a:rPr lang="sv-SE" smtClean="0"/>
-              <a:t>2018-10-29</a:t>
+              <a:t>2018-10-30</a:t>
             </a:fld>
             <a:endParaRPr lang="sv-SE"/>
           </a:p>
@@ -6992,7 +7300,7 @@
           <a:p>
             <a:fld id="{B4C653A3-D7FF-4AF7-943B-34A467C3139E}" type="datetimeFigureOut">
               <a:rPr lang="sv-SE" smtClean="0"/>
-              <a:t>2018-10-29</a:t>
+              <a:t>2018-10-30</a:t>
             </a:fld>
             <a:endParaRPr lang="sv-SE"/>
           </a:p>
@@ -7087,7 +7395,7 @@
           <a:p>
             <a:fld id="{B4C653A3-D7FF-4AF7-943B-34A467C3139E}" type="datetimeFigureOut">
               <a:rPr lang="sv-SE" smtClean="0"/>
-              <a:t>2018-10-29</a:t>
+              <a:t>2018-10-30</a:t>
             </a:fld>
             <a:endParaRPr lang="sv-SE"/>
           </a:p>
@@ -7362,7 +7670,7 @@
           <a:p>
             <a:fld id="{B4C653A3-D7FF-4AF7-943B-34A467C3139E}" type="datetimeFigureOut">
               <a:rPr lang="sv-SE" smtClean="0"/>
-              <a:t>2018-10-29</a:t>
+              <a:t>2018-10-30</a:t>
             </a:fld>
             <a:endParaRPr lang="sv-SE"/>
           </a:p>
@@ -7614,7 +7922,7 @@
           <a:p>
             <a:fld id="{B4C653A3-D7FF-4AF7-943B-34A467C3139E}" type="datetimeFigureOut">
               <a:rPr lang="sv-SE" smtClean="0"/>
-              <a:t>2018-10-29</a:t>
+              <a:t>2018-10-30</a:t>
             </a:fld>
             <a:endParaRPr lang="sv-SE"/>
           </a:p>
@@ -7825,7 +8133,7 @@
           <a:p>
             <a:fld id="{B4C653A3-D7FF-4AF7-943B-34A467C3139E}" type="datetimeFigureOut">
               <a:rPr lang="sv-SE" smtClean="0"/>
-              <a:t>2018-10-29</a:t>
+              <a:t>2018-10-30</a:t>
             </a:fld>
             <a:endParaRPr lang="sv-SE"/>
           </a:p>
@@ -21060,36 +21368,374 @@
           <a:p>
             <a:r>
               <a:rPr lang="sv-SE" dirty="0"/>
-              <a:t>Profiler</a:t>
+              <a:t>Profiler - </a:t>
+            </a:r>
+            <a:r>
+              <a:rPr lang="sv-SE" dirty="0" err="1"/>
+              <a:t>GeneratedMap</a:t>
+            </a:r>
+            <a:endParaRPr lang="sv-SE" dirty="0"/>
+          </a:p>
+        </p:txBody>
+      </p:sp>
+      <p:pic>
+        <p:nvPicPr>
+          <p:cNvPr id="5" name="Bildobjekt 4">
+            <a:extLst>
+              <a:ext uri="{FF2B5EF4-FFF2-40B4-BE49-F238E27FC236}">
+                <a16:creationId xmlns:a16="http://schemas.microsoft.com/office/drawing/2014/main" id="{A48FBA35-C5B0-244C-BE43-186516F7BB8B}"/>
+              </a:ext>
+            </a:extLst>
+          </p:cNvPr>
+          <p:cNvPicPr>
+            <a:picLocks noChangeAspect="1"/>
+          </p:cNvPicPr>
+          <p:nvPr/>
+        </p:nvPicPr>
+        <p:blipFill>
+          <a:blip r:embed="rId4">
+            <a:extLst>
+              <a:ext uri="{28A0092B-C50C-407E-A947-70E740481C1C}">
+                <a14:useLocalDpi xmlns:a14="http://schemas.microsoft.com/office/drawing/2010/main" val="0"/>
+              </a:ext>
+            </a:extLst>
+          </a:blip>
+          <a:stretch>
+            <a:fillRect/>
+          </a:stretch>
+        </p:blipFill>
+        <p:spPr>
+          <a:xfrm>
+            <a:off x="1352550" y="2709862"/>
+            <a:ext cx="9690100" cy="2844800"/>
+          </a:xfrm>
+          <a:prstGeom prst="rect">
+            <a:avLst/>
+          </a:prstGeom>
+        </p:spPr>
+      </p:pic>
+      <p:sp>
+        <p:nvSpPr>
+          <p:cNvPr id="8" name="textruta 7">
+            <a:extLst>
+              <a:ext uri="{FF2B5EF4-FFF2-40B4-BE49-F238E27FC236}">
+                <a16:creationId xmlns:a16="http://schemas.microsoft.com/office/drawing/2014/main" id="{4185AF3B-BAC6-E04A-BF9C-4DCB8537C2F6}"/>
+              </a:ext>
+            </a:extLst>
+          </p:cNvPr>
+          <p:cNvSpPr txBox="1"/>
+          <p:nvPr/>
+        </p:nvSpPr>
+        <p:spPr>
+          <a:xfrm>
+            <a:off x="1587500" y="2044700"/>
+            <a:ext cx="6942221" cy="369332"/>
+          </a:xfrm>
+          <a:prstGeom prst="rect">
+            <a:avLst/>
+          </a:prstGeom>
+          <a:noFill/>
+        </p:spPr>
+        <p:txBody>
+          <a:bodyPr wrap="none" rtlCol="0">
+            <a:spAutoFit/>
+          </a:bodyPr>
+          <a:lstStyle/>
+          <a:p>
+            <a:r>
+              <a:rPr lang="sv-SE" dirty="0" err="1"/>
+              <a:t>GeneratedMap</a:t>
+            </a:r>
+            <a:r>
+              <a:rPr lang="sv-SE" dirty="0"/>
+              <a:t> </a:t>
+            </a:r>
+            <a:r>
+              <a:rPr lang="sv-SE" dirty="0" err="1"/>
+              <a:t>map</a:t>
+            </a:r>
+            <a:r>
+              <a:rPr lang="sv-SE" dirty="0"/>
+              <a:t> = new </a:t>
+            </a:r>
+            <a:r>
+              <a:rPr lang="sv-SE" dirty="0" err="1"/>
+              <a:t>GeneratedMap</a:t>
+            </a:r>
+            <a:r>
+              <a:rPr lang="sv-SE" dirty="0"/>
+              <a:t>(1000, 1000, new Hero(100));</a:t>
             </a:r>
           </a:p>
         </p:txBody>
       </p:sp>
       <p:sp>
         <p:nvSpPr>
-          <p:cNvPr id="3" name="Platshållare för innehåll 2"/>
-          <p:cNvSpPr>
-            <a:spLocks noGrp="1"/>
-          </p:cNvSpPr>
-          <p:nvPr>
-            <p:ph idx="1"/>
-          </p:nvPr>
+          <p:cNvPr id="12" name="Vänster 11">
+            <a:extLst>
+              <a:ext uri="{FF2B5EF4-FFF2-40B4-BE49-F238E27FC236}">
+                <a16:creationId xmlns:a16="http://schemas.microsoft.com/office/drawing/2014/main" id="{9D68455C-8F0B-9F41-B5F3-FA6B0F2C2646}"/>
+              </a:ext>
+            </a:extLst>
+          </p:cNvPr>
+          <p:cNvSpPr/>
+          <p:nvPr/>
         </p:nvSpPr>
-        <p:spPr/>
+        <p:spPr>
+          <a:xfrm rot="10800000">
+            <a:off x="1297130" y="4267200"/>
+            <a:ext cx="812800" cy="241300"/>
+          </a:xfrm>
+          <a:prstGeom prst="leftArrow">
+            <a:avLst/>
+          </a:prstGeom>
+        </p:spPr>
+        <p:style>
+          <a:lnRef idx="2">
+            <a:schemeClr val="accent1">
+              <a:shade val="50000"/>
+            </a:schemeClr>
+          </a:lnRef>
+          <a:fillRef idx="1">
+            <a:schemeClr val="accent1"/>
+          </a:fillRef>
+          <a:effectRef idx="0">
+            <a:schemeClr val="accent1"/>
+          </a:effectRef>
+          <a:fontRef idx="minor">
+            <a:schemeClr val="lt1"/>
+          </a:fontRef>
+        </p:style>
         <p:txBody>
-          <a:bodyPr>
-            <a:normAutofit/>
+          <a:bodyPr rtlCol="0" anchor="ctr"/>
+          <a:lstStyle/>
+          <a:p>
+            <a:pPr algn="ctr"/>
+            <a:endParaRPr lang="sv-SE"/>
+          </a:p>
+        </p:txBody>
+      </p:sp>
+    </p:spTree>
+    <p:custDataLst>
+      <p:tags r:id="rId1"/>
+    </p:custDataLst>
+    <p:extLst>
+      <p:ext uri="{BB962C8B-B14F-4D97-AF65-F5344CB8AC3E}">
+        <p14:creationId xmlns:p14="http://schemas.microsoft.com/office/powerpoint/2010/main" val="2276453216"/>
+      </p:ext>
+    </p:extLst>
+  </p:cSld>
+  <p:clrMapOvr>
+    <a:masterClrMapping/>
+  </p:clrMapOvr>
+</p:sld>
+</file>
+
+<file path=ppt/slides/slide35.xml><?xml version="1.0" encoding="utf-8"?>
+<p:sld xmlns:a="http://schemas.openxmlformats.org/drawingml/2006/main" xmlns:r="http://schemas.openxmlformats.org/officeDocument/2006/relationships" xmlns:p="http://schemas.openxmlformats.org/presentationml/2006/main">
+  <p:cSld>
+    <p:spTree>
+      <p:nvGrpSpPr>
+        <p:cNvPr id="1" name=""/>
+        <p:cNvGrpSpPr/>
+        <p:nvPr/>
+      </p:nvGrpSpPr>
+      <p:grpSpPr>
+        <a:xfrm>
+          <a:off x="0" y="0"/>
+          <a:ext cx="0" cy="0"/>
+          <a:chOff x="0" y="0"/>
+          <a:chExt cx="0" cy="0"/>
+        </a:xfrm>
+      </p:grpSpPr>
+      <p:sp>
+        <p:nvSpPr>
+          <p:cNvPr id="8" name="textruta 7">
+            <a:extLst>
+              <a:ext uri="{FF2B5EF4-FFF2-40B4-BE49-F238E27FC236}">
+                <a16:creationId xmlns:a16="http://schemas.microsoft.com/office/drawing/2014/main" id="{4185AF3B-BAC6-E04A-BF9C-4DCB8537C2F6}"/>
+              </a:ext>
+            </a:extLst>
+          </p:cNvPr>
+          <p:cNvSpPr txBox="1"/>
+          <p:nvPr/>
+        </p:nvSpPr>
+        <p:spPr>
+          <a:xfrm>
+            <a:off x="1101436" y="177284"/>
+            <a:ext cx="10251589" cy="369332"/>
+          </a:xfrm>
+          <a:prstGeom prst="rect">
+            <a:avLst/>
+          </a:prstGeom>
+          <a:noFill/>
+        </p:spPr>
+        <p:txBody>
+          <a:bodyPr wrap="none" rtlCol="0">
+            <a:spAutoFit/>
           </a:bodyPr>
           <a:lstStyle/>
           <a:p>
             <a:r>
-              <a:rPr lang="sv-SE" sz="1800" dirty="0" err="1"/>
-              <a:t>MapGeneration</a:t>
-            </a:r>
-            <a:r>
-              <a:rPr lang="sv-SE" sz="1800" dirty="0"/>
-              <a:t>?</a:t>
-            </a:r>
+              <a:rPr lang="sv-SE" dirty="0" err="1"/>
+              <a:t>GeneratedMap</a:t>
+            </a:r>
+            <a:r>
+              <a:rPr lang="sv-SE" dirty="0"/>
+              <a:t> </a:t>
+            </a:r>
+            <a:r>
+              <a:rPr lang="sv-SE" dirty="0" err="1"/>
+              <a:t>map</a:t>
+            </a:r>
+            <a:r>
+              <a:rPr lang="sv-SE" dirty="0"/>
+              <a:t> = new </a:t>
+            </a:r>
+            <a:r>
+              <a:rPr lang="sv-SE" dirty="0" err="1"/>
+              <a:t>GeneratedMap</a:t>
+            </a:r>
+            <a:r>
+              <a:rPr lang="sv-SE" dirty="0"/>
+              <a:t>(10000, 10000, new Hero(100)); //</a:t>
+            </a:r>
+            <a:r>
+              <a:rPr lang="sv-SE" dirty="0" err="1"/>
+              <a:t>renderGeneratedToConsole</a:t>
+            </a:r>
+            <a:r>
+              <a:rPr lang="sv-SE" dirty="0"/>
+              <a:t>(); </a:t>
+            </a:r>
+          </a:p>
+        </p:txBody>
+      </p:sp>
+      <p:pic>
+        <p:nvPicPr>
+          <p:cNvPr id="14" name="Bildobjekt 13">
+            <a:extLst>
+              <a:ext uri="{FF2B5EF4-FFF2-40B4-BE49-F238E27FC236}">
+                <a16:creationId xmlns:a16="http://schemas.microsoft.com/office/drawing/2014/main" id="{6574DF48-8B65-8749-89CE-CFC3BB46110E}"/>
+              </a:ext>
+            </a:extLst>
+          </p:cNvPr>
+          <p:cNvPicPr>
+            <a:picLocks noChangeAspect="1"/>
+          </p:cNvPicPr>
+          <p:nvPr/>
+        </p:nvPicPr>
+        <p:blipFill>
+          <a:blip r:embed="rId4">
+            <a:extLst>
+              <a:ext uri="{28A0092B-C50C-407E-A947-70E740481C1C}">
+                <a14:useLocalDpi xmlns:a14="http://schemas.microsoft.com/office/drawing/2010/main" val="0"/>
+              </a:ext>
+            </a:extLst>
+          </a:blip>
+          <a:stretch>
+            <a:fillRect/>
+          </a:stretch>
+        </p:blipFill>
+        <p:spPr>
+          <a:xfrm>
+            <a:off x="546100" y="641350"/>
+            <a:ext cx="10261600" cy="5854700"/>
+          </a:xfrm>
+          <a:prstGeom prst="rect">
+            <a:avLst/>
+          </a:prstGeom>
+        </p:spPr>
+      </p:pic>
+      <p:sp>
+        <p:nvSpPr>
+          <p:cNvPr id="17" name="Vänster 16">
+            <a:extLst>
+              <a:ext uri="{FF2B5EF4-FFF2-40B4-BE49-F238E27FC236}">
+                <a16:creationId xmlns:a16="http://schemas.microsoft.com/office/drawing/2014/main" id="{B1FBD720-1A3A-7F40-8A57-8FAE3623D42B}"/>
+              </a:ext>
+            </a:extLst>
+          </p:cNvPr>
+          <p:cNvSpPr/>
+          <p:nvPr/>
+        </p:nvSpPr>
+        <p:spPr>
+          <a:xfrm rot="10800000">
+            <a:off x="520700" y="2677391"/>
+            <a:ext cx="812800" cy="241300"/>
+          </a:xfrm>
+          <a:prstGeom prst="leftArrow">
+            <a:avLst/>
+          </a:prstGeom>
+        </p:spPr>
+        <p:style>
+          <a:lnRef idx="2">
+            <a:schemeClr val="accent1">
+              <a:shade val="50000"/>
+            </a:schemeClr>
+          </a:lnRef>
+          <a:fillRef idx="1">
+            <a:schemeClr val="accent1"/>
+          </a:fillRef>
+          <a:effectRef idx="0">
+            <a:schemeClr val="accent1"/>
+          </a:effectRef>
+          <a:fontRef idx="minor">
+            <a:schemeClr val="lt1"/>
+          </a:fontRef>
+        </p:style>
+        <p:txBody>
+          <a:bodyPr rtlCol="0" anchor="ctr"/>
+          <a:lstStyle/>
+          <a:p>
+            <a:pPr algn="ctr"/>
+            <a:endParaRPr lang="sv-SE"/>
+          </a:p>
+        </p:txBody>
+      </p:sp>
+      <p:sp>
+        <p:nvSpPr>
+          <p:cNvPr id="12" name="Vänster 11">
+            <a:extLst>
+              <a:ext uri="{FF2B5EF4-FFF2-40B4-BE49-F238E27FC236}">
+                <a16:creationId xmlns:a16="http://schemas.microsoft.com/office/drawing/2014/main" id="{9D68455C-8F0B-9F41-B5F3-FA6B0F2C2646}"/>
+              </a:ext>
+            </a:extLst>
+          </p:cNvPr>
+          <p:cNvSpPr/>
+          <p:nvPr/>
+        </p:nvSpPr>
+        <p:spPr>
+          <a:xfrm rot="10800000">
+            <a:off x="498764" y="1418071"/>
+            <a:ext cx="812800" cy="241300"/>
+          </a:xfrm>
+          <a:prstGeom prst="leftArrow">
+            <a:avLst/>
+          </a:prstGeom>
+        </p:spPr>
+        <p:style>
+          <a:lnRef idx="2">
+            <a:schemeClr val="accent1">
+              <a:shade val="50000"/>
+            </a:schemeClr>
+          </a:lnRef>
+          <a:fillRef idx="1">
+            <a:schemeClr val="accent1"/>
+          </a:fillRef>
+          <a:effectRef idx="0">
+            <a:schemeClr val="accent1"/>
+          </a:effectRef>
+          <a:fontRef idx="minor">
+            <a:schemeClr val="lt1"/>
+          </a:fontRef>
+        </p:style>
+        <p:txBody>
+          <a:bodyPr rtlCol="0" anchor="ctr"/>
+          <a:lstStyle/>
+          <a:p>
+            <a:pPr algn="ctr"/>
+            <a:endParaRPr lang="sv-SE"/>
           </a:p>
         </p:txBody>
       </p:sp>
@@ -21109,7 +21755,422 @@
 </p:sld>
 </file>
 
-<file path=ppt/slides/slide35.xml><?xml version="1.0" encoding="utf-8"?>
+<file path=ppt/slides/slide36.xml><?xml version="1.0" encoding="utf-8"?>
+<p:sld xmlns:a="http://schemas.openxmlformats.org/drawingml/2006/main" xmlns:r="http://schemas.openxmlformats.org/officeDocument/2006/relationships" xmlns:p="http://schemas.openxmlformats.org/presentationml/2006/main">
+  <p:cSld>
+    <p:bg>
+      <p:bgPr>
+        <a:solidFill>
+          <a:schemeClr val="bg1"/>
+        </a:solidFill>
+        <a:effectLst/>
+      </p:bgPr>
+    </p:bg>
+    <p:spTree>
+      <p:nvGrpSpPr>
+        <p:cNvPr id="1" name=""/>
+        <p:cNvGrpSpPr/>
+        <p:nvPr/>
+      </p:nvGrpSpPr>
+      <p:grpSpPr>
+        <a:xfrm>
+          <a:off x="0" y="0"/>
+          <a:ext cx="0" cy="0"/>
+          <a:chOff x="0" y="0"/>
+          <a:chExt cx="0" cy="0"/>
+        </a:xfrm>
+      </p:grpSpPr>
+      <p:pic>
+        <p:nvPicPr>
+          <p:cNvPr id="5" name="Bildobjekt 4">
+            <a:extLst>
+              <a:ext uri="{FF2B5EF4-FFF2-40B4-BE49-F238E27FC236}">
+                <a16:creationId xmlns:a16="http://schemas.microsoft.com/office/drawing/2014/main" id="{803DFD53-B72E-3245-B3FA-8DF0CEF1A4B3}"/>
+              </a:ext>
+            </a:extLst>
+          </p:cNvPr>
+          <p:cNvPicPr>
+            <a:picLocks noChangeAspect="1"/>
+          </p:cNvPicPr>
+          <p:nvPr/>
+        </p:nvPicPr>
+        <p:blipFill>
+          <a:blip r:embed="rId2">
+            <a:extLst>
+              <a:ext uri="{28A0092B-C50C-407E-A947-70E740481C1C}">
+                <a14:useLocalDpi xmlns:a14="http://schemas.microsoft.com/office/drawing/2010/main" val="0"/>
+              </a:ext>
+            </a:extLst>
+          </a:blip>
+          <a:stretch>
+            <a:fillRect/>
+          </a:stretch>
+        </p:blipFill>
+        <p:spPr>
+          <a:xfrm>
+            <a:off x="2501762" y="643466"/>
+            <a:ext cx="7188475" cy="5571067"/>
+          </a:xfrm>
+          <a:prstGeom prst="rect">
+            <a:avLst/>
+          </a:prstGeom>
+        </p:spPr>
+      </p:pic>
+    </p:spTree>
+    <p:extLst>
+      <p:ext uri="{BB962C8B-B14F-4D97-AF65-F5344CB8AC3E}">
+        <p14:creationId xmlns:p14="http://schemas.microsoft.com/office/powerpoint/2010/main" val="1402650674"/>
+      </p:ext>
+    </p:extLst>
+  </p:cSld>
+  <p:clrMapOvr>
+    <a:masterClrMapping/>
+  </p:clrMapOvr>
+</p:sld>
+</file>
+
+<file path=ppt/slides/slide37.xml><?xml version="1.0" encoding="utf-8"?>
+<p:sld xmlns:a="http://schemas.openxmlformats.org/drawingml/2006/main" xmlns:r="http://schemas.openxmlformats.org/officeDocument/2006/relationships" xmlns:p="http://schemas.openxmlformats.org/presentationml/2006/main">
+  <p:cSld>
+    <p:spTree>
+      <p:nvGrpSpPr>
+        <p:cNvPr id="1" name=""/>
+        <p:cNvGrpSpPr/>
+        <p:nvPr/>
+      </p:nvGrpSpPr>
+      <p:grpSpPr>
+        <a:xfrm>
+          <a:off x="0" y="0"/>
+          <a:ext cx="0" cy="0"/>
+          <a:chOff x="0" y="0"/>
+          <a:chExt cx="0" cy="0"/>
+        </a:xfrm>
+      </p:grpSpPr>
+      <p:sp>
+        <p:nvSpPr>
+          <p:cNvPr id="8" name="textruta 7">
+            <a:extLst>
+              <a:ext uri="{FF2B5EF4-FFF2-40B4-BE49-F238E27FC236}">
+                <a16:creationId xmlns:a16="http://schemas.microsoft.com/office/drawing/2014/main" id="{4185AF3B-BAC6-E04A-BF9C-4DCB8537C2F6}"/>
+              </a:ext>
+            </a:extLst>
+          </p:cNvPr>
+          <p:cNvSpPr txBox="1"/>
+          <p:nvPr/>
+        </p:nvSpPr>
+        <p:spPr>
+          <a:xfrm>
+            <a:off x="1101436" y="177284"/>
+            <a:ext cx="10251589" cy="369332"/>
+          </a:xfrm>
+          <a:prstGeom prst="rect">
+            <a:avLst/>
+          </a:prstGeom>
+          <a:noFill/>
+        </p:spPr>
+        <p:txBody>
+          <a:bodyPr wrap="none" rtlCol="0">
+            <a:spAutoFit/>
+          </a:bodyPr>
+          <a:lstStyle/>
+          <a:p>
+            <a:r>
+              <a:rPr lang="sv-SE" dirty="0" err="1"/>
+              <a:t>GeneratedMap</a:t>
+            </a:r>
+            <a:r>
+              <a:rPr lang="sv-SE" dirty="0"/>
+              <a:t> </a:t>
+            </a:r>
+            <a:r>
+              <a:rPr lang="sv-SE" dirty="0" err="1"/>
+              <a:t>map</a:t>
+            </a:r>
+            <a:r>
+              <a:rPr lang="sv-SE" dirty="0"/>
+              <a:t> = new </a:t>
+            </a:r>
+            <a:r>
+              <a:rPr lang="sv-SE" dirty="0" err="1"/>
+              <a:t>GeneratedMap</a:t>
+            </a:r>
+            <a:r>
+              <a:rPr lang="sv-SE" dirty="0"/>
+              <a:t>(10000, 10000, new Hero(100)); //</a:t>
+            </a:r>
+            <a:r>
+              <a:rPr lang="sv-SE" dirty="0" err="1"/>
+              <a:t>renderGeneratedToConsole</a:t>
+            </a:r>
+            <a:r>
+              <a:rPr lang="sv-SE" dirty="0"/>
+              <a:t>(); </a:t>
+            </a:r>
+          </a:p>
+        </p:txBody>
+      </p:sp>
+      <p:pic>
+        <p:nvPicPr>
+          <p:cNvPr id="3" name="Bildobjekt 2">
+            <a:extLst>
+              <a:ext uri="{FF2B5EF4-FFF2-40B4-BE49-F238E27FC236}">
+                <a16:creationId xmlns:a16="http://schemas.microsoft.com/office/drawing/2014/main" id="{D6378A41-C7B4-C243-95E0-C9DAE2221FEB}"/>
+              </a:ext>
+            </a:extLst>
+          </p:cNvPr>
+          <p:cNvPicPr>
+            <a:picLocks noChangeAspect="1"/>
+          </p:cNvPicPr>
+          <p:nvPr/>
+        </p:nvPicPr>
+        <p:blipFill>
+          <a:blip r:embed="rId4">
+            <a:extLst>
+              <a:ext uri="{28A0092B-C50C-407E-A947-70E740481C1C}">
+                <a14:useLocalDpi xmlns:a14="http://schemas.microsoft.com/office/drawing/2010/main" val="0"/>
+              </a:ext>
+            </a:extLst>
+          </a:blip>
+          <a:stretch>
+            <a:fillRect/>
+          </a:stretch>
+        </p:blipFill>
+        <p:spPr>
+          <a:xfrm>
+            <a:off x="863600" y="615950"/>
+            <a:ext cx="10464800" cy="5626100"/>
+          </a:xfrm>
+          <a:prstGeom prst="rect">
+            <a:avLst/>
+          </a:prstGeom>
+        </p:spPr>
+      </p:pic>
+      <p:sp>
+        <p:nvSpPr>
+          <p:cNvPr id="17" name="Vänster 16">
+            <a:extLst>
+              <a:ext uri="{FF2B5EF4-FFF2-40B4-BE49-F238E27FC236}">
+                <a16:creationId xmlns:a16="http://schemas.microsoft.com/office/drawing/2014/main" id="{B1FBD720-1A3A-7F40-8A57-8FAE3623D42B}"/>
+              </a:ext>
+            </a:extLst>
+          </p:cNvPr>
+          <p:cNvSpPr/>
+          <p:nvPr/>
+        </p:nvSpPr>
+        <p:spPr>
+          <a:xfrm rot="10800000">
+            <a:off x="826655" y="2150919"/>
+            <a:ext cx="812800" cy="241300"/>
+          </a:xfrm>
+          <a:prstGeom prst="leftArrow">
+            <a:avLst/>
+          </a:prstGeom>
+        </p:spPr>
+        <p:style>
+          <a:lnRef idx="2">
+            <a:schemeClr val="accent1">
+              <a:shade val="50000"/>
+            </a:schemeClr>
+          </a:lnRef>
+          <a:fillRef idx="1">
+            <a:schemeClr val="accent1"/>
+          </a:fillRef>
+          <a:effectRef idx="0">
+            <a:schemeClr val="accent1"/>
+          </a:effectRef>
+          <a:fontRef idx="minor">
+            <a:schemeClr val="lt1"/>
+          </a:fontRef>
+        </p:style>
+        <p:txBody>
+          <a:bodyPr rtlCol="0" anchor="ctr"/>
+          <a:lstStyle/>
+          <a:p>
+            <a:pPr algn="ctr"/>
+            <a:endParaRPr lang="sv-SE"/>
+          </a:p>
+        </p:txBody>
+      </p:sp>
+      <p:sp>
+        <p:nvSpPr>
+          <p:cNvPr id="12" name="Vänster 11">
+            <a:extLst>
+              <a:ext uri="{FF2B5EF4-FFF2-40B4-BE49-F238E27FC236}">
+                <a16:creationId xmlns:a16="http://schemas.microsoft.com/office/drawing/2014/main" id="{9D68455C-8F0B-9F41-B5F3-FA6B0F2C2646}"/>
+              </a:ext>
+            </a:extLst>
+          </p:cNvPr>
+          <p:cNvSpPr/>
+          <p:nvPr/>
+        </p:nvSpPr>
+        <p:spPr>
+          <a:xfrm rot="10800000">
+            <a:off x="826655" y="4948093"/>
+            <a:ext cx="812800" cy="241300"/>
+          </a:xfrm>
+          <a:prstGeom prst="leftArrow">
+            <a:avLst/>
+          </a:prstGeom>
+        </p:spPr>
+        <p:style>
+          <a:lnRef idx="2">
+            <a:schemeClr val="accent1">
+              <a:shade val="50000"/>
+            </a:schemeClr>
+          </a:lnRef>
+          <a:fillRef idx="1">
+            <a:schemeClr val="accent1"/>
+          </a:fillRef>
+          <a:effectRef idx="0">
+            <a:schemeClr val="accent1"/>
+          </a:effectRef>
+          <a:fontRef idx="minor">
+            <a:schemeClr val="lt1"/>
+          </a:fontRef>
+        </p:style>
+        <p:txBody>
+          <a:bodyPr rtlCol="0" anchor="ctr"/>
+          <a:lstStyle/>
+          <a:p>
+            <a:pPr algn="ctr"/>
+            <a:endParaRPr lang="sv-SE"/>
+          </a:p>
+        </p:txBody>
+      </p:sp>
+    </p:spTree>
+    <p:custDataLst>
+      <p:tags r:id="rId1"/>
+    </p:custDataLst>
+    <p:extLst>
+      <p:ext uri="{BB962C8B-B14F-4D97-AF65-F5344CB8AC3E}">
+        <p14:creationId xmlns:p14="http://schemas.microsoft.com/office/powerpoint/2010/main" val="3644151933"/>
+      </p:ext>
+    </p:extLst>
+  </p:cSld>
+  <p:clrMapOvr>
+    <a:masterClrMapping/>
+  </p:clrMapOvr>
+</p:sld>
+</file>
+
+<file path=ppt/slides/slide38.xml><?xml version="1.0" encoding="utf-8"?>
+<p:sld xmlns:a="http://schemas.openxmlformats.org/drawingml/2006/main" xmlns:r="http://schemas.openxmlformats.org/officeDocument/2006/relationships" xmlns:p="http://schemas.openxmlformats.org/presentationml/2006/main">
+  <p:cSld>
+    <p:bg>
+      <p:bgPr>
+        <a:solidFill>
+          <a:schemeClr val="bg1"/>
+        </a:solidFill>
+        <a:effectLst/>
+      </p:bgPr>
+    </p:bg>
+    <p:spTree>
+      <p:nvGrpSpPr>
+        <p:cNvPr id="1" name=""/>
+        <p:cNvGrpSpPr/>
+        <p:nvPr/>
+      </p:nvGrpSpPr>
+      <p:grpSpPr>
+        <a:xfrm>
+          <a:off x="0" y="0"/>
+          <a:ext cx="0" cy="0"/>
+          <a:chOff x="0" y="0"/>
+          <a:chExt cx="0" cy="0"/>
+        </a:xfrm>
+      </p:grpSpPr>
+      <p:pic>
+        <p:nvPicPr>
+          <p:cNvPr id="5" name="Bildobjekt 4">
+            <a:extLst>
+              <a:ext uri="{FF2B5EF4-FFF2-40B4-BE49-F238E27FC236}">
+                <a16:creationId xmlns:a16="http://schemas.microsoft.com/office/drawing/2014/main" id="{57355B15-EA56-AE4B-92D2-3D2BBB919A92}"/>
+              </a:ext>
+            </a:extLst>
+          </p:cNvPr>
+          <p:cNvPicPr>
+            <a:picLocks noChangeAspect="1"/>
+          </p:cNvPicPr>
+          <p:nvPr/>
+        </p:nvPicPr>
+        <p:blipFill>
+          <a:blip r:embed="rId2">
+            <a:extLst>
+              <a:ext uri="{28A0092B-C50C-407E-A947-70E740481C1C}">
+                <a14:useLocalDpi xmlns:a14="http://schemas.microsoft.com/office/drawing/2010/main" val="0"/>
+              </a:ext>
+            </a:extLst>
+          </a:blip>
+          <a:stretch>
+            <a:fillRect/>
+          </a:stretch>
+        </p:blipFill>
+        <p:spPr>
+          <a:xfrm>
+            <a:off x="643467" y="2079498"/>
+            <a:ext cx="10905066" cy="2699002"/>
+          </a:xfrm>
+          <a:prstGeom prst="rect">
+            <a:avLst/>
+          </a:prstGeom>
+        </p:spPr>
+      </p:pic>
+      <p:sp>
+        <p:nvSpPr>
+          <p:cNvPr id="6" name="textruta 5">
+            <a:extLst>
+              <a:ext uri="{FF2B5EF4-FFF2-40B4-BE49-F238E27FC236}">
+                <a16:creationId xmlns:a16="http://schemas.microsoft.com/office/drawing/2014/main" id="{239B91C0-8C26-6E4A-ACC7-0F031EC61056}"/>
+              </a:ext>
+            </a:extLst>
+          </p:cNvPr>
+          <p:cNvSpPr txBox="1"/>
+          <p:nvPr/>
+        </p:nvSpPr>
+        <p:spPr>
+          <a:xfrm>
+            <a:off x="2733040" y="483985"/>
+            <a:ext cx="6725920" cy="584775"/>
+          </a:xfrm>
+          <a:prstGeom prst="rect">
+            <a:avLst/>
+          </a:prstGeom>
+          <a:noFill/>
+        </p:spPr>
+        <p:txBody>
+          <a:bodyPr wrap="square" rtlCol="0">
+            <a:spAutoFit/>
+          </a:bodyPr>
+          <a:lstStyle/>
+          <a:p>
+            <a:r>
+              <a:rPr lang="sv-SE" sz="3200" dirty="0"/>
+              <a:t>En närmre titt på </a:t>
+            </a:r>
+            <a:r>
+              <a:rPr lang="sv-SE" sz="3200" dirty="0" err="1"/>
+              <a:t>putMonstersOnMap</a:t>
+            </a:r>
+            <a:r>
+              <a:rPr lang="sv-SE" sz="3200" dirty="0"/>
+              <a:t>()</a:t>
+            </a:r>
+          </a:p>
+        </p:txBody>
+      </p:sp>
+    </p:spTree>
+    <p:extLst>
+      <p:ext uri="{BB962C8B-B14F-4D97-AF65-F5344CB8AC3E}">
+        <p14:creationId xmlns:p14="http://schemas.microsoft.com/office/powerpoint/2010/main" val="340316833"/>
+      </p:ext>
+    </p:extLst>
+  </p:cSld>
+  <p:clrMapOvr>
+    <a:masterClrMapping/>
+  </p:clrMapOvr>
+</p:sld>
+</file>
+
+<file path=ppt/slides/slide39.xml><?xml version="1.0" encoding="utf-8"?>
 <p:sld xmlns:a="http://schemas.openxmlformats.org/drawingml/2006/main" xmlns:r="http://schemas.openxmlformats.org/officeDocument/2006/relationships" xmlns:p="http://schemas.openxmlformats.org/presentationml/2006/main">
   <p:cSld>
     <p:spTree>
@@ -24502,1610 +25563,6 @@
     <p:extLst>
       <p:ext uri="{BB962C8B-B14F-4D97-AF65-F5344CB8AC3E}">
         <p14:creationId xmlns:p14="http://schemas.microsoft.com/office/powerpoint/2010/main" val="963717311"/>
-      </p:ext>
-    </p:extLst>
-  </p:cSld>
-  <p:clrMapOvr>
-    <a:masterClrMapping/>
-  </p:clrMapOvr>
-</p:sld>
-</file>
-
-<file path=ppt/slides/slide36.xml><?xml version="1.0" encoding="utf-8"?>
-<p:sld xmlns:a="http://schemas.openxmlformats.org/drawingml/2006/main" xmlns:r="http://schemas.openxmlformats.org/officeDocument/2006/relationships" xmlns:p="http://schemas.openxmlformats.org/presentationml/2006/main">
-  <p:cSld>
-    <p:spTree>
-      <p:nvGrpSpPr>
-        <p:cNvPr id="1" name=""/>
-        <p:cNvGrpSpPr/>
-        <p:nvPr/>
-      </p:nvGrpSpPr>
-      <p:grpSpPr>
-        <a:xfrm>
-          <a:off x="0" y="0"/>
-          <a:ext cx="0" cy="0"/>
-          <a:chOff x="0" y="0"/>
-          <a:chExt cx="0" cy="0"/>
-        </a:xfrm>
-      </p:grpSpPr>
-      <p:sp>
-        <p:nvSpPr>
-          <p:cNvPr id="2" name="Rubrik 1"/>
-          <p:cNvSpPr>
-            <a:spLocks noGrp="1"/>
-          </p:cNvSpPr>
-          <p:nvPr>
-            <p:ph type="title"/>
-          </p:nvPr>
-        </p:nvSpPr>
-        <p:spPr>
-          <a:xfrm>
-            <a:off x="838200" y="365125"/>
-            <a:ext cx="10515600" cy="1325563"/>
-          </a:xfrm>
-        </p:spPr>
-        <p:txBody>
-          <a:bodyPr/>
-          <a:lstStyle/>
-          <a:p>
-            <a:r>
-              <a:rPr lang="sv-SE" dirty="0"/>
-              <a:t>Byggscript 2</a:t>
-            </a:r>
-          </a:p>
-        </p:txBody>
-      </p:sp>
-      <p:sp>
-        <p:nvSpPr>
-          <p:cNvPr id="4" name="Platshållare för innehåll 2">
-            <a:extLst>
-              <a:ext uri="{FF2B5EF4-FFF2-40B4-BE49-F238E27FC236}">
-                <a16:creationId xmlns:a16="http://schemas.microsoft.com/office/drawing/2014/main" id="{7502AE00-9333-EB4B-95D9-391326FD9AE0}"/>
-              </a:ext>
-            </a:extLst>
-          </p:cNvPr>
-          <p:cNvSpPr txBox="1">
-            <a:spLocks/>
-          </p:cNvSpPr>
-          <p:nvPr/>
-        </p:nvSpPr>
-        <p:spPr>
-          <a:xfrm>
-            <a:off x="6578600" y="1690688"/>
-            <a:ext cx="4775200" cy="4067175"/>
-          </a:xfrm>
-          <a:prstGeom prst="rect">
-            <a:avLst/>
-          </a:prstGeom>
-        </p:spPr>
-        <p:txBody>
-          <a:bodyPr vert="horz" lIns="91440" tIns="45720" rIns="91440" bIns="45720" rtlCol="0">
-            <a:normAutofit/>
-          </a:bodyPr>
-          <a:lstStyle>
-            <a:lvl1pPr marL="228600" indent="-228600" algn="l" defTabSz="914400" rtl="0" eaLnBrk="1" latinLnBrk="0" hangingPunct="1">
-              <a:lnSpc>
-                <a:spcPct val="90000"/>
-              </a:lnSpc>
-              <a:spcBef>
-                <a:spcPts val="1000"/>
-              </a:spcBef>
-              <a:buFont typeface="Arial" panose="020B0604020202020204" pitchFamily="34" charset="0"/>
-              <a:buChar char="•"/>
-              <a:defRPr sz="2800" kern="1200">
-                <a:solidFill>
-                  <a:schemeClr val="tx1"/>
-                </a:solidFill>
-                <a:latin typeface="+mn-lt"/>
-                <a:ea typeface="+mn-ea"/>
-                <a:cs typeface="+mn-cs"/>
-              </a:defRPr>
-            </a:lvl1pPr>
-            <a:lvl2pPr marL="685800" indent="-228600" algn="l" defTabSz="914400" rtl="0" eaLnBrk="1" latinLnBrk="0" hangingPunct="1">
-              <a:lnSpc>
-                <a:spcPct val="90000"/>
-              </a:lnSpc>
-              <a:spcBef>
-                <a:spcPts val="500"/>
-              </a:spcBef>
-              <a:buFont typeface="Arial" panose="020B0604020202020204" pitchFamily="34" charset="0"/>
-              <a:buChar char="•"/>
-              <a:defRPr sz="2400" kern="1200">
-                <a:solidFill>
-                  <a:schemeClr val="tx1"/>
-                </a:solidFill>
-                <a:latin typeface="+mn-lt"/>
-                <a:ea typeface="+mn-ea"/>
-                <a:cs typeface="+mn-cs"/>
-              </a:defRPr>
-            </a:lvl2pPr>
-            <a:lvl3pPr marL="1143000" indent="-228600" algn="l" defTabSz="914400" rtl="0" eaLnBrk="1" latinLnBrk="0" hangingPunct="1">
-              <a:lnSpc>
-                <a:spcPct val="90000"/>
-              </a:lnSpc>
-              <a:spcBef>
-                <a:spcPts val="500"/>
-              </a:spcBef>
-              <a:buFont typeface="Arial" panose="020B0604020202020204" pitchFamily="34" charset="0"/>
-              <a:buChar char="•"/>
-              <a:defRPr sz="2000" kern="1200">
-                <a:solidFill>
-                  <a:schemeClr val="tx1"/>
-                </a:solidFill>
-                <a:latin typeface="+mn-lt"/>
-                <a:ea typeface="+mn-ea"/>
-                <a:cs typeface="+mn-cs"/>
-              </a:defRPr>
-            </a:lvl3pPr>
-            <a:lvl4pPr marL="1600200" indent="-228600" algn="l" defTabSz="914400" rtl="0" eaLnBrk="1" latinLnBrk="0" hangingPunct="1">
-              <a:lnSpc>
-                <a:spcPct val="90000"/>
-              </a:lnSpc>
-              <a:spcBef>
-                <a:spcPts val="500"/>
-              </a:spcBef>
-              <a:buFont typeface="Arial" panose="020B0604020202020204" pitchFamily="34" charset="0"/>
-              <a:buChar char="•"/>
-              <a:defRPr sz="1800" kern="1200">
-                <a:solidFill>
-                  <a:schemeClr val="tx1"/>
-                </a:solidFill>
-                <a:latin typeface="+mn-lt"/>
-                <a:ea typeface="+mn-ea"/>
-                <a:cs typeface="+mn-cs"/>
-              </a:defRPr>
-            </a:lvl4pPr>
-            <a:lvl5pPr marL="2057400" indent="-228600" algn="l" defTabSz="914400" rtl="0" eaLnBrk="1" latinLnBrk="0" hangingPunct="1">
-              <a:lnSpc>
-                <a:spcPct val="90000"/>
-              </a:lnSpc>
-              <a:spcBef>
-                <a:spcPts val="500"/>
-              </a:spcBef>
-              <a:buFont typeface="Arial" panose="020B0604020202020204" pitchFamily="34" charset="0"/>
-              <a:buChar char="•"/>
-              <a:defRPr sz="1800" kern="1200">
-                <a:solidFill>
-                  <a:schemeClr val="tx1"/>
-                </a:solidFill>
-                <a:latin typeface="+mn-lt"/>
-                <a:ea typeface="+mn-ea"/>
-                <a:cs typeface="+mn-cs"/>
-              </a:defRPr>
-            </a:lvl5pPr>
-            <a:lvl6pPr marL="2514600" indent="-228600" algn="l" defTabSz="914400" rtl="0" eaLnBrk="1" latinLnBrk="0" hangingPunct="1">
-              <a:lnSpc>
-                <a:spcPct val="90000"/>
-              </a:lnSpc>
-              <a:spcBef>
-                <a:spcPts val="500"/>
-              </a:spcBef>
-              <a:buFont typeface="Arial" panose="020B0604020202020204" pitchFamily="34" charset="0"/>
-              <a:buChar char="•"/>
-              <a:defRPr sz="1800" kern="1200">
-                <a:solidFill>
-                  <a:schemeClr val="tx1"/>
-                </a:solidFill>
-                <a:latin typeface="+mn-lt"/>
-                <a:ea typeface="+mn-ea"/>
-                <a:cs typeface="+mn-cs"/>
-              </a:defRPr>
-            </a:lvl6pPr>
-            <a:lvl7pPr marL="2971800" indent="-228600" algn="l" defTabSz="914400" rtl="0" eaLnBrk="1" latinLnBrk="0" hangingPunct="1">
-              <a:lnSpc>
-                <a:spcPct val="90000"/>
-              </a:lnSpc>
-              <a:spcBef>
-                <a:spcPts val="500"/>
-              </a:spcBef>
-              <a:buFont typeface="Arial" panose="020B0604020202020204" pitchFamily="34" charset="0"/>
-              <a:buChar char="•"/>
-              <a:defRPr sz="1800" kern="1200">
-                <a:solidFill>
-                  <a:schemeClr val="tx1"/>
-                </a:solidFill>
-                <a:latin typeface="+mn-lt"/>
-                <a:ea typeface="+mn-ea"/>
-                <a:cs typeface="+mn-cs"/>
-              </a:defRPr>
-            </a:lvl7pPr>
-            <a:lvl8pPr marL="3429000" indent="-228600" algn="l" defTabSz="914400" rtl="0" eaLnBrk="1" latinLnBrk="0" hangingPunct="1">
-              <a:lnSpc>
-                <a:spcPct val="90000"/>
-              </a:lnSpc>
-              <a:spcBef>
-                <a:spcPts val="500"/>
-              </a:spcBef>
-              <a:buFont typeface="Arial" panose="020B0604020202020204" pitchFamily="34" charset="0"/>
-              <a:buChar char="•"/>
-              <a:defRPr sz="1800" kern="1200">
-                <a:solidFill>
-                  <a:schemeClr val="tx1"/>
-                </a:solidFill>
-                <a:latin typeface="+mn-lt"/>
-                <a:ea typeface="+mn-ea"/>
-                <a:cs typeface="+mn-cs"/>
-              </a:defRPr>
-            </a:lvl8pPr>
-            <a:lvl9pPr marL="3886200" indent="-228600" algn="l" defTabSz="914400" rtl="0" eaLnBrk="1" latinLnBrk="0" hangingPunct="1">
-              <a:lnSpc>
-                <a:spcPct val="90000"/>
-              </a:lnSpc>
-              <a:spcBef>
-                <a:spcPts val="500"/>
-              </a:spcBef>
-              <a:buFont typeface="Arial" panose="020B0604020202020204" pitchFamily="34" charset="0"/>
-              <a:buChar char="•"/>
-              <a:defRPr sz="1800" kern="1200">
-                <a:solidFill>
-                  <a:schemeClr val="tx1"/>
-                </a:solidFill>
-                <a:latin typeface="+mn-lt"/>
-                <a:ea typeface="+mn-ea"/>
-                <a:cs typeface="+mn-cs"/>
-              </a:defRPr>
-            </a:lvl9pPr>
-          </a:lstStyle>
-          <a:p>
-            <a:pPr marL="0" indent="0">
-              <a:buFont typeface="Arial" panose="020B0604020202020204" pitchFamily="34" charset="0"/>
-              <a:buNone/>
-            </a:pPr>
-            <a:endParaRPr lang="sv-SE" dirty="0"/>
-          </a:p>
-        </p:txBody>
-      </p:sp>
-      <p:sp>
-        <p:nvSpPr>
-          <p:cNvPr id="6" name="Content Placeholder 5">
-            <a:extLst>
-              <a:ext uri="{FF2B5EF4-FFF2-40B4-BE49-F238E27FC236}">
-                <a16:creationId xmlns:a16="http://schemas.microsoft.com/office/drawing/2014/main" id="{F0405698-C1F8-6044-B4CF-2285BC06E265}"/>
-              </a:ext>
-            </a:extLst>
-          </p:cNvPr>
-          <p:cNvSpPr>
-            <a:spLocks noGrp="1"/>
-          </p:cNvSpPr>
-          <p:nvPr>
-            <p:ph idx="1"/>
-          </p:nvPr>
-        </p:nvSpPr>
-        <p:spPr>
-          <a:xfrm>
-            <a:off x="838200" y="1548606"/>
-            <a:ext cx="10515600" cy="4351338"/>
-          </a:xfrm>
-        </p:spPr>
-        <p:txBody>
-          <a:bodyPr>
-            <a:normAutofit fontScale="32500" lnSpcReduction="20000"/>
-          </a:bodyPr>
-          <a:lstStyle/>
-          <a:p>
-            <a:pPr marL="0" indent="0">
-              <a:buNone/>
-            </a:pPr>
-            <a:r>
-              <a:rPr lang="sv-SE" sz="4300" dirty="0">
-                <a:solidFill>
-                  <a:schemeClr val="accent1">
-                    <a:lumMod val="75000"/>
-                  </a:schemeClr>
-                </a:solidFill>
-              </a:rPr>
-              <a:t>&lt;?</a:t>
-            </a:r>
-            <a:r>
-              <a:rPr lang="sv-SE" sz="4300" dirty="0" err="1">
-                <a:solidFill>
-                  <a:schemeClr val="accent1">
-                    <a:lumMod val="75000"/>
-                  </a:schemeClr>
-                </a:solidFill>
-              </a:rPr>
-              <a:t>xml</a:t>
-            </a:r>
-            <a:r>
-              <a:rPr lang="sv-SE" sz="4300" dirty="0">
-                <a:solidFill>
-                  <a:schemeClr val="accent1">
-                    <a:lumMod val="75000"/>
-                  </a:schemeClr>
-                </a:solidFill>
-              </a:rPr>
-              <a:t> version="1.0" </a:t>
-            </a:r>
-            <a:r>
-              <a:rPr lang="sv-SE" sz="4300" dirty="0" err="1">
-                <a:solidFill>
-                  <a:schemeClr val="accent1">
-                    <a:lumMod val="75000"/>
-                  </a:schemeClr>
-                </a:solidFill>
-              </a:rPr>
-              <a:t>encoding</a:t>
-            </a:r>
-            <a:r>
-              <a:rPr lang="sv-SE" sz="4300" dirty="0">
-                <a:solidFill>
-                  <a:schemeClr val="accent1">
-                    <a:lumMod val="75000"/>
-                  </a:schemeClr>
-                </a:solidFill>
-              </a:rPr>
-              <a:t>="UTF-8"?&gt;</a:t>
-            </a:r>
-            <a:br>
-              <a:rPr lang="sv-SE" sz="4300" dirty="0">
-                <a:solidFill>
-                  <a:schemeClr val="accent1">
-                    <a:lumMod val="75000"/>
-                  </a:schemeClr>
-                </a:solidFill>
-              </a:rPr>
-            </a:br>
-            <a:br>
-              <a:rPr lang="sv-SE" sz="4300" dirty="0">
-                <a:solidFill>
-                  <a:schemeClr val="accent1">
-                    <a:lumMod val="75000"/>
-                  </a:schemeClr>
-                </a:solidFill>
-              </a:rPr>
-            </a:br>
-            <a:r>
-              <a:rPr lang="sv-SE" sz="4300" dirty="0">
-                <a:solidFill>
-                  <a:schemeClr val="accent1">
-                    <a:lumMod val="75000"/>
-                  </a:schemeClr>
-                </a:solidFill>
-              </a:rPr>
-              <a:t>&lt;</a:t>
-            </a:r>
-            <a:r>
-              <a:rPr lang="sv-SE" sz="4300" dirty="0" err="1">
-                <a:solidFill>
-                  <a:schemeClr val="accent1">
-                    <a:lumMod val="75000"/>
-                  </a:schemeClr>
-                </a:solidFill>
-              </a:rPr>
-              <a:t>project</a:t>
-            </a:r>
-            <a:r>
-              <a:rPr lang="sv-SE" sz="4300" dirty="0">
-                <a:solidFill>
-                  <a:schemeClr val="accent1">
-                    <a:lumMod val="75000"/>
-                  </a:schemeClr>
-                </a:solidFill>
-              </a:rPr>
-              <a:t> </a:t>
-            </a:r>
-            <a:r>
-              <a:rPr lang="sv-SE" sz="4300" dirty="0" err="1">
-                <a:solidFill>
-                  <a:schemeClr val="accent1">
-                    <a:lumMod val="75000"/>
-                  </a:schemeClr>
-                </a:solidFill>
-              </a:rPr>
-              <a:t>xmlns</a:t>
-            </a:r>
-            <a:r>
-              <a:rPr lang="sv-SE" sz="4300" dirty="0">
-                <a:solidFill>
-                  <a:schemeClr val="accent1">
-                    <a:lumMod val="75000"/>
-                  </a:schemeClr>
-                </a:solidFill>
-              </a:rPr>
-              <a:t>="http://</a:t>
-            </a:r>
-            <a:r>
-              <a:rPr lang="sv-SE" sz="4300" dirty="0" err="1">
-                <a:solidFill>
-                  <a:schemeClr val="accent1">
-                    <a:lumMod val="75000"/>
-                  </a:schemeClr>
-                </a:solidFill>
-              </a:rPr>
-              <a:t>maven.apache.org</a:t>
-            </a:r>
-            <a:r>
-              <a:rPr lang="sv-SE" sz="4300" dirty="0">
-                <a:solidFill>
-                  <a:schemeClr val="accent1">
-                    <a:lumMod val="75000"/>
-                  </a:schemeClr>
-                </a:solidFill>
-              </a:rPr>
-              <a:t>/POM/4.0.0" </a:t>
-            </a:r>
-            <a:r>
-              <a:rPr lang="sv-SE" sz="4300" dirty="0" err="1">
-                <a:solidFill>
-                  <a:schemeClr val="accent1">
-                    <a:lumMod val="75000"/>
-                  </a:schemeClr>
-                </a:solidFill>
-              </a:rPr>
-              <a:t>xmlns:xsi</a:t>
-            </a:r>
-            <a:r>
-              <a:rPr lang="sv-SE" sz="4300" dirty="0">
-                <a:solidFill>
-                  <a:schemeClr val="accent1">
-                    <a:lumMod val="75000"/>
-                  </a:schemeClr>
-                </a:solidFill>
-              </a:rPr>
-              <a:t>="http://www.w3.org/2001/</a:t>
-            </a:r>
-            <a:r>
-              <a:rPr lang="sv-SE" sz="4300" dirty="0" err="1">
-                <a:solidFill>
-                  <a:schemeClr val="accent1">
-                    <a:lumMod val="75000"/>
-                  </a:schemeClr>
-                </a:solidFill>
-              </a:rPr>
-              <a:t>XMLSchema-instance</a:t>
-            </a:r>
-            <a:r>
-              <a:rPr lang="sv-SE" sz="4300" dirty="0">
-                <a:solidFill>
-                  <a:schemeClr val="accent1">
-                    <a:lumMod val="75000"/>
-                  </a:schemeClr>
-                </a:solidFill>
-              </a:rPr>
-              <a:t>"</a:t>
-            </a:r>
-            <a:br>
-              <a:rPr lang="sv-SE" sz="4300" dirty="0">
-                <a:solidFill>
-                  <a:schemeClr val="accent1">
-                    <a:lumMod val="75000"/>
-                  </a:schemeClr>
-                </a:solidFill>
-              </a:rPr>
-            </a:br>
-            <a:r>
-              <a:rPr lang="sv-SE" sz="4300" dirty="0">
-                <a:solidFill>
-                  <a:schemeClr val="accent1">
-                    <a:lumMod val="75000"/>
-                  </a:schemeClr>
-                </a:solidFill>
-              </a:rPr>
-              <a:t>  </a:t>
-            </a:r>
-            <a:r>
-              <a:rPr lang="sv-SE" sz="4300" dirty="0" err="1">
-                <a:solidFill>
-                  <a:schemeClr val="accent1">
-                    <a:lumMod val="75000"/>
-                  </a:schemeClr>
-                </a:solidFill>
-              </a:rPr>
-              <a:t>xsi:schemaLocation</a:t>
-            </a:r>
-            <a:r>
-              <a:rPr lang="sv-SE" sz="4300" dirty="0">
-                <a:solidFill>
-                  <a:schemeClr val="accent1">
-                    <a:lumMod val="75000"/>
-                  </a:schemeClr>
-                </a:solidFill>
-              </a:rPr>
-              <a:t>="http://</a:t>
-            </a:r>
-            <a:r>
-              <a:rPr lang="sv-SE" sz="4300" dirty="0" err="1">
-                <a:solidFill>
-                  <a:schemeClr val="accent1">
-                    <a:lumMod val="75000"/>
-                  </a:schemeClr>
-                </a:solidFill>
-              </a:rPr>
-              <a:t>maven.apache.org</a:t>
-            </a:r>
-            <a:r>
-              <a:rPr lang="sv-SE" sz="4300" dirty="0">
-                <a:solidFill>
-                  <a:schemeClr val="accent1">
-                    <a:lumMod val="75000"/>
-                  </a:schemeClr>
-                </a:solidFill>
-              </a:rPr>
-              <a:t>/POM/4.0.0 http://</a:t>
-            </a:r>
-            <a:r>
-              <a:rPr lang="sv-SE" sz="4300" dirty="0" err="1">
-                <a:solidFill>
-                  <a:schemeClr val="accent1">
-                    <a:lumMod val="75000"/>
-                  </a:schemeClr>
-                </a:solidFill>
-              </a:rPr>
-              <a:t>maven.apache.org</a:t>
-            </a:r>
-            <a:r>
-              <a:rPr lang="sv-SE" sz="4300" dirty="0">
-                <a:solidFill>
-                  <a:schemeClr val="accent1">
-                    <a:lumMod val="75000"/>
-                  </a:schemeClr>
-                </a:solidFill>
-              </a:rPr>
-              <a:t>/</a:t>
-            </a:r>
-            <a:r>
-              <a:rPr lang="sv-SE" sz="4300" dirty="0" err="1">
-                <a:solidFill>
-                  <a:schemeClr val="accent1">
-                    <a:lumMod val="75000"/>
-                  </a:schemeClr>
-                </a:solidFill>
-              </a:rPr>
-              <a:t>xsd</a:t>
-            </a:r>
-            <a:r>
-              <a:rPr lang="sv-SE" sz="4300" dirty="0">
-                <a:solidFill>
-                  <a:schemeClr val="accent1">
-                    <a:lumMod val="75000"/>
-                  </a:schemeClr>
-                </a:solidFill>
-              </a:rPr>
-              <a:t>/maven-4.0.0.xsd"&gt;</a:t>
-            </a:r>
-            <a:br>
-              <a:rPr lang="sv-SE" sz="4300" dirty="0">
-                <a:solidFill>
-                  <a:schemeClr val="accent1">
-                    <a:lumMod val="75000"/>
-                  </a:schemeClr>
-                </a:solidFill>
-              </a:rPr>
-            </a:br>
-            <a:r>
-              <a:rPr lang="sv-SE" sz="4300" dirty="0">
-                <a:solidFill>
-                  <a:schemeClr val="accent1">
-                    <a:lumMod val="75000"/>
-                  </a:schemeClr>
-                </a:solidFill>
-              </a:rPr>
-              <a:t>  &lt;</a:t>
-            </a:r>
-            <a:r>
-              <a:rPr lang="sv-SE" sz="4300" dirty="0" err="1">
-                <a:solidFill>
-                  <a:schemeClr val="accent1">
-                    <a:lumMod val="75000"/>
-                  </a:schemeClr>
-                </a:solidFill>
-              </a:rPr>
-              <a:t>modelVersion</a:t>
-            </a:r>
-            <a:r>
-              <a:rPr lang="sv-SE" sz="4300" dirty="0">
-                <a:solidFill>
-                  <a:schemeClr val="accent1">
-                    <a:lumMod val="75000"/>
-                  </a:schemeClr>
-                </a:solidFill>
-              </a:rPr>
-              <a:t>&gt;4.0.0&lt;/</a:t>
-            </a:r>
-            <a:r>
-              <a:rPr lang="sv-SE" sz="4300" dirty="0" err="1">
-                <a:solidFill>
-                  <a:schemeClr val="accent1">
-                    <a:lumMod val="75000"/>
-                  </a:schemeClr>
-                </a:solidFill>
-              </a:rPr>
-              <a:t>modelVersion</a:t>
-            </a:r>
-            <a:r>
-              <a:rPr lang="sv-SE" sz="4300" dirty="0">
-                <a:solidFill>
-                  <a:schemeClr val="accent1">
-                    <a:lumMod val="75000"/>
-                  </a:schemeClr>
-                </a:solidFill>
-              </a:rPr>
-              <a:t>&gt;</a:t>
-            </a:r>
-            <a:br>
-              <a:rPr lang="sv-SE" sz="4300" dirty="0">
-                <a:solidFill>
-                  <a:schemeClr val="accent1">
-                    <a:lumMod val="75000"/>
-                  </a:schemeClr>
-                </a:solidFill>
-              </a:rPr>
-            </a:br>
-            <a:br>
-              <a:rPr lang="sv-SE" sz="4300" dirty="0">
-                <a:solidFill>
-                  <a:schemeClr val="accent1">
-                    <a:lumMod val="75000"/>
-                  </a:schemeClr>
-                </a:solidFill>
-              </a:rPr>
-            </a:br>
-            <a:r>
-              <a:rPr lang="sv-SE" sz="4300" dirty="0">
-                <a:solidFill>
-                  <a:schemeClr val="accent1">
-                    <a:lumMod val="75000"/>
-                  </a:schemeClr>
-                </a:solidFill>
-              </a:rPr>
-              <a:t>  &lt;</a:t>
-            </a:r>
-            <a:r>
-              <a:rPr lang="sv-SE" sz="4300" dirty="0" err="1">
-                <a:solidFill>
-                  <a:schemeClr val="accent1">
-                    <a:lumMod val="75000"/>
-                  </a:schemeClr>
-                </a:solidFill>
-              </a:rPr>
-              <a:t>groupId</a:t>
-            </a:r>
-            <a:r>
-              <a:rPr lang="sv-SE" sz="4300" dirty="0">
-                <a:solidFill>
-                  <a:schemeClr val="accent1">
-                    <a:lumMod val="75000"/>
-                  </a:schemeClr>
-                </a:solidFill>
-              </a:rPr>
-              <a:t>&gt;se.inte.group5&lt;/</a:t>
-            </a:r>
-            <a:r>
-              <a:rPr lang="sv-SE" sz="4300" dirty="0" err="1">
-                <a:solidFill>
-                  <a:schemeClr val="accent1">
-                    <a:lumMod val="75000"/>
-                  </a:schemeClr>
-                </a:solidFill>
-              </a:rPr>
-              <a:t>groupId</a:t>
-            </a:r>
-            <a:r>
-              <a:rPr lang="sv-SE" sz="4300" dirty="0">
-                <a:solidFill>
-                  <a:schemeClr val="accent1">
-                    <a:lumMod val="75000"/>
-                  </a:schemeClr>
-                </a:solidFill>
-              </a:rPr>
-              <a:t>&gt;</a:t>
-            </a:r>
-            <a:br>
-              <a:rPr lang="sv-SE" sz="4300" dirty="0">
-                <a:solidFill>
-                  <a:schemeClr val="accent1">
-                    <a:lumMod val="75000"/>
-                  </a:schemeClr>
-                </a:solidFill>
-              </a:rPr>
-            </a:br>
-            <a:r>
-              <a:rPr lang="sv-SE" sz="4300" dirty="0">
-                <a:solidFill>
-                  <a:schemeClr val="accent1">
-                    <a:lumMod val="75000"/>
-                  </a:schemeClr>
-                </a:solidFill>
-              </a:rPr>
-              <a:t>  &lt;</a:t>
-            </a:r>
-            <a:r>
-              <a:rPr lang="sv-SE" sz="4300" dirty="0" err="1">
-                <a:solidFill>
-                  <a:schemeClr val="accent1">
-                    <a:lumMod val="75000"/>
-                  </a:schemeClr>
-                </a:solidFill>
-              </a:rPr>
-              <a:t>artifactId</a:t>
-            </a:r>
-            <a:r>
-              <a:rPr lang="sv-SE" sz="4300" dirty="0">
-                <a:solidFill>
-                  <a:schemeClr val="accent1">
-                    <a:lumMod val="75000"/>
-                  </a:schemeClr>
-                </a:solidFill>
-              </a:rPr>
-              <a:t>&gt;</a:t>
-            </a:r>
-            <a:r>
-              <a:rPr lang="sv-SE" sz="4300" dirty="0" err="1">
-                <a:solidFill>
-                  <a:schemeClr val="accent1">
-                    <a:lumMod val="75000"/>
-                  </a:schemeClr>
-                </a:solidFill>
-              </a:rPr>
-              <a:t>InteGame</a:t>
-            </a:r>
-            <a:r>
-              <a:rPr lang="sv-SE" sz="4300" dirty="0">
-                <a:solidFill>
-                  <a:schemeClr val="accent1">
-                    <a:lumMod val="75000"/>
-                  </a:schemeClr>
-                </a:solidFill>
-              </a:rPr>
-              <a:t>&lt;/</a:t>
-            </a:r>
-            <a:r>
-              <a:rPr lang="sv-SE" sz="4300" dirty="0" err="1">
-                <a:solidFill>
-                  <a:schemeClr val="accent1">
-                    <a:lumMod val="75000"/>
-                  </a:schemeClr>
-                </a:solidFill>
-              </a:rPr>
-              <a:t>artifactId</a:t>
-            </a:r>
-            <a:r>
-              <a:rPr lang="sv-SE" sz="4300" dirty="0">
-                <a:solidFill>
-                  <a:schemeClr val="accent1">
-                    <a:lumMod val="75000"/>
-                  </a:schemeClr>
-                </a:solidFill>
-              </a:rPr>
-              <a:t>&gt;</a:t>
-            </a:r>
-            <a:br>
-              <a:rPr lang="sv-SE" sz="4300" dirty="0">
-                <a:solidFill>
-                  <a:schemeClr val="accent1">
-                    <a:lumMod val="75000"/>
-                  </a:schemeClr>
-                </a:solidFill>
-              </a:rPr>
-            </a:br>
-            <a:r>
-              <a:rPr lang="sv-SE" sz="4300" dirty="0">
-                <a:solidFill>
-                  <a:schemeClr val="accent1">
-                    <a:lumMod val="75000"/>
-                  </a:schemeClr>
-                </a:solidFill>
-              </a:rPr>
-              <a:t>  &lt;version&gt;1.0-SNAPSHOT&lt;/version&gt;</a:t>
-            </a:r>
-            <a:br>
-              <a:rPr lang="sv-SE" sz="4300" dirty="0">
-                <a:solidFill>
-                  <a:schemeClr val="accent1">
-                    <a:lumMod val="75000"/>
-                  </a:schemeClr>
-                </a:solidFill>
-              </a:rPr>
-            </a:br>
-            <a:br>
-              <a:rPr lang="sv-SE" sz="4300" dirty="0">
-                <a:solidFill>
-                  <a:schemeClr val="accent1">
-                    <a:lumMod val="75000"/>
-                  </a:schemeClr>
-                </a:solidFill>
-              </a:rPr>
-            </a:br>
-            <a:r>
-              <a:rPr lang="sv-SE" sz="4300" dirty="0">
-                <a:solidFill>
-                  <a:schemeClr val="accent1">
-                    <a:lumMod val="75000"/>
-                  </a:schemeClr>
-                </a:solidFill>
-              </a:rPr>
-              <a:t>  &lt;</a:t>
-            </a:r>
-            <a:r>
-              <a:rPr lang="sv-SE" sz="4300" dirty="0" err="1">
-                <a:solidFill>
-                  <a:schemeClr val="accent1">
-                    <a:lumMod val="75000"/>
-                  </a:schemeClr>
-                </a:solidFill>
-              </a:rPr>
-              <a:t>name</a:t>
-            </a:r>
-            <a:r>
-              <a:rPr lang="sv-SE" sz="4300" dirty="0">
-                <a:solidFill>
-                  <a:schemeClr val="accent1">
-                    <a:lumMod val="75000"/>
-                  </a:schemeClr>
-                </a:solidFill>
-              </a:rPr>
-              <a:t>&gt;</a:t>
-            </a:r>
-            <a:r>
-              <a:rPr lang="sv-SE" sz="4300" dirty="0" err="1">
-                <a:solidFill>
-                  <a:schemeClr val="accent1">
-                    <a:lumMod val="75000"/>
-                  </a:schemeClr>
-                </a:solidFill>
-              </a:rPr>
-              <a:t>InteGame</a:t>
-            </a:r>
-            <a:r>
-              <a:rPr lang="sv-SE" sz="4300" dirty="0">
-                <a:solidFill>
-                  <a:schemeClr val="accent1">
-                    <a:lumMod val="75000"/>
-                  </a:schemeClr>
-                </a:solidFill>
-              </a:rPr>
-              <a:t>&lt;/</a:t>
-            </a:r>
-            <a:r>
-              <a:rPr lang="sv-SE" sz="4300" dirty="0" err="1">
-                <a:solidFill>
-                  <a:schemeClr val="accent1">
-                    <a:lumMod val="75000"/>
-                  </a:schemeClr>
-                </a:solidFill>
-              </a:rPr>
-              <a:t>name</a:t>
-            </a:r>
-            <a:r>
-              <a:rPr lang="sv-SE" sz="4300" dirty="0">
-                <a:solidFill>
-                  <a:schemeClr val="accent1">
-                    <a:lumMod val="75000"/>
-                  </a:schemeClr>
-                </a:solidFill>
-              </a:rPr>
-              <a:t>&gt;</a:t>
-            </a:r>
-            <a:br>
-              <a:rPr lang="sv-SE" sz="4300" dirty="0">
-                <a:solidFill>
-                  <a:schemeClr val="accent1">
-                    <a:lumMod val="75000"/>
-                  </a:schemeClr>
-                </a:solidFill>
-              </a:rPr>
-            </a:br>
-            <a:br>
-              <a:rPr lang="sv-SE" sz="4300" dirty="0">
-                <a:solidFill>
-                  <a:schemeClr val="accent1">
-                    <a:lumMod val="75000"/>
-                  </a:schemeClr>
-                </a:solidFill>
-              </a:rPr>
-            </a:br>
-            <a:r>
-              <a:rPr lang="sv-SE" sz="4300" dirty="0">
-                <a:solidFill>
-                  <a:schemeClr val="accent1">
-                    <a:lumMod val="75000"/>
-                  </a:schemeClr>
-                </a:solidFill>
-              </a:rPr>
-              <a:t>  &lt;</a:t>
-            </a:r>
-            <a:r>
-              <a:rPr lang="sv-SE" sz="4300" dirty="0" err="1">
-                <a:solidFill>
-                  <a:schemeClr val="accent1">
-                    <a:lumMod val="75000"/>
-                  </a:schemeClr>
-                </a:solidFill>
-              </a:rPr>
-              <a:t>properties</a:t>
-            </a:r>
-            <a:r>
-              <a:rPr lang="sv-SE" sz="4300" dirty="0">
-                <a:solidFill>
-                  <a:schemeClr val="accent1">
-                    <a:lumMod val="75000"/>
-                  </a:schemeClr>
-                </a:solidFill>
-              </a:rPr>
-              <a:t>&gt;</a:t>
-            </a:r>
-            <a:br>
-              <a:rPr lang="sv-SE" sz="4300" dirty="0">
-                <a:solidFill>
-                  <a:schemeClr val="accent1">
-                    <a:lumMod val="75000"/>
-                  </a:schemeClr>
-                </a:solidFill>
-              </a:rPr>
-            </a:br>
-            <a:r>
-              <a:rPr lang="sv-SE" sz="4300" dirty="0">
-                <a:solidFill>
-                  <a:schemeClr val="accent1">
-                    <a:lumMod val="75000"/>
-                  </a:schemeClr>
-                </a:solidFill>
-              </a:rPr>
-              <a:t>    &lt;</a:t>
-            </a:r>
-            <a:r>
-              <a:rPr lang="sv-SE" sz="4300" dirty="0" err="1">
-                <a:solidFill>
-                  <a:schemeClr val="accent1">
-                    <a:lumMod val="75000"/>
-                  </a:schemeClr>
-                </a:solidFill>
-              </a:rPr>
-              <a:t>project.build.sourceEncoding</a:t>
-            </a:r>
-            <a:r>
-              <a:rPr lang="sv-SE" sz="4300" dirty="0">
-                <a:solidFill>
-                  <a:schemeClr val="accent1">
-                    <a:lumMod val="75000"/>
-                  </a:schemeClr>
-                </a:solidFill>
-              </a:rPr>
-              <a:t>&gt;UTF-8&lt;/</a:t>
-            </a:r>
-            <a:r>
-              <a:rPr lang="sv-SE" sz="4300" dirty="0" err="1">
-                <a:solidFill>
-                  <a:schemeClr val="accent1">
-                    <a:lumMod val="75000"/>
-                  </a:schemeClr>
-                </a:solidFill>
-              </a:rPr>
-              <a:t>project.build.sourceEncoding</a:t>
-            </a:r>
-            <a:r>
-              <a:rPr lang="sv-SE" sz="4300" dirty="0">
-                <a:solidFill>
-                  <a:schemeClr val="accent1">
-                    <a:lumMod val="75000"/>
-                  </a:schemeClr>
-                </a:solidFill>
-              </a:rPr>
-              <a:t>&gt;</a:t>
-            </a:r>
-            <a:br>
-              <a:rPr lang="sv-SE" sz="4300" dirty="0">
-                <a:solidFill>
-                  <a:schemeClr val="accent1">
-                    <a:lumMod val="75000"/>
-                  </a:schemeClr>
-                </a:solidFill>
-              </a:rPr>
-            </a:br>
-            <a:r>
-              <a:rPr lang="sv-SE" sz="4300" dirty="0">
-                <a:solidFill>
-                  <a:schemeClr val="accent1">
-                    <a:lumMod val="75000"/>
-                  </a:schemeClr>
-                </a:solidFill>
-              </a:rPr>
-              <a:t>    &lt;</a:t>
-            </a:r>
-            <a:r>
-              <a:rPr lang="sv-SE" sz="4300" dirty="0" err="1">
-                <a:solidFill>
-                  <a:schemeClr val="accent1">
-                    <a:lumMod val="75000"/>
-                  </a:schemeClr>
-                </a:solidFill>
-              </a:rPr>
-              <a:t>maven.compiler.source</a:t>
-            </a:r>
-            <a:r>
-              <a:rPr lang="sv-SE" sz="4300" dirty="0">
-                <a:solidFill>
-                  <a:schemeClr val="accent1">
-                    <a:lumMod val="75000"/>
-                  </a:schemeClr>
-                </a:solidFill>
-              </a:rPr>
-              <a:t>&gt;1.7&lt;/</a:t>
-            </a:r>
-            <a:r>
-              <a:rPr lang="sv-SE" sz="4300" dirty="0" err="1">
-                <a:solidFill>
-                  <a:schemeClr val="accent1">
-                    <a:lumMod val="75000"/>
-                  </a:schemeClr>
-                </a:solidFill>
-              </a:rPr>
-              <a:t>maven.compiler.source</a:t>
-            </a:r>
-            <a:r>
-              <a:rPr lang="sv-SE" sz="4300" dirty="0">
-                <a:solidFill>
-                  <a:schemeClr val="accent1">
-                    <a:lumMod val="75000"/>
-                  </a:schemeClr>
-                </a:solidFill>
-              </a:rPr>
-              <a:t>&gt;</a:t>
-            </a:r>
-            <a:br>
-              <a:rPr lang="sv-SE" sz="4300" dirty="0">
-                <a:solidFill>
-                  <a:schemeClr val="accent1">
-                    <a:lumMod val="75000"/>
-                  </a:schemeClr>
-                </a:solidFill>
-              </a:rPr>
-            </a:br>
-            <a:r>
-              <a:rPr lang="sv-SE" sz="4300" dirty="0">
-                <a:solidFill>
-                  <a:schemeClr val="accent1">
-                    <a:lumMod val="75000"/>
-                  </a:schemeClr>
-                </a:solidFill>
-              </a:rPr>
-              <a:t>    &lt;</a:t>
-            </a:r>
-            <a:r>
-              <a:rPr lang="sv-SE" sz="4300" dirty="0" err="1">
-                <a:solidFill>
-                  <a:schemeClr val="accent1">
-                    <a:lumMod val="75000"/>
-                  </a:schemeClr>
-                </a:solidFill>
-              </a:rPr>
-              <a:t>maven.compiler.target</a:t>
-            </a:r>
-            <a:r>
-              <a:rPr lang="sv-SE" sz="4300" dirty="0">
-                <a:solidFill>
-                  <a:schemeClr val="accent1">
-                    <a:lumMod val="75000"/>
-                  </a:schemeClr>
-                </a:solidFill>
-              </a:rPr>
-              <a:t>&gt;1.7&lt;/</a:t>
-            </a:r>
-            <a:r>
-              <a:rPr lang="sv-SE" sz="4300" dirty="0" err="1">
-                <a:solidFill>
-                  <a:schemeClr val="accent1">
-                    <a:lumMod val="75000"/>
-                  </a:schemeClr>
-                </a:solidFill>
-              </a:rPr>
-              <a:t>maven.compiler.target</a:t>
-            </a:r>
-            <a:r>
-              <a:rPr lang="sv-SE" sz="4300" dirty="0">
-                <a:solidFill>
-                  <a:schemeClr val="accent1">
-                    <a:lumMod val="75000"/>
-                  </a:schemeClr>
-                </a:solidFill>
-              </a:rPr>
-              <a:t>&gt;</a:t>
-            </a:r>
-            <a:br>
-              <a:rPr lang="sv-SE" sz="4300" dirty="0">
-                <a:solidFill>
-                  <a:schemeClr val="accent1">
-                    <a:lumMod val="75000"/>
-                  </a:schemeClr>
-                </a:solidFill>
-              </a:rPr>
-            </a:br>
-            <a:r>
-              <a:rPr lang="sv-SE" sz="4300" dirty="0">
-                <a:solidFill>
-                  <a:schemeClr val="accent1">
-                    <a:lumMod val="75000"/>
-                  </a:schemeClr>
-                </a:solidFill>
-              </a:rPr>
-              <a:t>  &lt;/</a:t>
-            </a:r>
-            <a:r>
-              <a:rPr lang="sv-SE" sz="4300" dirty="0" err="1">
-                <a:solidFill>
-                  <a:schemeClr val="accent1">
-                    <a:lumMod val="75000"/>
-                  </a:schemeClr>
-                </a:solidFill>
-              </a:rPr>
-              <a:t>properties</a:t>
-            </a:r>
-            <a:r>
-              <a:rPr lang="sv-SE" sz="4300" dirty="0">
-                <a:solidFill>
-                  <a:schemeClr val="accent1">
-                    <a:lumMod val="75000"/>
-                  </a:schemeClr>
-                </a:solidFill>
-              </a:rPr>
-              <a:t>&gt;</a:t>
-            </a:r>
-            <a:br>
-              <a:rPr lang="sv-SE" sz="4300" dirty="0">
-                <a:solidFill>
-                  <a:schemeClr val="accent1">
-                    <a:lumMod val="75000"/>
-                  </a:schemeClr>
-                </a:solidFill>
-              </a:rPr>
-            </a:br>
-            <a:br>
-              <a:rPr lang="sv-SE" sz="4300" dirty="0">
-                <a:solidFill>
-                  <a:schemeClr val="accent1">
-                    <a:lumMod val="75000"/>
-                  </a:schemeClr>
-                </a:solidFill>
-              </a:rPr>
-            </a:br>
-            <a:r>
-              <a:rPr lang="sv-SE" sz="4300" dirty="0">
-                <a:solidFill>
-                  <a:schemeClr val="accent1">
-                    <a:lumMod val="75000"/>
-                  </a:schemeClr>
-                </a:solidFill>
-              </a:rPr>
-              <a:t>  &lt;</a:t>
-            </a:r>
-            <a:r>
-              <a:rPr lang="sv-SE" sz="4300" dirty="0" err="1">
-                <a:solidFill>
-                  <a:schemeClr val="accent1">
-                    <a:lumMod val="75000"/>
-                  </a:schemeClr>
-                </a:solidFill>
-              </a:rPr>
-              <a:t>dependencies</a:t>
-            </a:r>
-            <a:r>
-              <a:rPr lang="sv-SE" sz="4300" dirty="0">
-                <a:solidFill>
-                  <a:schemeClr val="accent1">
-                    <a:lumMod val="75000"/>
-                  </a:schemeClr>
-                </a:solidFill>
-              </a:rPr>
-              <a:t>&gt;</a:t>
-            </a:r>
-            <a:br>
-              <a:rPr lang="sv-SE" sz="4300" dirty="0">
-                <a:solidFill>
-                  <a:schemeClr val="accent1">
-                    <a:lumMod val="75000"/>
-                  </a:schemeClr>
-                </a:solidFill>
-              </a:rPr>
-            </a:br>
-            <a:r>
-              <a:rPr lang="sv-SE" sz="4300" dirty="0">
-                <a:solidFill>
-                  <a:schemeClr val="accent1">
-                    <a:lumMod val="75000"/>
-                  </a:schemeClr>
-                </a:solidFill>
-              </a:rPr>
-              <a:t>    &lt;</a:t>
-            </a:r>
-            <a:r>
-              <a:rPr lang="sv-SE" sz="4300" dirty="0" err="1">
-                <a:solidFill>
-                  <a:schemeClr val="accent1">
-                    <a:lumMod val="75000"/>
-                  </a:schemeClr>
-                </a:solidFill>
-              </a:rPr>
-              <a:t>dependency</a:t>
-            </a:r>
-            <a:r>
-              <a:rPr lang="sv-SE" sz="4300" dirty="0">
-                <a:solidFill>
-                  <a:schemeClr val="accent1">
-                    <a:lumMod val="75000"/>
-                  </a:schemeClr>
-                </a:solidFill>
-              </a:rPr>
-              <a:t>&gt;</a:t>
-            </a:r>
-            <a:br>
-              <a:rPr lang="sv-SE" sz="4300" dirty="0">
-                <a:solidFill>
-                  <a:schemeClr val="accent1">
-                    <a:lumMod val="75000"/>
-                  </a:schemeClr>
-                </a:solidFill>
-              </a:rPr>
-            </a:br>
-            <a:r>
-              <a:rPr lang="sv-SE" sz="4300" dirty="0">
-                <a:solidFill>
-                  <a:schemeClr val="accent1">
-                    <a:lumMod val="75000"/>
-                  </a:schemeClr>
-                </a:solidFill>
-              </a:rPr>
-              <a:t>      &lt;</a:t>
-            </a:r>
-            <a:r>
-              <a:rPr lang="sv-SE" sz="4300" dirty="0" err="1">
-                <a:solidFill>
-                  <a:schemeClr val="accent1">
-                    <a:lumMod val="75000"/>
-                  </a:schemeClr>
-                </a:solidFill>
-              </a:rPr>
-              <a:t>groupId</a:t>
-            </a:r>
-            <a:r>
-              <a:rPr lang="sv-SE" sz="4300" dirty="0">
-                <a:solidFill>
-                  <a:schemeClr val="accent1">
-                    <a:lumMod val="75000"/>
-                  </a:schemeClr>
-                </a:solidFill>
-              </a:rPr>
-              <a:t>&gt;</a:t>
-            </a:r>
-            <a:r>
-              <a:rPr lang="sv-SE" sz="4300" dirty="0" err="1">
-                <a:solidFill>
-                  <a:schemeClr val="accent1">
-                    <a:lumMod val="75000"/>
-                  </a:schemeClr>
-                </a:solidFill>
-              </a:rPr>
-              <a:t>junit</a:t>
-            </a:r>
-            <a:r>
-              <a:rPr lang="sv-SE" sz="4300" dirty="0">
-                <a:solidFill>
-                  <a:schemeClr val="accent1">
-                    <a:lumMod val="75000"/>
-                  </a:schemeClr>
-                </a:solidFill>
-              </a:rPr>
-              <a:t>&lt;/</a:t>
-            </a:r>
-            <a:r>
-              <a:rPr lang="sv-SE" sz="4300" dirty="0" err="1">
-                <a:solidFill>
-                  <a:schemeClr val="accent1">
-                    <a:lumMod val="75000"/>
-                  </a:schemeClr>
-                </a:solidFill>
-              </a:rPr>
-              <a:t>groupId</a:t>
-            </a:r>
-            <a:r>
-              <a:rPr lang="sv-SE" sz="4300" dirty="0">
-                <a:solidFill>
-                  <a:schemeClr val="accent1">
-                    <a:lumMod val="75000"/>
-                  </a:schemeClr>
-                </a:solidFill>
-              </a:rPr>
-              <a:t>&gt;</a:t>
-            </a:r>
-            <a:br>
-              <a:rPr lang="sv-SE" sz="4300" dirty="0">
-                <a:solidFill>
-                  <a:schemeClr val="accent1">
-                    <a:lumMod val="75000"/>
-                  </a:schemeClr>
-                </a:solidFill>
-              </a:rPr>
-            </a:br>
-            <a:r>
-              <a:rPr lang="sv-SE" sz="4300" dirty="0">
-                <a:solidFill>
-                  <a:schemeClr val="accent1">
-                    <a:lumMod val="75000"/>
-                  </a:schemeClr>
-                </a:solidFill>
-              </a:rPr>
-              <a:t>      &lt;</a:t>
-            </a:r>
-            <a:r>
-              <a:rPr lang="sv-SE" sz="4300" dirty="0" err="1">
-                <a:solidFill>
-                  <a:schemeClr val="accent1">
-                    <a:lumMod val="75000"/>
-                  </a:schemeClr>
-                </a:solidFill>
-              </a:rPr>
-              <a:t>artifactId</a:t>
-            </a:r>
-            <a:r>
-              <a:rPr lang="sv-SE" sz="4300" dirty="0">
-                <a:solidFill>
-                  <a:schemeClr val="accent1">
-                    <a:lumMod val="75000"/>
-                  </a:schemeClr>
-                </a:solidFill>
-              </a:rPr>
-              <a:t>&gt;</a:t>
-            </a:r>
-            <a:r>
-              <a:rPr lang="sv-SE" sz="4300" dirty="0" err="1">
-                <a:solidFill>
-                  <a:schemeClr val="accent1">
-                    <a:lumMod val="75000"/>
-                  </a:schemeClr>
-                </a:solidFill>
-              </a:rPr>
-              <a:t>junit</a:t>
-            </a:r>
-            <a:r>
-              <a:rPr lang="sv-SE" sz="4300" dirty="0">
-                <a:solidFill>
-                  <a:schemeClr val="accent1">
-                    <a:lumMod val="75000"/>
-                  </a:schemeClr>
-                </a:solidFill>
-              </a:rPr>
-              <a:t>&lt;/</a:t>
-            </a:r>
-            <a:r>
-              <a:rPr lang="sv-SE" sz="4300" dirty="0" err="1">
-                <a:solidFill>
-                  <a:schemeClr val="accent1">
-                    <a:lumMod val="75000"/>
-                  </a:schemeClr>
-                </a:solidFill>
-              </a:rPr>
-              <a:t>artifactId</a:t>
-            </a:r>
-            <a:r>
-              <a:rPr lang="sv-SE" sz="4300" dirty="0">
-                <a:solidFill>
-                  <a:schemeClr val="accent1">
-                    <a:lumMod val="75000"/>
-                  </a:schemeClr>
-                </a:solidFill>
-              </a:rPr>
-              <a:t>&gt;</a:t>
-            </a:r>
-            <a:br>
-              <a:rPr lang="sv-SE" sz="4300" dirty="0">
-                <a:solidFill>
-                  <a:schemeClr val="accent1">
-                    <a:lumMod val="75000"/>
-                  </a:schemeClr>
-                </a:solidFill>
-              </a:rPr>
-            </a:br>
-            <a:r>
-              <a:rPr lang="sv-SE" sz="4300" dirty="0">
-                <a:solidFill>
-                  <a:schemeClr val="accent1">
-                    <a:lumMod val="75000"/>
-                  </a:schemeClr>
-                </a:solidFill>
-              </a:rPr>
-              <a:t>      &lt;version&gt;4.11&lt;/version&gt;</a:t>
-            </a:r>
-            <a:br>
-              <a:rPr lang="sv-SE" sz="4300" dirty="0">
-                <a:solidFill>
-                  <a:schemeClr val="accent1">
-                    <a:lumMod val="75000"/>
-                  </a:schemeClr>
-                </a:solidFill>
-              </a:rPr>
-            </a:br>
-            <a:r>
-              <a:rPr lang="sv-SE" sz="4300" dirty="0">
-                <a:solidFill>
-                  <a:schemeClr val="accent1">
-                    <a:lumMod val="75000"/>
-                  </a:schemeClr>
-                </a:solidFill>
-              </a:rPr>
-              <a:t>      &lt;</a:t>
-            </a:r>
-            <a:r>
-              <a:rPr lang="sv-SE" sz="4300" dirty="0" err="1">
-                <a:solidFill>
-                  <a:schemeClr val="accent1">
-                    <a:lumMod val="75000"/>
-                  </a:schemeClr>
-                </a:solidFill>
-              </a:rPr>
-              <a:t>scope</a:t>
-            </a:r>
-            <a:r>
-              <a:rPr lang="sv-SE" sz="4300" dirty="0">
-                <a:solidFill>
-                  <a:schemeClr val="accent1">
-                    <a:lumMod val="75000"/>
-                  </a:schemeClr>
-                </a:solidFill>
-              </a:rPr>
-              <a:t>&gt;test&lt;/</a:t>
-            </a:r>
-            <a:r>
-              <a:rPr lang="sv-SE" sz="4300" dirty="0" err="1">
-                <a:solidFill>
-                  <a:schemeClr val="accent1">
-                    <a:lumMod val="75000"/>
-                  </a:schemeClr>
-                </a:solidFill>
-              </a:rPr>
-              <a:t>scope</a:t>
-            </a:r>
-            <a:r>
-              <a:rPr lang="sv-SE" sz="4300" dirty="0">
-                <a:solidFill>
-                  <a:schemeClr val="accent1">
-                    <a:lumMod val="75000"/>
-                  </a:schemeClr>
-                </a:solidFill>
-              </a:rPr>
-              <a:t>&gt;</a:t>
-            </a:r>
-            <a:br>
-              <a:rPr lang="sv-SE" sz="4300" dirty="0">
-                <a:solidFill>
-                  <a:schemeClr val="accent1">
-                    <a:lumMod val="75000"/>
-                  </a:schemeClr>
-                </a:solidFill>
-              </a:rPr>
-            </a:br>
-            <a:r>
-              <a:rPr lang="sv-SE" sz="4300" dirty="0">
-                <a:solidFill>
-                  <a:schemeClr val="accent1">
-                    <a:lumMod val="75000"/>
-                  </a:schemeClr>
-                </a:solidFill>
-              </a:rPr>
-              <a:t>    &lt;/</a:t>
-            </a:r>
-            <a:r>
-              <a:rPr lang="sv-SE" sz="4300" dirty="0" err="1">
-                <a:solidFill>
-                  <a:schemeClr val="accent1">
-                    <a:lumMod val="75000"/>
-                  </a:schemeClr>
-                </a:solidFill>
-              </a:rPr>
-              <a:t>dependency</a:t>
-            </a:r>
-            <a:r>
-              <a:rPr lang="sv-SE" sz="4300" dirty="0">
-                <a:solidFill>
-                  <a:schemeClr val="accent1">
-                    <a:lumMod val="75000"/>
-                  </a:schemeClr>
-                </a:solidFill>
-              </a:rPr>
-              <a:t>&gt;</a:t>
-            </a:r>
-            <a:br>
-              <a:rPr lang="sv-SE" sz="4300" dirty="0">
-                <a:solidFill>
-                  <a:schemeClr val="accent1">
-                    <a:lumMod val="75000"/>
-                  </a:schemeClr>
-                </a:solidFill>
-              </a:rPr>
-            </a:br>
-            <a:r>
-              <a:rPr lang="sv-SE" sz="4300" dirty="0">
-                <a:solidFill>
-                  <a:schemeClr val="accent1">
-                    <a:lumMod val="75000"/>
-                  </a:schemeClr>
-                </a:solidFill>
-              </a:rPr>
-              <a:t>  &lt;/</a:t>
-            </a:r>
-            <a:r>
-              <a:rPr lang="sv-SE" sz="4300" dirty="0" err="1">
-                <a:solidFill>
-                  <a:schemeClr val="accent1">
-                    <a:lumMod val="75000"/>
-                  </a:schemeClr>
-                </a:solidFill>
-              </a:rPr>
-              <a:t>dependencies</a:t>
-            </a:r>
-            <a:r>
-              <a:rPr lang="sv-SE" sz="4300" dirty="0">
-                <a:solidFill>
-                  <a:schemeClr val="accent1">
-                    <a:lumMod val="75000"/>
-                  </a:schemeClr>
-                </a:solidFill>
-              </a:rPr>
-              <a:t>&gt;</a:t>
-            </a:r>
-            <a:br>
-              <a:rPr lang="sv-SE" sz="4300" dirty="0">
-                <a:solidFill>
-                  <a:schemeClr val="accent1">
-                    <a:lumMod val="75000"/>
-                  </a:schemeClr>
-                </a:solidFill>
-              </a:rPr>
-            </a:br>
-            <a:br>
-              <a:rPr lang="sv-SE" sz="4300" dirty="0">
-                <a:solidFill>
-                  <a:schemeClr val="accent1">
-                    <a:lumMod val="75000"/>
-                  </a:schemeClr>
-                </a:solidFill>
-              </a:rPr>
-            </a:br>
-            <a:r>
-              <a:rPr lang="sv-SE" sz="4300" dirty="0">
-                <a:solidFill>
-                  <a:schemeClr val="accent1">
-                    <a:lumMod val="75000"/>
-                  </a:schemeClr>
-                </a:solidFill>
-              </a:rPr>
-              <a:t>&lt;/</a:t>
-            </a:r>
-            <a:r>
-              <a:rPr lang="sv-SE" sz="4300" dirty="0" err="1">
-                <a:solidFill>
-                  <a:schemeClr val="accent1">
-                    <a:lumMod val="75000"/>
-                  </a:schemeClr>
-                </a:solidFill>
-              </a:rPr>
-              <a:t>project</a:t>
-            </a:r>
-            <a:r>
-              <a:rPr lang="sv-SE" sz="4300" dirty="0">
-                <a:solidFill>
-                  <a:schemeClr val="accent1">
-                    <a:lumMod val="75000"/>
-                  </a:schemeClr>
-                </a:solidFill>
-              </a:rPr>
-              <a:t>&gt;</a:t>
-            </a:r>
-            <a:endParaRPr lang="sv-SE" dirty="0">
-              <a:solidFill>
-                <a:schemeClr val="accent1">
-                  <a:lumMod val="75000"/>
-                </a:schemeClr>
-              </a:solidFill>
-            </a:endParaRPr>
-          </a:p>
-        </p:txBody>
-      </p:sp>
-    </p:spTree>
-    <p:custDataLst>
-      <p:tags r:id="rId1"/>
-    </p:custDataLst>
-    <p:extLst>
-      <p:ext uri="{BB962C8B-B14F-4D97-AF65-F5344CB8AC3E}">
-        <p14:creationId xmlns:p14="http://schemas.microsoft.com/office/powerpoint/2010/main" val="1633220100"/>
       </p:ext>
     </p:extLst>
   </p:cSld>
@@ -26196,6 +25653,1610 @@
     <p:extLst>
       <p:ext uri="{BB962C8B-B14F-4D97-AF65-F5344CB8AC3E}">
         <p14:creationId xmlns:p14="http://schemas.microsoft.com/office/powerpoint/2010/main" val="1173390620"/>
+      </p:ext>
+    </p:extLst>
+  </p:cSld>
+  <p:clrMapOvr>
+    <a:masterClrMapping/>
+  </p:clrMapOvr>
+</p:sld>
+</file>
+
+<file path=ppt/slides/slide40.xml><?xml version="1.0" encoding="utf-8"?>
+<p:sld xmlns:a="http://schemas.openxmlformats.org/drawingml/2006/main" xmlns:r="http://schemas.openxmlformats.org/officeDocument/2006/relationships" xmlns:p="http://schemas.openxmlformats.org/presentationml/2006/main">
+  <p:cSld>
+    <p:spTree>
+      <p:nvGrpSpPr>
+        <p:cNvPr id="1" name=""/>
+        <p:cNvGrpSpPr/>
+        <p:nvPr/>
+      </p:nvGrpSpPr>
+      <p:grpSpPr>
+        <a:xfrm>
+          <a:off x="0" y="0"/>
+          <a:ext cx="0" cy="0"/>
+          <a:chOff x="0" y="0"/>
+          <a:chExt cx="0" cy="0"/>
+        </a:xfrm>
+      </p:grpSpPr>
+      <p:sp>
+        <p:nvSpPr>
+          <p:cNvPr id="2" name="Rubrik 1"/>
+          <p:cNvSpPr>
+            <a:spLocks noGrp="1"/>
+          </p:cNvSpPr>
+          <p:nvPr>
+            <p:ph type="title"/>
+          </p:nvPr>
+        </p:nvSpPr>
+        <p:spPr>
+          <a:xfrm>
+            <a:off x="838200" y="365125"/>
+            <a:ext cx="10515600" cy="1325563"/>
+          </a:xfrm>
+        </p:spPr>
+        <p:txBody>
+          <a:bodyPr/>
+          <a:lstStyle/>
+          <a:p>
+            <a:r>
+              <a:rPr lang="sv-SE" dirty="0"/>
+              <a:t>Byggscript 2</a:t>
+            </a:r>
+          </a:p>
+        </p:txBody>
+      </p:sp>
+      <p:sp>
+        <p:nvSpPr>
+          <p:cNvPr id="4" name="Platshållare för innehåll 2">
+            <a:extLst>
+              <a:ext uri="{FF2B5EF4-FFF2-40B4-BE49-F238E27FC236}">
+                <a16:creationId xmlns:a16="http://schemas.microsoft.com/office/drawing/2014/main" id="{7502AE00-9333-EB4B-95D9-391326FD9AE0}"/>
+              </a:ext>
+            </a:extLst>
+          </p:cNvPr>
+          <p:cNvSpPr txBox="1">
+            <a:spLocks/>
+          </p:cNvSpPr>
+          <p:nvPr/>
+        </p:nvSpPr>
+        <p:spPr>
+          <a:xfrm>
+            <a:off x="6578600" y="1690688"/>
+            <a:ext cx="4775200" cy="4067175"/>
+          </a:xfrm>
+          <a:prstGeom prst="rect">
+            <a:avLst/>
+          </a:prstGeom>
+        </p:spPr>
+        <p:txBody>
+          <a:bodyPr vert="horz" lIns="91440" tIns="45720" rIns="91440" bIns="45720" rtlCol="0">
+            <a:normAutofit/>
+          </a:bodyPr>
+          <a:lstStyle>
+            <a:lvl1pPr marL="228600" indent="-228600" algn="l" defTabSz="914400" rtl="0" eaLnBrk="1" latinLnBrk="0" hangingPunct="1">
+              <a:lnSpc>
+                <a:spcPct val="90000"/>
+              </a:lnSpc>
+              <a:spcBef>
+                <a:spcPts val="1000"/>
+              </a:spcBef>
+              <a:buFont typeface="Arial" panose="020B0604020202020204" pitchFamily="34" charset="0"/>
+              <a:buChar char="•"/>
+              <a:defRPr sz="2800" kern="1200">
+                <a:solidFill>
+                  <a:schemeClr val="tx1"/>
+                </a:solidFill>
+                <a:latin typeface="+mn-lt"/>
+                <a:ea typeface="+mn-ea"/>
+                <a:cs typeface="+mn-cs"/>
+              </a:defRPr>
+            </a:lvl1pPr>
+            <a:lvl2pPr marL="685800" indent="-228600" algn="l" defTabSz="914400" rtl="0" eaLnBrk="1" latinLnBrk="0" hangingPunct="1">
+              <a:lnSpc>
+                <a:spcPct val="90000"/>
+              </a:lnSpc>
+              <a:spcBef>
+                <a:spcPts val="500"/>
+              </a:spcBef>
+              <a:buFont typeface="Arial" panose="020B0604020202020204" pitchFamily="34" charset="0"/>
+              <a:buChar char="•"/>
+              <a:defRPr sz="2400" kern="1200">
+                <a:solidFill>
+                  <a:schemeClr val="tx1"/>
+                </a:solidFill>
+                <a:latin typeface="+mn-lt"/>
+                <a:ea typeface="+mn-ea"/>
+                <a:cs typeface="+mn-cs"/>
+              </a:defRPr>
+            </a:lvl2pPr>
+            <a:lvl3pPr marL="1143000" indent="-228600" algn="l" defTabSz="914400" rtl="0" eaLnBrk="1" latinLnBrk="0" hangingPunct="1">
+              <a:lnSpc>
+                <a:spcPct val="90000"/>
+              </a:lnSpc>
+              <a:spcBef>
+                <a:spcPts val="500"/>
+              </a:spcBef>
+              <a:buFont typeface="Arial" panose="020B0604020202020204" pitchFamily="34" charset="0"/>
+              <a:buChar char="•"/>
+              <a:defRPr sz="2000" kern="1200">
+                <a:solidFill>
+                  <a:schemeClr val="tx1"/>
+                </a:solidFill>
+                <a:latin typeface="+mn-lt"/>
+                <a:ea typeface="+mn-ea"/>
+                <a:cs typeface="+mn-cs"/>
+              </a:defRPr>
+            </a:lvl3pPr>
+            <a:lvl4pPr marL="1600200" indent="-228600" algn="l" defTabSz="914400" rtl="0" eaLnBrk="1" latinLnBrk="0" hangingPunct="1">
+              <a:lnSpc>
+                <a:spcPct val="90000"/>
+              </a:lnSpc>
+              <a:spcBef>
+                <a:spcPts val="500"/>
+              </a:spcBef>
+              <a:buFont typeface="Arial" panose="020B0604020202020204" pitchFamily="34" charset="0"/>
+              <a:buChar char="•"/>
+              <a:defRPr sz="1800" kern="1200">
+                <a:solidFill>
+                  <a:schemeClr val="tx1"/>
+                </a:solidFill>
+                <a:latin typeface="+mn-lt"/>
+                <a:ea typeface="+mn-ea"/>
+                <a:cs typeface="+mn-cs"/>
+              </a:defRPr>
+            </a:lvl4pPr>
+            <a:lvl5pPr marL="2057400" indent="-228600" algn="l" defTabSz="914400" rtl="0" eaLnBrk="1" latinLnBrk="0" hangingPunct="1">
+              <a:lnSpc>
+                <a:spcPct val="90000"/>
+              </a:lnSpc>
+              <a:spcBef>
+                <a:spcPts val="500"/>
+              </a:spcBef>
+              <a:buFont typeface="Arial" panose="020B0604020202020204" pitchFamily="34" charset="0"/>
+              <a:buChar char="•"/>
+              <a:defRPr sz="1800" kern="1200">
+                <a:solidFill>
+                  <a:schemeClr val="tx1"/>
+                </a:solidFill>
+                <a:latin typeface="+mn-lt"/>
+                <a:ea typeface="+mn-ea"/>
+                <a:cs typeface="+mn-cs"/>
+              </a:defRPr>
+            </a:lvl5pPr>
+            <a:lvl6pPr marL="2514600" indent="-228600" algn="l" defTabSz="914400" rtl="0" eaLnBrk="1" latinLnBrk="0" hangingPunct="1">
+              <a:lnSpc>
+                <a:spcPct val="90000"/>
+              </a:lnSpc>
+              <a:spcBef>
+                <a:spcPts val="500"/>
+              </a:spcBef>
+              <a:buFont typeface="Arial" panose="020B0604020202020204" pitchFamily="34" charset="0"/>
+              <a:buChar char="•"/>
+              <a:defRPr sz="1800" kern="1200">
+                <a:solidFill>
+                  <a:schemeClr val="tx1"/>
+                </a:solidFill>
+                <a:latin typeface="+mn-lt"/>
+                <a:ea typeface="+mn-ea"/>
+                <a:cs typeface="+mn-cs"/>
+              </a:defRPr>
+            </a:lvl6pPr>
+            <a:lvl7pPr marL="2971800" indent="-228600" algn="l" defTabSz="914400" rtl="0" eaLnBrk="1" latinLnBrk="0" hangingPunct="1">
+              <a:lnSpc>
+                <a:spcPct val="90000"/>
+              </a:lnSpc>
+              <a:spcBef>
+                <a:spcPts val="500"/>
+              </a:spcBef>
+              <a:buFont typeface="Arial" panose="020B0604020202020204" pitchFamily="34" charset="0"/>
+              <a:buChar char="•"/>
+              <a:defRPr sz="1800" kern="1200">
+                <a:solidFill>
+                  <a:schemeClr val="tx1"/>
+                </a:solidFill>
+                <a:latin typeface="+mn-lt"/>
+                <a:ea typeface="+mn-ea"/>
+                <a:cs typeface="+mn-cs"/>
+              </a:defRPr>
+            </a:lvl7pPr>
+            <a:lvl8pPr marL="3429000" indent="-228600" algn="l" defTabSz="914400" rtl="0" eaLnBrk="1" latinLnBrk="0" hangingPunct="1">
+              <a:lnSpc>
+                <a:spcPct val="90000"/>
+              </a:lnSpc>
+              <a:spcBef>
+                <a:spcPts val="500"/>
+              </a:spcBef>
+              <a:buFont typeface="Arial" panose="020B0604020202020204" pitchFamily="34" charset="0"/>
+              <a:buChar char="•"/>
+              <a:defRPr sz="1800" kern="1200">
+                <a:solidFill>
+                  <a:schemeClr val="tx1"/>
+                </a:solidFill>
+                <a:latin typeface="+mn-lt"/>
+                <a:ea typeface="+mn-ea"/>
+                <a:cs typeface="+mn-cs"/>
+              </a:defRPr>
+            </a:lvl8pPr>
+            <a:lvl9pPr marL="3886200" indent="-228600" algn="l" defTabSz="914400" rtl="0" eaLnBrk="1" latinLnBrk="0" hangingPunct="1">
+              <a:lnSpc>
+                <a:spcPct val="90000"/>
+              </a:lnSpc>
+              <a:spcBef>
+                <a:spcPts val="500"/>
+              </a:spcBef>
+              <a:buFont typeface="Arial" panose="020B0604020202020204" pitchFamily="34" charset="0"/>
+              <a:buChar char="•"/>
+              <a:defRPr sz="1800" kern="1200">
+                <a:solidFill>
+                  <a:schemeClr val="tx1"/>
+                </a:solidFill>
+                <a:latin typeface="+mn-lt"/>
+                <a:ea typeface="+mn-ea"/>
+                <a:cs typeface="+mn-cs"/>
+              </a:defRPr>
+            </a:lvl9pPr>
+          </a:lstStyle>
+          <a:p>
+            <a:pPr marL="0" indent="0">
+              <a:buFont typeface="Arial" panose="020B0604020202020204" pitchFamily="34" charset="0"/>
+              <a:buNone/>
+            </a:pPr>
+            <a:endParaRPr lang="sv-SE" dirty="0"/>
+          </a:p>
+        </p:txBody>
+      </p:sp>
+      <p:sp>
+        <p:nvSpPr>
+          <p:cNvPr id="6" name="Content Placeholder 5">
+            <a:extLst>
+              <a:ext uri="{FF2B5EF4-FFF2-40B4-BE49-F238E27FC236}">
+                <a16:creationId xmlns:a16="http://schemas.microsoft.com/office/drawing/2014/main" id="{F0405698-C1F8-6044-B4CF-2285BC06E265}"/>
+              </a:ext>
+            </a:extLst>
+          </p:cNvPr>
+          <p:cNvSpPr>
+            <a:spLocks noGrp="1"/>
+          </p:cNvSpPr>
+          <p:nvPr>
+            <p:ph idx="1"/>
+          </p:nvPr>
+        </p:nvSpPr>
+        <p:spPr>
+          <a:xfrm>
+            <a:off x="838200" y="1548606"/>
+            <a:ext cx="10515600" cy="4351338"/>
+          </a:xfrm>
+        </p:spPr>
+        <p:txBody>
+          <a:bodyPr>
+            <a:normAutofit fontScale="32500" lnSpcReduction="20000"/>
+          </a:bodyPr>
+          <a:lstStyle/>
+          <a:p>
+            <a:pPr marL="0" indent="0">
+              <a:buNone/>
+            </a:pPr>
+            <a:r>
+              <a:rPr lang="sv-SE" sz="4300" dirty="0">
+                <a:solidFill>
+                  <a:schemeClr val="accent1">
+                    <a:lumMod val="75000"/>
+                  </a:schemeClr>
+                </a:solidFill>
+              </a:rPr>
+              <a:t>&lt;?</a:t>
+            </a:r>
+            <a:r>
+              <a:rPr lang="sv-SE" sz="4300" dirty="0" err="1">
+                <a:solidFill>
+                  <a:schemeClr val="accent1">
+                    <a:lumMod val="75000"/>
+                  </a:schemeClr>
+                </a:solidFill>
+              </a:rPr>
+              <a:t>xml</a:t>
+            </a:r>
+            <a:r>
+              <a:rPr lang="sv-SE" sz="4300" dirty="0">
+                <a:solidFill>
+                  <a:schemeClr val="accent1">
+                    <a:lumMod val="75000"/>
+                  </a:schemeClr>
+                </a:solidFill>
+              </a:rPr>
+              <a:t> version="1.0" </a:t>
+            </a:r>
+            <a:r>
+              <a:rPr lang="sv-SE" sz="4300" dirty="0" err="1">
+                <a:solidFill>
+                  <a:schemeClr val="accent1">
+                    <a:lumMod val="75000"/>
+                  </a:schemeClr>
+                </a:solidFill>
+              </a:rPr>
+              <a:t>encoding</a:t>
+            </a:r>
+            <a:r>
+              <a:rPr lang="sv-SE" sz="4300" dirty="0">
+                <a:solidFill>
+                  <a:schemeClr val="accent1">
+                    <a:lumMod val="75000"/>
+                  </a:schemeClr>
+                </a:solidFill>
+              </a:rPr>
+              <a:t>="UTF-8"?&gt;</a:t>
+            </a:r>
+            <a:br>
+              <a:rPr lang="sv-SE" sz="4300" dirty="0">
+                <a:solidFill>
+                  <a:schemeClr val="accent1">
+                    <a:lumMod val="75000"/>
+                  </a:schemeClr>
+                </a:solidFill>
+              </a:rPr>
+            </a:br>
+            <a:br>
+              <a:rPr lang="sv-SE" sz="4300" dirty="0">
+                <a:solidFill>
+                  <a:schemeClr val="accent1">
+                    <a:lumMod val="75000"/>
+                  </a:schemeClr>
+                </a:solidFill>
+              </a:rPr>
+            </a:br>
+            <a:r>
+              <a:rPr lang="sv-SE" sz="4300" dirty="0">
+                <a:solidFill>
+                  <a:schemeClr val="accent1">
+                    <a:lumMod val="75000"/>
+                  </a:schemeClr>
+                </a:solidFill>
+              </a:rPr>
+              <a:t>&lt;</a:t>
+            </a:r>
+            <a:r>
+              <a:rPr lang="sv-SE" sz="4300" dirty="0" err="1">
+                <a:solidFill>
+                  <a:schemeClr val="accent1">
+                    <a:lumMod val="75000"/>
+                  </a:schemeClr>
+                </a:solidFill>
+              </a:rPr>
+              <a:t>project</a:t>
+            </a:r>
+            <a:r>
+              <a:rPr lang="sv-SE" sz="4300" dirty="0">
+                <a:solidFill>
+                  <a:schemeClr val="accent1">
+                    <a:lumMod val="75000"/>
+                  </a:schemeClr>
+                </a:solidFill>
+              </a:rPr>
+              <a:t> </a:t>
+            </a:r>
+            <a:r>
+              <a:rPr lang="sv-SE" sz="4300" dirty="0" err="1">
+                <a:solidFill>
+                  <a:schemeClr val="accent1">
+                    <a:lumMod val="75000"/>
+                  </a:schemeClr>
+                </a:solidFill>
+              </a:rPr>
+              <a:t>xmlns</a:t>
+            </a:r>
+            <a:r>
+              <a:rPr lang="sv-SE" sz="4300" dirty="0">
+                <a:solidFill>
+                  <a:schemeClr val="accent1">
+                    <a:lumMod val="75000"/>
+                  </a:schemeClr>
+                </a:solidFill>
+              </a:rPr>
+              <a:t>="http://</a:t>
+            </a:r>
+            <a:r>
+              <a:rPr lang="sv-SE" sz="4300" dirty="0" err="1">
+                <a:solidFill>
+                  <a:schemeClr val="accent1">
+                    <a:lumMod val="75000"/>
+                  </a:schemeClr>
+                </a:solidFill>
+              </a:rPr>
+              <a:t>maven.apache.org</a:t>
+            </a:r>
+            <a:r>
+              <a:rPr lang="sv-SE" sz="4300" dirty="0">
+                <a:solidFill>
+                  <a:schemeClr val="accent1">
+                    <a:lumMod val="75000"/>
+                  </a:schemeClr>
+                </a:solidFill>
+              </a:rPr>
+              <a:t>/POM/4.0.0" </a:t>
+            </a:r>
+            <a:r>
+              <a:rPr lang="sv-SE" sz="4300" dirty="0" err="1">
+                <a:solidFill>
+                  <a:schemeClr val="accent1">
+                    <a:lumMod val="75000"/>
+                  </a:schemeClr>
+                </a:solidFill>
+              </a:rPr>
+              <a:t>xmlns:xsi</a:t>
+            </a:r>
+            <a:r>
+              <a:rPr lang="sv-SE" sz="4300" dirty="0">
+                <a:solidFill>
+                  <a:schemeClr val="accent1">
+                    <a:lumMod val="75000"/>
+                  </a:schemeClr>
+                </a:solidFill>
+              </a:rPr>
+              <a:t>="http://www.w3.org/2001/</a:t>
+            </a:r>
+            <a:r>
+              <a:rPr lang="sv-SE" sz="4300" dirty="0" err="1">
+                <a:solidFill>
+                  <a:schemeClr val="accent1">
+                    <a:lumMod val="75000"/>
+                  </a:schemeClr>
+                </a:solidFill>
+              </a:rPr>
+              <a:t>XMLSchema-instance</a:t>
+            </a:r>
+            <a:r>
+              <a:rPr lang="sv-SE" sz="4300" dirty="0">
+                <a:solidFill>
+                  <a:schemeClr val="accent1">
+                    <a:lumMod val="75000"/>
+                  </a:schemeClr>
+                </a:solidFill>
+              </a:rPr>
+              <a:t>"</a:t>
+            </a:r>
+            <a:br>
+              <a:rPr lang="sv-SE" sz="4300" dirty="0">
+                <a:solidFill>
+                  <a:schemeClr val="accent1">
+                    <a:lumMod val="75000"/>
+                  </a:schemeClr>
+                </a:solidFill>
+              </a:rPr>
+            </a:br>
+            <a:r>
+              <a:rPr lang="sv-SE" sz="4300" dirty="0">
+                <a:solidFill>
+                  <a:schemeClr val="accent1">
+                    <a:lumMod val="75000"/>
+                  </a:schemeClr>
+                </a:solidFill>
+              </a:rPr>
+              <a:t>  </a:t>
+            </a:r>
+            <a:r>
+              <a:rPr lang="sv-SE" sz="4300" dirty="0" err="1">
+                <a:solidFill>
+                  <a:schemeClr val="accent1">
+                    <a:lumMod val="75000"/>
+                  </a:schemeClr>
+                </a:solidFill>
+              </a:rPr>
+              <a:t>xsi:schemaLocation</a:t>
+            </a:r>
+            <a:r>
+              <a:rPr lang="sv-SE" sz="4300" dirty="0">
+                <a:solidFill>
+                  <a:schemeClr val="accent1">
+                    <a:lumMod val="75000"/>
+                  </a:schemeClr>
+                </a:solidFill>
+              </a:rPr>
+              <a:t>="http://</a:t>
+            </a:r>
+            <a:r>
+              <a:rPr lang="sv-SE" sz="4300" dirty="0" err="1">
+                <a:solidFill>
+                  <a:schemeClr val="accent1">
+                    <a:lumMod val="75000"/>
+                  </a:schemeClr>
+                </a:solidFill>
+              </a:rPr>
+              <a:t>maven.apache.org</a:t>
+            </a:r>
+            <a:r>
+              <a:rPr lang="sv-SE" sz="4300" dirty="0">
+                <a:solidFill>
+                  <a:schemeClr val="accent1">
+                    <a:lumMod val="75000"/>
+                  </a:schemeClr>
+                </a:solidFill>
+              </a:rPr>
+              <a:t>/POM/4.0.0 http://</a:t>
+            </a:r>
+            <a:r>
+              <a:rPr lang="sv-SE" sz="4300" dirty="0" err="1">
+                <a:solidFill>
+                  <a:schemeClr val="accent1">
+                    <a:lumMod val="75000"/>
+                  </a:schemeClr>
+                </a:solidFill>
+              </a:rPr>
+              <a:t>maven.apache.org</a:t>
+            </a:r>
+            <a:r>
+              <a:rPr lang="sv-SE" sz="4300" dirty="0">
+                <a:solidFill>
+                  <a:schemeClr val="accent1">
+                    <a:lumMod val="75000"/>
+                  </a:schemeClr>
+                </a:solidFill>
+              </a:rPr>
+              <a:t>/</a:t>
+            </a:r>
+            <a:r>
+              <a:rPr lang="sv-SE" sz="4300" dirty="0" err="1">
+                <a:solidFill>
+                  <a:schemeClr val="accent1">
+                    <a:lumMod val="75000"/>
+                  </a:schemeClr>
+                </a:solidFill>
+              </a:rPr>
+              <a:t>xsd</a:t>
+            </a:r>
+            <a:r>
+              <a:rPr lang="sv-SE" sz="4300" dirty="0">
+                <a:solidFill>
+                  <a:schemeClr val="accent1">
+                    <a:lumMod val="75000"/>
+                  </a:schemeClr>
+                </a:solidFill>
+              </a:rPr>
+              <a:t>/maven-4.0.0.xsd"&gt;</a:t>
+            </a:r>
+            <a:br>
+              <a:rPr lang="sv-SE" sz="4300" dirty="0">
+                <a:solidFill>
+                  <a:schemeClr val="accent1">
+                    <a:lumMod val="75000"/>
+                  </a:schemeClr>
+                </a:solidFill>
+              </a:rPr>
+            </a:br>
+            <a:r>
+              <a:rPr lang="sv-SE" sz="4300" dirty="0">
+                <a:solidFill>
+                  <a:schemeClr val="accent1">
+                    <a:lumMod val="75000"/>
+                  </a:schemeClr>
+                </a:solidFill>
+              </a:rPr>
+              <a:t>  &lt;</a:t>
+            </a:r>
+            <a:r>
+              <a:rPr lang="sv-SE" sz="4300" dirty="0" err="1">
+                <a:solidFill>
+                  <a:schemeClr val="accent1">
+                    <a:lumMod val="75000"/>
+                  </a:schemeClr>
+                </a:solidFill>
+              </a:rPr>
+              <a:t>modelVersion</a:t>
+            </a:r>
+            <a:r>
+              <a:rPr lang="sv-SE" sz="4300" dirty="0">
+                <a:solidFill>
+                  <a:schemeClr val="accent1">
+                    <a:lumMod val="75000"/>
+                  </a:schemeClr>
+                </a:solidFill>
+              </a:rPr>
+              <a:t>&gt;4.0.0&lt;/</a:t>
+            </a:r>
+            <a:r>
+              <a:rPr lang="sv-SE" sz="4300" dirty="0" err="1">
+                <a:solidFill>
+                  <a:schemeClr val="accent1">
+                    <a:lumMod val="75000"/>
+                  </a:schemeClr>
+                </a:solidFill>
+              </a:rPr>
+              <a:t>modelVersion</a:t>
+            </a:r>
+            <a:r>
+              <a:rPr lang="sv-SE" sz="4300" dirty="0">
+                <a:solidFill>
+                  <a:schemeClr val="accent1">
+                    <a:lumMod val="75000"/>
+                  </a:schemeClr>
+                </a:solidFill>
+              </a:rPr>
+              <a:t>&gt;</a:t>
+            </a:r>
+            <a:br>
+              <a:rPr lang="sv-SE" sz="4300" dirty="0">
+                <a:solidFill>
+                  <a:schemeClr val="accent1">
+                    <a:lumMod val="75000"/>
+                  </a:schemeClr>
+                </a:solidFill>
+              </a:rPr>
+            </a:br>
+            <a:br>
+              <a:rPr lang="sv-SE" sz="4300" dirty="0">
+                <a:solidFill>
+                  <a:schemeClr val="accent1">
+                    <a:lumMod val="75000"/>
+                  </a:schemeClr>
+                </a:solidFill>
+              </a:rPr>
+            </a:br>
+            <a:r>
+              <a:rPr lang="sv-SE" sz="4300" dirty="0">
+                <a:solidFill>
+                  <a:schemeClr val="accent1">
+                    <a:lumMod val="75000"/>
+                  </a:schemeClr>
+                </a:solidFill>
+              </a:rPr>
+              <a:t>  &lt;</a:t>
+            </a:r>
+            <a:r>
+              <a:rPr lang="sv-SE" sz="4300" dirty="0" err="1">
+                <a:solidFill>
+                  <a:schemeClr val="accent1">
+                    <a:lumMod val="75000"/>
+                  </a:schemeClr>
+                </a:solidFill>
+              </a:rPr>
+              <a:t>groupId</a:t>
+            </a:r>
+            <a:r>
+              <a:rPr lang="sv-SE" sz="4300" dirty="0">
+                <a:solidFill>
+                  <a:schemeClr val="accent1">
+                    <a:lumMod val="75000"/>
+                  </a:schemeClr>
+                </a:solidFill>
+              </a:rPr>
+              <a:t>&gt;se.inte.group5&lt;/</a:t>
+            </a:r>
+            <a:r>
+              <a:rPr lang="sv-SE" sz="4300" dirty="0" err="1">
+                <a:solidFill>
+                  <a:schemeClr val="accent1">
+                    <a:lumMod val="75000"/>
+                  </a:schemeClr>
+                </a:solidFill>
+              </a:rPr>
+              <a:t>groupId</a:t>
+            </a:r>
+            <a:r>
+              <a:rPr lang="sv-SE" sz="4300" dirty="0">
+                <a:solidFill>
+                  <a:schemeClr val="accent1">
+                    <a:lumMod val="75000"/>
+                  </a:schemeClr>
+                </a:solidFill>
+              </a:rPr>
+              <a:t>&gt;</a:t>
+            </a:r>
+            <a:br>
+              <a:rPr lang="sv-SE" sz="4300" dirty="0">
+                <a:solidFill>
+                  <a:schemeClr val="accent1">
+                    <a:lumMod val="75000"/>
+                  </a:schemeClr>
+                </a:solidFill>
+              </a:rPr>
+            </a:br>
+            <a:r>
+              <a:rPr lang="sv-SE" sz="4300" dirty="0">
+                <a:solidFill>
+                  <a:schemeClr val="accent1">
+                    <a:lumMod val="75000"/>
+                  </a:schemeClr>
+                </a:solidFill>
+              </a:rPr>
+              <a:t>  &lt;</a:t>
+            </a:r>
+            <a:r>
+              <a:rPr lang="sv-SE" sz="4300" dirty="0" err="1">
+                <a:solidFill>
+                  <a:schemeClr val="accent1">
+                    <a:lumMod val="75000"/>
+                  </a:schemeClr>
+                </a:solidFill>
+              </a:rPr>
+              <a:t>artifactId</a:t>
+            </a:r>
+            <a:r>
+              <a:rPr lang="sv-SE" sz="4300" dirty="0">
+                <a:solidFill>
+                  <a:schemeClr val="accent1">
+                    <a:lumMod val="75000"/>
+                  </a:schemeClr>
+                </a:solidFill>
+              </a:rPr>
+              <a:t>&gt;</a:t>
+            </a:r>
+            <a:r>
+              <a:rPr lang="sv-SE" sz="4300" dirty="0" err="1">
+                <a:solidFill>
+                  <a:schemeClr val="accent1">
+                    <a:lumMod val="75000"/>
+                  </a:schemeClr>
+                </a:solidFill>
+              </a:rPr>
+              <a:t>InteGame</a:t>
+            </a:r>
+            <a:r>
+              <a:rPr lang="sv-SE" sz="4300" dirty="0">
+                <a:solidFill>
+                  <a:schemeClr val="accent1">
+                    <a:lumMod val="75000"/>
+                  </a:schemeClr>
+                </a:solidFill>
+              </a:rPr>
+              <a:t>&lt;/</a:t>
+            </a:r>
+            <a:r>
+              <a:rPr lang="sv-SE" sz="4300" dirty="0" err="1">
+                <a:solidFill>
+                  <a:schemeClr val="accent1">
+                    <a:lumMod val="75000"/>
+                  </a:schemeClr>
+                </a:solidFill>
+              </a:rPr>
+              <a:t>artifactId</a:t>
+            </a:r>
+            <a:r>
+              <a:rPr lang="sv-SE" sz="4300" dirty="0">
+                <a:solidFill>
+                  <a:schemeClr val="accent1">
+                    <a:lumMod val="75000"/>
+                  </a:schemeClr>
+                </a:solidFill>
+              </a:rPr>
+              <a:t>&gt;</a:t>
+            </a:r>
+            <a:br>
+              <a:rPr lang="sv-SE" sz="4300" dirty="0">
+                <a:solidFill>
+                  <a:schemeClr val="accent1">
+                    <a:lumMod val="75000"/>
+                  </a:schemeClr>
+                </a:solidFill>
+              </a:rPr>
+            </a:br>
+            <a:r>
+              <a:rPr lang="sv-SE" sz="4300" dirty="0">
+                <a:solidFill>
+                  <a:schemeClr val="accent1">
+                    <a:lumMod val="75000"/>
+                  </a:schemeClr>
+                </a:solidFill>
+              </a:rPr>
+              <a:t>  &lt;version&gt;1.0-SNAPSHOT&lt;/version&gt;</a:t>
+            </a:r>
+            <a:br>
+              <a:rPr lang="sv-SE" sz="4300" dirty="0">
+                <a:solidFill>
+                  <a:schemeClr val="accent1">
+                    <a:lumMod val="75000"/>
+                  </a:schemeClr>
+                </a:solidFill>
+              </a:rPr>
+            </a:br>
+            <a:br>
+              <a:rPr lang="sv-SE" sz="4300" dirty="0">
+                <a:solidFill>
+                  <a:schemeClr val="accent1">
+                    <a:lumMod val="75000"/>
+                  </a:schemeClr>
+                </a:solidFill>
+              </a:rPr>
+            </a:br>
+            <a:r>
+              <a:rPr lang="sv-SE" sz="4300" dirty="0">
+                <a:solidFill>
+                  <a:schemeClr val="accent1">
+                    <a:lumMod val="75000"/>
+                  </a:schemeClr>
+                </a:solidFill>
+              </a:rPr>
+              <a:t>  &lt;</a:t>
+            </a:r>
+            <a:r>
+              <a:rPr lang="sv-SE" sz="4300" dirty="0" err="1">
+                <a:solidFill>
+                  <a:schemeClr val="accent1">
+                    <a:lumMod val="75000"/>
+                  </a:schemeClr>
+                </a:solidFill>
+              </a:rPr>
+              <a:t>name</a:t>
+            </a:r>
+            <a:r>
+              <a:rPr lang="sv-SE" sz="4300" dirty="0">
+                <a:solidFill>
+                  <a:schemeClr val="accent1">
+                    <a:lumMod val="75000"/>
+                  </a:schemeClr>
+                </a:solidFill>
+              </a:rPr>
+              <a:t>&gt;</a:t>
+            </a:r>
+            <a:r>
+              <a:rPr lang="sv-SE" sz="4300" dirty="0" err="1">
+                <a:solidFill>
+                  <a:schemeClr val="accent1">
+                    <a:lumMod val="75000"/>
+                  </a:schemeClr>
+                </a:solidFill>
+              </a:rPr>
+              <a:t>InteGame</a:t>
+            </a:r>
+            <a:r>
+              <a:rPr lang="sv-SE" sz="4300" dirty="0">
+                <a:solidFill>
+                  <a:schemeClr val="accent1">
+                    <a:lumMod val="75000"/>
+                  </a:schemeClr>
+                </a:solidFill>
+              </a:rPr>
+              <a:t>&lt;/</a:t>
+            </a:r>
+            <a:r>
+              <a:rPr lang="sv-SE" sz="4300" dirty="0" err="1">
+                <a:solidFill>
+                  <a:schemeClr val="accent1">
+                    <a:lumMod val="75000"/>
+                  </a:schemeClr>
+                </a:solidFill>
+              </a:rPr>
+              <a:t>name</a:t>
+            </a:r>
+            <a:r>
+              <a:rPr lang="sv-SE" sz="4300" dirty="0">
+                <a:solidFill>
+                  <a:schemeClr val="accent1">
+                    <a:lumMod val="75000"/>
+                  </a:schemeClr>
+                </a:solidFill>
+              </a:rPr>
+              <a:t>&gt;</a:t>
+            </a:r>
+            <a:br>
+              <a:rPr lang="sv-SE" sz="4300" dirty="0">
+                <a:solidFill>
+                  <a:schemeClr val="accent1">
+                    <a:lumMod val="75000"/>
+                  </a:schemeClr>
+                </a:solidFill>
+              </a:rPr>
+            </a:br>
+            <a:br>
+              <a:rPr lang="sv-SE" sz="4300" dirty="0">
+                <a:solidFill>
+                  <a:schemeClr val="accent1">
+                    <a:lumMod val="75000"/>
+                  </a:schemeClr>
+                </a:solidFill>
+              </a:rPr>
+            </a:br>
+            <a:r>
+              <a:rPr lang="sv-SE" sz="4300" dirty="0">
+                <a:solidFill>
+                  <a:schemeClr val="accent1">
+                    <a:lumMod val="75000"/>
+                  </a:schemeClr>
+                </a:solidFill>
+              </a:rPr>
+              <a:t>  &lt;</a:t>
+            </a:r>
+            <a:r>
+              <a:rPr lang="sv-SE" sz="4300" dirty="0" err="1">
+                <a:solidFill>
+                  <a:schemeClr val="accent1">
+                    <a:lumMod val="75000"/>
+                  </a:schemeClr>
+                </a:solidFill>
+              </a:rPr>
+              <a:t>properties</a:t>
+            </a:r>
+            <a:r>
+              <a:rPr lang="sv-SE" sz="4300" dirty="0">
+                <a:solidFill>
+                  <a:schemeClr val="accent1">
+                    <a:lumMod val="75000"/>
+                  </a:schemeClr>
+                </a:solidFill>
+              </a:rPr>
+              <a:t>&gt;</a:t>
+            </a:r>
+            <a:br>
+              <a:rPr lang="sv-SE" sz="4300" dirty="0">
+                <a:solidFill>
+                  <a:schemeClr val="accent1">
+                    <a:lumMod val="75000"/>
+                  </a:schemeClr>
+                </a:solidFill>
+              </a:rPr>
+            </a:br>
+            <a:r>
+              <a:rPr lang="sv-SE" sz="4300" dirty="0">
+                <a:solidFill>
+                  <a:schemeClr val="accent1">
+                    <a:lumMod val="75000"/>
+                  </a:schemeClr>
+                </a:solidFill>
+              </a:rPr>
+              <a:t>    &lt;</a:t>
+            </a:r>
+            <a:r>
+              <a:rPr lang="sv-SE" sz="4300" dirty="0" err="1">
+                <a:solidFill>
+                  <a:schemeClr val="accent1">
+                    <a:lumMod val="75000"/>
+                  </a:schemeClr>
+                </a:solidFill>
+              </a:rPr>
+              <a:t>project.build.sourceEncoding</a:t>
+            </a:r>
+            <a:r>
+              <a:rPr lang="sv-SE" sz="4300" dirty="0">
+                <a:solidFill>
+                  <a:schemeClr val="accent1">
+                    <a:lumMod val="75000"/>
+                  </a:schemeClr>
+                </a:solidFill>
+              </a:rPr>
+              <a:t>&gt;UTF-8&lt;/</a:t>
+            </a:r>
+            <a:r>
+              <a:rPr lang="sv-SE" sz="4300" dirty="0" err="1">
+                <a:solidFill>
+                  <a:schemeClr val="accent1">
+                    <a:lumMod val="75000"/>
+                  </a:schemeClr>
+                </a:solidFill>
+              </a:rPr>
+              <a:t>project.build.sourceEncoding</a:t>
+            </a:r>
+            <a:r>
+              <a:rPr lang="sv-SE" sz="4300" dirty="0">
+                <a:solidFill>
+                  <a:schemeClr val="accent1">
+                    <a:lumMod val="75000"/>
+                  </a:schemeClr>
+                </a:solidFill>
+              </a:rPr>
+              <a:t>&gt;</a:t>
+            </a:r>
+            <a:br>
+              <a:rPr lang="sv-SE" sz="4300" dirty="0">
+                <a:solidFill>
+                  <a:schemeClr val="accent1">
+                    <a:lumMod val="75000"/>
+                  </a:schemeClr>
+                </a:solidFill>
+              </a:rPr>
+            </a:br>
+            <a:r>
+              <a:rPr lang="sv-SE" sz="4300" dirty="0">
+                <a:solidFill>
+                  <a:schemeClr val="accent1">
+                    <a:lumMod val="75000"/>
+                  </a:schemeClr>
+                </a:solidFill>
+              </a:rPr>
+              <a:t>    &lt;</a:t>
+            </a:r>
+            <a:r>
+              <a:rPr lang="sv-SE" sz="4300" dirty="0" err="1">
+                <a:solidFill>
+                  <a:schemeClr val="accent1">
+                    <a:lumMod val="75000"/>
+                  </a:schemeClr>
+                </a:solidFill>
+              </a:rPr>
+              <a:t>maven.compiler.source</a:t>
+            </a:r>
+            <a:r>
+              <a:rPr lang="sv-SE" sz="4300" dirty="0">
+                <a:solidFill>
+                  <a:schemeClr val="accent1">
+                    <a:lumMod val="75000"/>
+                  </a:schemeClr>
+                </a:solidFill>
+              </a:rPr>
+              <a:t>&gt;1.7&lt;/</a:t>
+            </a:r>
+            <a:r>
+              <a:rPr lang="sv-SE" sz="4300" dirty="0" err="1">
+                <a:solidFill>
+                  <a:schemeClr val="accent1">
+                    <a:lumMod val="75000"/>
+                  </a:schemeClr>
+                </a:solidFill>
+              </a:rPr>
+              <a:t>maven.compiler.source</a:t>
+            </a:r>
+            <a:r>
+              <a:rPr lang="sv-SE" sz="4300" dirty="0">
+                <a:solidFill>
+                  <a:schemeClr val="accent1">
+                    <a:lumMod val="75000"/>
+                  </a:schemeClr>
+                </a:solidFill>
+              </a:rPr>
+              <a:t>&gt;</a:t>
+            </a:r>
+            <a:br>
+              <a:rPr lang="sv-SE" sz="4300" dirty="0">
+                <a:solidFill>
+                  <a:schemeClr val="accent1">
+                    <a:lumMod val="75000"/>
+                  </a:schemeClr>
+                </a:solidFill>
+              </a:rPr>
+            </a:br>
+            <a:r>
+              <a:rPr lang="sv-SE" sz="4300" dirty="0">
+                <a:solidFill>
+                  <a:schemeClr val="accent1">
+                    <a:lumMod val="75000"/>
+                  </a:schemeClr>
+                </a:solidFill>
+              </a:rPr>
+              <a:t>    &lt;</a:t>
+            </a:r>
+            <a:r>
+              <a:rPr lang="sv-SE" sz="4300" dirty="0" err="1">
+                <a:solidFill>
+                  <a:schemeClr val="accent1">
+                    <a:lumMod val="75000"/>
+                  </a:schemeClr>
+                </a:solidFill>
+              </a:rPr>
+              <a:t>maven.compiler.target</a:t>
+            </a:r>
+            <a:r>
+              <a:rPr lang="sv-SE" sz="4300" dirty="0">
+                <a:solidFill>
+                  <a:schemeClr val="accent1">
+                    <a:lumMod val="75000"/>
+                  </a:schemeClr>
+                </a:solidFill>
+              </a:rPr>
+              <a:t>&gt;1.7&lt;/</a:t>
+            </a:r>
+            <a:r>
+              <a:rPr lang="sv-SE" sz="4300" dirty="0" err="1">
+                <a:solidFill>
+                  <a:schemeClr val="accent1">
+                    <a:lumMod val="75000"/>
+                  </a:schemeClr>
+                </a:solidFill>
+              </a:rPr>
+              <a:t>maven.compiler.target</a:t>
+            </a:r>
+            <a:r>
+              <a:rPr lang="sv-SE" sz="4300" dirty="0">
+                <a:solidFill>
+                  <a:schemeClr val="accent1">
+                    <a:lumMod val="75000"/>
+                  </a:schemeClr>
+                </a:solidFill>
+              </a:rPr>
+              <a:t>&gt;</a:t>
+            </a:r>
+            <a:br>
+              <a:rPr lang="sv-SE" sz="4300" dirty="0">
+                <a:solidFill>
+                  <a:schemeClr val="accent1">
+                    <a:lumMod val="75000"/>
+                  </a:schemeClr>
+                </a:solidFill>
+              </a:rPr>
+            </a:br>
+            <a:r>
+              <a:rPr lang="sv-SE" sz="4300" dirty="0">
+                <a:solidFill>
+                  <a:schemeClr val="accent1">
+                    <a:lumMod val="75000"/>
+                  </a:schemeClr>
+                </a:solidFill>
+              </a:rPr>
+              <a:t>  &lt;/</a:t>
+            </a:r>
+            <a:r>
+              <a:rPr lang="sv-SE" sz="4300" dirty="0" err="1">
+                <a:solidFill>
+                  <a:schemeClr val="accent1">
+                    <a:lumMod val="75000"/>
+                  </a:schemeClr>
+                </a:solidFill>
+              </a:rPr>
+              <a:t>properties</a:t>
+            </a:r>
+            <a:r>
+              <a:rPr lang="sv-SE" sz="4300" dirty="0">
+                <a:solidFill>
+                  <a:schemeClr val="accent1">
+                    <a:lumMod val="75000"/>
+                  </a:schemeClr>
+                </a:solidFill>
+              </a:rPr>
+              <a:t>&gt;</a:t>
+            </a:r>
+            <a:br>
+              <a:rPr lang="sv-SE" sz="4300" dirty="0">
+                <a:solidFill>
+                  <a:schemeClr val="accent1">
+                    <a:lumMod val="75000"/>
+                  </a:schemeClr>
+                </a:solidFill>
+              </a:rPr>
+            </a:br>
+            <a:br>
+              <a:rPr lang="sv-SE" sz="4300" dirty="0">
+                <a:solidFill>
+                  <a:schemeClr val="accent1">
+                    <a:lumMod val="75000"/>
+                  </a:schemeClr>
+                </a:solidFill>
+              </a:rPr>
+            </a:br>
+            <a:r>
+              <a:rPr lang="sv-SE" sz="4300" dirty="0">
+                <a:solidFill>
+                  <a:schemeClr val="accent1">
+                    <a:lumMod val="75000"/>
+                  </a:schemeClr>
+                </a:solidFill>
+              </a:rPr>
+              <a:t>  &lt;</a:t>
+            </a:r>
+            <a:r>
+              <a:rPr lang="sv-SE" sz="4300" dirty="0" err="1">
+                <a:solidFill>
+                  <a:schemeClr val="accent1">
+                    <a:lumMod val="75000"/>
+                  </a:schemeClr>
+                </a:solidFill>
+              </a:rPr>
+              <a:t>dependencies</a:t>
+            </a:r>
+            <a:r>
+              <a:rPr lang="sv-SE" sz="4300" dirty="0">
+                <a:solidFill>
+                  <a:schemeClr val="accent1">
+                    <a:lumMod val="75000"/>
+                  </a:schemeClr>
+                </a:solidFill>
+              </a:rPr>
+              <a:t>&gt;</a:t>
+            </a:r>
+            <a:br>
+              <a:rPr lang="sv-SE" sz="4300" dirty="0">
+                <a:solidFill>
+                  <a:schemeClr val="accent1">
+                    <a:lumMod val="75000"/>
+                  </a:schemeClr>
+                </a:solidFill>
+              </a:rPr>
+            </a:br>
+            <a:r>
+              <a:rPr lang="sv-SE" sz="4300" dirty="0">
+                <a:solidFill>
+                  <a:schemeClr val="accent1">
+                    <a:lumMod val="75000"/>
+                  </a:schemeClr>
+                </a:solidFill>
+              </a:rPr>
+              <a:t>    &lt;</a:t>
+            </a:r>
+            <a:r>
+              <a:rPr lang="sv-SE" sz="4300" dirty="0" err="1">
+                <a:solidFill>
+                  <a:schemeClr val="accent1">
+                    <a:lumMod val="75000"/>
+                  </a:schemeClr>
+                </a:solidFill>
+              </a:rPr>
+              <a:t>dependency</a:t>
+            </a:r>
+            <a:r>
+              <a:rPr lang="sv-SE" sz="4300" dirty="0">
+                <a:solidFill>
+                  <a:schemeClr val="accent1">
+                    <a:lumMod val="75000"/>
+                  </a:schemeClr>
+                </a:solidFill>
+              </a:rPr>
+              <a:t>&gt;</a:t>
+            </a:r>
+            <a:br>
+              <a:rPr lang="sv-SE" sz="4300" dirty="0">
+                <a:solidFill>
+                  <a:schemeClr val="accent1">
+                    <a:lumMod val="75000"/>
+                  </a:schemeClr>
+                </a:solidFill>
+              </a:rPr>
+            </a:br>
+            <a:r>
+              <a:rPr lang="sv-SE" sz="4300" dirty="0">
+                <a:solidFill>
+                  <a:schemeClr val="accent1">
+                    <a:lumMod val="75000"/>
+                  </a:schemeClr>
+                </a:solidFill>
+              </a:rPr>
+              <a:t>      &lt;</a:t>
+            </a:r>
+            <a:r>
+              <a:rPr lang="sv-SE" sz="4300" dirty="0" err="1">
+                <a:solidFill>
+                  <a:schemeClr val="accent1">
+                    <a:lumMod val="75000"/>
+                  </a:schemeClr>
+                </a:solidFill>
+              </a:rPr>
+              <a:t>groupId</a:t>
+            </a:r>
+            <a:r>
+              <a:rPr lang="sv-SE" sz="4300" dirty="0">
+                <a:solidFill>
+                  <a:schemeClr val="accent1">
+                    <a:lumMod val="75000"/>
+                  </a:schemeClr>
+                </a:solidFill>
+              </a:rPr>
+              <a:t>&gt;</a:t>
+            </a:r>
+            <a:r>
+              <a:rPr lang="sv-SE" sz="4300" dirty="0" err="1">
+                <a:solidFill>
+                  <a:schemeClr val="accent1">
+                    <a:lumMod val="75000"/>
+                  </a:schemeClr>
+                </a:solidFill>
+              </a:rPr>
+              <a:t>junit</a:t>
+            </a:r>
+            <a:r>
+              <a:rPr lang="sv-SE" sz="4300" dirty="0">
+                <a:solidFill>
+                  <a:schemeClr val="accent1">
+                    <a:lumMod val="75000"/>
+                  </a:schemeClr>
+                </a:solidFill>
+              </a:rPr>
+              <a:t>&lt;/</a:t>
+            </a:r>
+            <a:r>
+              <a:rPr lang="sv-SE" sz="4300" dirty="0" err="1">
+                <a:solidFill>
+                  <a:schemeClr val="accent1">
+                    <a:lumMod val="75000"/>
+                  </a:schemeClr>
+                </a:solidFill>
+              </a:rPr>
+              <a:t>groupId</a:t>
+            </a:r>
+            <a:r>
+              <a:rPr lang="sv-SE" sz="4300" dirty="0">
+                <a:solidFill>
+                  <a:schemeClr val="accent1">
+                    <a:lumMod val="75000"/>
+                  </a:schemeClr>
+                </a:solidFill>
+              </a:rPr>
+              <a:t>&gt;</a:t>
+            </a:r>
+            <a:br>
+              <a:rPr lang="sv-SE" sz="4300" dirty="0">
+                <a:solidFill>
+                  <a:schemeClr val="accent1">
+                    <a:lumMod val="75000"/>
+                  </a:schemeClr>
+                </a:solidFill>
+              </a:rPr>
+            </a:br>
+            <a:r>
+              <a:rPr lang="sv-SE" sz="4300" dirty="0">
+                <a:solidFill>
+                  <a:schemeClr val="accent1">
+                    <a:lumMod val="75000"/>
+                  </a:schemeClr>
+                </a:solidFill>
+              </a:rPr>
+              <a:t>      &lt;</a:t>
+            </a:r>
+            <a:r>
+              <a:rPr lang="sv-SE" sz="4300" dirty="0" err="1">
+                <a:solidFill>
+                  <a:schemeClr val="accent1">
+                    <a:lumMod val="75000"/>
+                  </a:schemeClr>
+                </a:solidFill>
+              </a:rPr>
+              <a:t>artifactId</a:t>
+            </a:r>
+            <a:r>
+              <a:rPr lang="sv-SE" sz="4300" dirty="0">
+                <a:solidFill>
+                  <a:schemeClr val="accent1">
+                    <a:lumMod val="75000"/>
+                  </a:schemeClr>
+                </a:solidFill>
+              </a:rPr>
+              <a:t>&gt;</a:t>
+            </a:r>
+            <a:r>
+              <a:rPr lang="sv-SE" sz="4300" dirty="0" err="1">
+                <a:solidFill>
+                  <a:schemeClr val="accent1">
+                    <a:lumMod val="75000"/>
+                  </a:schemeClr>
+                </a:solidFill>
+              </a:rPr>
+              <a:t>junit</a:t>
+            </a:r>
+            <a:r>
+              <a:rPr lang="sv-SE" sz="4300" dirty="0">
+                <a:solidFill>
+                  <a:schemeClr val="accent1">
+                    <a:lumMod val="75000"/>
+                  </a:schemeClr>
+                </a:solidFill>
+              </a:rPr>
+              <a:t>&lt;/</a:t>
+            </a:r>
+            <a:r>
+              <a:rPr lang="sv-SE" sz="4300" dirty="0" err="1">
+                <a:solidFill>
+                  <a:schemeClr val="accent1">
+                    <a:lumMod val="75000"/>
+                  </a:schemeClr>
+                </a:solidFill>
+              </a:rPr>
+              <a:t>artifactId</a:t>
+            </a:r>
+            <a:r>
+              <a:rPr lang="sv-SE" sz="4300" dirty="0">
+                <a:solidFill>
+                  <a:schemeClr val="accent1">
+                    <a:lumMod val="75000"/>
+                  </a:schemeClr>
+                </a:solidFill>
+              </a:rPr>
+              <a:t>&gt;</a:t>
+            </a:r>
+            <a:br>
+              <a:rPr lang="sv-SE" sz="4300" dirty="0">
+                <a:solidFill>
+                  <a:schemeClr val="accent1">
+                    <a:lumMod val="75000"/>
+                  </a:schemeClr>
+                </a:solidFill>
+              </a:rPr>
+            </a:br>
+            <a:r>
+              <a:rPr lang="sv-SE" sz="4300" dirty="0">
+                <a:solidFill>
+                  <a:schemeClr val="accent1">
+                    <a:lumMod val="75000"/>
+                  </a:schemeClr>
+                </a:solidFill>
+              </a:rPr>
+              <a:t>      &lt;version&gt;4.11&lt;/version&gt;</a:t>
+            </a:r>
+            <a:br>
+              <a:rPr lang="sv-SE" sz="4300" dirty="0">
+                <a:solidFill>
+                  <a:schemeClr val="accent1">
+                    <a:lumMod val="75000"/>
+                  </a:schemeClr>
+                </a:solidFill>
+              </a:rPr>
+            </a:br>
+            <a:r>
+              <a:rPr lang="sv-SE" sz="4300" dirty="0">
+                <a:solidFill>
+                  <a:schemeClr val="accent1">
+                    <a:lumMod val="75000"/>
+                  </a:schemeClr>
+                </a:solidFill>
+              </a:rPr>
+              <a:t>      &lt;</a:t>
+            </a:r>
+            <a:r>
+              <a:rPr lang="sv-SE" sz="4300" dirty="0" err="1">
+                <a:solidFill>
+                  <a:schemeClr val="accent1">
+                    <a:lumMod val="75000"/>
+                  </a:schemeClr>
+                </a:solidFill>
+              </a:rPr>
+              <a:t>scope</a:t>
+            </a:r>
+            <a:r>
+              <a:rPr lang="sv-SE" sz="4300" dirty="0">
+                <a:solidFill>
+                  <a:schemeClr val="accent1">
+                    <a:lumMod val="75000"/>
+                  </a:schemeClr>
+                </a:solidFill>
+              </a:rPr>
+              <a:t>&gt;test&lt;/</a:t>
+            </a:r>
+            <a:r>
+              <a:rPr lang="sv-SE" sz="4300" dirty="0" err="1">
+                <a:solidFill>
+                  <a:schemeClr val="accent1">
+                    <a:lumMod val="75000"/>
+                  </a:schemeClr>
+                </a:solidFill>
+              </a:rPr>
+              <a:t>scope</a:t>
+            </a:r>
+            <a:r>
+              <a:rPr lang="sv-SE" sz="4300" dirty="0">
+                <a:solidFill>
+                  <a:schemeClr val="accent1">
+                    <a:lumMod val="75000"/>
+                  </a:schemeClr>
+                </a:solidFill>
+              </a:rPr>
+              <a:t>&gt;</a:t>
+            </a:r>
+            <a:br>
+              <a:rPr lang="sv-SE" sz="4300" dirty="0">
+                <a:solidFill>
+                  <a:schemeClr val="accent1">
+                    <a:lumMod val="75000"/>
+                  </a:schemeClr>
+                </a:solidFill>
+              </a:rPr>
+            </a:br>
+            <a:r>
+              <a:rPr lang="sv-SE" sz="4300" dirty="0">
+                <a:solidFill>
+                  <a:schemeClr val="accent1">
+                    <a:lumMod val="75000"/>
+                  </a:schemeClr>
+                </a:solidFill>
+              </a:rPr>
+              <a:t>    &lt;/</a:t>
+            </a:r>
+            <a:r>
+              <a:rPr lang="sv-SE" sz="4300" dirty="0" err="1">
+                <a:solidFill>
+                  <a:schemeClr val="accent1">
+                    <a:lumMod val="75000"/>
+                  </a:schemeClr>
+                </a:solidFill>
+              </a:rPr>
+              <a:t>dependency</a:t>
+            </a:r>
+            <a:r>
+              <a:rPr lang="sv-SE" sz="4300" dirty="0">
+                <a:solidFill>
+                  <a:schemeClr val="accent1">
+                    <a:lumMod val="75000"/>
+                  </a:schemeClr>
+                </a:solidFill>
+              </a:rPr>
+              <a:t>&gt;</a:t>
+            </a:r>
+            <a:br>
+              <a:rPr lang="sv-SE" sz="4300" dirty="0">
+                <a:solidFill>
+                  <a:schemeClr val="accent1">
+                    <a:lumMod val="75000"/>
+                  </a:schemeClr>
+                </a:solidFill>
+              </a:rPr>
+            </a:br>
+            <a:r>
+              <a:rPr lang="sv-SE" sz="4300" dirty="0">
+                <a:solidFill>
+                  <a:schemeClr val="accent1">
+                    <a:lumMod val="75000"/>
+                  </a:schemeClr>
+                </a:solidFill>
+              </a:rPr>
+              <a:t>  &lt;/</a:t>
+            </a:r>
+            <a:r>
+              <a:rPr lang="sv-SE" sz="4300" dirty="0" err="1">
+                <a:solidFill>
+                  <a:schemeClr val="accent1">
+                    <a:lumMod val="75000"/>
+                  </a:schemeClr>
+                </a:solidFill>
+              </a:rPr>
+              <a:t>dependencies</a:t>
+            </a:r>
+            <a:r>
+              <a:rPr lang="sv-SE" sz="4300" dirty="0">
+                <a:solidFill>
+                  <a:schemeClr val="accent1">
+                    <a:lumMod val="75000"/>
+                  </a:schemeClr>
+                </a:solidFill>
+              </a:rPr>
+              <a:t>&gt;</a:t>
+            </a:r>
+            <a:br>
+              <a:rPr lang="sv-SE" sz="4300" dirty="0">
+                <a:solidFill>
+                  <a:schemeClr val="accent1">
+                    <a:lumMod val="75000"/>
+                  </a:schemeClr>
+                </a:solidFill>
+              </a:rPr>
+            </a:br>
+            <a:br>
+              <a:rPr lang="sv-SE" sz="4300" dirty="0">
+                <a:solidFill>
+                  <a:schemeClr val="accent1">
+                    <a:lumMod val="75000"/>
+                  </a:schemeClr>
+                </a:solidFill>
+              </a:rPr>
+            </a:br>
+            <a:r>
+              <a:rPr lang="sv-SE" sz="4300" dirty="0">
+                <a:solidFill>
+                  <a:schemeClr val="accent1">
+                    <a:lumMod val="75000"/>
+                  </a:schemeClr>
+                </a:solidFill>
+              </a:rPr>
+              <a:t>&lt;/</a:t>
+            </a:r>
+            <a:r>
+              <a:rPr lang="sv-SE" sz="4300" dirty="0" err="1">
+                <a:solidFill>
+                  <a:schemeClr val="accent1">
+                    <a:lumMod val="75000"/>
+                  </a:schemeClr>
+                </a:solidFill>
+              </a:rPr>
+              <a:t>project</a:t>
+            </a:r>
+            <a:r>
+              <a:rPr lang="sv-SE" sz="4300" dirty="0">
+                <a:solidFill>
+                  <a:schemeClr val="accent1">
+                    <a:lumMod val="75000"/>
+                  </a:schemeClr>
+                </a:solidFill>
+              </a:rPr>
+              <a:t>&gt;</a:t>
+            </a:r>
+            <a:endParaRPr lang="sv-SE" dirty="0">
+              <a:solidFill>
+                <a:schemeClr val="accent1">
+                  <a:lumMod val="75000"/>
+                </a:schemeClr>
+              </a:solidFill>
+            </a:endParaRPr>
+          </a:p>
+        </p:txBody>
+      </p:sp>
+    </p:spTree>
+    <p:custDataLst>
+      <p:tags r:id="rId1"/>
+    </p:custDataLst>
+    <p:extLst>
+      <p:ext uri="{BB962C8B-B14F-4D97-AF65-F5344CB8AC3E}">
+        <p14:creationId xmlns:p14="http://schemas.microsoft.com/office/powerpoint/2010/main" val="1633220100"/>
       </p:ext>
     </p:extLst>
   </p:cSld>
@@ -29359,6 +30420,18 @@
 </file>
 
 <file path=ppt/tags/tag37.xml><?xml version="1.0" encoding="utf-8"?>
+<p:tagLst xmlns:a="http://schemas.openxmlformats.org/drawingml/2006/main" xmlns:r="http://schemas.openxmlformats.org/officeDocument/2006/relationships" xmlns:p="http://schemas.openxmlformats.org/presentationml/2006/main">
+  <p:tag name="ARTICULATE_SLIDE_THUMBNAIL_REFRESH" val="1"/>
+</p:tagLst>
+</file>
+
+<file path=ppt/tags/tag38.xml><?xml version="1.0" encoding="utf-8"?>
+<p:tagLst xmlns:a="http://schemas.openxmlformats.org/drawingml/2006/main" xmlns:r="http://schemas.openxmlformats.org/officeDocument/2006/relationships" xmlns:p="http://schemas.openxmlformats.org/presentationml/2006/main">
+  <p:tag name="ARTICULATE_SLIDE_THUMBNAIL_REFRESH" val="1"/>
+</p:tagLst>
+</file>
+
+<file path=ppt/tags/tag39.xml><?xml version="1.0" encoding="utf-8"?>
 <p:tagLst xmlns:a="http://schemas.openxmlformats.org/drawingml/2006/main" xmlns:r="http://schemas.openxmlformats.org/officeDocument/2006/relationships" xmlns:p="http://schemas.openxmlformats.org/presentationml/2006/main">
   <p:tag name="ARTICULATE_SLIDE_THUMBNAIL_REFRESH" val="1"/>
 </p:tagLst>

</xml_diff>

<commit_message>
Updated FindBugs results after inspection, also changed one of my tdd examples.
</commit_message>
<xml_diff>
--- a/docs/Slutredovisning_grp5_v8.pptx
+++ b/docs/Slutredovisning_grp5_v8.pptx
@@ -21,8 +21,8 @@
     <p:sldId id="286" r:id="rId12"/>
     <p:sldId id="296" r:id="rId13"/>
     <p:sldId id="300" r:id="rId14"/>
-    <p:sldId id="288" r:id="rId15"/>
-    <p:sldId id="289" r:id="rId16"/>
+    <p:sldId id="306" r:id="rId15"/>
+    <p:sldId id="288" r:id="rId16"/>
     <p:sldId id="291" r:id="rId17"/>
     <p:sldId id="290" r:id="rId18"/>
     <p:sldId id="260" r:id="rId19"/>
@@ -1407,7 +1407,7 @@
     </p:spTree>
     <p:extLst>
       <p:ext uri="{BB962C8B-B14F-4D97-AF65-F5344CB8AC3E}">
-        <p14:creationId xmlns:p14="http://schemas.microsoft.com/office/powerpoint/2010/main" val="3918203260"/>
+        <p14:creationId xmlns:p14="http://schemas.microsoft.com/office/powerpoint/2010/main" val="3023726169"/>
       </p:ext>
     </p:extLst>
   </p:cSld>
@@ -1570,7 +1570,7 @@
     </p:spTree>
     <p:extLst>
       <p:ext uri="{BB962C8B-B14F-4D97-AF65-F5344CB8AC3E}">
-        <p14:creationId xmlns:p14="http://schemas.microsoft.com/office/powerpoint/2010/main" val="3050129784"/>
+        <p14:creationId xmlns:p14="http://schemas.microsoft.com/office/powerpoint/2010/main" val="3918203260"/>
       </p:ext>
     </p:extLst>
   </p:cSld>
@@ -13087,6 +13087,9 @@
           <a:lstStyle/>
           <a:p>
             <a:pPr marL="0" indent="0">
+              <a:spcBef>
+                <a:spcPts val="0"/>
+              </a:spcBef>
               <a:buNone/>
             </a:pPr>
             <a:r>
@@ -13095,21 +13098,317 @@
                   <a:srgbClr val="0070C0"/>
                 </a:solidFill>
               </a:rPr>
+              <a:t>Wall w; </a:t>
+            </a:r>
+          </a:p>
+          <a:p>
+            <a:pPr marL="0" indent="0">
+              <a:spcBef>
+                <a:spcPts val="0"/>
+              </a:spcBef>
+              <a:buNone/>
+            </a:pPr>
+            <a:endParaRPr lang="sv-SE" sz="1500" dirty="0">
+              <a:solidFill>
+                <a:srgbClr val="0070C0"/>
+              </a:solidFill>
+            </a:endParaRPr>
+          </a:p>
+          <a:p>
+            <a:pPr marL="0" indent="0">
+              <a:spcBef>
+                <a:spcPts val="0"/>
+              </a:spcBef>
+              <a:buNone/>
+            </a:pPr>
+            <a:r>
+              <a:rPr lang="sv-SE" sz="1500" dirty="0">
+                <a:solidFill>
+                  <a:srgbClr val="0070C0"/>
+                </a:solidFill>
+              </a:rPr>
+              <a:t>@Before</a:t>
+            </a:r>
+          </a:p>
+          <a:p>
+            <a:pPr marL="0" indent="0">
+              <a:spcBef>
+                <a:spcPts val="0"/>
+              </a:spcBef>
+              <a:buNone/>
+            </a:pPr>
+            <a:r>
+              <a:rPr lang="sv-SE" sz="1500" dirty="0">
+                <a:solidFill>
+                  <a:srgbClr val="0070C0"/>
+                </a:solidFill>
+              </a:rPr>
+              <a:t>public </a:t>
+            </a:r>
+            <a:r>
+              <a:rPr lang="sv-SE" sz="1500" dirty="0" err="1">
+                <a:solidFill>
+                  <a:srgbClr val="0070C0"/>
+                </a:solidFill>
+              </a:rPr>
+              <a:t>void</a:t>
+            </a:r>
+            <a:r>
+              <a:rPr lang="sv-SE" sz="1500" dirty="0">
+                <a:solidFill>
+                  <a:srgbClr val="0070C0"/>
+                </a:solidFill>
+              </a:rPr>
+              <a:t> </a:t>
+            </a:r>
+            <a:r>
+              <a:rPr lang="sv-SE" sz="1500" dirty="0" err="1">
+                <a:solidFill>
+                  <a:srgbClr val="0070C0"/>
+                </a:solidFill>
+              </a:rPr>
+              <a:t>createWall</a:t>
+            </a:r>
+            <a:r>
+              <a:rPr lang="sv-SE" sz="1500" dirty="0">
+                <a:solidFill>
+                  <a:srgbClr val="0070C0"/>
+                </a:solidFill>
+              </a:rPr>
+              <a:t>() {</a:t>
+            </a:r>
+          </a:p>
+          <a:p>
+            <a:pPr marL="0" indent="0">
+              <a:spcBef>
+                <a:spcPts val="0"/>
+              </a:spcBef>
+              <a:buNone/>
+            </a:pPr>
+            <a:r>
+              <a:rPr lang="sv-SE" sz="1500" dirty="0">
+                <a:solidFill>
+                  <a:srgbClr val="0070C0"/>
+                </a:solidFill>
+              </a:rPr>
+              <a:t>        w = new Wall(</a:t>
+            </a:r>
+            <a:r>
+              <a:rPr lang="sv-SE" sz="1500" dirty="0" err="1">
+                <a:solidFill>
+                  <a:srgbClr val="0070C0"/>
+                </a:solidFill>
+              </a:rPr>
+              <a:t>Color.GRAY</a:t>
+            </a:r>
+            <a:r>
+              <a:rPr lang="sv-SE" sz="1500" dirty="0">
+                <a:solidFill>
+                  <a:srgbClr val="0070C0"/>
+                </a:solidFill>
+              </a:rPr>
+              <a:t>);</a:t>
+            </a:r>
+          </a:p>
+          <a:p>
+            <a:pPr marL="0" indent="0">
+              <a:spcBef>
+                <a:spcPts val="0"/>
+              </a:spcBef>
+              <a:buNone/>
+            </a:pPr>
+            <a:r>
+              <a:rPr lang="sv-SE" sz="1500" dirty="0">
+                <a:solidFill>
+                  <a:srgbClr val="0070C0"/>
+                </a:solidFill>
+              </a:rPr>
+              <a:t>}</a:t>
+            </a:r>
+          </a:p>
+          <a:p>
+            <a:pPr marL="0" indent="0">
+              <a:spcBef>
+                <a:spcPts val="0"/>
+              </a:spcBef>
+              <a:buNone/>
+            </a:pPr>
+            <a:endParaRPr lang="sv-SE" sz="1500" dirty="0">
+              <a:solidFill>
+                <a:srgbClr val="0070C0"/>
+              </a:solidFill>
+            </a:endParaRPr>
+          </a:p>
+          <a:p>
+            <a:pPr marL="0" indent="0">
+              <a:spcBef>
+                <a:spcPts val="0"/>
+              </a:spcBef>
+              <a:buNone/>
+            </a:pPr>
+            <a:r>
+              <a:rPr lang="sv-SE" sz="1500" dirty="0">
+                <a:solidFill>
+                  <a:srgbClr val="0070C0"/>
+                </a:solidFill>
+              </a:rPr>
               <a:t>@Test</a:t>
             </a:r>
-            <a:br>
+          </a:p>
+          <a:p>
+            <a:pPr marL="0" indent="0">
+              <a:spcBef>
+                <a:spcPts val="0"/>
+              </a:spcBef>
+              <a:buNone/>
+            </a:pPr>
+            <a:r>
               <a:rPr lang="sv-SE" sz="1500" dirty="0">
                 <a:solidFill>
                   <a:srgbClr val="0070C0"/>
                 </a:solidFill>
               </a:rPr>
-            </a:br>
+              <a:t>public </a:t>
+            </a:r>
+            <a:r>
+              <a:rPr lang="sv-SE" sz="1500" dirty="0" err="1">
+                <a:solidFill>
+                  <a:srgbClr val="0070C0"/>
+                </a:solidFill>
+              </a:rPr>
+              <a:t>void</a:t>
+            </a:r>
             <a:r>
               <a:rPr lang="sv-SE" sz="1500" dirty="0">
                 <a:solidFill>
                   <a:srgbClr val="0070C0"/>
                 </a:solidFill>
               </a:rPr>
+              <a:t> </a:t>
+            </a:r>
+            <a:r>
+              <a:rPr lang="sv-SE" sz="1500" dirty="0" err="1">
+                <a:solidFill>
+                  <a:srgbClr val="0070C0"/>
+                </a:solidFill>
+              </a:rPr>
+              <a:t>getSymbol_symbolIsX_true</a:t>
+            </a:r>
+            <a:r>
+              <a:rPr lang="sv-SE" sz="1500" dirty="0">
+                <a:solidFill>
+                  <a:srgbClr val="0070C0"/>
+                </a:solidFill>
+              </a:rPr>
+              <a:t>() {</a:t>
+            </a:r>
+          </a:p>
+          <a:p>
+            <a:pPr marL="0" indent="0">
+              <a:spcBef>
+                <a:spcPts val="0"/>
+              </a:spcBef>
+              <a:buNone/>
+            </a:pPr>
+            <a:r>
+              <a:rPr lang="sv-SE" sz="1500" dirty="0">
+                <a:solidFill>
+                  <a:srgbClr val="0070C0"/>
+                </a:solidFill>
+              </a:rPr>
+              <a:t>        </a:t>
+            </a:r>
+            <a:r>
+              <a:rPr lang="sv-SE" sz="1500" dirty="0" err="1">
+                <a:solidFill>
+                  <a:srgbClr val="0070C0"/>
+                </a:solidFill>
+              </a:rPr>
+              <a:t>assertEquals</a:t>
+            </a:r>
+            <a:r>
+              <a:rPr lang="sv-SE" sz="1500" dirty="0">
+                <a:solidFill>
+                  <a:srgbClr val="0070C0"/>
+                </a:solidFill>
+              </a:rPr>
+              <a:t>('X', </a:t>
+            </a:r>
+            <a:r>
+              <a:rPr lang="sv-SE" sz="1500" dirty="0" err="1">
+                <a:solidFill>
+                  <a:srgbClr val="0070C0"/>
+                </a:solidFill>
+              </a:rPr>
+              <a:t>w.getSymbol</a:t>
+            </a:r>
+            <a:r>
+              <a:rPr lang="sv-SE" sz="1500" dirty="0">
+                <a:solidFill>
+                  <a:srgbClr val="0070C0"/>
+                </a:solidFill>
+              </a:rPr>
+              <a:t>());</a:t>
+            </a:r>
+          </a:p>
+          <a:p>
+            <a:pPr marL="0" indent="0">
+              <a:spcBef>
+                <a:spcPts val="0"/>
+              </a:spcBef>
+              <a:buNone/>
+            </a:pPr>
+            <a:r>
+              <a:rPr lang="sv-SE" sz="1500" dirty="0">
+                <a:solidFill>
+                  <a:srgbClr val="0070C0"/>
+                </a:solidFill>
+              </a:rPr>
+              <a:t>}</a:t>
+            </a:r>
+          </a:p>
+          <a:p>
+            <a:pPr marL="0" indent="0">
+              <a:spcBef>
+                <a:spcPts val="0"/>
+              </a:spcBef>
+              <a:buNone/>
+            </a:pPr>
+            <a:endParaRPr lang="sv-SE" sz="1500" dirty="0">
+              <a:solidFill>
+                <a:srgbClr val="0070C0"/>
+              </a:solidFill>
+            </a:endParaRPr>
+          </a:p>
+          <a:p>
+            <a:pPr marL="0" indent="0">
+              <a:spcBef>
+                <a:spcPts val="0"/>
+              </a:spcBef>
+              <a:buNone/>
+            </a:pPr>
+            <a:r>
+              <a:rPr lang="sv-SE" sz="1500" dirty="0">
+                <a:solidFill>
+                  <a:srgbClr val="0070C0"/>
+                </a:solidFill>
+              </a:rPr>
+              <a:t>@Test</a:t>
+            </a:r>
+          </a:p>
+          <a:p>
+            <a:pPr marL="0" indent="0">
+              <a:spcBef>
+                <a:spcPts val="0"/>
+              </a:spcBef>
+              <a:buNone/>
+            </a:pPr>
+            <a:r>
+              <a:rPr lang="sv-SE" sz="1500" dirty="0">
+                <a:solidFill>
+                  <a:srgbClr val="0070C0"/>
+                </a:solidFill>
+              </a:rPr>
               <a:t>public </a:t>
             </a:r>
             <a:r>
@@ -13126,30 +13425,47 @@
                   <a:srgbClr val="0070C0"/>
                 </a:solidFill>
               </a:rPr>
-              <a:t> addItem_Empty5SlotInventory_true() {</a:t>
-            </a:r>
-            <a:br>
+              <a:t> </a:t>
+            </a:r>
+            <a:r>
+              <a:rPr lang="sv-SE" sz="1500" dirty="0" err="1">
+                <a:solidFill>
+                  <a:srgbClr val="0070C0"/>
+                </a:solidFill>
+              </a:rPr>
+              <a:t>getColor_colorIsGray_true</a:t>
+            </a:r>
+            <a:r>
               <a:rPr lang="sv-SE" sz="1500" dirty="0">
                 <a:solidFill>
                   <a:srgbClr val="0070C0"/>
                 </a:solidFill>
               </a:rPr>
-            </a:br>
+              <a:t>() {</a:t>
+            </a:r>
+          </a:p>
+          <a:p>
+            <a:pPr marL="0" indent="0">
+              <a:spcBef>
+                <a:spcPts val="0"/>
+              </a:spcBef>
+              <a:buNone/>
+            </a:pPr>
             <a:r>
               <a:rPr lang="sv-SE" sz="1500" dirty="0">
                 <a:solidFill>
                   <a:srgbClr val="0070C0"/>
                 </a:solidFill>
               </a:rPr>
-              <a:t>    </a:t>
-            </a:r>
-            <a:r>
-              <a:rPr lang="sv-SE" sz="1500" i="1" dirty="0" err="1">
-                <a:solidFill>
-                  <a:srgbClr val="0070C0"/>
-                </a:solidFill>
-              </a:rPr>
-              <a:t>assertTrue</a:t>
+              <a:t>        </a:t>
+            </a:r>
+            <a:r>
+              <a:rPr lang="sv-SE" sz="1500" dirty="0" err="1">
+                <a:solidFill>
+                  <a:srgbClr val="0070C0"/>
+                </a:solidFill>
+              </a:rPr>
+              <a:t>assertEquals</a:t>
             </a:r>
             <a:r>
               <a:rPr lang="sv-SE" sz="1500" dirty="0">
@@ -13165,7 +13481,7 @@
                   <a:srgbClr val="0070C0"/>
                 </a:solidFill>
               </a:rPr>
-              <a:t>inventory.addItem</a:t>
+              <a:t>Color.GRAY</a:t>
             </a:r>
             <a:r>
               <a:rPr lang="sv-SE" sz="1500" dirty="0">
@@ -13173,7 +13489,7 @@
                   <a:srgbClr val="0070C0"/>
                 </a:solidFill>
               </a:rPr>
-              <a:t>(new </a:t>
+              <a:t>, </a:t>
             </a:r>
             <a:r>
               <a:rPr lang="sv-SE" sz="1500" dirty="0" err="1">
@@ -13181,7 +13497,7 @@
                   <a:srgbClr val="0070C0"/>
                 </a:solidFill>
               </a:rPr>
-              <a:t>Armor</a:t>
+              <a:t>w.getColor</a:t>
             </a:r>
             <a:r>
               <a:rPr lang="sv-SE" sz="1500" dirty="0">
@@ -13189,271 +13505,16 @@
                   <a:srgbClr val="0070C0"/>
                 </a:solidFill>
               </a:rPr>
-              <a:t>(20)));</a:t>
-            </a:r>
-            <a:br>
-              <a:rPr lang="sv-SE" sz="1500" dirty="0">
-                <a:solidFill>
-                  <a:srgbClr val="0070C0"/>
-                </a:solidFill>
-              </a:rPr>
-            </a:br>
-            <a:r>
-              <a:rPr lang="sv-SE" sz="1500" dirty="0">
-                <a:solidFill>
-                  <a:srgbClr val="0070C0"/>
-                </a:solidFill>
-              </a:rPr>
-              <a:t>}</a:t>
-            </a:r>
-            <a:br>
-              <a:rPr lang="sv-SE" sz="1500" dirty="0">
-                <a:solidFill>
-                  <a:srgbClr val="0070C0"/>
-                </a:solidFill>
-              </a:rPr>
-            </a:br>
-            <a:br>
-              <a:rPr lang="sv-SE" sz="1500" dirty="0">
-                <a:solidFill>
-                  <a:srgbClr val="0070C0"/>
-                </a:solidFill>
-              </a:rPr>
-            </a:br>
-            <a:r>
-              <a:rPr lang="sv-SE" sz="1500" dirty="0">
-                <a:solidFill>
-                  <a:srgbClr val="0070C0"/>
-                </a:solidFill>
-              </a:rPr>
-              <a:t>@Test</a:t>
-            </a:r>
-            <a:br>
-              <a:rPr lang="sv-SE" sz="1500" dirty="0">
-                <a:solidFill>
-                  <a:srgbClr val="0070C0"/>
-                </a:solidFill>
-              </a:rPr>
-            </a:br>
-            <a:r>
-              <a:rPr lang="sv-SE" sz="1500" dirty="0">
-                <a:solidFill>
-                  <a:srgbClr val="0070C0"/>
-                </a:solidFill>
-              </a:rPr>
-              <a:t>public </a:t>
-            </a:r>
-            <a:r>
-              <a:rPr lang="sv-SE" sz="1500" dirty="0" err="1">
-                <a:solidFill>
-                  <a:srgbClr val="0070C0"/>
-                </a:solidFill>
-              </a:rPr>
-              <a:t>void</a:t>
-            </a:r>
-            <a:r>
-              <a:rPr lang="sv-SE" sz="1500" dirty="0">
-                <a:solidFill>
-                  <a:srgbClr val="0070C0"/>
-                </a:solidFill>
-              </a:rPr>
-              <a:t> addItem_Full5SlotInventory_false() {</a:t>
-            </a:r>
-            <a:br>
-              <a:rPr lang="sv-SE" sz="1500" dirty="0">
-                <a:solidFill>
-                  <a:srgbClr val="0070C0"/>
-                </a:solidFill>
-              </a:rPr>
-            </a:br>
-            <a:r>
-              <a:rPr lang="sv-SE" sz="1500" dirty="0">
-                <a:solidFill>
-                  <a:srgbClr val="0070C0"/>
-                </a:solidFill>
-              </a:rPr>
-              <a:t>    for (</a:t>
-            </a:r>
-            <a:r>
-              <a:rPr lang="sv-SE" sz="1500" dirty="0" err="1">
-                <a:solidFill>
-                  <a:srgbClr val="0070C0"/>
-                </a:solidFill>
-              </a:rPr>
-              <a:t>int</a:t>
-            </a:r>
-            <a:r>
-              <a:rPr lang="sv-SE" sz="1500" dirty="0">
-                <a:solidFill>
-                  <a:srgbClr val="0070C0"/>
-                </a:solidFill>
-              </a:rPr>
-              <a:t> i = 0; i &lt; </a:t>
-            </a:r>
-            <a:r>
-              <a:rPr lang="sv-SE" sz="1500" dirty="0" err="1">
-                <a:solidFill>
-                  <a:srgbClr val="0070C0"/>
-                </a:solidFill>
-              </a:rPr>
-              <a:t>inventory.getInventoryArray</a:t>
-            </a:r>
-            <a:r>
-              <a:rPr lang="sv-SE" sz="1500" dirty="0">
-                <a:solidFill>
-                  <a:srgbClr val="0070C0"/>
-                </a:solidFill>
-              </a:rPr>
-              <a:t>().</a:t>
-            </a:r>
-            <a:r>
-              <a:rPr lang="sv-SE" sz="1500" dirty="0" err="1">
-                <a:solidFill>
-                  <a:srgbClr val="0070C0"/>
-                </a:solidFill>
-              </a:rPr>
-              <a:t>length</a:t>
-            </a:r>
-            <a:r>
-              <a:rPr lang="sv-SE" sz="1500" dirty="0">
-                <a:solidFill>
-                  <a:srgbClr val="0070C0"/>
-                </a:solidFill>
-              </a:rPr>
-              <a:t>; i++) {</a:t>
-            </a:r>
-            <a:br>
-              <a:rPr lang="sv-SE" sz="1500" dirty="0">
-                <a:solidFill>
-                  <a:srgbClr val="0070C0"/>
-                </a:solidFill>
-              </a:rPr>
-            </a:br>
-            <a:r>
-              <a:rPr lang="sv-SE" sz="1500" dirty="0">
-                <a:solidFill>
-                  <a:srgbClr val="0070C0"/>
-                </a:solidFill>
-              </a:rPr>
-              <a:t>        </a:t>
-            </a:r>
-            <a:r>
-              <a:rPr lang="sv-SE" sz="1500" dirty="0" err="1">
-                <a:solidFill>
-                  <a:srgbClr val="0070C0"/>
-                </a:solidFill>
-              </a:rPr>
-              <a:t>inventory.addItem</a:t>
-            </a:r>
-            <a:r>
-              <a:rPr lang="sv-SE" sz="1500" dirty="0">
-                <a:solidFill>
-                  <a:srgbClr val="0070C0"/>
-                </a:solidFill>
-              </a:rPr>
-              <a:t>(new </a:t>
-            </a:r>
-            <a:r>
-              <a:rPr lang="sv-SE" sz="1500" dirty="0" err="1">
-                <a:solidFill>
-                  <a:srgbClr val="0070C0"/>
-                </a:solidFill>
-              </a:rPr>
-              <a:t>Armor</a:t>
-            </a:r>
-            <a:r>
-              <a:rPr lang="sv-SE" sz="1500" dirty="0">
-                <a:solidFill>
-                  <a:srgbClr val="0070C0"/>
-                </a:solidFill>
-              </a:rPr>
-              <a:t>(1));</a:t>
-            </a:r>
-            <a:br>
-              <a:rPr lang="sv-SE" sz="1500" dirty="0">
-                <a:solidFill>
-                  <a:srgbClr val="0070C0"/>
-                </a:solidFill>
-              </a:rPr>
-            </a:br>
-            <a:r>
-              <a:rPr lang="sv-SE" sz="1500" dirty="0">
-                <a:solidFill>
-                  <a:srgbClr val="0070C0"/>
-                </a:solidFill>
-              </a:rPr>
-              <a:t>    }</a:t>
-            </a:r>
-            <a:br>
-              <a:rPr lang="sv-SE" sz="1500" dirty="0">
-                <a:solidFill>
-                  <a:srgbClr val="0070C0"/>
-                </a:solidFill>
-              </a:rPr>
-            </a:br>
-            <a:r>
-              <a:rPr lang="sv-SE" sz="1500" dirty="0">
-                <a:solidFill>
-                  <a:srgbClr val="0070C0"/>
-                </a:solidFill>
-              </a:rPr>
-              <a:t>    </a:t>
-            </a:r>
-            <a:r>
-              <a:rPr lang="sv-SE" sz="1500" i="1" dirty="0" err="1">
-                <a:solidFill>
-                  <a:srgbClr val="0070C0"/>
-                </a:solidFill>
-              </a:rPr>
-              <a:t>assertFalse</a:t>
-            </a:r>
-            <a:r>
-              <a:rPr lang="sv-SE" sz="1500" dirty="0">
-                <a:solidFill>
-                  <a:srgbClr val="0070C0"/>
-                </a:solidFill>
-              </a:rPr>
-              <a:t>(</a:t>
-            </a:r>
-            <a:r>
-              <a:rPr lang="sv-SE" sz="1500" dirty="0" err="1">
-                <a:solidFill>
-                  <a:srgbClr val="0070C0"/>
-                </a:solidFill>
-              </a:rPr>
-              <a:t>inventory.addItem</a:t>
-            </a:r>
-            <a:r>
-              <a:rPr lang="sv-SE" sz="1500" dirty="0">
-                <a:solidFill>
-                  <a:srgbClr val="0070C0"/>
-                </a:solidFill>
-              </a:rPr>
-              <a:t>(new </a:t>
-            </a:r>
-            <a:r>
-              <a:rPr lang="sv-SE" sz="1500" dirty="0" err="1">
-                <a:solidFill>
-                  <a:srgbClr val="0070C0"/>
-                </a:solidFill>
-              </a:rPr>
-              <a:t>Weapon</a:t>
-            </a:r>
-            <a:r>
-              <a:rPr lang="sv-SE" sz="1500" dirty="0">
-                <a:solidFill>
-                  <a:srgbClr val="0070C0"/>
-                </a:solidFill>
-              </a:rPr>
-              <a:t>(10)));</a:t>
-            </a:r>
-            <a:br>
-              <a:rPr lang="sv-SE" sz="1500" dirty="0">
-                <a:solidFill>
-                  <a:srgbClr val="0070C0"/>
-                </a:solidFill>
-              </a:rPr>
-            </a:br>
+              <a:t>());</a:t>
+            </a:r>
+          </a:p>
+          <a:p>
+            <a:pPr marL="0" indent="0">
+              <a:spcBef>
+                <a:spcPts val="0"/>
+              </a:spcBef>
+              <a:buNone/>
+            </a:pPr>
             <a:r>
               <a:rPr lang="sv-SE" sz="1500" dirty="0">
                 <a:solidFill>
@@ -13505,328 +13566,114 @@
           <a:lstStyle/>
           <a:p>
             <a:pPr marL="0" indent="0">
+              <a:spcBef>
+                <a:spcPts val="0"/>
+              </a:spcBef>
               <a:buNone/>
             </a:pPr>
             <a:r>
-              <a:rPr lang="sv-SE" sz="1500" dirty="0">
-                <a:solidFill>
-                  <a:srgbClr val="0070C0"/>
-                </a:solidFill>
-              </a:rPr>
-              <a:t>public </a:t>
-            </a:r>
-            <a:r>
-              <a:rPr lang="sv-SE" sz="1500" dirty="0" err="1">
-                <a:solidFill>
-                  <a:srgbClr val="0070C0"/>
-                </a:solidFill>
-              </a:rPr>
-              <a:t>boolean</a:t>
-            </a:r>
-            <a:r>
-              <a:rPr lang="sv-SE" sz="1500" dirty="0">
-                <a:solidFill>
-                  <a:srgbClr val="0070C0"/>
-                </a:solidFill>
-              </a:rPr>
-              <a:t> </a:t>
-            </a:r>
-            <a:r>
-              <a:rPr lang="sv-SE" sz="1500" dirty="0" err="1">
-                <a:solidFill>
-                  <a:srgbClr val="0070C0"/>
-                </a:solidFill>
-              </a:rPr>
-              <a:t>addItem</a:t>
-            </a:r>
-            <a:r>
-              <a:rPr lang="sv-SE" sz="1500" dirty="0">
-                <a:solidFill>
-                  <a:srgbClr val="0070C0"/>
-                </a:solidFill>
-              </a:rPr>
-              <a:t>(Equipment item) {</a:t>
-            </a:r>
-            <a:br>
-              <a:rPr lang="sv-SE" sz="1500" dirty="0">
-                <a:solidFill>
-                  <a:srgbClr val="0070C0"/>
-                </a:solidFill>
-              </a:rPr>
-            </a:br>
-            <a:r>
-              <a:rPr lang="sv-SE" sz="1500" dirty="0">
-                <a:solidFill>
-                  <a:srgbClr val="0070C0"/>
-                </a:solidFill>
-              </a:rPr>
-              <a:t>    for (</a:t>
-            </a:r>
-            <a:r>
-              <a:rPr lang="sv-SE" sz="1500" dirty="0" err="1">
-                <a:solidFill>
-                  <a:srgbClr val="0070C0"/>
-                </a:solidFill>
-              </a:rPr>
-              <a:t>int</a:t>
-            </a:r>
-            <a:r>
-              <a:rPr lang="sv-SE" sz="1500" dirty="0">
-                <a:solidFill>
-                  <a:srgbClr val="0070C0"/>
-                </a:solidFill>
-              </a:rPr>
-              <a:t> i = 0; i &lt; </a:t>
-            </a:r>
-            <a:r>
-              <a:rPr lang="sv-SE" sz="1500" dirty="0" err="1">
-                <a:solidFill>
-                  <a:srgbClr val="0070C0"/>
-                </a:solidFill>
-              </a:rPr>
-              <a:t>inventoryArray.length</a:t>
-            </a:r>
-            <a:r>
-              <a:rPr lang="sv-SE" sz="1500" dirty="0">
-                <a:solidFill>
-                  <a:srgbClr val="0070C0"/>
-                </a:solidFill>
-              </a:rPr>
-              <a:t>; i++) {</a:t>
-            </a:r>
-            <a:br>
-              <a:rPr lang="sv-SE" sz="1500" dirty="0">
-                <a:solidFill>
-                  <a:srgbClr val="0070C0"/>
-                </a:solidFill>
-              </a:rPr>
-            </a:br>
-            <a:r>
-              <a:rPr lang="sv-SE" sz="1500" dirty="0">
-                <a:solidFill>
-                  <a:srgbClr val="0070C0"/>
-                </a:solidFill>
-              </a:rPr>
-              <a:t>        </a:t>
-            </a:r>
-            <a:r>
-              <a:rPr lang="sv-SE" sz="1500" dirty="0" err="1">
-                <a:solidFill>
-                  <a:srgbClr val="0070C0"/>
-                </a:solidFill>
-              </a:rPr>
-              <a:t>if</a:t>
-            </a:r>
-            <a:r>
-              <a:rPr lang="sv-SE" sz="1500" dirty="0">
-                <a:solidFill>
-                  <a:srgbClr val="0070C0"/>
-                </a:solidFill>
-              </a:rPr>
-              <a:t> (</a:t>
-            </a:r>
-            <a:r>
-              <a:rPr lang="sv-SE" sz="1500" dirty="0" err="1">
-                <a:solidFill>
-                  <a:srgbClr val="0070C0"/>
-                </a:solidFill>
-              </a:rPr>
-              <a:t>inventoryArray</a:t>
-            </a:r>
-            <a:r>
-              <a:rPr lang="sv-SE" sz="1500" dirty="0">
-                <a:solidFill>
-                  <a:srgbClr val="0070C0"/>
-                </a:solidFill>
-              </a:rPr>
-              <a:t>[i] == </a:t>
-            </a:r>
-            <a:r>
-              <a:rPr lang="sv-SE" sz="1500" dirty="0" err="1">
-                <a:solidFill>
-                  <a:srgbClr val="0070C0"/>
-                </a:solidFill>
-              </a:rPr>
-              <a:t>null</a:t>
-            </a:r>
-            <a:r>
-              <a:rPr lang="sv-SE" sz="1500" dirty="0">
-                <a:solidFill>
-                  <a:srgbClr val="0070C0"/>
-                </a:solidFill>
-              </a:rPr>
-              <a:t>) {</a:t>
-            </a:r>
-            <a:br>
-              <a:rPr lang="sv-SE" sz="1500" dirty="0">
-                <a:solidFill>
-                  <a:srgbClr val="0070C0"/>
-                </a:solidFill>
-              </a:rPr>
-            </a:br>
-            <a:r>
-              <a:rPr lang="sv-SE" sz="1500" dirty="0">
-                <a:solidFill>
-                  <a:srgbClr val="0070C0"/>
-                </a:solidFill>
-              </a:rPr>
-              <a:t>            </a:t>
-            </a:r>
-            <a:r>
-              <a:rPr lang="sv-SE" sz="1500" dirty="0" err="1">
-                <a:solidFill>
-                  <a:srgbClr val="0070C0"/>
-                </a:solidFill>
-              </a:rPr>
-              <a:t>inventoryArray</a:t>
-            </a:r>
-            <a:r>
-              <a:rPr lang="sv-SE" sz="1500" dirty="0">
-                <a:solidFill>
-                  <a:srgbClr val="0070C0"/>
-                </a:solidFill>
-              </a:rPr>
-              <a:t>[i] = item;</a:t>
-            </a:r>
-            <a:br>
-              <a:rPr lang="sv-SE" sz="1500" dirty="0">
-                <a:solidFill>
-                  <a:srgbClr val="0070C0"/>
-                </a:solidFill>
-              </a:rPr>
-            </a:br>
-            <a:r>
-              <a:rPr lang="sv-SE" sz="1500" dirty="0">
-                <a:solidFill>
-                  <a:srgbClr val="0070C0"/>
-                </a:solidFill>
-              </a:rPr>
-              <a:t>            </a:t>
-            </a:r>
-            <a:r>
-              <a:rPr lang="sv-SE" sz="1500" dirty="0" err="1">
-                <a:solidFill>
-                  <a:srgbClr val="0070C0"/>
-                </a:solidFill>
-              </a:rPr>
-              <a:t>return</a:t>
-            </a:r>
-            <a:r>
-              <a:rPr lang="sv-SE" sz="1500" dirty="0">
-                <a:solidFill>
-                  <a:srgbClr val="0070C0"/>
-                </a:solidFill>
-              </a:rPr>
-              <a:t> </a:t>
-            </a:r>
-            <a:r>
-              <a:rPr lang="sv-SE" sz="1500" dirty="0" err="1">
-                <a:solidFill>
-                  <a:srgbClr val="0070C0"/>
-                </a:solidFill>
-              </a:rPr>
-              <a:t>true</a:t>
-            </a:r>
-            <a:r>
-              <a:rPr lang="sv-SE" sz="1500" dirty="0">
-                <a:solidFill>
-                  <a:srgbClr val="0070C0"/>
-                </a:solidFill>
-              </a:rPr>
-              <a:t>;</a:t>
-            </a:r>
-            <a:br>
-              <a:rPr lang="sv-SE" sz="1500" dirty="0">
-                <a:solidFill>
-                  <a:srgbClr val="0070C0"/>
-                </a:solidFill>
-              </a:rPr>
-            </a:br>
-            <a:r>
-              <a:rPr lang="sv-SE" sz="1500" dirty="0">
-                <a:solidFill>
-                  <a:srgbClr val="0070C0"/>
-                </a:solidFill>
-              </a:rPr>
-              <a:t>        }</a:t>
-            </a:r>
-            <a:br>
-              <a:rPr lang="sv-SE" sz="1500" dirty="0">
-                <a:solidFill>
-                  <a:srgbClr val="0070C0"/>
-                </a:solidFill>
-              </a:rPr>
-            </a:br>
-            <a:r>
-              <a:rPr lang="sv-SE" sz="1500" dirty="0">
+              <a:rPr lang="en-US" sz="1800" dirty="0">
+                <a:solidFill>
+                  <a:srgbClr val="0070C0"/>
+                </a:solidFill>
+              </a:rPr>
+              <a:t>public class Wall extends Stationary {</a:t>
+            </a:r>
+          </a:p>
+          <a:p>
+            <a:pPr marL="0" indent="0">
+              <a:spcBef>
+                <a:spcPts val="0"/>
+              </a:spcBef>
+              <a:buNone/>
+            </a:pPr>
+            <a:endParaRPr lang="en-US" sz="1800" dirty="0">
+              <a:solidFill>
+                <a:srgbClr val="0070C0"/>
+              </a:solidFill>
+            </a:endParaRPr>
+          </a:p>
+          <a:p>
+            <a:pPr marL="0" indent="0">
+              <a:spcBef>
+                <a:spcPts val="0"/>
+              </a:spcBef>
+              <a:buNone/>
+            </a:pPr>
+            <a:r>
+              <a:rPr lang="en-US" sz="1800" dirty="0">
+                <a:solidFill>
+                  <a:srgbClr val="0070C0"/>
+                </a:solidFill>
+              </a:rPr>
+              <a:t>    public Wall(Color color) {</a:t>
+            </a:r>
+          </a:p>
+          <a:p>
+            <a:pPr marL="0" indent="0">
+              <a:spcBef>
+                <a:spcPts val="0"/>
+              </a:spcBef>
+              <a:buNone/>
+            </a:pPr>
+            <a:r>
+              <a:rPr lang="en-US" sz="1800" dirty="0">
+                <a:solidFill>
+                  <a:srgbClr val="0070C0"/>
+                </a:solidFill>
+              </a:rPr>
+              <a:t>        super('X', color);</a:t>
+            </a:r>
+          </a:p>
+          <a:p>
+            <a:pPr marL="0" indent="0">
+              <a:spcBef>
+                <a:spcPts val="0"/>
+              </a:spcBef>
+              <a:buNone/>
+            </a:pPr>
+            <a:r>
+              <a:rPr lang="en-US" sz="1800" dirty="0">
                 <a:solidFill>
                   <a:srgbClr val="0070C0"/>
                 </a:solidFill>
               </a:rPr>
               <a:t>    }</a:t>
             </a:r>
-            <a:br>
-              <a:rPr lang="sv-SE" sz="1500" dirty="0">
-                <a:solidFill>
-                  <a:srgbClr val="0070C0"/>
-                </a:solidFill>
-              </a:rPr>
-            </a:br>
-            <a:r>
-              <a:rPr lang="sv-SE" sz="1500" dirty="0">
-                <a:solidFill>
-                  <a:srgbClr val="0070C0"/>
-                </a:solidFill>
-              </a:rPr>
-              <a:t>    </a:t>
-            </a:r>
-            <a:r>
-              <a:rPr lang="sv-SE" sz="1500" dirty="0" err="1">
-                <a:solidFill>
-                  <a:srgbClr val="0070C0"/>
-                </a:solidFill>
-              </a:rPr>
-              <a:t>return</a:t>
-            </a:r>
-            <a:r>
-              <a:rPr lang="sv-SE" sz="1500" dirty="0">
-                <a:solidFill>
-                  <a:srgbClr val="0070C0"/>
-                </a:solidFill>
-              </a:rPr>
-              <a:t> </a:t>
-            </a:r>
-            <a:r>
-              <a:rPr lang="sv-SE" sz="1500" dirty="0" err="1">
-                <a:solidFill>
-                  <a:srgbClr val="0070C0"/>
-                </a:solidFill>
-              </a:rPr>
-              <a:t>false</a:t>
-            </a:r>
-            <a:r>
-              <a:rPr lang="sv-SE" sz="1500" dirty="0">
-                <a:solidFill>
-                  <a:srgbClr val="0070C0"/>
-                </a:solidFill>
-              </a:rPr>
-              <a:t>;</a:t>
-            </a:r>
-            <a:br>
-              <a:rPr lang="sv-SE" sz="1500" dirty="0">
-                <a:solidFill>
-                  <a:srgbClr val="0070C0"/>
-                </a:solidFill>
-              </a:rPr>
-            </a:br>
-            <a:r>
-              <a:rPr lang="sv-SE" sz="1500" dirty="0">
+          </a:p>
+          <a:p>
+            <a:pPr marL="0" indent="0">
+              <a:spcBef>
+                <a:spcPts val="0"/>
+              </a:spcBef>
+              <a:buNone/>
+            </a:pPr>
+            <a:endParaRPr lang="en-US" sz="1800" dirty="0">
+              <a:solidFill>
+                <a:srgbClr val="0070C0"/>
+              </a:solidFill>
+            </a:endParaRPr>
+          </a:p>
+          <a:p>
+            <a:pPr marL="0" indent="0">
+              <a:spcBef>
+                <a:spcPts val="0"/>
+              </a:spcBef>
+              <a:buNone/>
+            </a:pPr>
+            <a:r>
+              <a:rPr lang="en-US" sz="1800" dirty="0">
                 <a:solidFill>
                   <a:srgbClr val="0070C0"/>
                 </a:solidFill>
               </a:rPr>
               <a:t>}</a:t>
             </a:r>
+            <a:endParaRPr lang="sv-SE" sz="1800" dirty="0">
+              <a:solidFill>
+                <a:srgbClr val="0070C0"/>
+              </a:solidFill>
+            </a:endParaRPr>
           </a:p>
         </p:txBody>
       </p:sp>
@@ -13836,7 +13683,7 @@
     </p:custDataLst>
     <p:extLst>
       <p:ext uri="{BB962C8B-B14F-4D97-AF65-F5344CB8AC3E}">
-        <p14:creationId xmlns:p14="http://schemas.microsoft.com/office/powerpoint/2010/main" val="1013014165"/>
+        <p14:creationId xmlns:p14="http://schemas.microsoft.com/office/powerpoint/2010/main" val="2036554503"/>
       </p:ext>
     </p:extLst>
   </p:cSld>
@@ -13895,12 +13742,7 @@
             <p:ph type="body" idx="1"/>
           </p:nvPr>
         </p:nvSpPr>
-        <p:spPr>
-          <a:xfrm>
-            <a:off x="382772" y="1227348"/>
-            <a:ext cx="5614803" cy="823912"/>
-          </a:xfrm>
-        </p:spPr>
+        <p:spPr/>
         <p:txBody>
           <a:bodyPr/>
           <a:lstStyle/>
@@ -13923,15 +13765,10 @@
             <p:ph sz="half" idx="2"/>
           </p:nvPr>
         </p:nvSpPr>
-        <p:spPr>
-          <a:xfrm>
-            <a:off x="304800" y="2101893"/>
-            <a:ext cx="5864224" cy="3684588"/>
-          </a:xfrm>
-        </p:spPr>
+        <p:spPr/>
         <p:txBody>
           <a:bodyPr>
-            <a:noAutofit/>
+            <a:normAutofit/>
           </a:bodyPr>
           <a:lstStyle/>
           <a:p>
@@ -13939,245 +13776,432 @@
               <a:buNone/>
             </a:pPr>
             <a:r>
-              <a:rPr lang="sv-SE" sz="1400" dirty="0">
-                <a:solidFill>
-                  <a:schemeClr val="accent1">
-                    <a:lumMod val="75000"/>
-                  </a:schemeClr>
-                </a:solidFill>
-              </a:rPr>
-              <a:t>@Test </a:t>
+              <a:rPr lang="sv-SE" sz="1500" dirty="0">
+                <a:solidFill>
+                  <a:srgbClr val="0070C0"/>
+                </a:solidFill>
+              </a:rPr>
+              <a:t>@Test</a:t>
             </a:r>
             <a:br>
-              <a:rPr lang="sv-SE" sz="1400" dirty="0">
-                <a:solidFill>
-                  <a:schemeClr val="accent1">
-                    <a:lumMod val="75000"/>
-                  </a:schemeClr>
+              <a:rPr lang="sv-SE" sz="1500" dirty="0">
+                <a:solidFill>
+                  <a:srgbClr val="0070C0"/>
                 </a:solidFill>
               </a:rPr>
             </a:br>
             <a:r>
-              <a:rPr lang="sv-SE" sz="1400" dirty="0">
-                <a:solidFill>
-                  <a:schemeClr val="accent1">
-                    <a:lumMod val="75000"/>
-                  </a:schemeClr>
+              <a:rPr lang="sv-SE" sz="1500" dirty="0">
+                <a:solidFill>
+                  <a:srgbClr val="0070C0"/>
                 </a:solidFill>
               </a:rPr>
               <a:t>public </a:t>
             </a:r>
             <a:r>
-              <a:rPr lang="sv-SE" sz="1400" dirty="0" err="1">
-                <a:solidFill>
-                  <a:schemeClr val="accent1">
-                    <a:lumMod val="75000"/>
-                  </a:schemeClr>
+              <a:rPr lang="sv-SE" sz="1500" dirty="0" err="1">
+                <a:solidFill>
+                  <a:srgbClr val="0070C0"/>
                 </a:solidFill>
               </a:rPr>
               <a:t>void</a:t>
             </a:r>
             <a:r>
-              <a:rPr lang="sv-SE" sz="1400" dirty="0">
-                <a:solidFill>
-                  <a:schemeClr val="accent1">
-                    <a:lumMod val="75000"/>
-                  </a:schemeClr>
-                </a:solidFill>
-              </a:rPr>
-              <a:t> </a:t>
-            </a:r>
-            <a:r>
-              <a:rPr lang="sv-SE" sz="1400" dirty="0" err="1">
-                <a:solidFill>
-                  <a:schemeClr val="accent1">
-                    <a:lumMod val="75000"/>
-                  </a:schemeClr>
-                </a:solidFill>
-              </a:rPr>
-              <a:t>moveCreatures_OneCreatureOnEmptyMap_CreatureHasMoved</a:t>
-            </a:r>
-            <a:r>
-              <a:rPr lang="sv-SE" sz="1400" dirty="0">
-                <a:solidFill>
-                  <a:schemeClr val="accent1">
-                    <a:lumMod val="75000"/>
-                  </a:schemeClr>
-                </a:solidFill>
-              </a:rPr>
-              <a:t>() { </a:t>
+              <a:rPr lang="sv-SE" sz="1500" dirty="0">
+                <a:solidFill>
+                  <a:srgbClr val="0070C0"/>
+                </a:solidFill>
+              </a:rPr>
+              <a:t> addItem_Empty5SlotInventory_true() {</a:t>
             </a:r>
             <a:br>
-              <a:rPr lang="sv-SE" sz="1400" dirty="0">
-                <a:solidFill>
-                  <a:schemeClr val="accent1">
-                    <a:lumMod val="75000"/>
-                  </a:schemeClr>
+              <a:rPr lang="sv-SE" sz="1500" dirty="0">
+                <a:solidFill>
+                  <a:srgbClr val="0070C0"/>
                 </a:solidFill>
               </a:rPr>
             </a:br>
             <a:r>
-              <a:rPr lang="sv-SE" sz="1400" dirty="0">
-                <a:solidFill>
-                  <a:schemeClr val="accent1">
-                    <a:lumMod val="75000"/>
-                  </a:schemeClr>
-                </a:solidFill>
-              </a:rPr>
-              <a:t>    Monster monster = new Monster(10, 1);</a:t>
+              <a:rPr lang="sv-SE" sz="1500" dirty="0">
+                <a:solidFill>
+                  <a:srgbClr val="0070C0"/>
+                </a:solidFill>
+              </a:rPr>
+              <a:t>    </a:t>
+            </a:r>
+            <a:r>
+              <a:rPr lang="sv-SE" sz="1500" i="1" dirty="0" err="1">
+                <a:solidFill>
+                  <a:srgbClr val="0070C0"/>
+                </a:solidFill>
+              </a:rPr>
+              <a:t>assertTrue</a:t>
+            </a:r>
+            <a:r>
+              <a:rPr lang="sv-SE" sz="1500" dirty="0">
+                <a:solidFill>
+                  <a:srgbClr val="0070C0"/>
+                </a:solidFill>
+              </a:rPr>
+              <a:t>(</a:t>
+            </a:r>
+            <a:r>
+              <a:rPr lang="sv-SE" sz="1500" dirty="0" err="1">
+                <a:solidFill>
+                  <a:srgbClr val="0070C0"/>
+                </a:solidFill>
+              </a:rPr>
+              <a:t>inventory.addItem</a:t>
+            </a:r>
+            <a:r>
+              <a:rPr lang="sv-SE" sz="1500" dirty="0">
+                <a:solidFill>
+                  <a:srgbClr val="0070C0"/>
+                </a:solidFill>
+              </a:rPr>
+              <a:t>(new </a:t>
+            </a:r>
+            <a:r>
+              <a:rPr lang="sv-SE" sz="1500" dirty="0" err="1">
+                <a:solidFill>
+                  <a:srgbClr val="0070C0"/>
+                </a:solidFill>
+              </a:rPr>
+              <a:t>Armor</a:t>
+            </a:r>
+            <a:r>
+              <a:rPr lang="sv-SE" sz="1500" dirty="0">
+                <a:solidFill>
+                  <a:srgbClr val="0070C0"/>
+                </a:solidFill>
+              </a:rPr>
+              <a:t>(20)));</a:t>
+            </a:r>
+          </a:p>
+          <a:p>
+            <a:pPr marL="0" indent="0">
+              <a:spcBef>
+                <a:spcPts val="0"/>
+              </a:spcBef>
+              <a:buNone/>
+            </a:pPr>
+            <a:r>
+              <a:rPr lang="en-US" sz="1500" dirty="0">
+                <a:solidFill>
+                  <a:schemeClr val="accent1">
+                    <a:lumMod val="75000"/>
+                  </a:schemeClr>
+                </a:solidFill>
+              </a:rPr>
+              <a:t>    </a:t>
+            </a:r>
+            <a:r>
+              <a:rPr lang="en-US" sz="1500" dirty="0" err="1">
+                <a:solidFill>
+                  <a:schemeClr val="accent1">
+                    <a:lumMod val="75000"/>
+                  </a:schemeClr>
+                </a:solidFill>
+              </a:rPr>
+              <a:t>assertNotEquals</a:t>
+            </a:r>
+            <a:r>
+              <a:rPr lang="en-US" sz="1500" dirty="0">
+                <a:solidFill>
+                  <a:schemeClr val="accent1">
+                    <a:lumMod val="75000"/>
+                  </a:schemeClr>
+                </a:solidFill>
+              </a:rPr>
+              <a:t>(null, </a:t>
+            </a:r>
+            <a:r>
+              <a:rPr lang="en-US" sz="1500" dirty="0" err="1">
+                <a:solidFill>
+                  <a:schemeClr val="accent1">
+                    <a:lumMod val="75000"/>
+                  </a:schemeClr>
+                </a:solidFill>
+              </a:rPr>
+              <a:t>inventory.getInventoryArray</a:t>
+            </a:r>
+            <a:r>
+              <a:rPr lang="en-US" sz="1500" dirty="0">
+                <a:solidFill>
+                  <a:schemeClr val="accent1">
+                    <a:lumMod val="75000"/>
+                  </a:schemeClr>
+                </a:solidFill>
+              </a:rPr>
+              <a:t>()[0]);</a:t>
             </a:r>
             <a:br>
-              <a:rPr lang="sv-SE" sz="1400" dirty="0">
-                <a:solidFill>
-                  <a:schemeClr val="accent1">
-                    <a:lumMod val="75000"/>
-                  </a:schemeClr>
+              <a:rPr lang="sv-SE" sz="1500" dirty="0">
+                <a:solidFill>
+                  <a:srgbClr val="0070C0"/>
                 </a:solidFill>
               </a:rPr>
             </a:br>
             <a:r>
-              <a:rPr lang="sv-SE" sz="1400" dirty="0">
-                <a:solidFill>
-                  <a:schemeClr val="accent1">
-                    <a:lumMod val="75000"/>
-                  </a:schemeClr>
+              <a:rPr lang="sv-SE" sz="1500" dirty="0">
+                <a:solidFill>
+                  <a:srgbClr val="0070C0"/>
+                </a:solidFill>
+              </a:rPr>
+              <a:t>}</a:t>
+            </a:r>
+            <a:br>
+              <a:rPr lang="sv-SE" sz="1500" dirty="0">
+                <a:solidFill>
+                  <a:srgbClr val="0070C0"/>
+                </a:solidFill>
+              </a:rPr>
+            </a:br>
+            <a:br>
+              <a:rPr lang="sv-SE" sz="1500" dirty="0">
+                <a:solidFill>
+                  <a:srgbClr val="0070C0"/>
+                </a:solidFill>
+              </a:rPr>
+            </a:br>
+            <a:r>
+              <a:rPr lang="sv-SE" sz="1500" dirty="0">
+                <a:solidFill>
+                  <a:srgbClr val="0070C0"/>
+                </a:solidFill>
+              </a:rPr>
+              <a:t>@Test</a:t>
+            </a:r>
+            <a:br>
+              <a:rPr lang="sv-SE" sz="1500" dirty="0">
+                <a:solidFill>
+                  <a:srgbClr val="0070C0"/>
+                </a:solidFill>
+              </a:rPr>
+            </a:br>
+            <a:r>
+              <a:rPr lang="sv-SE" sz="1500" dirty="0">
+                <a:solidFill>
+                  <a:srgbClr val="0070C0"/>
+                </a:solidFill>
+              </a:rPr>
+              <a:t>public </a:t>
+            </a:r>
+            <a:r>
+              <a:rPr lang="sv-SE" sz="1500" dirty="0" err="1">
+                <a:solidFill>
+                  <a:srgbClr val="0070C0"/>
+                </a:solidFill>
+              </a:rPr>
+              <a:t>void</a:t>
+            </a:r>
+            <a:r>
+              <a:rPr lang="sv-SE" sz="1500" dirty="0">
+                <a:solidFill>
+                  <a:srgbClr val="0070C0"/>
+                </a:solidFill>
+              </a:rPr>
+              <a:t> addItem_Full5SlotInventory_false() {</a:t>
+            </a:r>
+            <a:br>
+              <a:rPr lang="sv-SE" sz="1500" dirty="0">
+                <a:solidFill>
+                  <a:srgbClr val="0070C0"/>
+                </a:solidFill>
+              </a:rPr>
+            </a:br>
+            <a:r>
+              <a:rPr lang="sv-SE" sz="1500" dirty="0">
+                <a:solidFill>
+                  <a:srgbClr val="0070C0"/>
+                </a:solidFill>
+              </a:rPr>
+              <a:t>    for (</a:t>
+            </a:r>
+            <a:r>
+              <a:rPr lang="sv-SE" sz="1500" dirty="0" err="1">
+                <a:solidFill>
+                  <a:srgbClr val="0070C0"/>
+                </a:solidFill>
+              </a:rPr>
+              <a:t>int</a:t>
+            </a:r>
+            <a:r>
+              <a:rPr lang="sv-SE" sz="1500" dirty="0">
+                <a:solidFill>
+                  <a:srgbClr val="0070C0"/>
+                </a:solidFill>
+              </a:rPr>
+              <a:t> i = 0; i &lt; </a:t>
+            </a:r>
+            <a:r>
+              <a:rPr lang="sv-SE" sz="1500" dirty="0" err="1">
+                <a:solidFill>
+                  <a:srgbClr val="0070C0"/>
+                </a:solidFill>
+              </a:rPr>
+              <a:t>inventory.getInventoryArray</a:t>
+            </a:r>
+            <a:r>
+              <a:rPr lang="sv-SE" sz="1500" dirty="0">
+                <a:solidFill>
+                  <a:srgbClr val="0070C0"/>
+                </a:solidFill>
+              </a:rPr>
+              <a:t>().</a:t>
+            </a:r>
+            <a:r>
+              <a:rPr lang="sv-SE" sz="1500" dirty="0" err="1">
+                <a:solidFill>
+                  <a:srgbClr val="0070C0"/>
+                </a:solidFill>
+              </a:rPr>
+              <a:t>length</a:t>
+            </a:r>
+            <a:r>
+              <a:rPr lang="sv-SE" sz="1500" dirty="0">
+                <a:solidFill>
+                  <a:srgbClr val="0070C0"/>
+                </a:solidFill>
+              </a:rPr>
+              <a:t>; i++) {</a:t>
+            </a:r>
+            <a:br>
+              <a:rPr lang="sv-SE" sz="1500" dirty="0">
+                <a:solidFill>
+                  <a:srgbClr val="0070C0"/>
+                </a:solidFill>
+              </a:rPr>
+            </a:br>
+            <a:r>
+              <a:rPr lang="sv-SE" sz="1500" dirty="0">
+                <a:solidFill>
+                  <a:srgbClr val="0070C0"/>
+                </a:solidFill>
+              </a:rPr>
+              <a:t>        </a:t>
+            </a:r>
+            <a:r>
+              <a:rPr lang="sv-SE" sz="1500" dirty="0" err="1">
+                <a:solidFill>
+                  <a:srgbClr val="0070C0"/>
+                </a:solidFill>
+              </a:rPr>
+              <a:t>inventory.addItem</a:t>
+            </a:r>
+            <a:r>
+              <a:rPr lang="sv-SE" sz="1500" dirty="0">
+                <a:solidFill>
+                  <a:srgbClr val="0070C0"/>
+                </a:solidFill>
+              </a:rPr>
+              <a:t>(new </a:t>
+            </a:r>
+            <a:r>
+              <a:rPr lang="sv-SE" sz="1500" dirty="0" err="1">
+                <a:solidFill>
+                  <a:srgbClr val="0070C0"/>
+                </a:solidFill>
+              </a:rPr>
+              <a:t>Armor</a:t>
+            </a:r>
+            <a:r>
+              <a:rPr lang="sv-SE" sz="1500" dirty="0">
+                <a:solidFill>
+                  <a:srgbClr val="0070C0"/>
+                </a:solidFill>
+              </a:rPr>
+              <a:t>(1));</a:t>
+            </a:r>
+            <a:br>
+              <a:rPr lang="sv-SE" sz="1500" dirty="0">
+                <a:solidFill>
+                  <a:srgbClr val="0070C0"/>
+                </a:solidFill>
+              </a:rPr>
+            </a:br>
+            <a:r>
+              <a:rPr lang="sv-SE" sz="1500" dirty="0">
+                <a:solidFill>
+                  <a:srgbClr val="0070C0"/>
+                </a:solidFill>
+              </a:rPr>
+              <a:t>    }</a:t>
+            </a:r>
+            <a:br>
+              <a:rPr lang="sv-SE" sz="1500" dirty="0">
+                <a:solidFill>
+                  <a:srgbClr val="0070C0"/>
+                </a:solidFill>
+              </a:rPr>
+            </a:br>
+            <a:r>
+              <a:rPr lang="sv-SE" sz="1500" dirty="0">
+                <a:solidFill>
+                  <a:srgbClr val="0070C0"/>
                 </a:solidFill>
               </a:rPr>
               <a:t>    </a:t>
             </a:r>
             <a:r>
-              <a:rPr lang="sv-SE" sz="1400" dirty="0" err="1">
-                <a:solidFill>
-                  <a:schemeClr val="accent1">
-                    <a:lumMod val="75000"/>
-                  </a:schemeClr>
-                </a:solidFill>
-              </a:rPr>
-              <a:t>map.placeGameObject</a:t>
-            </a:r>
-            <a:r>
-              <a:rPr lang="sv-SE" sz="1400" dirty="0">
-                <a:solidFill>
-                  <a:schemeClr val="accent1">
-                    <a:lumMod val="75000"/>
-                  </a:schemeClr>
-                </a:solidFill>
-              </a:rPr>
-              <a:t>(1,1, monster); </a:t>
+              <a:rPr lang="sv-SE" sz="1500" i="1" dirty="0" err="1">
+                <a:solidFill>
+                  <a:srgbClr val="0070C0"/>
+                </a:solidFill>
+              </a:rPr>
+              <a:t>assertFalse</a:t>
+            </a:r>
+            <a:r>
+              <a:rPr lang="sv-SE" sz="1500" dirty="0">
+                <a:solidFill>
+                  <a:srgbClr val="0070C0"/>
+                </a:solidFill>
+              </a:rPr>
+              <a:t>(</a:t>
+            </a:r>
+            <a:r>
+              <a:rPr lang="sv-SE" sz="1500" dirty="0" err="1">
+                <a:solidFill>
+                  <a:srgbClr val="0070C0"/>
+                </a:solidFill>
+              </a:rPr>
+              <a:t>inventory.addItem</a:t>
+            </a:r>
+            <a:r>
+              <a:rPr lang="sv-SE" sz="1500" dirty="0">
+                <a:solidFill>
+                  <a:srgbClr val="0070C0"/>
+                </a:solidFill>
+              </a:rPr>
+              <a:t>(new </a:t>
+            </a:r>
+            <a:r>
+              <a:rPr lang="sv-SE" sz="1500" dirty="0" err="1">
+                <a:solidFill>
+                  <a:srgbClr val="0070C0"/>
+                </a:solidFill>
+              </a:rPr>
+              <a:t>Weapon</a:t>
+            </a:r>
+            <a:r>
+              <a:rPr lang="sv-SE" sz="1500" dirty="0">
+                <a:solidFill>
+                  <a:srgbClr val="0070C0"/>
+                </a:solidFill>
+              </a:rPr>
+              <a:t>(10)));</a:t>
             </a:r>
             <a:br>
-              <a:rPr lang="sv-SE" sz="1400" dirty="0">
-                <a:solidFill>
-                  <a:schemeClr val="accent1">
-                    <a:lumMod val="75000"/>
-                  </a:schemeClr>
+              <a:rPr lang="sv-SE" sz="1500" dirty="0">
+                <a:solidFill>
+                  <a:srgbClr val="0070C0"/>
                 </a:solidFill>
               </a:rPr>
             </a:br>
             <a:r>
-              <a:rPr lang="sv-SE" sz="1400" dirty="0">
-                <a:solidFill>
-                  <a:schemeClr val="accent1">
-                    <a:lumMod val="75000"/>
-                  </a:schemeClr>
-                </a:solidFill>
-              </a:rPr>
-              <a:t>    </a:t>
-            </a:r>
-            <a:r>
-              <a:rPr lang="sv-SE" sz="1400" dirty="0" err="1">
-                <a:solidFill>
-                  <a:schemeClr val="accent1">
-                    <a:lumMod val="75000"/>
-                  </a:schemeClr>
-                </a:solidFill>
-              </a:rPr>
-              <a:t>map.moveCreatures</a:t>
-            </a:r>
-            <a:r>
-              <a:rPr lang="sv-SE" sz="1400" dirty="0">
-                <a:solidFill>
-                  <a:schemeClr val="accent1">
-                    <a:lumMod val="75000"/>
-                  </a:schemeClr>
-                </a:solidFill>
-              </a:rPr>
-              <a:t>(); </a:t>
-            </a:r>
-            <a:br>
-              <a:rPr lang="sv-SE" sz="1400" dirty="0">
-                <a:solidFill>
-                  <a:schemeClr val="accent1">
-                    <a:lumMod val="75000"/>
-                  </a:schemeClr>
-                </a:solidFill>
-              </a:rPr>
-            </a:br>
-            <a:r>
-              <a:rPr lang="sv-SE" sz="1400" dirty="0">
-                <a:solidFill>
-                  <a:schemeClr val="accent1">
-                    <a:lumMod val="75000"/>
-                  </a:schemeClr>
-                </a:solidFill>
-              </a:rPr>
-              <a:t>    </a:t>
-            </a:r>
-            <a:r>
-              <a:rPr lang="sv-SE" sz="1400" dirty="0" err="1">
-                <a:solidFill>
-                  <a:schemeClr val="accent1">
-                    <a:lumMod val="75000"/>
-                  </a:schemeClr>
-                </a:solidFill>
-              </a:rPr>
-              <a:t>assertNull</a:t>
-            </a:r>
-            <a:r>
-              <a:rPr lang="sv-SE" sz="1400" dirty="0">
-                <a:solidFill>
-                  <a:schemeClr val="accent1">
-                    <a:lumMod val="75000"/>
-                  </a:schemeClr>
-                </a:solidFill>
-              </a:rPr>
-              <a:t>(</a:t>
-            </a:r>
-            <a:r>
-              <a:rPr lang="sv-SE" sz="1400" dirty="0" err="1">
-                <a:solidFill>
-                  <a:schemeClr val="accent1">
-                    <a:lumMod val="75000"/>
-                  </a:schemeClr>
-                </a:solidFill>
-              </a:rPr>
-              <a:t>map.getMap</a:t>
-            </a:r>
-            <a:r>
-              <a:rPr lang="sv-SE" sz="1400" dirty="0">
-                <a:solidFill>
-                  <a:schemeClr val="accent1">
-                    <a:lumMod val="75000"/>
-                  </a:schemeClr>
-                </a:solidFill>
-              </a:rPr>
-              <a:t>()[1][1]); </a:t>
-            </a:r>
-            <a:br>
-              <a:rPr lang="sv-SE" sz="1400" dirty="0">
-                <a:solidFill>
-                  <a:schemeClr val="accent1">
-                    <a:lumMod val="75000"/>
-                  </a:schemeClr>
-                </a:solidFill>
-              </a:rPr>
-            </a:br>
-            <a:r>
-              <a:rPr lang="sv-SE" sz="1400" dirty="0">
-                <a:solidFill>
-                  <a:schemeClr val="accent1">
-                    <a:lumMod val="75000"/>
-                  </a:schemeClr>
+              <a:rPr lang="sv-SE" sz="1500" dirty="0">
+                <a:solidFill>
+                  <a:srgbClr val="0070C0"/>
                 </a:solidFill>
               </a:rPr>
               <a:t>}</a:t>
@@ -14195,12 +14219,7 @@
             <p:ph type="body" sz="quarter" idx="3"/>
           </p:nvPr>
         </p:nvSpPr>
-        <p:spPr>
-          <a:xfrm>
-            <a:off x="6169024" y="1227348"/>
-            <a:ext cx="5183188" cy="823912"/>
-          </a:xfrm>
-        </p:spPr>
+        <p:spPr/>
         <p:txBody>
           <a:bodyPr/>
           <a:lstStyle/>
@@ -14222,15 +14241,10 @@
             <p:ph sz="quarter" idx="4"/>
           </p:nvPr>
         </p:nvSpPr>
-        <p:spPr>
-          <a:xfrm>
-            <a:off x="6169024" y="2101893"/>
-            <a:ext cx="5183188" cy="3684588"/>
-          </a:xfrm>
-        </p:spPr>
+        <p:spPr/>
         <p:txBody>
           <a:bodyPr>
-            <a:noAutofit/>
+            <a:normAutofit/>
           </a:bodyPr>
           <a:lstStyle/>
           <a:p>
@@ -14238,1418 +14252,321 @@
               <a:buNone/>
             </a:pPr>
             <a:r>
-              <a:rPr lang="sv-SE" sz="1400" dirty="0">
-                <a:solidFill>
-                  <a:schemeClr val="accent1">
-                    <a:lumMod val="75000"/>
-                  </a:schemeClr>
+              <a:rPr lang="sv-SE" sz="1500" dirty="0">
+                <a:solidFill>
+                  <a:srgbClr val="0070C0"/>
                 </a:solidFill>
               </a:rPr>
               <a:t>public </a:t>
             </a:r>
             <a:r>
-              <a:rPr lang="sv-SE" sz="1400" dirty="0" err="1">
-                <a:solidFill>
-                  <a:schemeClr val="accent1">
-                    <a:lumMod val="75000"/>
-                  </a:schemeClr>
-                </a:solidFill>
-              </a:rPr>
-              <a:t>void</a:t>
-            </a:r>
-            <a:r>
-              <a:rPr lang="sv-SE" sz="1400" dirty="0">
-                <a:solidFill>
-                  <a:schemeClr val="accent1">
-                    <a:lumMod val="75000"/>
-                  </a:schemeClr>
+              <a:rPr lang="sv-SE" sz="1500" dirty="0" err="1">
+                <a:solidFill>
+                  <a:srgbClr val="0070C0"/>
+                </a:solidFill>
+              </a:rPr>
+              <a:t>boolean</a:t>
+            </a:r>
+            <a:r>
+              <a:rPr lang="sv-SE" sz="1500" dirty="0">
+                <a:solidFill>
+                  <a:srgbClr val="0070C0"/>
                 </a:solidFill>
               </a:rPr>
               <a:t> </a:t>
             </a:r>
             <a:r>
-              <a:rPr lang="sv-SE" sz="1400" dirty="0" err="1">
-                <a:solidFill>
-                  <a:schemeClr val="accent1">
-                    <a:lumMod val="75000"/>
-                  </a:schemeClr>
-                </a:solidFill>
-              </a:rPr>
-              <a:t>moveCreatures</a:t>
-            </a:r>
-            <a:r>
-              <a:rPr lang="sv-SE" sz="1400" dirty="0">
-                <a:solidFill>
-                  <a:schemeClr val="accent1">
-                    <a:lumMod val="75000"/>
-                  </a:schemeClr>
-                </a:solidFill>
-              </a:rPr>
-              <a:t>() {</a:t>
+              <a:rPr lang="sv-SE" sz="1500" dirty="0" err="1">
+                <a:solidFill>
+                  <a:srgbClr val="0070C0"/>
+                </a:solidFill>
+              </a:rPr>
+              <a:t>addItem</a:t>
+            </a:r>
+            <a:r>
+              <a:rPr lang="sv-SE" sz="1500" dirty="0">
+                <a:solidFill>
+                  <a:srgbClr val="0070C0"/>
+                </a:solidFill>
+              </a:rPr>
+              <a:t>(Equipment item) {</a:t>
             </a:r>
             <a:br>
-              <a:rPr lang="sv-SE" sz="1400" dirty="0">
-                <a:solidFill>
-                  <a:schemeClr val="accent1">
-                    <a:lumMod val="75000"/>
-                  </a:schemeClr>
+              <a:rPr lang="sv-SE" sz="1500" dirty="0">
+                <a:solidFill>
+                  <a:srgbClr val="0070C0"/>
                 </a:solidFill>
               </a:rPr>
             </a:br>
             <a:r>
-              <a:rPr lang="sv-SE" sz="1400" dirty="0">
-                <a:solidFill>
-                  <a:schemeClr val="accent1">
-                    <a:lumMod val="75000"/>
-                  </a:schemeClr>
+              <a:rPr lang="sv-SE" sz="1500" dirty="0">
+                <a:solidFill>
+                  <a:srgbClr val="0070C0"/>
                 </a:solidFill>
               </a:rPr>
               <a:t>    for (</a:t>
             </a:r>
             <a:r>
-              <a:rPr lang="sv-SE" sz="1400" dirty="0" err="1">
-                <a:solidFill>
-                  <a:schemeClr val="accent1">
-                    <a:lumMod val="75000"/>
-                  </a:schemeClr>
-                </a:solidFill>
-              </a:rPr>
-              <a:t>Creature</a:t>
-            </a:r>
-            <a:r>
-              <a:rPr lang="sv-SE" sz="1400" dirty="0">
-                <a:solidFill>
-                  <a:schemeClr val="accent1">
-                    <a:lumMod val="75000"/>
-                  </a:schemeClr>
-                </a:solidFill>
-              </a:rPr>
-              <a:t> c : </a:t>
-            </a:r>
-            <a:r>
-              <a:rPr lang="sv-SE" sz="1400" dirty="0" err="1">
-                <a:solidFill>
-                  <a:schemeClr val="accent1">
-                    <a:lumMod val="75000"/>
-                  </a:schemeClr>
-                </a:solidFill>
-              </a:rPr>
-              <a:t>creatures</a:t>
-            </a:r>
-            <a:r>
-              <a:rPr lang="sv-SE" sz="1400" dirty="0">
-                <a:solidFill>
-                  <a:schemeClr val="accent1">
-                    <a:lumMod val="75000"/>
-                  </a:schemeClr>
+              <a:rPr lang="sv-SE" sz="1500" dirty="0" err="1">
+                <a:solidFill>
+                  <a:srgbClr val="0070C0"/>
+                </a:solidFill>
+              </a:rPr>
+              <a:t>int</a:t>
+            </a:r>
+            <a:r>
+              <a:rPr lang="sv-SE" sz="1500" dirty="0">
+                <a:solidFill>
+                  <a:srgbClr val="0070C0"/>
+                </a:solidFill>
+              </a:rPr>
+              <a:t> i = 0; i &lt; </a:t>
+            </a:r>
+            <a:r>
+              <a:rPr lang="sv-SE" sz="1500" dirty="0" err="1">
+                <a:solidFill>
+                  <a:srgbClr val="0070C0"/>
+                </a:solidFill>
+              </a:rPr>
+              <a:t>inventoryArray.length</a:t>
+            </a:r>
+            <a:r>
+              <a:rPr lang="sv-SE" sz="1500" dirty="0">
+                <a:solidFill>
+                  <a:srgbClr val="0070C0"/>
+                </a:solidFill>
+              </a:rPr>
+              <a:t>; i++) {</a:t>
+            </a:r>
+            <a:br>
+              <a:rPr lang="sv-SE" sz="1500" dirty="0">
+                <a:solidFill>
+                  <a:srgbClr val="0070C0"/>
+                </a:solidFill>
+              </a:rPr>
+            </a:br>
+            <a:r>
+              <a:rPr lang="sv-SE" sz="1500" dirty="0">
+                <a:solidFill>
+                  <a:srgbClr val="0070C0"/>
+                </a:solidFill>
+              </a:rPr>
+              <a:t>        </a:t>
+            </a:r>
+            <a:r>
+              <a:rPr lang="sv-SE" sz="1500" dirty="0" err="1">
+                <a:solidFill>
+                  <a:srgbClr val="0070C0"/>
+                </a:solidFill>
+              </a:rPr>
+              <a:t>if</a:t>
+            </a:r>
+            <a:r>
+              <a:rPr lang="sv-SE" sz="1500" dirty="0">
+                <a:solidFill>
+                  <a:srgbClr val="0070C0"/>
+                </a:solidFill>
+              </a:rPr>
+              <a:t> (</a:t>
+            </a:r>
+            <a:r>
+              <a:rPr lang="sv-SE" sz="1500" dirty="0" err="1">
+                <a:solidFill>
+                  <a:srgbClr val="0070C0"/>
+                </a:solidFill>
+              </a:rPr>
+              <a:t>inventoryArray</a:t>
+            </a:r>
+            <a:r>
+              <a:rPr lang="sv-SE" sz="1500" dirty="0">
+                <a:solidFill>
+                  <a:srgbClr val="0070C0"/>
+                </a:solidFill>
+              </a:rPr>
+              <a:t>[i] == </a:t>
+            </a:r>
+            <a:r>
+              <a:rPr lang="sv-SE" sz="1500" dirty="0" err="1">
+                <a:solidFill>
+                  <a:srgbClr val="0070C0"/>
+                </a:solidFill>
+              </a:rPr>
+              <a:t>null</a:t>
+            </a:r>
+            <a:r>
+              <a:rPr lang="sv-SE" sz="1500" dirty="0">
+                <a:solidFill>
+                  <a:srgbClr val="0070C0"/>
                 </a:solidFill>
               </a:rPr>
               <a:t>) {</a:t>
             </a:r>
             <a:br>
-              <a:rPr lang="sv-SE" sz="1400" dirty="0">
-                <a:solidFill>
-                  <a:schemeClr val="accent1">
-                    <a:lumMod val="75000"/>
-                  </a:schemeClr>
+              <a:rPr lang="sv-SE" sz="1500" dirty="0">
+                <a:solidFill>
+                  <a:srgbClr val="0070C0"/>
                 </a:solidFill>
               </a:rPr>
             </a:br>
             <a:r>
-              <a:rPr lang="sv-SE" sz="1400" dirty="0">
-                <a:solidFill>
-                  <a:schemeClr val="accent1">
-                    <a:lumMod val="75000"/>
-                  </a:schemeClr>
-                </a:solidFill>
-              </a:rPr>
-              <a:t>        </a:t>
-            </a:r>
-            <a:r>
-              <a:rPr lang="sv-SE" sz="1400" dirty="0" err="1">
-                <a:solidFill>
-                  <a:schemeClr val="accent1">
-                    <a:lumMod val="75000"/>
-                  </a:schemeClr>
-                </a:solidFill>
-              </a:rPr>
-              <a:t>int</a:t>
-            </a:r>
-            <a:r>
-              <a:rPr lang="sv-SE" sz="1400" dirty="0">
-                <a:solidFill>
-                  <a:schemeClr val="accent1">
-                    <a:lumMod val="75000"/>
-                  </a:schemeClr>
+              <a:rPr lang="sv-SE" sz="1500" dirty="0">
+                <a:solidFill>
+                  <a:srgbClr val="0070C0"/>
+                </a:solidFill>
+              </a:rPr>
+              <a:t>            </a:t>
+            </a:r>
+            <a:r>
+              <a:rPr lang="sv-SE" sz="1500" dirty="0" err="1">
+                <a:solidFill>
+                  <a:srgbClr val="0070C0"/>
+                </a:solidFill>
+              </a:rPr>
+              <a:t>inventoryArray</a:t>
+            </a:r>
+            <a:r>
+              <a:rPr lang="sv-SE" sz="1500" dirty="0">
+                <a:solidFill>
+                  <a:srgbClr val="0070C0"/>
+                </a:solidFill>
+              </a:rPr>
+              <a:t>[i] = item;</a:t>
+            </a:r>
+            <a:br>
+              <a:rPr lang="sv-SE" sz="1500" dirty="0">
+                <a:solidFill>
+                  <a:srgbClr val="0070C0"/>
+                </a:solidFill>
+              </a:rPr>
+            </a:br>
+            <a:r>
+              <a:rPr lang="sv-SE" sz="1500" dirty="0">
+                <a:solidFill>
+                  <a:srgbClr val="0070C0"/>
+                </a:solidFill>
+              </a:rPr>
+              <a:t>            </a:t>
+            </a:r>
+            <a:r>
+              <a:rPr lang="sv-SE" sz="1500" dirty="0" err="1">
+                <a:solidFill>
+                  <a:srgbClr val="0070C0"/>
+                </a:solidFill>
+              </a:rPr>
+              <a:t>return</a:t>
+            </a:r>
+            <a:r>
+              <a:rPr lang="sv-SE" sz="1500" dirty="0">
+                <a:solidFill>
+                  <a:srgbClr val="0070C0"/>
                 </a:solidFill>
               </a:rPr>
               <a:t> </a:t>
             </a:r>
             <a:r>
-              <a:rPr lang="sv-SE" sz="1400" dirty="0" err="1">
-                <a:solidFill>
-                  <a:schemeClr val="accent1">
-                    <a:lumMod val="75000"/>
-                  </a:schemeClr>
-                </a:solidFill>
-              </a:rPr>
-              <a:t>pos</a:t>
-            </a:r>
-            <a:r>
-              <a:rPr lang="sv-SE" sz="1400" dirty="0">
-                <a:solidFill>
-                  <a:schemeClr val="accent1">
-                    <a:lumMod val="75000"/>
-                  </a:schemeClr>
-                </a:solidFill>
-              </a:rPr>
-              <a:t>[] = </a:t>
-            </a:r>
-            <a:r>
-              <a:rPr lang="sv-SE" sz="1400" dirty="0" err="1">
-                <a:solidFill>
-                  <a:schemeClr val="accent1">
-                    <a:lumMod val="75000"/>
-                  </a:schemeClr>
-                </a:solidFill>
-              </a:rPr>
-              <a:t>c.moveCreature</a:t>
-            </a:r>
-            <a:r>
-              <a:rPr lang="sv-SE" sz="1400" dirty="0">
-                <a:solidFill>
-                  <a:schemeClr val="accent1">
-                    <a:lumMod val="75000"/>
-                  </a:schemeClr>
-                </a:solidFill>
-              </a:rPr>
-              <a:t>();</a:t>
+              <a:rPr lang="sv-SE" sz="1500" dirty="0" err="1">
+                <a:solidFill>
+                  <a:srgbClr val="0070C0"/>
+                </a:solidFill>
+              </a:rPr>
+              <a:t>true</a:t>
+            </a:r>
+            <a:r>
+              <a:rPr lang="sv-SE" sz="1500" dirty="0">
+                <a:solidFill>
+                  <a:srgbClr val="0070C0"/>
+                </a:solidFill>
+              </a:rPr>
+              <a:t>;</a:t>
             </a:r>
             <a:br>
-              <a:rPr lang="sv-SE" sz="1400" dirty="0">
-                <a:solidFill>
-                  <a:schemeClr val="accent1">
-                    <a:lumMod val="75000"/>
-                  </a:schemeClr>
+              <a:rPr lang="sv-SE" sz="1500" dirty="0">
+                <a:solidFill>
+                  <a:srgbClr val="0070C0"/>
                 </a:solidFill>
               </a:rPr>
             </a:br>
+            <a:r>
+              <a:rPr lang="sv-SE" sz="1500" dirty="0">
+                <a:solidFill>
+                  <a:srgbClr val="0070C0"/>
+                </a:solidFill>
+              </a:rPr>
+              <a:t>        }</a:t>
+            </a:r>
             <a:br>
-              <a:rPr lang="sv-SE" sz="1400" dirty="0">
-                <a:solidFill>
-                  <a:schemeClr val="accent1">
-                    <a:lumMod val="75000"/>
-                  </a:schemeClr>
+              <a:rPr lang="sv-SE" sz="1500" dirty="0">
+                <a:solidFill>
+                  <a:srgbClr val="0070C0"/>
                 </a:solidFill>
               </a:rPr>
             </a:br>
             <a:r>
-              <a:rPr lang="sv-SE" sz="1400" dirty="0">
-                <a:solidFill>
-                  <a:schemeClr val="accent1">
-                    <a:lumMod val="75000"/>
-                  </a:schemeClr>
-                </a:solidFill>
-              </a:rPr>
-              <a:t>        </a:t>
-            </a:r>
-            <a:r>
-              <a:rPr lang="sv-SE" sz="1400" dirty="0" err="1">
-                <a:solidFill>
-                  <a:schemeClr val="accent1">
-                    <a:lumMod val="75000"/>
-                  </a:schemeClr>
-                </a:solidFill>
-              </a:rPr>
-              <a:t>if</a:t>
-            </a:r>
-            <a:r>
-              <a:rPr lang="sv-SE" sz="1400" dirty="0">
-                <a:solidFill>
-                  <a:schemeClr val="accent1">
-                    <a:lumMod val="75000"/>
-                  </a:schemeClr>
-                </a:solidFill>
-              </a:rPr>
-              <a:t> (!(</a:t>
-            </a:r>
-            <a:r>
-              <a:rPr lang="sv-SE" sz="1400" dirty="0" err="1">
-                <a:solidFill>
-                  <a:schemeClr val="accent1">
-                    <a:lumMod val="75000"/>
-                  </a:schemeClr>
-                </a:solidFill>
-              </a:rPr>
-              <a:t>map</a:t>
-            </a:r>
-            <a:r>
-              <a:rPr lang="sv-SE" sz="1400" dirty="0">
-                <a:solidFill>
-                  <a:schemeClr val="accent1">
-                    <a:lumMod val="75000"/>
-                  </a:schemeClr>
-                </a:solidFill>
-              </a:rPr>
-              <a:t>[</a:t>
-            </a:r>
-            <a:r>
-              <a:rPr lang="sv-SE" sz="1400" dirty="0" err="1">
-                <a:solidFill>
-                  <a:schemeClr val="accent1">
-                    <a:lumMod val="75000"/>
-                  </a:schemeClr>
-                </a:solidFill>
-              </a:rPr>
-              <a:t>pos</a:t>
-            </a:r>
-            <a:r>
-              <a:rPr lang="sv-SE" sz="1400" dirty="0">
-                <a:solidFill>
-                  <a:schemeClr val="accent1">
-                    <a:lumMod val="75000"/>
-                  </a:schemeClr>
-                </a:solidFill>
-              </a:rPr>
-              <a:t>[2]][</a:t>
-            </a:r>
-            <a:r>
-              <a:rPr lang="sv-SE" sz="1400" dirty="0" err="1">
-                <a:solidFill>
-                  <a:schemeClr val="accent1">
-                    <a:lumMod val="75000"/>
-                  </a:schemeClr>
-                </a:solidFill>
-              </a:rPr>
-              <a:t>pos</a:t>
-            </a:r>
-            <a:r>
-              <a:rPr lang="sv-SE" sz="1400" dirty="0">
-                <a:solidFill>
-                  <a:schemeClr val="accent1">
-                    <a:lumMod val="75000"/>
-                  </a:schemeClr>
-                </a:solidFill>
-              </a:rPr>
-              <a:t>[3]] </a:t>
-            </a:r>
-            <a:r>
-              <a:rPr lang="sv-SE" sz="1400" dirty="0" err="1">
-                <a:solidFill>
-                  <a:schemeClr val="accent1">
-                    <a:lumMod val="75000"/>
-                  </a:schemeClr>
-                </a:solidFill>
-              </a:rPr>
-              <a:t>instanceof</a:t>
-            </a:r>
-            <a:r>
-              <a:rPr lang="sv-SE" sz="1400" dirty="0">
-                <a:solidFill>
-                  <a:schemeClr val="accent1">
-                    <a:lumMod val="75000"/>
-                  </a:schemeClr>
+              <a:rPr lang="sv-SE" sz="1500" dirty="0">
+                <a:solidFill>
+                  <a:srgbClr val="0070C0"/>
+                </a:solidFill>
+              </a:rPr>
+              <a:t>    }</a:t>
+            </a:r>
+            <a:br>
+              <a:rPr lang="sv-SE" sz="1500" dirty="0">
+                <a:solidFill>
+                  <a:srgbClr val="0070C0"/>
+                </a:solidFill>
+              </a:rPr>
+            </a:br>
+            <a:r>
+              <a:rPr lang="sv-SE" sz="1500" dirty="0">
+                <a:solidFill>
+                  <a:srgbClr val="0070C0"/>
+                </a:solidFill>
+              </a:rPr>
+              <a:t>    </a:t>
+            </a:r>
+            <a:r>
+              <a:rPr lang="sv-SE" sz="1500" dirty="0" err="1">
+                <a:solidFill>
+                  <a:srgbClr val="0070C0"/>
+                </a:solidFill>
+              </a:rPr>
+              <a:t>return</a:t>
+            </a:r>
+            <a:r>
+              <a:rPr lang="sv-SE" sz="1500" dirty="0">
+                <a:solidFill>
+                  <a:srgbClr val="0070C0"/>
                 </a:solidFill>
               </a:rPr>
               <a:t> </a:t>
             </a:r>
             <a:r>
-              <a:rPr lang="sv-SE" sz="1400" dirty="0" err="1">
-                <a:solidFill>
-                  <a:schemeClr val="accent1">
-                    <a:lumMod val="75000"/>
-                  </a:schemeClr>
-                </a:solidFill>
-              </a:rPr>
-              <a:t>Stationary</a:t>
-            </a:r>
-            <a:r>
-              <a:rPr lang="sv-SE" sz="1400" dirty="0">
-                <a:solidFill>
-                  <a:schemeClr val="accent1">
-                    <a:lumMod val="75000"/>
-                  </a:schemeClr>
-                </a:solidFill>
-              </a:rPr>
-              <a:t>)) {</a:t>
+              <a:rPr lang="sv-SE" sz="1500" dirty="0" err="1">
+                <a:solidFill>
+                  <a:srgbClr val="0070C0"/>
+                </a:solidFill>
+              </a:rPr>
+              <a:t>false</a:t>
+            </a:r>
+            <a:r>
+              <a:rPr lang="sv-SE" sz="1500" dirty="0">
+                <a:solidFill>
+                  <a:srgbClr val="0070C0"/>
+                </a:solidFill>
+              </a:rPr>
+              <a:t>;</a:t>
             </a:r>
             <a:br>
-              <a:rPr lang="sv-SE" sz="1400" dirty="0">
-                <a:solidFill>
-                  <a:schemeClr val="accent1">
-                    <a:lumMod val="75000"/>
-                  </a:schemeClr>
+              <a:rPr lang="sv-SE" sz="1500" dirty="0">
+                <a:solidFill>
+                  <a:srgbClr val="0070C0"/>
                 </a:solidFill>
               </a:rPr>
             </a:br>
             <a:r>
-              <a:rPr lang="sv-SE" sz="1400" dirty="0">
-                <a:solidFill>
-                  <a:schemeClr val="accent1">
-                    <a:lumMod val="75000"/>
-                  </a:schemeClr>
-                </a:solidFill>
-              </a:rPr>
-              <a:t>            </a:t>
-            </a:r>
-            <a:r>
-              <a:rPr lang="sv-SE" sz="1400" dirty="0" err="1">
-                <a:solidFill>
-                  <a:schemeClr val="accent1">
-                    <a:lumMod val="75000"/>
-                  </a:schemeClr>
-                </a:solidFill>
-              </a:rPr>
-              <a:t>boolean</a:t>
-            </a:r>
-            <a:r>
-              <a:rPr lang="sv-SE" sz="1400" dirty="0">
-                <a:solidFill>
-                  <a:schemeClr val="accent1">
-                    <a:lumMod val="75000"/>
-                  </a:schemeClr>
-                </a:solidFill>
-              </a:rPr>
-              <a:t> </a:t>
-            </a:r>
-            <a:r>
-              <a:rPr lang="sv-SE" sz="1400" dirty="0" err="1">
-                <a:solidFill>
-                  <a:schemeClr val="accent1">
-                    <a:lumMod val="75000"/>
-                  </a:schemeClr>
-                </a:solidFill>
-              </a:rPr>
-              <a:t>allowed</a:t>
-            </a:r>
-            <a:r>
-              <a:rPr lang="sv-SE" sz="1400" dirty="0">
-                <a:solidFill>
-                  <a:schemeClr val="accent1">
-                    <a:lumMod val="75000"/>
-                  </a:schemeClr>
-                </a:solidFill>
-              </a:rPr>
-              <a:t> = </a:t>
-            </a:r>
-            <a:r>
-              <a:rPr lang="sv-SE" sz="1400" dirty="0" err="1">
-                <a:solidFill>
-                  <a:schemeClr val="accent1">
-                    <a:lumMod val="75000"/>
-                  </a:schemeClr>
-                </a:solidFill>
-              </a:rPr>
-              <a:t>false</a:t>
-            </a:r>
-            <a:r>
-              <a:rPr lang="sv-SE" sz="1400" dirty="0">
-                <a:solidFill>
-                  <a:schemeClr val="accent1">
-                    <a:lumMod val="75000"/>
-                  </a:schemeClr>
-                </a:solidFill>
-              </a:rPr>
-              <a:t>;</a:t>
-            </a:r>
-            <a:br>
-              <a:rPr lang="sv-SE" sz="1400" dirty="0">
-                <a:solidFill>
-                  <a:schemeClr val="accent1">
-                    <a:lumMod val="75000"/>
-                  </a:schemeClr>
-                </a:solidFill>
-              </a:rPr>
-            </a:br>
-            <a:r>
-              <a:rPr lang="sv-SE" sz="1400" dirty="0">
-                <a:solidFill>
-                  <a:schemeClr val="accent1">
-                    <a:lumMod val="75000"/>
-                  </a:schemeClr>
-                </a:solidFill>
-              </a:rPr>
-              <a:t>            </a:t>
-            </a:r>
-            <a:r>
-              <a:rPr lang="sv-SE" sz="1400" dirty="0" err="1">
-                <a:solidFill>
-                  <a:schemeClr val="accent1">
-                    <a:lumMod val="75000"/>
-                  </a:schemeClr>
-                </a:solidFill>
-              </a:rPr>
-              <a:t>if</a:t>
-            </a:r>
-            <a:r>
-              <a:rPr lang="sv-SE" sz="1400" dirty="0">
-                <a:solidFill>
-                  <a:schemeClr val="accent1">
-                    <a:lumMod val="75000"/>
-                  </a:schemeClr>
-                </a:solidFill>
-              </a:rPr>
-              <a:t> (c </a:t>
-            </a:r>
-            <a:r>
-              <a:rPr lang="sv-SE" sz="1400" dirty="0" err="1">
-                <a:solidFill>
-                  <a:schemeClr val="accent1">
-                    <a:lumMod val="75000"/>
-                  </a:schemeClr>
-                </a:solidFill>
-              </a:rPr>
-              <a:t>instanceof</a:t>
-            </a:r>
-            <a:r>
-              <a:rPr lang="sv-SE" sz="1400" dirty="0">
-                <a:solidFill>
-                  <a:schemeClr val="accent1">
-                    <a:lumMod val="75000"/>
-                  </a:schemeClr>
-                </a:solidFill>
-              </a:rPr>
-              <a:t> Hero) {</a:t>
-            </a:r>
-            <a:br>
-              <a:rPr lang="sv-SE" sz="1400" dirty="0">
-                <a:solidFill>
-                  <a:schemeClr val="accent1">
-                    <a:lumMod val="75000"/>
-                  </a:schemeClr>
-                </a:solidFill>
-              </a:rPr>
-            </a:br>
-            <a:r>
-              <a:rPr lang="sv-SE" sz="1400" dirty="0">
-                <a:solidFill>
-                  <a:schemeClr val="accent1">
-                    <a:lumMod val="75000"/>
-                  </a:schemeClr>
-                </a:solidFill>
-              </a:rPr>
-              <a:t>                </a:t>
-            </a:r>
-            <a:r>
-              <a:rPr lang="sv-SE" sz="1400" dirty="0" err="1">
-                <a:solidFill>
-                  <a:schemeClr val="accent1">
-                    <a:lumMod val="75000"/>
-                  </a:schemeClr>
-                </a:solidFill>
-              </a:rPr>
-              <a:t>allowed</a:t>
-            </a:r>
-            <a:r>
-              <a:rPr lang="sv-SE" sz="1400" dirty="0">
-                <a:solidFill>
-                  <a:schemeClr val="accent1">
-                    <a:lumMod val="75000"/>
-                  </a:schemeClr>
-                </a:solidFill>
-              </a:rPr>
-              <a:t> = </a:t>
-            </a:r>
-            <a:r>
-              <a:rPr lang="sv-SE" sz="1400" dirty="0" err="1">
-                <a:solidFill>
-                  <a:schemeClr val="accent1">
-                    <a:lumMod val="75000"/>
-                  </a:schemeClr>
-                </a:solidFill>
-              </a:rPr>
-              <a:t>true</a:t>
-            </a:r>
-            <a:r>
-              <a:rPr lang="sv-SE" sz="1400" dirty="0">
-                <a:solidFill>
-                  <a:schemeClr val="accent1">
-                    <a:lumMod val="75000"/>
-                  </a:schemeClr>
-                </a:solidFill>
-              </a:rPr>
-              <a:t>;</a:t>
-            </a:r>
-            <a:br>
-              <a:rPr lang="sv-SE" sz="1400" dirty="0">
-                <a:solidFill>
-                  <a:schemeClr val="accent1">
-                    <a:lumMod val="75000"/>
-                  </a:schemeClr>
-                </a:solidFill>
-              </a:rPr>
-            </a:br>
-            <a:r>
-              <a:rPr lang="sv-SE" sz="1400" dirty="0">
-                <a:solidFill>
-                  <a:schemeClr val="accent1">
-                    <a:lumMod val="75000"/>
-                  </a:schemeClr>
-                </a:solidFill>
-              </a:rPr>
-              <a:t>                </a:t>
-            </a:r>
-            <a:r>
-              <a:rPr lang="sv-SE" sz="1400" dirty="0" err="1">
-                <a:solidFill>
-                  <a:schemeClr val="accent1">
-                    <a:lumMod val="75000"/>
-                  </a:schemeClr>
-                </a:solidFill>
-              </a:rPr>
-              <a:t>if</a:t>
-            </a:r>
-            <a:r>
-              <a:rPr lang="sv-SE" sz="1400" dirty="0">
-                <a:solidFill>
-                  <a:schemeClr val="accent1">
-                    <a:lumMod val="75000"/>
-                  </a:schemeClr>
-                </a:solidFill>
-              </a:rPr>
-              <a:t> (</a:t>
-            </a:r>
-            <a:r>
-              <a:rPr lang="sv-SE" sz="1400" dirty="0" err="1">
-                <a:solidFill>
-                  <a:schemeClr val="accent1">
-                    <a:lumMod val="75000"/>
-                  </a:schemeClr>
-                </a:solidFill>
-              </a:rPr>
-              <a:t>map</a:t>
-            </a:r>
-            <a:r>
-              <a:rPr lang="sv-SE" sz="1400" dirty="0">
-                <a:solidFill>
-                  <a:schemeClr val="accent1">
-                    <a:lumMod val="75000"/>
-                  </a:schemeClr>
-                </a:solidFill>
-              </a:rPr>
-              <a:t>[</a:t>
-            </a:r>
-            <a:r>
-              <a:rPr lang="sv-SE" sz="1400" dirty="0" err="1">
-                <a:solidFill>
-                  <a:schemeClr val="accent1">
-                    <a:lumMod val="75000"/>
-                  </a:schemeClr>
-                </a:solidFill>
-              </a:rPr>
-              <a:t>pos</a:t>
-            </a:r>
-            <a:r>
-              <a:rPr lang="sv-SE" sz="1400" dirty="0">
-                <a:solidFill>
-                  <a:schemeClr val="accent1">
-                    <a:lumMod val="75000"/>
-                  </a:schemeClr>
-                </a:solidFill>
-              </a:rPr>
-              <a:t>[2]][</a:t>
-            </a:r>
-            <a:r>
-              <a:rPr lang="sv-SE" sz="1400" dirty="0" err="1">
-                <a:solidFill>
-                  <a:schemeClr val="accent1">
-                    <a:lumMod val="75000"/>
-                  </a:schemeClr>
-                </a:solidFill>
-              </a:rPr>
-              <a:t>pos</a:t>
-            </a:r>
-            <a:r>
-              <a:rPr lang="sv-SE" sz="1400" dirty="0">
-                <a:solidFill>
-                  <a:schemeClr val="accent1">
-                    <a:lumMod val="75000"/>
-                  </a:schemeClr>
-                </a:solidFill>
-              </a:rPr>
-              <a:t>[3]] </a:t>
-            </a:r>
-            <a:r>
-              <a:rPr lang="sv-SE" sz="1400" dirty="0" err="1">
-                <a:solidFill>
-                  <a:schemeClr val="accent1">
-                    <a:lumMod val="75000"/>
-                  </a:schemeClr>
-                </a:solidFill>
-              </a:rPr>
-              <a:t>instanceof</a:t>
-            </a:r>
-            <a:r>
-              <a:rPr lang="sv-SE" sz="1400" dirty="0">
-                <a:solidFill>
-                  <a:schemeClr val="accent1">
-                    <a:lumMod val="75000"/>
-                  </a:schemeClr>
-                </a:solidFill>
-              </a:rPr>
-              <a:t> Item) {</a:t>
-            </a:r>
-            <a:br>
-              <a:rPr lang="sv-SE" sz="1400" dirty="0">
-                <a:solidFill>
-                  <a:schemeClr val="accent1">
-                    <a:lumMod val="75000"/>
-                  </a:schemeClr>
-                </a:solidFill>
-              </a:rPr>
-            </a:br>
-            <a:r>
-              <a:rPr lang="sv-SE" sz="1400" dirty="0">
-                <a:solidFill>
-                  <a:schemeClr val="accent1">
-                    <a:lumMod val="75000"/>
-                  </a:schemeClr>
-                </a:solidFill>
-              </a:rPr>
-              <a:t>                    ((Hero) c).</a:t>
-            </a:r>
-            <a:r>
-              <a:rPr lang="sv-SE" sz="1400" dirty="0" err="1">
-                <a:solidFill>
-                  <a:schemeClr val="accent1">
-                    <a:lumMod val="75000"/>
-                  </a:schemeClr>
-                </a:solidFill>
-              </a:rPr>
-              <a:t>pickUpItem</a:t>
-            </a:r>
-            <a:r>
-              <a:rPr lang="sv-SE" sz="1400" dirty="0">
-                <a:solidFill>
-                  <a:schemeClr val="accent1">
-                    <a:lumMod val="75000"/>
-                  </a:schemeClr>
-                </a:solidFill>
-              </a:rPr>
-              <a:t>((Item) </a:t>
-            </a:r>
-            <a:r>
-              <a:rPr lang="sv-SE" sz="1400" dirty="0" err="1">
-                <a:solidFill>
-                  <a:schemeClr val="accent1">
-                    <a:lumMod val="75000"/>
-                  </a:schemeClr>
-                </a:solidFill>
-              </a:rPr>
-              <a:t>map</a:t>
-            </a:r>
-            <a:r>
-              <a:rPr lang="sv-SE" sz="1400" dirty="0">
-                <a:solidFill>
-                  <a:schemeClr val="accent1">
-                    <a:lumMod val="75000"/>
-                  </a:schemeClr>
-                </a:solidFill>
-              </a:rPr>
-              <a:t>[</a:t>
-            </a:r>
-            <a:r>
-              <a:rPr lang="sv-SE" sz="1400" dirty="0" err="1">
-                <a:solidFill>
-                  <a:schemeClr val="accent1">
-                    <a:lumMod val="75000"/>
-                  </a:schemeClr>
-                </a:solidFill>
-              </a:rPr>
-              <a:t>pos</a:t>
-            </a:r>
-            <a:r>
-              <a:rPr lang="sv-SE" sz="1400" dirty="0">
-                <a:solidFill>
-                  <a:schemeClr val="accent1">
-                    <a:lumMod val="75000"/>
-                  </a:schemeClr>
-                </a:solidFill>
-              </a:rPr>
-              <a:t>[2]][</a:t>
-            </a:r>
-            <a:r>
-              <a:rPr lang="sv-SE" sz="1400" dirty="0" err="1">
-                <a:solidFill>
-                  <a:schemeClr val="accent1">
-                    <a:lumMod val="75000"/>
-                  </a:schemeClr>
-                </a:solidFill>
-              </a:rPr>
-              <a:t>pos</a:t>
-            </a:r>
-            <a:r>
-              <a:rPr lang="sv-SE" sz="1400" dirty="0">
-                <a:solidFill>
-                  <a:schemeClr val="accent1">
-                    <a:lumMod val="75000"/>
-                  </a:schemeClr>
-                </a:solidFill>
-              </a:rPr>
-              <a:t>[3]]);</a:t>
-            </a:r>
-            <a:br>
-              <a:rPr lang="sv-SE" sz="1400" dirty="0">
-                <a:solidFill>
-                  <a:schemeClr val="accent1">
-                    <a:lumMod val="75000"/>
-                  </a:schemeClr>
-                </a:solidFill>
-              </a:rPr>
-            </a:br>
-            <a:r>
-              <a:rPr lang="sv-SE" sz="1400" dirty="0">
-                <a:solidFill>
-                  <a:schemeClr val="accent1">
-                    <a:lumMod val="75000"/>
-                  </a:schemeClr>
-                </a:solidFill>
-              </a:rPr>
-              <a:t>                }</a:t>
-            </a:r>
-            <a:br>
-              <a:rPr lang="sv-SE" sz="1400" dirty="0">
-                <a:solidFill>
-                  <a:schemeClr val="accent1">
-                    <a:lumMod val="75000"/>
-                  </a:schemeClr>
-                </a:solidFill>
-              </a:rPr>
-            </a:br>
-            <a:r>
-              <a:rPr lang="sv-SE" sz="1400" dirty="0">
-                <a:solidFill>
-                  <a:schemeClr val="accent1">
-                    <a:lumMod val="75000"/>
-                  </a:schemeClr>
-                </a:solidFill>
-              </a:rPr>
-              <a:t>            } </a:t>
-            </a:r>
-            <a:r>
-              <a:rPr lang="sv-SE" sz="1400" dirty="0" err="1">
-                <a:solidFill>
-                  <a:schemeClr val="accent1">
-                    <a:lumMod val="75000"/>
-                  </a:schemeClr>
-                </a:solidFill>
-              </a:rPr>
-              <a:t>else</a:t>
-            </a:r>
-            <a:r>
-              <a:rPr lang="sv-SE" sz="1400" dirty="0">
-                <a:solidFill>
-                  <a:schemeClr val="accent1">
-                    <a:lumMod val="75000"/>
-                  </a:schemeClr>
-                </a:solidFill>
-              </a:rPr>
-              <a:t> {</a:t>
-            </a:r>
-            <a:br>
-              <a:rPr lang="sv-SE" sz="1400" dirty="0">
-                <a:solidFill>
-                  <a:schemeClr val="accent1">
-                    <a:lumMod val="75000"/>
-                  </a:schemeClr>
-                </a:solidFill>
-              </a:rPr>
-            </a:br>
-            <a:r>
-              <a:rPr lang="sv-SE" sz="1400" dirty="0">
-                <a:solidFill>
-                  <a:schemeClr val="accent1">
-                    <a:lumMod val="75000"/>
-                  </a:schemeClr>
-                </a:solidFill>
-              </a:rPr>
-              <a:t>                </a:t>
-            </a:r>
-            <a:r>
-              <a:rPr lang="sv-SE" sz="1400" dirty="0" err="1">
-                <a:solidFill>
-                  <a:schemeClr val="accent1">
-                    <a:lumMod val="75000"/>
-                  </a:schemeClr>
-                </a:solidFill>
-              </a:rPr>
-              <a:t>if</a:t>
-            </a:r>
-            <a:r>
-              <a:rPr lang="sv-SE" sz="1400" dirty="0">
-                <a:solidFill>
-                  <a:schemeClr val="accent1">
-                    <a:lumMod val="75000"/>
-                  </a:schemeClr>
-                </a:solidFill>
-              </a:rPr>
-              <a:t> (</a:t>
-            </a:r>
-            <a:r>
-              <a:rPr lang="sv-SE" sz="1400" dirty="0" err="1">
-                <a:solidFill>
-                  <a:schemeClr val="accent1">
-                    <a:lumMod val="75000"/>
-                  </a:schemeClr>
-                </a:solidFill>
-              </a:rPr>
-              <a:t>map</a:t>
-            </a:r>
-            <a:r>
-              <a:rPr lang="sv-SE" sz="1400" dirty="0">
-                <a:solidFill>
-                  <a:schemeClr val="accent1">
-                    <a:lumMod val="75000"/>
-                  </a:schemeClr>
-                </a:solidFill>
-              </a:rPr>
-              <a:t>[</a:t>
-            </a:r>
-            <a:r>
-              <a:rPr lang="sv-SE" sz="1400" dirty="0" err="1">
-                <a:solidFill>
-                  <a:schemeClr val="accent1">
-                    <a:lumMod val="75000"/>
-                  </a:schemeClr>
-                </a:solidFill>
-              </a:rPr>
-              <a:t>pos</a:t>
-            </a:r>
-            <a:r>
-              <a:rPr lang="sv-SE" sz="1400" dirty="0">
-                <a:solidFill>
-                  <a:schemeClr val="accent1">
-                    <a:lumMod val="75000"/>
-                  </a:schemeClr>
-                </a:solidFill>
-              </a:rPr>
-              <a:t>[2]][</a:t>
-            </a:r>
-            <a:r>
-              <a:rPr lang="sv-SE" sz="1400" dirty="0" err="1">
-                <a:solidFill>
-                  <a:schemeClr val="accent1">
-                    <a:lumMod val="75000"/>
-                  </a:schemeClr>
-                </a:solidFill>
-              </a:rPr>
-              <a:t>pos</a:t>
-            </a:r>
-            <a:r>
-              <a:rPr lang="sv-SE" sz="1400" dirty="0">
-                <a:solidFill>
-                  <a:schemeClr val="accent1">
-                    <a:lumMod val="75000"/>
-                  </a:schemeClr>
-                </a:solidFill>
-              </a:rPr>
-              <a:t>[3]] == </a:t>
-            </a:r>
-            <a:r>
-              <a:rPr lang="sv-SE" sz="1400" dirty="0" err="1">
-                <a:solidFill>
-                  <a:schemeClr val="accent1">
-                    <a:lumMod val="75000"/>
-                  </a:schemeClr>
-                </a:solidFill>
-              </a:rPr>
-              <a:t>null</a:t>
-            </a:r>
-            <a:r>
-              <a:rPr lang="sv-SE" sz="1400" dirty="0">
-                <a:solidFill>
-                  <a:schemeClr val="accent1">
-                    <a:lumMod val="75000"/>
-                  </a:schemeClr>
-                </a:solidFill>
-              </a:rPr>
-              <a:t>) {</a:t>
-            </a:r>
-            <a:br>
-              <a:rPr lang="sv-SE" sz="1400" dirty="0">
-                <a:solidFill>
-                  <a:schemeClr val="accent1">
-                    <a:lumMod val="75000"/>
-                  </a:schemeClr>
-                </a:solidFill>
-              </a:rPr>
-            </a:br>
-            <a:r>
-              <a:rPr lang="sv-SE" sz="1400" dirty="0">
-                <a:solidFill>
-                  <a:schemeClr val="accent1">
-                    <a:lumMod val="75000"/>
-                  </a:schemeClr>
-                </a:solidFill>
-              </a:rPr>
-              <a:t>                    </a:t>
-            </a:r>
-            <a:r>
-              <a:rPr lang="sv-SE" sz="1400" dirty="0" err="1">
-                <a:solidFill>
-                  <a:schemeClr val="accent1">
-                    <a:lumMod val="75000"/>
-                  </a:schemeClr>
-                </a:solidFill>
-              </a:rPr>
-              <a:t>allowed</a:t>
-            </a:r>
-            <a:r>
-              <a:rPr lang="sv-SE" sz="1400" dirty="0">
-                <a:solidFill>
-                  <a:schemeClr val="accent1">
-                    <a:lumMod val="75000"/>
-                  </a:schemeClr>
-                </a:solidFill>
-              </a:rPr>
-              <a:t> = </a:t>
-            </a:r>
-            <a:r>
-              <a:rPr lang="sv-SE" sz="1400" dirty="0" err="1">
-                <a:solidFill>
-                  <a:schemeClr val="accent1">
-                    <a:lumMod val="75000"/>
-                  </a:schemeClr>
-                </a:solidFill>
-              </a:rPr>
-              <a:t>true</a:t>
-            </a:r>
-            <a:r>
-              <a:rPr lang="sv-SE" sz="1400" dirty="0">
-                <a:solidFill>
-                  <a:schemeClr val="accent1">
-                    <a:lumMod val="75000"/>
-                  </a:schemeClr>
-                </a:solidFill>
-              </a:rPr>
-              <a:t>;</a:t>
-            </a:r>
-            <a:br>
-              <a:rPr lang="sv-SE" sz="1400" dirty="0">
-                <a:solidFill>
-                  <a:schemeClr val="accent1">
-                    <a:lumMod val="75000"/>
-                  </a:schemeClr>
-                </a:solidFill>
-              </a:rPr>
-            </a:br>
-            <a:r>
-              <a:rPr lang="sv-SE" sz="1400" dirty="0">
-                <a:solidFill>
-                  <a:schemeClr val="accent1">
-                    <a:lumMod val="75000"/>
-                  </a:schemeClr>
-                </a:solidFill>
-              </a:rPr>
-              <a:t>                }</a:t>
-            </a:r>
-            <a:br>
-              <a:rPr lang="sv-SE" sz="1400" dirty="0">
-                <a:solidFill>
-                  <a:schemeClr val="accent1">
-                    <a:lumMod val="75000"/>
-                  </a:schemeClr>
-                </a:solidFill>
-              </a:rPr>
-            </a:br>
-            <a:r>
-              <a:rPr lang="sv-SE" sz="1400" dirty="0">
-                <a:solidFill>
-                  <a:schemeClr val="accent1">
-                    <a:lumMod val="75000"/>
-                  </a:schemeClr>
-                </a:solidFill>
-              </a:rPr>
-              <a:t>            }</a:t>
-            </a:r>
-            <a:br>
-              <a:rPr lang="sv-SE" sz="1400" dirty="0">
-                <a:solidFill>
-                  <a:schemeClr val="accent1">
-                    <a:lumMod val="75000"/>
-                  </a:schemeClr>
-                </a:solidFill>
-              </a:rPr>
-            </a:br>
-            <a:r>
-              <a:rPr lang="sv-SE" sz="1400" dirty="0">
-                <a:solidFill>
-                  <a:schemeClr val="accent1">
-                    <a:lumMod val="75000"/>
-                  </a:schemeClr>
-                </a:solidFill>
-              </a:rPr>
-              <a:t>            </a:t>
-            </a:r>
-            <a:r>
-              <a:rPr lang="sv-SE" sz="1400" dirty="0" err="1">
-                <a:solidFill>
-                  <a:schemeClr val="accent1">
-                    <a:lumMod val="75000"/>
-                  </a:schemeClr>
-                </a:solidFill>
-              </a:rPr>
-              <a:t>if</a:t>
-            </a:r>
-            <a:r>
-              <a:rPr lang="sv-SE" sz="1400" dirty="0">
-                <a:solidFill>
-                  <a:schemeClr val="accent1">
-                    <a:lumMod val="75000"/>
-                  </a:schemeClr>
-                </a:solidFill>
-              </a:rPr>
-              <a:t> (</a:t>
-            </a:r>
-            <a:r>
-              <a:rPr lang="sv-SE" sz="1400" dirty="0" err="1">
-                <a:solidFill>
-                  <a:schemeClr val="accent1">
-                    <a:lumMod val="75000"/>
-                  </a:schemeClr>
-                </a:solidFill>
-              </a:rPr>
-              <a:t>allowed</a:t>
-            </a:r>
-            <a:r>
-              <a:rPr lang="sv-SE" sz="1400" dirty="0">
-                <a:solidFill>
-                  <a:schemeClr val="accent1">
-                    <a:lumMod val="75000"/>
-                  </a:schemeClr>
-                </a:solidFill>
-              </a:rPr>
-              <a:t>) {</a:t>
-            </a:r>
-            <a:br>
-              <a:rPr lang="sv-SE" sz="1400" dirty="0">
-                <a:solidFill>
-                  <a:schemeClr val="accent1">
-                    <a:lumMod val="75000"/>
-                  </a:schemeClr>
-                </a:solidFill>
-              </a:rPr>
-            </a:br>
-            <a:r>
-              <a:rPr lang="sv-SE" sz="1400" dirty="0">
-                <a:solidFill>
-                  <a:schemeClr val="accent1">
-                    <a:lumMod val="75000"/>
-                  </a:schemeClr>
-                </a:solidFill>
-              </a:rPr>
-              <a:t>                </a:t>
-            </a:r>
-            <a:r>
-              <a:rPr lang="sv-SE" sz="1400" dirty="0" err="1">
-                <a:solidFill>
-                  <a:schemeClr val="accent1">
-                    <a:lumMod val="75000"/>
-                  </a:schemeClr>
-                </a:solidFill>
-              </a:rPr>
-              <a:t>map</a:t>
-            </a:r>
-            <a:r>
-              <a:rPr lang="sv-SE" sz="1400" dirty="0">
-                <a:solidFill>
-                  <a:schemeClr val="accent1">
-                    <a:lumMod val="75000"/>
-                  </a:schemeClr>
-                </a:solidFill>
-              </a:rPr>
-              <a:t>[</a:t>
-            </a:r>
-            <a:r>
-              <a:rPr lang="sv-SE" sz="1400" dirty="0" err="1">
-                <a:solidFill>
-                  <a:schemeClr val="accent1">
-                    <a:lumMod val="75000"/>
-                  </a:schemeClr>
-                </a:solidFill>
-              </a:rPr>
-              <a:t>pos</a:t>
-            </a:r>
-            <a:r>
-              <a:rPr lang="sv-SE" sz="1400" dirty="0">
-                <a:solidFill>
-                  <a:schemeClr val="accent1">
-                    <a:lumMod val="75000"/>
-                  </a:schemeClr>
-                </a:solidFill>
-              </a:rPr>
-              <a:t>[0]][</a:t>
-            </a:r>
-            <a:r>
-              <a:rPr lang="sv-SE" sz="1400" dirty="0" err="1">
-                <a:solidFill>
-                  <a:schemeClr val="accent1">
-                    <a:lumMod val="75000"/>
-                  </a:schemeClr>
-                </a:solidFill>
-              </a:rPr>
-              <a:t>pos</a:t>
-            </a:r>
-            <a:r>
-              <a:rPr lang="sv-SE" sz="1400" dirty="0">
-                <a:solidFill>
-                  <a:schemeClr val="accent1">
-                    <a:lumMod val="75000"/>
-                  </a:schemeClr>
-                </a:solidFill>
-              </a:rPr>
-              <a:t>[1]] = </a:t>
-            </a:r>
-            <a:r>
-              <a:rPr lang="sv-SE" sz="1400" dirty="0" err="1">
-                <a:solidFill>
-                  <a:schemeClr val="accent1">
-                    <a:lumMod val="75000"/>
-                  </a:schemeClr>
-                </a:solidFill>
-              </a:rPr>
-              <a:t>null</a:t>
-            </a:r>
-            <a:r>
-              <a:rPr lang="sv-SE" sz="1400" dirty="0">
-                <a:solidFill>
-                  <a:schemeClr val="accent1">
-                    <a:lumMod val="75000"/>
-                  </a:schemeClr>
-                </a:solidFill>
-              </a:rPr>
-              <a:t>;</a:t>
-            </a:r>
-            <a:br>
-              <a:rPr lang="sv-SE" sz="1400" dirty="0">
-                <a:solidFill>
-                  <a:schemeClr val="accent1">
-                    <a:lumMod val="75000"/>
-                  </a:schemeClr>
-                </a:solidFill>
-              </a:rPr>
-            </a:br>
-            <a:r>
-              <a:rPr lang="sv-SE" sz="1400" dirty="0">
-                <a:solidFill>
-                  <a:schemeClr val="accent1">
-                    <a:lumMod val="75000"/>
-                  </a:schemeClr>
-                </a:solidFill>
-              </a:rPr>
-              <a:t>                </a:t>
-            </a:r>
-            <a:r>
-              <a:rPr lang="sv-SE" sz="1400" dirty="0" err="1">
-                <a:solidFill>
-                  <a:schemeClr val="accent1">
-                    <a:lumMod val="75000"/>
-                  </a:schemeClr>
-                </a:solidFill>
-              </a:rPr>
-              <a:t>map</a:t>
-            </a:r>
-            <a:r>
-              <a:rPr lang="sv-SE" sz="1400" dirty="0">
-                <a:solidFill>
-                  <a:schemeClr val="accent1">
-                    <a:lumMod val="75000"/>
-                  </a:schemeClr>
-                </a:solidFill>
-              </a:rPr>
-              <a:t>[</a:t>
-            </a:r>
-            <a:r>
-              <a:rPr lang="sv-SE" sz="1400" dirty="0" err="1">
-                <a:solidFill>
-                  <a:schemeClr val="accent1">
-                    <a:lumMod val="75000"/>
-                  </a:schemeClr>
-                </a:solidFill>
-              </a:rPr>
-              <a:t>pos</a:t>
-            </a:r>
-            <a:r>
-              <a:rPr lang="sv-SE" sz="1400" dirty="0">
-                <a:solidFill>
-                  <a:schemeClr val="accent1">
-                    <a:lumMod val="75000"/>
-                  </a:schemeClr>
-                </a:solidFill>
-              </a:rPr>
-              <a:t>[2]][</a:t>
-            </a:r>
-            <a:r>
-              <a:rPr lang="sv-SE" sz="1400" dirty="0" err="1">
-                <a:solidFill>
-                  <a:schemeClr val="accent1">
-                    <a:lumMod val="75000"/>
-                  </a:schemeClr>
-                </a:solidFill>
-              </a:rPr>
-              <a:t>pos</a:t>
-            </a:r>
-            <a:r>
-              <a:rPr lang="sv-SE" sz="1400" dirty="0">
-                <a:solidFill>
-                  <a:schemeClr val="accent1">
-                    <a:lumMod val="75000"/>
-                  </a:schemeClr>
-                </a:solidFill>
-              </a:rPr>
-              <a:t>[3]] = c;</a:t>
-            </a:r>
-            <a:br>
-              <a:rPr lang="sv-SE" sz="1400" dirty="0">
-                <a:solidFill>
-                  <a:schemeClr val="accent1">
-                    <a:lumMod val="75000"/>
-                  </a:schemeClr>
-                </a:solidFill>
-              </a:rPr>
-            </a:br>
-            <a:r>
-              <a:rPr lang="sv-SE" sz="1400" dirty="0">
-                <a:solidFill>
-                  <a:schemeClr val="accent1">
-                    <a:lumMod val="75000"/>
-                  </a:schemeClr>
-                </a:solidFill>
-              </a:rPr>
-              <a:t>                </a:t>
-            </a:r>
-            <a:r>
-              <a:rPr lang="sv-SE" sz="1400" dirty="0" err="1">
-                <a:solidFill>
-                  <a:schemeClr val="accent1">
-                    <a:lumMod val="75000"/>
-                  </a:schemeClr>
-                </a:solidFill>
-              </a:rPr>
-              <a:t>c.setPosition</a:t>
-            </a:r>
-            <a:r>
-              <a:rPr lang="sv-SE" sz="1400" dirty="0">
-                <a:solidFill>
-                  <a:schemeClr val="accent1">
-                    <a:lumMod val="75000"/>
-                  </a:schemeClr>
-                </a:solidFill>
-              </a:rPr>
-              <a:t>(</a:t>
-            </a:r>
-            <a:r>
-              <a:rPr lang="sv-SE" sz="1400" dirty="0" err="1">
-                <a:solidFill>
-                  <a:schemeClr val="accent1">
-                    <a:lumMod val="75000"/>
-                  </a:schemeClr>
-                </a:solidFill>
-              </a:rPr>
-              <a:t>pos</a:t>
-            </a:r>
-            <a:r>
-              <a:rPr lang="sv-SE" sz="1400" dirty="0">
-                <a:solidFill>
-                  <a:schemeClr val="accent1">
-                    <a:lumMod val="75000"/>
-                  </a:schemeClr>
-                </a:solidFill>
-              </a:rPr>
-              <a:t>[2], </a:t>
-            </a:r>
-            <a:r>
-              <a:rPr lang="sv-SE" sz="1400" dirty="0" err="1">
-                <a:solidFill>
-                  <a:schemeClr val="accent1">
-                    <a:lumMod val="75000"/>
-                  </a:schemeClr>
-                </a:solidFill>
-              </a:rPr>
-              <a:t>pos</a:t>
-            </a:r>
-            <a:r>
-              <a:rPr lang="sv-SE" sz="1400" dirty="0">
-                <a:solidFill>
-                  <a:schemeClr val="accent1">
-                    <a:lumMod val="75000"/>
-                  </a:schemeClr>
-                </a:solidFill>
-              </a:rPr>
-              <a:t>[3]);</a:t>
-            </a:r>
-            <a:br>
-              <a:rPr lang="sv-SE" sz="1400" dirty="0">
-                <a:solidFill>
-                  <a:schemeClr val="accent1">
-                    <a:lumMod val="75000"/>
-                  </a:schemeClr>
-                </a:solidFill>
-              </a:rPr>
-            </a:br>
-            <a:r>
-              <a:rPr lang="sv-SE" sz="1400" dirty="0">
-                <a:solidFill>
-                  <a:schemeClr val="accent1">
-                    <a:lumMod val="75000"/>
-                  </a:schemeClr>
-                </a:solidFill>
-              </a:rPr>
-              <a:t>            }</a:t>
-            </a:r>
-            <a:br>
-              <a:rPr lang="sv-SE" sz="1400" dirty="0">
-                <a:solidFill>
-                  <a:schemeClr val="accent1">
-                    <a:lumMod val="75000"/>
-                  </a:schemeClr>
-                </a:solidFill>
-              </a:rPr>
-            </a:br>
-            <a:r>
-              <a:rPr lang="sv-SE" sz="1400" dirty="0">
-                <a:solidFill>
-                  <a:schemeClr val="accent1">
-                    <a:lumMod val="75000"/>
-                  </a:schemeClr>
-                </a:solidFill>
-              </a:rPr>
-              <a:t>        }</a:t>
-            </a:r>
-            <a:br>
-              <a:rPr lang="sv-SE" sz="1400" dirty="0">
-                <a:solidFill>
-                  <a:schemeClr val="accent1">
-                    <a:lumMod val="75000"/>
-                  </a:schemeClr>
-                </a:solidFill>
-              </a:rPr>
-            </a:br>
-            <a:r>
-              <a:rPr lang="sv-SE" sz="1400" dirty="0">
-                <a:solidFill>
-                  <a:schemeClr val="accent1">
-                    <a:lumMod val="75000"/>
-                  </a:schemeClr>
-                </a:solidFill>
-              </a:rPr>
-              <a:t>    }</a:t>
-            </a:r>
-            <a:br>
-              <a:rPr lang="sv-SE" sz="1400" dirty="0">
-                <a:solidFill>
-                  <a:schemeClr val="accent1">
-                    <a:lumMod val="75000"/>
-                  </a:schemeClr>
-                </a:solidFill>
-              </a:rPr>
-            </a:br>
-            <a:r>
-              <a:rPr lang="sv-SE" sz="1400" dirty="0">
-                <a:solidFill>
-                  <a:schemeClr val="accent1">
-                    <a:lumMod val="75000"/>
-                  </a:schemeClr>
+              <a:rPr lang="sv-SE" sz="1500" dirty="0">
+                <a:solidFill>
+                  <a:srgbClr val="0070C0"/>
                 </a:solidFill>
               </a:rPr>
               <a:t>}</a:t>
@@ -15663,7 +14580,7 @@
     </p:custDataLst>
     <p:extLst>
       <p:ext uri="{BB962C8B-B14F-4D97-AF65-F5344CB8AC3E}">
-        <p14:creationId xmlns:p14="http://schemas.microsoft.com/office/powerpoint/2010/main" val="593016741"/>
+        <p14:creationId xmlns:p14="http://schemas.microsoft.com/office/powerpoint/2010/main" val="1013014165"/>
       </p:ext>
     </p:extLst>
   </p:cSld>
@@ -20333,42 +19250,6 @@
           </a:p>
         </p:txBody>
       </p:sp>
-      <p:pic>
-        <p:nvPicPr>
-          <p:cNvPr id="13" name="Platshållare för bild 12">
-            <a:extLst>
-              <a:ext uri="{FF2B5EF4-FFF2-40B4-BE49-F238E27FC236}">
-                <a16:creationId xmlns:a16="http://schemas.microsoft.com/office/drawing/2014/main" id="{916DB166-5CF7-1044-A24D-D093AD43B49C}"/>
-              </a:ext>
-            </a:extLst>
-          </p:cNvPr>
-          <p:cNvPicPr>
-            <a:picLocks noGrp="1" noChangeAspect="1"/>
-          </p:cNvPicPr>
-          <p:nvPr>
-            <p:ph type="pic" idx="1"/>
-          </p:nvPr>
-        </p:nvPicPr>
-        <p:blipFill>
-          <a:blip r:embed="rId4">
-            <a:extLst>
-              <a:ext uri="{28A0092B-C50C-407E-A947-70E740481C1C}">
-                <a14:useLocalDpi xmlns:a14="http://schemas.microsoft.com/office/drawing/2010/main" val="0"/>
-              </a:ext>
-            </a:extLst>
-          </a:blip>
-          <a:srcRect l="1821" r="1821"/>
-          <a:stretch>
-            <a:fillRect/>
-          </a:stretch>
-        </p:blipFill>
-        <p:spPr>
-          <a:xfrm>
-            <a:off x="4965149" y="2208846"/>
-            <a:ext cx="6950927" cy="2808503"/>
-          </a:xfrm>
-        </p:spPr>
-      </p:pic>
       <p:sp>
         <p:nvSpPr>
           <p:cNvPr id="3" name="TextBox 2">
@@ -20384,7 +19265,7 @@
         <p:spPr>
           <a:xfrm>
             <a:off x="1060803" y="2274838"/>
-            <a:ext cx="3650312" cy="2246769"/>
+            <a:ext cx="3650312" cy="2554545"/>
           </a:xfrm>
           <a:prstGeom prst="rect">
             <a:avLst/>
@@ -20412,13 +19293,13 @@
           <a:p>
             <a:r>
               <a:rPr lang="sv-SE" sz="2000" dirty="0"/>
-              <a:t>     - felaktig get-metod </a:t>
+              <a:t>     - Felaktig get-metod </a:t>
             </a:r>
           </a:p>
           <a:p>
             <a:r>
               <a:rPr lang="sv-SE" sz="2000" dirty="0"/>
-              <a:t>     - icke-använda fält</a:t>
+              <a:t>     - Icke-använda fält</a:t>
             </a:r>
           </a:p>
           <a:p>
@@ -20428,7 +19309,7 @@
             </a:pPr>
             <a:r>
               <a:rPr lang="sv-SE" sz="2000" dirty="0"/>
-              <a:t>TODO</a:t>
+              <a:t>Fixat TODO</a:t>
             </a:r>
           </a:p>
           <a:p>
@@ -20443,6 +19324,16 @@
             <a:r>
               <a:rPr lang="sv-SE" sz="2000" dirty="0"/>
               <a:t> ej fixat</a:t>
+            </a:r>
+          </a:p>
+          <a:p>
+            <a:pPr marL="285750" indent="-285750">
+              <a:buFont typeface="Arial" panose="020B0604020202020204" pitchFamily="34" charset="0"/>
+              <a:buChar char="•"/>
+            </a:pPr>
+            <a:r>
+              <a:rPr lang="sv-SE" sz="2000" dirty="0"/>
+              <a:t>Inre klass har lagts till</a:t>
             </a:r>
           </a:p>
           <a:p>
@@ -20454,69 +19345,42 @@
           </a:p>
         </p:txBody>
       </p:sp>
-      <p:sp>
-        <p:nvSpPr>
-          <p:cNvPr id="4" name="textruta 3">
+      <p:pic>
+        <p:nvPicPr>
+          <p:cNvPr id="8" name="Bildobjekt 7">
             <a:extLst>
               <a:ext uri="{FF2B5EF4-FFF2-40B4-BE49-F238E27FC236}">
-                <a16:creationId xmlns:a16="http://schemas.microsoft.com/office/drawing/2014/main" id="{7C3EFF06-01CF-49D3-8372-E63FAE765BAC}"/>
+                <a16:creationId xmlns:a16="http://schemas.microsoft.com/office/drawing/2014/main" id="{E4275DB3-826A-47D7-881A-EF10E632EF3B}"/>
               </a:ext>
             </a:extLst>
           </p:cNvPr>
-          <p:cNvSpPr txBox="1"/>
+          <p:cNvPicPr>
+            <a:picLocks noChangeAspect="1"/>
+          </p:cNvPicPr>
           <p:nvPr/>
-        </p:nvSpPr>
+        </p:nvPicPr>
+        <p:blipFill>
+          <a:blip r:embed="rId4">
+            <a:extLst>
+              <a:ext uri="{28A0092B-C50C-407E-A947-70E740481C1C}">
+                <a14:useLocalDpi xmlns:a14="http://schemas.microsoft.com/office/drawing/2010/main" val="0"/>
+              </a:ext>
+            </a:extLst>
+          </a:blip>
+          <a:stretch>
+            <a:fillRect/>
+          </a:stretch>
+        </p:blipFill>
         <p:spPr>
           <a:xfrm>
-            <a:off x="6226688" y="3128940"/>
-            <a:ext cx="4301836" cy="707886"/>
+            <a:off x="5086519" y="2484270"/>
+            <a:ext cx="6696465" cy="1889459"/>
           </a:xfrm>
           <a:prstGeom prst="rect">
             <a:avLst/>
           </a:prstGeom>
-          <a:noFill/>
         </p:spPr>
-        <p:txBody>
-          <a:bodyPr wrap="square" rtlCol="0">
-            <a:spAutoFit/>
-          </a:bodyPr>
-          <a:lstStyle/>
-          <a:p>
-            <a:r>
-              <a:rPr lang="en-US" sz="4000" dirty="0" err="1">
-                <a:solidFill>
-                  <a:srgbClr val="FF0000"/>
-                </a:solidFill>
-              </a:rPr>
-              <a:t>Bilden</a:t>
-            </a:r>
-            <a:r>
-              <a:rPr lang="en-US" sz="4000" dirty="0">
-                <a:solidFill>
-                  <a:srgbClr val="FF0000"/>
-                </a:solidFill>
-              </a:rPr>
-              <a:t> ska </a:t>
-            </a:r>
-            <a:r>
-              <a:rPr lang="en-US" sz="4000" dirty="0" err="1">
-                <a:solidFill>
-                  <a:srgbClr val="FF0000"/>
-                </a:solidFill>
-              </a:rPr>
-              <a:t>bytas</a:t>
-            </a:r>
-            <a:r>
-              <a:rPr lang="en-US" sz="4000" dirty="0">
-                <a:solidFill>
-                  <a:srgbClr val="FF0000"/>
-                </a:solidFill>
-              </a:rPr>
-              <a:t>!</a:t>
-            </a:r>
-          </a:p>
-        </p:txBody>
-      </p:sp>
+      </p:pic>
     </p:spTree>
     <p:custDataLst>
       <p:tags r:id="rId1"/>

</xml_diff>